<commit_message>
Slide com os integrantes+fotos de cada um
</commit_message>
<xml_diff>
--- a/Pitch-SavvyFix.pptx
+++ b/Pitch-SavvyFix.pptx
@@ -5,24 +5,30 @@
     <p:sldMasterId id="2147483683" r:id="rId1"/>
   </p:sldMasterIdLst>
   <p:notesMasterIdLst>
-    <p:notesMasterId r:id="rId4"/>
+    <p:notesMasterId r:id="rId5"/>
   </p:notesMasterIdLst>
   <p:sldIdLst>
     <p:sldId id="256" r:id="rId2"/>
-    <p:sldId id="281" r:id="rId3"/>
+    <p:sldId id="289" r:id="rId3"/>
+    <p:sldId id="281" r:id="rId4"/>
   </p:sldIdLst>
   <p:sldSz cx="9144000" cy="5143500" type="screen16x9"/>
   <p:notesSz cx="6858000" cy="9144000"/>
   <p:embeddedFontLst>
     <p:embeddedFont>
       <p:font typeface="Inter" panose="020B0604020202020204" charset="0"/>
-      <p:regular r:id="rId5"/>
-      <p:bold r:id="rId6"/>
+      <p:regular r:id="rId6"/>
+      <p:bold r:id="rId7"/>
     </p:embeddedFont>
     <p:embeddedFont>
       <p:font typeface="Manrope Medium" panose="020B0604020202020204" charset="0"/>
-      <p:regular r:id="rId7"/>
-      <p:bold r:id="rId8"/>
+      <p:regular r:id="rId8"/>
+      <p:bold r:id="rId9"/>
+    </p:embeddedFont>
+    <p:embeddedFont>
+      <p:font typeface="Manrope SemiBold" panose="020B0604020202020204" charset="0"/>
+      <p:regular r:id="rId10"/>
+      <p:bold r:id="rId11"/>
     </p:embeddedFont>
   </p:embeddedFontLst>
   <p:defaultTextStyle>
@@ -812,6 +818,110 @@
   <p:cSld>
     <p:spTree>
       <p:nvGrpSpPr>
+        <p:cNvPr id="1" name="Shape 2558"/>
+        <p:cNvGrpSpPr/>
+        <p:nvPr/>
+      </p:nvGrpSpPr>
+      <p:grpSpPr>
+        <a:xfrm>
+          <a:off x="0" y="0"/>
+          <a:ext cx="0" cy="0"/>
+          <a:chOff x="0" y="0"/>
+          <a:chExt cx="0" cy="0"/>
+        </a:xfrm>
+      </p:grpSpPr>
+      <p:sp>
+        <p:nvSpPr>
+          <p:cNvPr id="2559" name="Google Shape;2559;g238dfbb53c3_0_8509:notes"/>
+          <p:cNvSpPr>
+            <a:spLocks noGrp="1" noRot="1" noChangeAspect="1"/>
+          </p:cNvSpPr>
+          <p:nvPr>
+            <p:ph type="sldImg" idx="2"/>
+          </p:nvPr>
+        </p:nvSpPr>
+        <p:spPr>
+          <a:xfrm>
+            <a:off x="381000" y="685800"/>
+            <a:ext cx="6096000" cy="3429000"/>
+          </a:xfrm>
+          <a:custGeom>
+            <a:avLst/>
+            <a:gdLst/>
+            <a:ahLst/>
+            <a:cxnLst/>
+            <a:rect l="l" t="t" r="r" b="b"/>
+            <a:pathLst>
+              <a:path w="120000" h="120000" extrusionOk="0">
+                <a:moveTo>
+                  <a:pt x="0" y="0"/>
+                </a:moveTo>
+                <a:lnTo>
+                  <a:pt x="120000" y="0"/>
+                </a:lnTo>
+                <a:lnTo>
+                  <a:pt x="120000" y="120000"/>
+                </a:lnTo>
+                <a:lnTo>
+                  <a:pt x="0" y="120000"/>
+                </a:lnTo>
+                <a:close/>
+              </a:path>
+            </a:pathLst>
+          </a:custGeom>
+        </p:spPr>
+      </p:sp>
+      <p:sp>
+        <p:nvSpPr>
+          <p:cNvPr id="2560" name="Google Shape;2560;g238dfbb53c3_0_8509:notes"/>
+          <p:cNvSpPr txBox="1">
+            <a:spLocks noGrp="1"/>
+          </p:cNvSpPr>
+          <p:nvPr>
+            <p:ph type="body" idx="1"/>
+          </p:nvPr>
+        </p:nvSpPr>
+        <p:spPr>
+          <a:xfrm>
+            <a:off x="685800" y="4343400"/>
+            <a:ext cx="5486400" cy="4114800"/>
+          </a:xfrm>
+          <a:prstGeom prst="rect">
+            <a:avLst/>
+          </a:prstGeom>
+        </p:spPr>
+        <p:txBody>
+          <a:bodyPr spcFirstLastPara="1" wrap="square" lIns="91425" tIns="91425" rIns="91425" bIns="91425" anchor="t" anchorCtr="0">
+            <a:noAutofit/>
+          </a:bodyPr>
+          <a:lstStyle/>
+          <a:p>
+            <a:pPr marL="0" lvl="0" indent="0" algn="l" rtl="0">
+              <a:spcBef>
+                <a:spcPts val="0"/>
+              </a:spcBef>
+              <a:spcAft>
+                <a:spcPts val="0"/>
+              </a:spcAft>
+              <a:buNone/>
+            </a:pPr>
+            <a:endParaRPr/>
+          </a:p>
+        </p:txBody>
+      </p:sp>
+    </p:spTree>
+  </p:cSld>
+  <p:clrMapOvr>
+    <a:masterClrMapping/>
+  </p:clrMapOvr>
+</p:notes>
+</file>
+
+<file path=ppt/notesSlides/notesSlide3.xml><?xml version="1.0" encoding="utf-8"?>
+<p:notes xmlns:a="http://schemas.openxmlformats.org/drawingml/2006/main" xmlns:r="http://schemas.openxmlformats.org/officeDocument/2006/relationships" xmlns:p="http://schemas.openxmlformats.org/presentationml/2006/main" showMasterSp="0" showMasterPhAnim="0">
+  <p:cSld>
+    <p:spTree>
+      <p:nvGrpSpPr>
         <p:cNvPr id="1" name="Shape 2409"/>
         <p:cNvGrpSpPr/>
         <p:nvPr/>
@@ -6356,6 +6466,3172 @@
 </file>
 
 <file path=ppt/slideLayouts/slideLayout4.xml><?xml version="1.0" encoding="utf-8"?>
+<p:sldLayout xmlns:a="http://schemas.openxmlformats.org/drawingml/2006/main" xmlns:r="http://schemas.openxmlformats.org/officeDocument/2006/relationships" xmlns:p="http://schemas.openxmlformats.org/presentationml/2006/main" matchingName="Title and three columns 1">
+  <p:cSld name="CUSTOM_5">
+    <p:spTree>
+      <p:nvGrpSpPr>
+        <p:cNvPr id="1" name="Shape 1222"/>
+        <p:cNvGrpSpPr/>
+        <p:nvPr/>
+      </p:nvGrpSpPr>
+      <p:grpSpPr>
+        <a:xfrm>
+          <a:off x="0" y="0"/>
+          <a:ext cx="0" cy="0"/>
+          <a:chOff x="0" y="0"/>
+          <a:chExt cx="0" cy="0"/>
+        </a:xfrm>
+      </p:grpSpPr>
+      <p:sp>
+        <p:nvSpPr>
+          <p:cNvPr id="1223" name="Google Shape;1223;p28"/>
+          <p:cNvSpPr txBox="1">
+            <a:spLocks noGrp="1"/>
+          </p:cNvSpPr>
+          <p:nvPr>
+            <p:ph type="title"/>
+          </p:nvPr>
+        </p:nvSpPr>
+        <p:spPr>
+          <a:xfrm>
+            <a:off x="713225" y="520925"/>
+            <a:ext cx="7717500" cy="708000"/>
+          </a:xfrm>
+          <a:prstGeom prst="rect">
+            <a:avLst/>
+          </a:prstGeom>
+        </p:spPr>
+        <p:txBody>
+          <a:bodyPr spcFirstLastPara="1" wrap="square" lIns="91425" tIns="91425" rIns="91425" bIns="91425" anchor="t" anchorCtr="0">
+            <a:noAutofit/>
+          </a:bodyPr>
+          <a:lstStyle>
+            <a:lvl1pPr lvl="0">
+              <a:spcBef>
+                <a:spcPts val="0"/>
+              </a:spcBef>
+              <a:spcAft>
+                <a:spcPts val="0"/>
+              </a:spcAft>
+              <a:buSzPts val="3200"/>
+              <a:buNone/>
+              <a:defRPr/>
+            </a:lvl1pPr>
+            <a:lvl2pPr lvl="1">
+              <a:spcBef>
+                <a:spcPts val="0"/>
+              </a:spcBef>
+              <a:spcAft>
+                <a:spcPts val="0"/>
+              </a:spcAft>
+              <a:buSzPts val="3200"/>
+              <a:buNone/>
+              <a:defRPr/>
+            </a:lvl2pPr>
+            <a:lvl3pPr lvl="2">
+              <a:spcBef>
+                <a:spcPts val="0"/>
+              </a:spcBef>
+              <a:spcAft>
+                <a:spcPts val="0"/>
+              </a:spcAft>
+              <a:buSzPts val="3200"/>
+              <a:buNone/>
+              <a:defRPr/>
+            </a:lvl3pPr>
+            <a:lvl4pPr lvl="3">
+              <a:spcBef>
+                <a:spcPts val="0"/>
+              </a:spcBef>
+              <a:spcAft>
+                <a:spcPts val="0"/>
+              </a:spcAft>
+              <a:buSzPts val="3200"/>
+              <a:buNone/>
+              <a:defRPr/>
+            </a:lvl4pPr>
+            <a:lvl5pPr lvl="4">
+              <a:spcBef>
+                <a:spcPts val="0"/>
+              </a:spcBef>
+              <a:spcAft>
+                <a:spcPts val="0"/>
+              </a:spcAft>
+              <a:buSzPts val="3200"/>
+              <a:buNone/>
+              <a:defRPr/>
+            </a:lvl5pPr>
+            <a:lvl6pPr lvl="5">
+              <a:spcBef>
+                <a:spcPts val="0"/>
+              </a:spcBef>
+              <a:spcAft>
+                <a:spcPts val="0"/>
+              </a:spcAft>
+              <a:buSzPts val="3200"/>
+              <a:buNone/>
+              <a:defRPr/>
+            </a:lvl6pPr>
+            <a:lvl7pPr lvl="6">
+              <a:spcBef>
+                <a:spcPts val="0"/>
+              </a:spcBef>
+              <a:spcAft>
+                <a:spcPts val="0"/>
+              </a:spcAft>
+              <a:buSzPts val="3200"/>
+              <a:buNone/>
+              <a:defRPr/>
+            </a:lvl7pPr>
+            <a:lvl8pPr lvl="7">
+              <a:spcBef>
+                <a:spcPts val="0"/>
+              </a:spcBef>
+              <a:spcAft>
+                <a:spcPts val="0"/>
+              </a:spcAft>
+              <a:buSzPts val="3200"/>
+              <a:buNone/>
+              <a:defRPr/>
+            </a:lvl8pPr>
+            <a:lvl9pPr lvl="8">
+              <a:spcBef>
+                <a:spcPts val="0"/>
+              </a:spcBef>
+              <a:spcAft>
+                <a:spcPts val="0"/>
+              </a:spcAft>
+              <a:buSzPts val="3200"/>
+              <a:buNone/>
+              <a:defRPr/>
+            </a:lvl9pPr>
+          </a:lstStyle>
+          <a:p>
+            <a:endParaRPr/>
+          </a:p>
+        </p:txBody>
+      </p:sp>
+      <p:sp>
+        <p:nvSpPr>
+          <p:cNvPr id="1224" name="Google Shape;1224;p28"/>
+          <p:cNvSpPr txBox="1">
+            <a:spLocks noGrp="1"/>
+          </p:cNvSpPr>
+          <p:nvPr>
+            <p:ph type="subTitle" idx="1"/>
+          </p:nvPr>
+        </p:nvSpPr>
+        <p:spPr>
+          <a:xfrm>
+            <a:off x="713225" y="3465499"/>
+            <a:ext cx="2262600" cy="615600"/>
+          </a:xfrm>
+          <a:prstGeom prst="rect">
+            <a:avLst/>
+          </a:prstGeom>
+        </p:spPr>
+        <p:txBody>
+          <a:bodyPr spcFirstLastPara="1" wrap="square" lIns="91425" tIns="91425" rIns="91425" bIns="91425" anchor="t" anchorCtr="0">
+            <a:noAutofit/>
+          </a:bodyPr>
+          <a:lstStyle>
+            <a:lvl1pPr lvl="0" algn="ctr" rtl="0">
+              <a:lnSpc>
+                <a:spcPct val="100000"/>
+              </a:lnSpc>
+              <a:spcBef>
+                <a:spcPts val="0"/>
+              </a:spcBef>
+              <a:spcAft>
+                <a:spcPts val="0"/>
+              </a:spcAft>
+              <a:buSzPts val="1200"/>
+              <a:buNone/>
+              <a:defRPr/>
+            </a:lvl1pPr>
+            <a:lvl2pPr lvl="1" algn="ctr" rtl="0">
+              <a:lnSpc>
+                <a:spcPct val="100000"/>
+              </a:lnSpc>
+              <a:spcBef>
+                <a:spcPts val="0"/>
+              </a:spcBef>
+              <a:spcAft>
+                <a:spcPts val="0"/>
+              </a:spcAft>
+              <a:buSzPts val="1200"/>
+              <a:buNone/>
+              <a:defRPr/>
+            </a:lvl2pPr>
+            <a:lvl3pPr lvl="2" algn="ctr" rtl="0">
+              <a:lnSpc>
+                <a:spcPct val="100000"/>
+              </a:lnSpc>
+              <a:spcBef>
+                <a:spcPts val="0"/>
+              </a:spcBef>
+              <a:spcAft>
+                <a:spcPts val="0"/>
+              </a:spcAft>
+              <a:buSzPts val="1200"/>
+              <a:buNone/>
+              <a:defRPr/>
+            </a:lvl3pPr>
+            <a:lvl4pPr lvl="3" algn="ctr" rtl="0">
+              <a:lnSpc>
+                <a:spcPct val="100000"/>
+              </a:lnSpc>
+              <a:spcBef>
+                <a:spcPts val="0"/>
+              </a:spcBef>
+              <a:spcAft>
+                <a:spcPts val="0"/>
+              </a:spcAft>
+              <a:buSzPts val="1200"/>
+              <a:buNone/>
+              <a:defRPr/>
+            </a:lvl4pPr>
+            <a:lvl5pPr lvl="4" algn="ctr" rtl="0">
+              <a:lnSpc>
+                <a:spcPct val="100000"/>
+              </a:lnSpc>
+              <a:spcBef>
+                <a:spcPts val="0"/>
+              </a:spcBef>
+              <a:spcAft>
+                <a:spcPts val="0"/>
+              </a:spcAft>
+              <a:buSzPts val="1200"/>
+              <a:buNone/>
+              <a:defRPr/>
+            </a:lvl5pPr>
+            <a:lvl6pPr lvl="5" algn="ctr" rtl="0">
+              <a:lnSpc>
+                <a:spcPct val="100000"/>
+              </a:lnSpc>
+              <a:spcBef>
+                <a:spcPts val="0"/>
+              </a:spcBef>
+              <a:spcAft>
+                <a:spcPts val="0"/>
+              </a:spcAft>
+              <a:buSzPts val="1200"/>
+              <a:buNone/>
+              <a:defRPr/>
+            </a:lvl6pPr>
+            <a:lvl7pPr lvl="6" algn="ctr" rtl="0">
+              <a:lnSpc>
+                <a:spcPct val="100000"/>
+              </a:lnSpc>
+              <a:spcBef>
+                <a:spcPts val="0"/>
+              </a:spcBef>
+              <a:spcAft>
+                <a:spcPts val="0"/>
+              </a:spcAft>
+              <a:buSzPts val="1200"/>
+              <a:buNone/>
+              <a:defRPr/>
+            </a:lvl7pPr>
+            <a:lvl8pPr lvl="7" algn="ctr" rtl="0">
+              <a:lnSpc>
+                <a:spcPct val="100000"/>
+              </a:lnSpc>
+              <a:spcBef>
+                <a:spcPts val="0"/>
+              </a:spcBef>
+              <a:spcAft>
+                <a:spcPts val="0"/>
+              </a:spcAft>
+              <a:buSzPts val="1200"/>
+              <a:buNone/>
+              <a:defRPr/>
+            </a:lvl8pPr>
+            <a:lvl9pPr lvl="8" algn="ctr" rtl="0">
+              <a:lnSpc>
+                <a:spcPct val="100000"/>
+              </a:lnSpc>
+              <a:spcBef>
+                <a:spcPts val="0"/>
+              </a:spcBef>
+              <a:spcAft>
+                <a:spcPts val="0"/>
+              </a:spcAft>
+              <a:buSzPts val="1200"/>
+              <a:buNone/>
+              <a:defRPr/>
+            </a:lvl9pPr>
+          </a:lstStyle>
+          <a:p>
+            <a:endParaRPr/>
+          </a:p>
+        </p:txBody>
+      </p:sp>
+      <p:sp>
+        <p:nvSpPr>
+          <p:cNvPr id="1225" name="Google Shape;1225;p28"/>
+          <p:cNvSpPr txBox="1">
+            <a:spLocks noGrp="1"/>
+          </p:cNvSpPr>
+          <p:nvPr>
+            <p:ph type="subTitle" idx="2"/>
+          </p:nvPr>
+        </p:nvSpPr>
+        <p:spPr>
+          <a:xfrm>
+            <a:off x="713225" y="2996438"/>
+            <a:ext cx="2262600" cy="554100"/>
+          </a:xfrm>
+          <a:prstGeom prst="rect">
+            <a:avLst/>
+          </a:prstGeom>
+        </p:spPr>
+        <p:txBody>
+          <a:bodyPr spcFirstLastPara="1" wrap="square" lIns="91425" tIns="91425" rIns="91425" bIns="91425" anchor="b" anchorCtr="0">
+            <a:noAutofit/>
+          </a:bodyPr>
+          <a:lstStyle>
+            <a:lvl1pPr lvl="0" algn="ctr" rtl="0">
+              <a:lnSpc>
+                <a:spcPct val="100000"/>
+              </a:lnSpc>
+              <a:spcBef>
+                <a:spcPts val="0"/>
+              </a:spcBef>
+              <a:spcAft>
+                <a:spcPts val="0"/>
+              </a:spcAft>
+              <a:buSzPts val="2400"/>
+              <a:buFont typeface="Manrope SemiBold"/>
+              <a:buNone/>
+              <a:defRPr sz="2400">
+                <a:latin typeface="Manrope SemiBold"/>
+                <a:ea typeface="Manrope SemiBold"/>
+                <a:cs typeface="Manrope SemiBold"/>
+                <a:sym typeface="Manrope SemiBold"/>
+              </a:defRPr>
+            </a:lvl1pPr>
+            <a:lvl2pPr lvl="1" algn="ctr" rtl="0">
+              <a:lnSpc>
+                <a:spcPct val="100000"/>
+              </a:lnSpc>
+              <a:spcBef>
+                <a:spcPts val="0"/>
+              </a:spcBef>
+              <a:spcAft>
+                <a:spcPts val="0"/>
+              </a:spcAft>
+              <a:buSzPts val="2400"/>
+              <a:buFont typeface="Manrope SemiBold"/>
+              <a:buNone/>
+              <a:defRPr sz="2400">
+                <a:latin typeface="Manrope SemiBold"/>
+                <a:ea typeface="Manrope SemiBold"/>
+                <a:cs typeface="Manrope SemiBold"/>
+                <a:sym typeface="Manrope SemiBold"/>
+              </a:defRPr>
+            </a:lvl2pPr>
+            <a:lvl3pPr lvl="2" algn="ctr" rtl="0">
+              <a:lnSpc>
+                <a:spcPct val="100000"/>
+              </a:lnSpc>
+              <a:spcBef>
+                <a:spcPts val="0"/>
+              </a:spcBef>
+              <a:spcAft>
+                <a:spcPts val="0"/>
+              </a:spcAft>
+              <a:buSzPts val="2400"/>
+              <a:buFont typeface="Manrope SemiBold"/>
+              <a:buNone/>
+              <a:defRPr sz="2400">
+                <a:latin typeface="Manrope SemiBold"/>
+                <a:ea typeface="Manrope SemiBold"/>
+                <a:cs typeface="Manrope SemiBold"/>
+                <a:sym typeface="Manrope SemiBold"/>
+              </a:defRPr>
+            </a:lvl3pPr>
+            <a:lvl4pPr lvl="3" algn="ctr" rtl="0">
+              <a:lnSpc>
+                <a:spcPct val="100000"/>
+              </a:lnSpc>
+              <a:spcBef>
+                <a:spcPts val="0"/>
+              </a:spcBef>
+              <a:spcAft>
+                <a:spcPts val="0"/>
+              </a:spcAft>
+              <a:buSzPts val="2400"/>
+              <a:buFont typeface="Manrope SemiBold"/>
+              <a:buNone/>
+              <a:defRPr sz="2400">
+                <a:latin typeface="Manrope SemiBold"/>
+                <a:ea typeface="Manrope SemiBold"/>
+                <a:cs typeface="Manrope SemiBold"/>
+                <a:sym typeface="Manrope SemiBold"/>
+              </a:defRPr>
+            </a:lvl4pPr>
+            <a:lvl5pPr lvl="4" algn="ctr" rtl="0">
+              <a:lnSpc>
+                <a:spcPct val="100000"/>
+              </a:lnSpc>
+              <a:spcBef>
+                <a:spcPts val="0"/>
+              </a:spcBef>
+              <a:spcAft>
+                <a:spcPts val="0"/>
+              </a:spcAft>
+              <a:buSzPts val="2400"/>
+              <a:buFont typeface="Manrope SemiBold"/>
+              <a:buNone/>
+              <a:defRPr sz="2400">
+                <a:latin typeface="Manrope SemiBold"/>
+                <a:ea typeface="Manrope SemiBold"/>
+                <a:cs typeface="Manrope SemiBold"/>
+                <a:sym typeface="Manrope SemiBold"/>
+              </a:defRPr>
+            </a:lvl5pPr>
+            <a:lvl6pPr lvl="5" algn="ctr" rtl="0">
+              <a:lnSpc>
+                <a:spcPct val="100000"/>
+              </a:lnSpc>
+              <a:spcBef>
+                <a:spcPts val="0"/>
+              </a:spcBef>
+              <a:spcAft>
+                <a:spcPts val="0"/>
+              </a:spcAft>
+              <a:buSzPts val="2400"/>
+              <a:buFont typeface="Manrope SemiBold"/>
+              <a:buNone/>
+              <a:defRPr sz="2400">
+                <a:latin typeface="Manrope SemiBold"/>
+                <a:ea typeface="Manrope SemiBold"/>
+                <a:cs typeface="Manrope SemiBold"/>
+                <a:sym typeface="Manrope SemiBold"/>
+              </a:defRPr>
+            </a:lvl6pPr>
+            <a:lvl7pPr lvl="6" algn="ctr" rtl="0">
+              <a:lnSpc>
+                <a:spcPct val="100000"/>
+              </a:lnSpc>
+              <a:spcBef>
+                <a:spcPts val="0"/>
+              </a:spcBef>
+              <a:spcAft>
+                <a:spcPts val="0"/>
+              </a:spcAft>
+              <a:buSzPts val="2400"/>
+              <a:buFont typeface="Manrope SemiBold"/>
+              <a:buNone/>
+              <a:defRPr sz="2400">
+                <a:latin typeface="Manrope SemiBold"/>
+                <a:ea typeface="Manrope SemiBold"/>
+                <a:cs typeface="Manrope SemiBold"/>
+                <a:sym typeface="Manrope SemiBold"/>
+              </a:defRPr>
+            </a:lvl7pPr>
+            <a:lvl8pPr lvl="7" algn="ctr" rtl="0">
+              <a:lnSpc>
+                <a:spcPct val="100000"/>
+              </a:lnSpc>
+              <a:spcBef>
+                <a:spcPts val="0"/>
+              </a:spcBef>
+              <a:spcAft>
+                <a:spcPts val="0"/>
+              </a:spcAft>
+              <a:buSzPts val="2400"/>
+              <a:buFont typeface="Manrope SemiBold"/>
+              <a:buNone/>
+              <a:defRPr sz="2400">
+                <a:latin typeface="Manrope SemiBold"/>
+                <a:ea typeface="Manrope SemiBold"/>
+                <a:cs typeface="Manrope SemiBold"/>
+                <a:sym typeface="Manrope SemiBold"/>
+              </a:defRPr>
+            </a:lvl8pPr>
+            <a:lvl9pPr lvl="8" algn="ctr" rtl="0">
+              <a:lnSpc>
+                <a:spcPct val="100000"/>
+              </a:lnSpc>
+              <a:spcBef>
+                <a:spcPts val="0"/>
+              </a:spcBef>
+              <a:spcAft>
+                <a:spcPts val="0"/>
+              </a:spcAft>
+              <a:buSzPts val="2400"/>
+              <a:buFont typeface="Manrope SemiBold"/>
+              <a:buNone/>
+              <a:defRPr sz="2400">
+                <a:latin typeface="Manrope SemiBold"/>
+                <a:ea typeface="Manrope SemiBold"/>
+                <a:cs typeface="Manrope SemiBold"/>
+                <a:sym typeface="Manrope SemiBold"/>
+              </a:defRPr>
+            </a:lvl9pPr>
+          </a:lstStyle>
+          <a:p>
+            <a:endParaRPr/>
+          </a:p>
+        </p:txBody>
+      </p:sp>
+      <p:sp>
+        <p:nvSpPr>
+          <p:cNvPr id="1226" name="Google Shape;1226;p28"/>
+          <p:cNvSpPr txBox="1">
+            <a:spLocks noGrp="1"/>
+          </p:cNvSpPr>
+          <p:nvPr>
+            <p:ph type="subTitle" idx="3"/>
+          </p:nvPr>
+        </p:nvSpPr>
+        <p:spPr>
+          <a:xfrm>
+            <a:off x="6168175" y="3465499"/>
+            <a:ext cx="2262600" cy="615600"/>
+          </a:xfrm>
+          <a:prstGeom prst="rect">
+            <a:avLst/>
+          </a:prstGeom>
+        </p:spPr>
+        <p:txBody>
+          <a:bodyPr spcFirstLastPara="1" wrap="square" lIns="91425" tIns="91425" rIns="91425" bIns="91425" anchor="t" anchorCtr="0">
+            <a:noAutofit/>
+          </a:bodyPr>
+          <a:lstStyle>
+            <a:lvl1pPr lvl="0" algn="ctr" rtl="0">
+              <a:lnSpc>
+                <a:spcPct val="100000"/>
+              </a:lnSpc>
+              <a:spcBef>
+                <a:spcPts val="0"/>
+              </a:spcBef>
+              <a:spcAft>
+                <a:spcPts val="0"/>
+              </a:spcAft>
+              <a:buSzPts val="1200"/>
+              <a:buNone/>
+              <a:defRPr/>
+            </a:lvl1pPr>
+            <a:lvl2pPr lvl="1" algn="ctr" rtl="0">
+              <a:lnSpc>
+                <a:spcPct val="100000"/>
+              </a:lnSpc>
+              <a:spcBef>
+                <a:spcPts val="0"/>
+              </a:spcBef>
+              <a:spcAft>
+                <a:spcPts val="0"/>
+              </a:spcAft>
+              <a:buSzPts val="1200"/>
+              <a:buNone/>
+              <a:defRPr/>
+            </a:lvl2pPr>
+            <a:lvl3pPr lvl="2" algn="ctr" rtl="0">
+              <a:lnSpc>
+                <a:spcPct val="100000"/>
+              </a:lnSpc>
+              <a:spcBef>
+                <a:spcPts val="0"/>
+              </a:spcBef>
+              <a:spcAft>
+                <a:spcPts val="0"/>
+              </a:spcAft>
+              <a:buSzPts val="1200"/>
+              <a:buNone/>
+              <a:defRPr/>
+            </a:lvl3pPr>
+            <a:lvl4pPr lvl="3" algn="ctr" rtl="0">
+              <a:lnSpc>
+                <a:spcPct val="100000"/>
+              </a:lnSpc>
+              <a:spcBef>
+                <a:spcPts val="0"/>
+              </a:spcBef>
+              <a:spcAft>
+                <a:spcPts val="0"/>
+              </a:spcAft>
+              <a:buSzPts val="1200"/>
+              <a:buNone/>
+              <a:defRPr/>
+            </a:lvl4pPr>
+            <a:lvl5pPr lvl="4" algn="ctr" rtl="0">
+              <a:lnSpc>
+                <a:spcPct val="100000"/>
+              </a:lnSpc>
+              <a:spcBef>
+                <a:spcPts val="0"/>
+              </a:spcBef>
+              <a:spcAft>
+                <a:spcPts val="0"/>
+              </a:spcAft>
+              <a:buSzPts val="1200"/>
+              <a:buNone/>
+              <a:defRPr/>
+            </a:lvl5pPr>
+            <a:lvl6pPr lvl="5" algn="ctr" rtl="0">
+              <a:lnSpc>
+                <a:spcPct val="100000"/>
+              </a:lnSpc>
+              <a:spcBef>
+                <a:spcPts val="0"/>
+              </a:spcBef>
+              <a:spcAft>
+                <a:spcPts val="0"/>
+              </a:spcAft>
+              <a:buSzPts val="1200"/>
+              <a:buNone/>
+              <a:defRPr/>
+            </a:lvl6pPr>
+            <a:lvl7pPr lvl="6" algn="ctr" rtl="0">
+              <a:lnSpc>
+                <a:spcPct val="100000"/>
+              </a:lnSpc>
+              <a:spcBef>
+                <a:spcPts val="0"/>
+              </a:spcBef>
+              <a:spcAft>
+                <a:spcPts val="0"/>
+              </a:spcAft>
+              <a:buSzPts val="1200"/>
+              <a:buNone/>
+              <a:defRPr/>
+            </a:lvl7pPr>
+            <a:lvl8pPr lvl="7" algn="ctr" rtl="0">
+              <a:lnSpc>
+                <a:spcPct val="100000"/>
+              </a:lnSpc>
+              <a:spcBef>
+                <a:spcPts val="0"/>
+              </a:spcBef>
+              <a:spcAft>
+                <a:spcPts val="0"/>
+              </a:spcAft>
+              <a:buSzPts val="1200"/>
+              <a:buNone/>
+              <a:defRPr/>
+            </a:lvl8pPr>
+            <a:lvl9pPr lvl="8" algn="ctr" rtl="0">
+              <a:lnSpc>
+                <a:spcPct val="100000"/>
+              </a:lnSpc>
+              <a:spcBef>
+                <a:spcPts val="0"/>
+              </a:spcBef>
+              <a:spcAft>
+                <a:spcPts val="0"/>
+              </a:spcAft>
+              <a:buSzPts val="1200"/>
+              <a:buNone/>
+              <a:defRPr/>
+            </a:lvl9pPr>
+          </a:lstStyle>
+          <a:p>
+            <a:endParaRPr/>
+          </a:p>
+        </p:txBody>
+      </p:sp>
+      <p:sp>
+        <p:nvSpPr>
+          <p:cNvPr id="1227" name="Google Shape;1227;p28"/>
+          <p:cNvSpPr txBox="1">
+            <a:spLocks noGrp="1"/>
+          </p:cNvSpPr>
+          <p:nvPr>
+            <p:ph type="subTitle" idx="4"/>
+          </p:nvPr>
+        </p:nvSpPr>
+        <p:spPr>
+          <a:xfrm>
+            <a:off x="6168175" y="2996438"/>
+            <a:ext cx="2262600" cy="554100"/>
+          </a:xfrm>
+          <a:prstGeom prst="rect">
+            <a:avLst/>
+          </a:prstGeom>
+        </p:spPr>
+        <p:txBody>
+          <a:bodyPr spcFirstLastPara="1" wrap="square" lIns="91425" tIns="91425" rIns="91425" bIns="91425" anchor="b" anchorCtr="0">
+            <a:noAutofit/>
+          </a:bodyPr>
+          <a:lstStyle>
+            <a:lvl1pPr lvl="0" algn="ctr" rtl="0">
+              <a:lnSpc>
+                <a:spcPct val="100000"/>
+              </a:lnSpc>
+              <a:spcBef>
+                <a:spcPts val="0"/>
+              </a:spcBef>
+              <a:spcAft>
+                <a:spcPts val="0"/>
+              </a:spcAft>
+              <a:buSzPts val="2400"/>
+              <a:buFont typeface="Manrope SemiBold"/>
+              <a:buNone/>
+              <a:defRPr sz="2400">
+                <a:latin typeface="Manrope SemiBold"/>
+                <a:ea typeface="Manrope SemiBold"/>
+                <a:cs typeface="Manrope SemiBold"/>
+                <a:sym typeface="Manrope SemiBold"/>
+              </a:defRPr>
+            </a:lvl1pPr>
+            <a:lvl2pPr lvl="1" algn="ctr" rtl="0">
+              <a:lnSpc>
+                <a:spcPct val="100000"/>
+              </a:lnSpc>
+              <a:spcBef>
+                <a:spcPts val="0"/>
+              </a:spcBef>
+              <a:spcAft>
+                <a:spcPts val="0"/>
+              </a:spcAft>
+              <a:buSzPts val="2400"/>
+              <a:buFont typeface="Manrope SemiBold"/>
+              <a:buNone/>
+              <a:defRPr sz="2400">
+                <a:latin typeface="Manrope SemiBold"/>
+                <a:ea typeface="Manrope SemiBold"/>
+                <a:cs typeface="Manrope SemiBold"/>
+                <a:sym typeface="Manrope SemiBold"/>
+              </a:defRPr>
+            </a:lvl2pPr>
+            <a:lvl3pPr lvl="2" algn="ctr" rtl="0">
+              <a:lnSpc>
+                <a:spcPct val="100000"/>
+              </a:lnSpc>
+              <a:spcBef>
+                <a:spcPts val="0"/>
+              </a:spcBef>
+              <a:spcAft>
+                <a:spcPts val="0"/>
+              </a:spcAft>
+              <a:buSzPts val="2400"/>
+              <a:buFont typeface="Manrope SemiBold"/>
+              <a:buNone/>
+              <a:defRPr sz="2400">
+                <a:latin typeface="Manrope SemiBold"/>
+                <a:ea typeface="Manrope SemiBold"/>
+                <a:cs typeface="Manrope SemiBold"/>
+                <a:sym typeface="Manrope SemiBold"/>
+              </a:defRPr>
+            </a:lvl3pPr>
+            <a:lvl4pPr lvl="3" algn="ctr" rtl="0">
+              <a:lnSpc>
+                <a:spcPct val="100000"/>
+              </a:lnSpc>
+              <a:spcBef>
+                <a:spcPts val="0"/>
+              </a:spcBef>
+              <a:spcAft>
+                <a:spcPts val="0"/>
+              </a:spcAft>
+              <a:buSzPts val="2400"/>
+              <a:buFont typeface="Manrope SemiBold"/>
+              <a:buNone/>
+              <a:defRPr sz="2400">
+                <a:latin typeface="Manrope SemiBold"/>
+                <a:ea typeface="Manrope SemiBold"/>
+                <a:cs typeface="Manrope SemiBold"/>
+                <a:sym typeface="Manrope SemiBold"/>
+              </a:defRPr>
+            </a:lvl4pPr>
+            <a:lvl5pPr lvl="4" algn="ctr" rtl="0">
+              <a:lnSpc>
+                <a:spcPct val="100000"/>
+              </a:lnSpc>
+              <a:spcBef>
+                <a:spcPts val="0"/>
+              </a:spcBef>
+              <a:spcAft>
+                <a:spcPts val="0"/>
+              </a:spcAft>
+              <a:buSzPts val="2400"/>
+              <a:buFont typeface="Manrope SemiBold"/>
+              <a:buNone/>
+              <a:defRPr sz="2400">
+                <a:latin typeface="Manrope SemiBold"/>
+                <a:ea typeface="Manrope SemiBold"/>
+                <a:cs typeface="Manrope SemiBold"/>
+                <a:sym typeface="Manrope SemiBold"/>
+              </a:defRPr>
+            </a:lvl5pPr>
+            <a:lvl6pPr lvl="5" algn="ctr" rtl="0">
+              <a:lnSpc>
+                <a:spcPct val="100000"/>
+              </a:lnSpc>
+              <a:spcBef>
+                <a:spcPts val="0"/>
+              </a:spcBef>
+              <a:spcAft>
+                <a:spcPts val="0"/>
+              </a:spcAft>
+              <a:buSzPts val="2400"/>
+              <a:buFont typeface="Manrope SemiBold"/>
+              <a:buNone/>
+              <a:defRPr sz="2400">
+                <a:latin typeface="Manrope SemiBold"/>
+                <a:ea typeface="Manrope SemiBold"/>
+                <a:cs typeface="Manrope SemiBold"/>
+                <a:sym typeface="Manrope SemiBold"/>
+              </a:defRPr>
+            </a:lvl6pPr>
+            <a:lvl7pPr lvl="6" algn="ctr" rtl="0">
+              <a:lnSpc>
+                <a:spcPct val="100000"/>
+              </a:lnSpc>
+              <a:spcBef>
+                <a:spcPts val="0"/>
+              </a:spcBef>
+              <a:spcAft>
+                <a:spcPts val="0"/>
+              </a:spcAft>
+              <a:buSzPts val="2400"/>
+              <a:buFont typeface="Manrope SemiBold"/>
+              <a:buNone/>
+              <a:defRPr sz="2400">
+                <a:latin typeface="Manrope SemiBold"/>
+                <a:ea typeface="Manrope SemiBold"/>
+                <a:cs typeface="Manrope SemiBold"/>
+                <a:sym typeface="Manrope SemiBold"/>
+              </a:defRPr>
+            </a:lvl7pPr>
+            <a:lvl8pPr lvl="7" algn="ctr" rtl="0">
+              <a:lnSpc>
+                <a:spcPct val="100000"/>
+              </a:lnSpc>
+              <a:spcBef>
+                <a:spcPts val="0"/>
+              </a:spcBef>
+              <a:spcAft>
+                <a:spcPts val="0"/>
+              </a:spcAft>
+              <a:buSzPts val="2400"/>
+              <a:buFont typeface="Manrope SemiBold"/>
+              <a:buNone/>
+              <a:defRPr sz="2400">
+                <a:latin typeface="Manrope SemiBold"/>
+                <a:ea typeface="Manrope SemiBold"/>
+                <a:cs typeface="Manrope SemiBold"/>
+                <a:sym typeface="Manrope SemiBold"/>
+              </a:defRPr>
+            </a:lvl8pPr>
+            <a:lvl9pPr lvl="8" algn="ctr" rtl="0">
+              <a:lnSpc>
+                <a:spcPct val="100000"/>
+              </a:lnSpc>
+              <a:spcBef>
+                <a:spcPts val="0"/>
+              </a:spcBef>
+              <a:spcAft>
+                <a:spcPts val="0"/>
+              </a:spcAft>
+              <a:buSzPts val="2400"/>
+              <a:buFont typeface="Manrope SemiBold"/>
+              <a:buNone/>
+              <a:defRPr sz="2400">
+                <a:latin typeface="Manrope SemiBold"/>
+                <a:ea typeface="Manrope SemiBold"/>
+                <a:cs typeface="Manrope SemiBold"/>
+                <a:sym typeface="Manrope SemiBold"/>
+              </a:defRPr>
+            </a:lvl9pPr>
+          </a:lstStyle>
+          <a:p>
+            <a:endParaRPr/>
+          </a:p>
+        </p:txBody>
+      </p:sp>
+      <p:sp>
+        <p:nvSpPr>
+          <p:cNvPr id="1228" name="Google Shape;1228;p28"/>
+          <p:cNvSpPr txBox="1">
+            <a:spLocks noGrp="1"/>
+          </p:cNvSpPr>
+          <p:nvPr>
+            <p:ph type="subTitle" idx="5"/>
+          </p:nvPr>
+        </p:nvSpPr>
+        <p:spPr>
+          <a:xfrm>
+            <a:off x="3440700" y="3465499"/>
+            <a:ext cx="2262600" cy="615600"/>
+          </a:xfrm>
+          <a:prstGeom prst="rect">
+            <a:avLst/>
+          </a:prstGeom>
+        </p:spPr>
+        <p:txBody>
+          <a:bodyPr spcFirstLastPara="1" wrap="square" lIns="91425" tIns="91425" rIns="91425" bIns="91425" anchor="t" anchorCtr="0">
+            <a:noAutofit/>
+          </a:bodyPr>
+          <a:lstStyle>
+            <a:lvl1pPr lvl="0" algn="ctr" rtl="0">
+              <a:lnSpc>
+                <a:spcPct val="100000"/>
+              </a:lnSpc>
+              <a:spcBef>
+                <a:spcPts val="0"/>
+              </a:spcBef>
+              <a:spcAft>
+                <a:spcPts val="0"/>
+              </a:spcAft>
+              <a:buSzPts val="1200"/>
+              <a:buNone/>
+              <a:defRPr/>
+            </a:lvl1pPr>
+            <a:lvl2pPr lvl="1" algn="ctr" rtl="0">
+              <a:lnSpc>
+                <a:spcPct val="100000"/>
+              </a:lnSpc>
+              <a:spcBef>
+                <a:spcPts val="0"/>
+              </a:spcBef>
+              <a:spcAft>
+                <a:spcPts val="0"/>
+              </a:spcAft>
+              <a:buSzPts val="1200"/>
+              <a:buNone/>
+              <a:defRPr/>
+            </a:lvl2pPr>
+            <a:lvl3pPr lvl="2" algn="ctr" rtl="0">
+              <a:lnSpc>
+                <a:spcPct val="100000"/>
+              </a:lnSpc>
+              <a:spcBef>
+                <a:spcPts val="0"/>
+              </a:spcBef>
+              <a:spcAft>
+                <a:spcPts val="0"/>
+              </a:spcAft>
+              <a:buSzPts val="1200"/>
+              <a:buNone/>
+              <a:defRPr/>
+            </a:lvl3pPr>
+            <a:lvl4pPr lvl="3" algn="ctr" rtl="0">
+              <a:lnSpc>
+                <a:spcPct val="100000"/>
+              </a:lnSpc>
+              <a:spcBef>
+                <a:spcPts val="0"/>
+              </a:spcBef>
+              <a:spcAft>
+                <a:spcPts val="0"/>
+              </a:spcAft>
+              <a:buSzPts val="1200"/>
+              <a:buNone/>
+              <a:defRPr/>
+            </a:lvl4pPr>
+            <a:lvl5pPr lvl="4" algn="ctr" rtl="0">
+              <a:lnSpc>
+                <a:spcPct val="100000"/>
+              </a:lnSpc>
+              <a:spcBef>
+                <a:spcPts val="0"/>
+              </a:spcBef>
+              <a:spcAft>
+                <a:spcPts val="0"/>
+              </a:spcAft>
+              <a:buSzPts val="1200"/>
+              <a:buNone/>
+              <a:defRPr/>
+            </a:lvl5pPr>
+            <a:lvl6pPr lvl="5" algn="ctr" rtl="0">
+              <a:lnSpc>
+                <a:spcPct val="100000"/>
+              </a:lnSpc>
+              <a:spcBef>
+                <a:spcPts val="0"/>
+              </a:spcBef>
+              <a:spcAft>
+                <a:spcPts val="0"/>
+              </a:spcAft>
+              <a:buSzPts val="1200"/>
+              <a:buNone/>
+              <a:defRPr/>
+            </a:lvl6pPr>
+            <a:lvl7pPr lvl="6" algn="ctr" rtl="0">
+              <a:lnSpc>
+                <a:spcPct val="100000"/>
+              </a:lnSpc>
+              <a:spcBef>
+                <a:spcPts val="0"/>
+              </a:spcBef>
+              <a:spcAft>
+                <a:spcPts val="0"/>
+              </a:spcAft>
+              <a:buSzPts val="1200"/>
+              <a:buNone/>
+              <a:defRPr/>
+            </a:lvl7pPr>
+            <a:lvl8pPr lvl="7" algn="ctr" rtl="0">
+              <a:lnSpc>
+                <a:spcPct val="100000"/>
+              </a:lnSpc>
+              <a:spcBef>
+                <a:spcPts val="0"/>
+              </a:spcBef>
+              <a:spcAft>
+                <a:spcPts val="0"/>
+              </a:spcAft>
+              <a:buSzPts val="1200"/>
+              <a:buNone/>
+              <a:defRPr/>
+            </a:lvl8pPr>
+            <a:lvl9pPr lvl="8" algn="ctr" rtl="0">
+              <a:lnSpc>
+                <a:spcPct val="100000"/>
+              </a:lnSpc>
+              <a:spcBef>
+                <a:spcPts val="0"/>
+              </a:spcBef>
+              <a:spcAft>
+                <a:spcPts val="0"/>
+              </a:spcAft>
+              <a:buSzPts val="1200"/>
+              <a:buNone/>
+              <a:defRPr/>
+            </a:lvl9pPr>
+          </a:lstStyle>
+          <a:p>
+            <a:endParaRPr/>
+          </a:p>
+        </p:txBody>
+      </p:sp>
+      <p:sp>
+        <p:nvSpPr>
+          <p:cNvPr id="1229" name="Google Shape;1229;p28"/>
+          <p:cNvSpPr txBox="1">
+            <a:spLocks noGrp="1"/>
+          </p:cNvSpPr>
+          <p:nvPr>
+            <p:ph type="subTitle" idx="6"/>
+          </p:nvPr>
+        </p:nvSpPr>
+        <p:spPr>
+          <a:xfrm>
+            <a:off x="3440700" y="2996438"/>
+            <a:ext cx="2262600" cy="554100"/>
+          </a:xfrm>
+          <a:prstGeom prst="rect">
+            <a:avLst/>
+          </a:prstGeom>
+        </p:spPr>
+        <p:txBody>
+          <a:bodyPr spcFirstLastPara="1" wrap="square" lIns="91425" tIns="91425" rIns="91425" bIns="91425" anchor="b" anchorCtr="0">
+            <a:noAutofit/>
+          </a:bodyPr>
+          <a:lstStyle>
+            <a:lvl1pPr lvl="0" algn="ctr" rtl="0">
+              <a:lnSpc>
+                <a:spcPct val="100000"/>
+              </a:lnSpc>
+              <a:spcBef>
+                <a:spcPts val="0"/>
+              </a:spcBef>
+              <a:spcAft>
+                <a:spcPts val="0"/>
+              </a:spcAft>
+              <a:buSzPts val="2400"/>
+              <a:buFont typeface="Manrope SemiBold"/>
+              <a:buNone/>
+              <a:defRPr sz="2400">
+                <a:latin typeface="Manrope SemiBold"/>
+                <a:ea typeface="Manrope SemiBold"/>
+                <a:cs typeface="Manrope SemiBold"/>
+                <a:sym typeface="Manrope SemiBold"/>
+              </a:defRPr>
+            </a:lvl1pPr>
+            <a:lvl2pPr lvl="1" algn="ctr" rtl="0">
+              <a:lnSpc>
+                <a:spcPct val="100000"/>
+              </a:lnSpc>
+              <a:spcBef>
+                <a:spcPts val="0"/>
+              </a:spcBef>
+              <a:spcAft>
+                <a:spcPts val="0"/>
+              </a:spcAft>
+              <a:buSzPts val="2400"/>
+              <a:buFont typeface="Manrope SemiBold"/>
+              <a:buNone/>
+              <a:defRPr sz="2400">
+                <a:latin typeface="Manrope SemiBold"/>
+                <a:ea typeface="Manrope SemiBold"/>
+                <a:cs typeface="Manrope SemiBold"/>
+                <a:sym typeface="Manrope SemiBold"/>
+              </a:defRPr>
+            </a:lvl2pPr>
+            <a:lvl3pPr lvl="2" algn="ctr" rtl="0">
+              <a:lnSpc>
+                <a:spcPct val="100000"/>
+              </a:lnSpc>
+              <a:spcBef>
+                <a:spcPts val="0"/>
+              </a:spcBef>
+              <a:spcAft>
+                <a:spcPts val="0"/>
+              </a:spcAft>
+              <a:buSzPts val="2400"/>
+              <a:buFont typeface="Manrope SemiBold"/>
+              <a:buNone/>
+              <a:defRPr sz="2400">
+                <a:latin typeface="Manrope SemiBold"/>
+                <a:ea typeface="Manrope SemiBold"/>
+                <a:cs typeface="Manrope SemiBold"/>
+                <a:sym typeface="Manrope SemiBold"/>
+              </a:defRPr>
+            </a:lvl3pPr>
+            <a:lvl4pPr lvl="3" algn="ctr" rtl="0">
+              <a:lnSpc>
+                <a:spcPct val="100000"/>
+              </a:lnSpc>
+              <a:spcBef>
+                <a:spcPts val="0"/>
+              </a:spcBef>
+              <a:spcAft>
+                <a:spcPts val="0"/>
+              </a:spcAft>
+              <a:buSzPts val="2400"/>
+              <a:buFont typeface="Manrope SemiBold"/>
+              <a:buNone/>
+              <a:defRPr sz="2400">
+                <a:latin typeface="Manrope SemiBold"/>
+                <a:ea typeface="Manrope SemiBold"/>
+                <a:cs typeface="Manrope SemiBold"/>
+                <a:sym typeface="Manrope SemiBold"/>
+              </a:defRPr>
+            </a:lvl4pPr>
+            <a:lvl5pPr lvl="4" algn="ctr" rtl="0">
+              <a:lnSpc>
+                <a:spcPct val="100000"/>
+              </a:lnSpc>
+              <a:spcBef>
+                <a:spcPts val="0"/>
+              </a:spcBef>
+              <a:spcAft>
+                <a:spcPts val="0"/>
+              </a:spcAft>
+              <a:buSzPts val="2400"/>
+              <a:buFont typeface="Manrope SemiBold"/>
+              <a:buNone/>
+              <a:defRPr sz="2400">
+                <a:latin typeface="Manrope SemiBold"/>
+                <a:ea typeface="Manrope SemiBold"/>
+                <a:cs typeface="Manrope SemiBold"/>
+                <a:sym typeface="Manrope SemiBold"/>
+              </a:defRPr>
+            </a:lvl5pPr>
+            <a:lvl6pPr lvl="5" algn="ctr" rtl="0">
+              <a:lnSpc>
+                <a:spcPct val="100000"/>
+              </a:lnSpc>
+              <a:spcBef>
+                <a:spcPts val="0"/>
+              </a:spcBef>
+              <a:spcAft>
+                <a:spcPts val="0"/>
+              </a:spcAft>
+              <a:buSzPts val="2400"/>
+              <a:buFont typeface="Manrope SemiBold"/>
+              <a:buNone/>
+              <a:defRPr sz="2400">
+                <a:latin typeface="Manrope SemiBold"/>
+                <a:ea typeface="Manrope SemiBold"/>
+                <a:cs typeface="Manrope SemiBold"/>
+                <a:sym typeface="Manrope SemiBold"/>
+              </a:defRPr>
+            </a:lvl6pPr>
+            <a:lvl7pPr lvl="6" algn="ctr" rtl="0">
+              <a:lnSpc>
+                <a:spcPct val="100000"/>
+              </a:lnSpc>
+              <a:spcBef>
+                <a:spcPts val="0"/>
+              </a:spcBef>
+              <a:spcAft>
+                <a:spcPts val="0"/>
+              </a:spcAft>
+              <a:buSzPts val="2400"/>
+              <a:buFont typeface="Manrope SemiBold"/>
+              <a:buNone/>
+              <a:defRPr sz="2400">
+                <a:latin typeface="Manrope SemiBold"/>
+                <a:ea typeface="Manrope SemiBold"/>
+                <a:cs typeface="Manrope SemiBold"/>
+                <a:sym typeface="Manrope SemiBold"/>
+              </a:defRPr>
+            </a:lvl7pPr>
+            <a:lvl8pPr lvl="7" algn="ctr" rtl="0">
+              <a:lnSpc>
+                <a:spcPct val="100000"/>
+              </a:lnSpc>
+              <a:spcBef>
+                <a:spcPts val="0"/>
+              </a:spcBef>
+              <a:spcAft>
+                <a:spcPts val="0"/>
+              </a:spcAft>
+              <a:buSzPts val="2400"/>
+              <a:buFont typeface="Manrope SemiBold"/>
+              <a:buNone/>
+              <a:defRPr sz="2400">
+                <a:latin typeface="Manrope SemiBold"/>
+                <a:ea typeface="Manrope SemiBold"/>
+                <a:cs typeface="Manrope SemiBold"/>
+                <a:sym typeface="Manrope SemiBold"/>
+              </a:defRPr>
+            </a:lvl8pPr>
+            <a:lvl9pPr lvl="8" algn="ctr" rtl="0">
+              <a:lnSpc>
+                <a:spcPct val="100000"/>
+              </a:lnSpc>
+              <a:spcBef>
+                <a:spcPts val="0"/>
+              </a:spcBef>
+              <a:spcAft>
+                <a:spcPts val="0"/>
+              </a:spcAft>
+              <a:buSzPts val="2400"/>
+              <a:buFont typeface="Manrope SemiBold"/>
+              <a:buNone/>
+              <a:defRPr sz="2400">
+                <a:latin typeface="Manrope SemiBold"/>
+                <a:ea typeface="Manrope SemiBold"/>
+                <a:cs typeface="Manrope SemiBold"/>
+                <a:sym typeface="Manrope SemiBold"/>
+              </a:defRPr>
+            </a:lvl9pPr>
+          </a:lstStyle>
+          <a:p>
+            <a:endParaRPr/>
+          </a:p>
+        </p:txBody>
+      </p:sp>
+      <p:grpSp>
+        <p:nvGrpSpPr>
+          <p:cNvPr id="1230" name="Google Shape;1230;p28"/>
+          <p:cNvGrpSpPr/>
+          <p:nvPr/>
+        </p:nvGrpSpPr>
+        <p:grpSpPr>
+          <a:xfrm>
+            <a:off x="-933564" y="4566019"/>
+            <a:ext cx="2577160" cy="2638569"/>
+            <a:chOff x="-1115775" y="4467744"/>
+            <a:chExt cx="2577160" cy="2638569"/>
+          </a:xfrm>
+        </p:grpSpPr>
+        <p:sp>
+          <p:nvSpPr>
+            <p:cNvPr id="1231" name="Google Shape;1231;p28"/>
+            <p:cNvSpPr/>
+            <p:nvPr/>
+          </p:nvSpPr>
+          <p:spPr>
+            <a:xfrm>
+              <a:off x="-961762" y="4467744"/>
+              <a:ext cx="1751700" cy="1751700"/>
+            </a:xfrm>
+            <a:prstGeom prst="ellipse">
+              <a:avLst/>
+            </a:prstGeom>
+            <a:solidFill>
+              <a:schemeClr val="accent1"/>
+            </a:solidFill>
+            <a:ln>
+              <a:noFill/>
+            </a:ln>
+          </p:spPr>
+          <p:txBody>
+            <a:bodyPr spcFirstLastPara="1" wrap="square" lIns="91425" tIns="91425" rIns="91425" bIns="91425" anchor="ctr" anchorCtr="0">
+              <a:noAutofit/>
+            </a:bodyPr>
+            <a:lstStyle/>
+            <a:p>
+              <a:pPr marL="0" lvl="0" indent="0" algn="l" rtl="0">
+                <a:spcBef>
+                  <a:spcPts val="0"/>
+                </a:spcBef>
+                <a:spcAft>
+                  <a:spcPts val="0"/>
+                </a:spcAft>
+                <a:buNone/>
+              </a:pPr>
+              <a:endParaRPr>
+                <a:latin typeface="Inter"/>
+                <a:ea typeface="Inter"/>
+                <a:cs typeface="Inter"/>
+                <a:sym typeface="Inter"/>
+              </a:endParaRPr>
+            </a:p>
+          </p:txBody>
+        </p:sp>
+        <p:grpSp>
+          <p:nvGrpSpPr>
+            <p:cNvPr id="1232" name="Google Shape;1232;p28"/>
+            <p:cNvGrpSpPr/>
+            <p:nvPr/>
+          </p:nvGrpSpPr>
+          <p:grpSpPr>
+            <a:xfrm rot="5400000" flipH="1">
+              <a:off x="-1115103" y="4529824"/>
+              <a:ext cx="2575817" cy="2577160"/>
+              <a:chOff x="1550275" y="1493275"/>
+              <a:chExt cx="1582100" cy="1582925"/>
+            </a:xfrm>
+          </p:grpSpPr>
+          <p:sp>
+            <p:nvSpPr>
+              <p:cNvPr id="1233" name="Google Shape;1233;p28"/>
+              <p:cNvSpPr/>
+              <p:nvPr/>
+            </p:nvSpPr>
+            <p:spPr>
+              <a:xfrm>
+                <a:off x="1650275" y="1594100"/>
+                <a:ext cx="301650" cy="300825"/>
+              </a:xfrm>
+              <a:custGeom>
+                <a:avLst/>
+                <a:gdLst/>
+                <a:ahLst/>
+                <a:cxnLst/>
+                <a:rect l="l" t="t" r="r" b="b"/>
+                <a:pathLst>
+                  <a:path w="12066" h="12033" fill="none" extrusionOk="0">
+                    <a:moveTo>
+                      <a:pt x="1" y="12032"/>
+                    </a:moveTo>
+                    <a:lnTo>
+                      <a:pt x="12065" y="0"/>
+                    </a:lnTo>
+                  </a:path>
+                </a:pathLst>
+              </a:custGeom>
+              <a:noFill/>
+              <a:ln w="19050" cap="rnd" cmpd="sng">
+                <a:solidFill>
+                  <a:schemeClr val="lt2"/>
+                </a:solidFill>
+                <a:prstDash val="solid"/>
+                <a:miter lim="32519"/>
+                <a:headEnd type="none" w="sm" len="sm"/>
+                <a:tailEnd type="none" w="sm" len="sm"/>
+              </a:ln>
+            </p:spPr>
+            <p:txBody>
+              <a:bodyPr spcFirstLastPara="1" wrap="square" lIns="91425" tIns="91425" rIns="91425" bIns="91425" anchor="ctr" anchorCtr="0">
+                <a:noAutofit/>
+              </a:bodyPr>
+              <a:lstStyle/>
+              <a:p>
+                <a:pPr marL="0" lvl="0" indent="0" algn="l" rtl="0">
+                  <a:spcBef>
+                    <a:spcPts val="0"/>
+                  </a:spcBef>
+                  <a:spcAft>
+                    <a:spcPts val="0"/>
+                  </a:spcAft>
+                  <a:buNone/>
+                </a:pPr>
+                <a:endParaRPr>
+                  <a:latin typeface="Inter"/>
+                  <a:ea typeface="Inter"/>
+                  <a:cs typeface="Inter"/>
+                  <a:sym typeface="Inter"/>
+                </a:endParaRPr>
+              </a:p>
+            </p:txBody>
+          </p:sp>
+          <p:sp>
+            <p:nvSpPr>
+              <p:cNvPr id="1234" name="Google Shape;1234;p28"/>
+              <p:cNvSpPr/>
+              <p:nvPr/>
+            </p:nvSpPr>
+            <p:spPr>
+              <a:xfrm>
+                <a:off x="1560025" y="1503850"/>
+                <a:ext cx="648800" cy="647975"/>
+              </a:xfrm>
+              <a:custGeom>
+                <a:avLst/>
+                <a:gdLst/>
+                <a:ahLst/>
+                <a:cxnLst/>
+                <a:rect l="l" t="t" r="r" b="b"/>
+                <a:pathLst>
+                  <a:path w="25952" h="25919" fill="none" extrusionOk="0">
+                    <a:moveTo>
+                      <a:pt x="1" y="25919"/>
+                    </a:moveTo>
+                    <a:lnTo>
+                      <a:pt x="25952" y="0"/>
+                    </a:lnTo>
+                  </a:path>
+                </a:pathLst>
+              </a:custGeom>
+              <a:noFill/>
+              <a:ln w="19050" cap="rnd" cmpd="sng">
+                <a:solidFill>
+                  <a:schemeClr val="lt2"/>
+                </a:solidFill>
+                <a:prstDash val="solid"/>
+                <a:miter lim="32519"/>
+                <a:headEnd type="none" w="sm" len="sm"/>
+                <a:tailEnd type="none" w="sm" len="sm"/>
+              </a:ln>
+            </p:spPr>
+            <p:txBody>
+              <a:bodyPr spcFirstLastPara="1" wrap="square" lIns="91425" tIns="91425" rIns="91425" bIns="91425" anchor="ctr" anchorCtr="0">
+                <a:noAutofit/>
+              </a:bodyPr>
+              <a:lstStyle/>
+              <a:p>
+                <a:pPr marL="0" lvl="0" indent="0" algn="l" rtl="0">
+                  <a:spcBef>
+                    <a:spcPts val="0"/>
+                  </a:spcBef>
+                  <a:spcAft>
+                    <a:spcPts val="0"/>
+                  </a:spcAft>
+                  <a:buNone/>
+                </a:pPr>
+                <a:endParaRPr>
+                  <a:latin typeface="Inter"/>
+                  <a:ea typeface="Inter"/>
+                  <a:cs typeface="Inter"/>
+                  <a:sym typeface="Inter"/>
+                </a:endParaRPr>
+              </a:p>
+            </p:txBody>
+          </p:sp>
+          <p:sp>
+            <p:nvSpPr>
+              <p:cNvPr id="1235" name="Google Shape;1235;p28"/>
+              <p:cNvSpPr/>
+              <p:nvPr/>
+            </p:nvSpPr>
+            <p:spPr>
+              <a:xfrm>
+                <a:off x="1550275" y="1493275"/>
+                <a:ext cx="834150" cy="834975"/>
+              </a:xfrm>
+              <a:custGeom>
+                <a:avLst/>
+                <a:gdLst/>
+                <a:ahLst/>
+                <a:cxnLst/>
+                <a:rect l="l" t="t" r="r" b="b"/>
+                <a:pathLst>
+                  <a:path w="33366" h="33399" fill="none" extrusionOk="0">
+                    <a:moveTo>
+                      <a:pt x="1" y="33398"/>
+                    </a:moveTo>
+                    <a:lnTo>
+                      <a:pt x="33366" y="1"/>
+                    </a:lnTo>
+                  </a:path>
+                </a:pathLst>
+              </a:custGeom>
+              <a:noFill/>
+              <a:ln w="19050" cap="rnd" cmpd="sng">
+                <a:solidFill>
+                  <a:schemeClr val="lt2"/>
+                </a:solidFill>
+                <a:prstDash val="solid"/>
+                <a:miter lim="32519"/>
+                <a:headEnd type="none" w="sm" len="sm"/>
+                <a:tailEnd type="none" w="sm" len="sm"/>
+              </a:ln>
+            </p:spPr>
+            <p:txBody>
+              <a:bodyPr spcFirstLastPara="1" wrap="square" lIns="91425" tIns="91425" rIns="91425" bIns="91425" anchor="ctr" anchorCtr="0">
+                <a:noAutofit/>
+              </a:bodyPr>
+              <a:lstStyle/>
+              <a:p>
+                <a:pPr marL="0" lvl="0" indent="0" algn="l" rtl="0">
+                  <a:spcBef>
+                    <a:spcPts val="0"/>
+                  </a:spcBef>
+                  <a:spcAft>
+                    <a:spcPts val="0"/>
+                  </a:spcAft>
+                  <a:buNone/>
+                </a:pPr>
+                <a:endParaRPr>
+                  <a:latin typeface="Inter"/>
+                  <a:ea typeface="Inter"/>
+                  <a:cs typeface="Inter"/>
+                  <a:sym typeface="Inter"/>
+                </a:endParaRPr>
+              </a:p>
+            </p:txBody>
+          </p:sp>
+          <p:sp>
+            <p:nvSpPr>
+              <p:cNvPr id="1236" name="Google Shape;1236;p28"/>
+              <p:cNvSpPr/>
+              <p:nvPr/>
+            </p:nvSpPr>
+            <p:spPr>
+              <a:xfrm>
+                <a:off x="1571425" y="1514425"/>
+                <a:ext cx="957725" cy="958525"/>
+              </a:xfrm>
+              <a:custGeom>
+                <a:avLst/>
+                <a:gdLst/>
+                <a:ahLst/>
+                <a:cxnLst/>
+                <a:rect l="l" t="t" r="r" b="b"/>
+                <a:pathLst>
+                  <a:path w="38309" h="38341" fill="none" extrusionOk="0">
+                    <a:moveTo>
+                      <a:pt x="0" y="38341"/>
+                    </a:moveTo>
+                    <a:lnTo>
+                      <a:pt x="38308" y="0"/>
+                    </a:lnTo>
+                  </a:path>
+                </a:pathLst>
+              </a:custGeom>
+              <a:noFill/>
+              <a:ln w="19050" cap="rnd" cmpd="sng">
+                <a:solidFill>
+                  <a:schemeClr val="lt2"/>
+                </a:solidFill>
+                <a:prstDash val="solid"/>
+                <a:miter lim="32519"/>
+                <a:headEnd type="none" w="sm" len="sm"/>
+                <a:tailEnd type="none" w="sm" len="sm"/>
+              </a:ln>
+            </p:spPr>
+            <p:txBody>
+              <a:bodyPr spcFirstLastPara="1" wrap="square" lIns="91425" tIns="91425" rIns="91425" bIns="91425" anchor="ctr" anchorCtr="0">
+                <a:noAutofit/>
+              </a:bodyPr>
+              <a:lstStyle/>
+              <a:p>
+                <a:pPr marL="0" lvl="0" indent="0" algn="l" rtl="0">
+                  <a:spcBef>
+                    <a:spcPts val="0"/>
+                  </a:spcBef>
+                  <a:spcAft>
+                    <a:spcPts val="0"/>
+                  </a:spcAft>
+                  <a:buNone/>
+                </a:pPr>
+                <a:endParaRPr>
+                  <a:latin typeface="Inter"/>
+                  <a:ea typeface="Inter"/>
+                  <a:cs typeface="Inter"/>
+                  <a:sym typeface="Inter"/>
+                </a:endParaRPr>
+              </a:p>
+            </p:txBody>
+          </p:sp>
+          <p:sp>
+            <p:nvSpPr>
+              <p:cNvPr id="1237" name="Google Shape;1237;p28"/>
+              <p:cNvSpPr/>
+              <p:nvPr/>
+            </p:nvSpPr>
+            <p:spPr>
+              <a:xfrm>
+                <a:off x="1612875" y="1555875"/>
+                <a:ext cx="1041475" cy="1042275"/>
+              </a:xfrm>
+              <a:custGeom>
+                <a:avLst/>
+                <a:gdLst/>
+                <a:ahLst/>
+                <a:cxnLst/>
+                <a:rect l="l" t="t" r="r" b="b"/>
+                <a:pathLst>
+                  <a:path w="41659" h="41691" fill="none" extrusionOk="0">
+                    <a:moveTo>
+                      <a:pt x="1" y="41691"/>
+                    </a:moveTo>
+                    <a:lnTo>
+                      <a:pt x="41658" y="1"/>
+                    </a:lnTo>
+                  </a:path>
+                </a:pathLst>
+              </a:custGeom>
+              <a:noFill/>
+              <a:ln w="19050" cap="rnd" cmpd="sng">
+                <a:solidFill>
+                  <a:schemeClr val="lt2"/>
+                </a:solidFill>
+                <a:prstDash val="solid"/>
+                <a:miter lim="32519"/>
+                <a:headEnd type="none" w="sm" len="sm"/>
+                <a:tailEnd type="none" w="sm" len="sm"/>
+              </a:ln>
+            </p:spPr>
+            <p:txBody>
+              <a:bodyPr spcFirstLastPara="1" wrap="square" lIns="91425" tIns="91425" rIns="91425" bIns="91425" anchor="ctr" anchorCtr="0">
+                <a:noAutofit/>
+              </a:bodyPr>
+              <a:lstStyle/>
+              <a:p>
+                <a:pPr marL="0" lvl="0" indent="0" algn="l" rtl="0">
+                  <a:spcBef>
+                    <a:spcPts val="0"/>
+                  </a:spcBef>
+                  <a:spcAft>
+                    <a:spcPts val="0"/>
+                  </a:spcAft>
+                  <a:buNone/>
+                </a:pPr>
+                <a:endParaRPr>
+                  <a:latin typeface="Inter"/>
+                  <a:ea typeface="Inter"/>
+                  <a:cs typeface="Inter"/>
+                  <a:sym typeface="Inter"/>
+                </a:endParaRPr>
+              </a:p>
+            </p:txBody>
+          </p:sp>
+          <p:sp>
+            <p:nvSpPr>
+              <p:cNvPr id="1238" name="Google Shape;1238;p28"/>
+              <p:cNvSpPr/>
+              <p:nvPr/>
+            </p:nvSpPr>
+            <p:spPr>
+              <a:xfrm>
+                <a:off x="1669800" y="1613600"/>
+                <a:ext cx="1093475" cy="1092675"/>
+              </a:xfrm>
+              <a:custGeom>
+                <a:avLst/>
+                <a:gdLst/>
+                <a:ahLst/>
+                <a:cxnLst/>
+                <a:rect l="l" t="t" r="r" b="b"/>
+                <a:pathLst>
+                  <a:path w="43739" h="43707" fill="none" extrusionOk="0">
+                    <a:moveTo>
+                      <a:pt x="0" y="43707"/>
+                    </a:moveTo>
+                    <a:lnTo>
+                      <a:pt x="43739" y="1"/>
+                    </a:lnTo>
+                  </a:path>
+                </a:pathLst>
+              </a:custGeom>
+              <a:noFill/>
+              <a:ln w="19050" cap="rnd" cmpd="sng">
+                <a:solidFill>
+                  <a:schemeClr val="lt2"/>
+                </a:solidFill>
+                <a:prstDash val="solid"/>
+                <a:miter lim="32519"/>
+                <a:headEnd type="none" w="sm" len="sm"/>
+                <a:tailEnd type="none" w="sm" len="sm"/>
+              </a:ln>
+            </p:spPr>
+            <p:txBody>
+              <a:bodyPr spcFirstLastPara="1" wrap="square" lIns="91425" tIns="91425" rIns="91425" bIns="91425" anchor="ctr" anchorCtr="0">
+                <a:noAutofit/>
+              </a:bodyPr>
+              <a:lstStyle/>
+              <a:p>
+                <a:pPr marL="0" lvl="0" indent="0" algn="l" rtl="0">
+                  <a:spcBef>
+                    <a:spcPts val="0"/>
+                  </a:spcBef>
+                  <a:spcAft>
+                    <a:spcPts val="0"/>
+                  </a:spcAft>
+                  <a:buNone/>
+                </a:pPr>
+                <a:endParaRPr>
+                  <a:latin typeface="Inter"/>
+                  <a:ea typeface="Inter"/>
+                  <a:cs typeface="Inter"/>
+                  <a:sym typeface="Inter"/>
+                </a:endParaRPr>
+              </a:p>
+            </p:txBody>
+          </p:sp>
+          <p:sp>
+            <p:nvSpPr>
+              <p:cNvPr id="1239" name="Google Shape;1239;p28"/>
+              <p:cNvSpPr/>
+              <p:nvPr/>
+            </p:nvSpPr>
+            <p:spPr>
+              <a:xfrm>
+                <a:off x="1710100" y="1684329"/>
+                <a:ext cx="1148362" cy="1145328"/>
+              </a:xfrm>
+              <a:custGeom>
+                <a:avLst/>
+                <a:gdLst/>
+                <a:ahLst/>
+                <a:cxnLst/>
+                <a:rect l="l" t="t" r="r" b="b"/>
+                <a:pathLst>
+                  <a:path w="75837" h="75837" fill="none" extrusionOk="0">
+                    <a:moveTo>
+                      <a:pt x="1" y="75836"/>
+                    </a:moveTo>
+                    <a:lnTo>
+                      <a:pt x="75837" y="1"/>
+                    </a:lnTo>
+                  </a:path>
+                </a:pathLst>
+              </a:custGeom>
+              <a:noFill/>
+              <a:ln w="19050" cap="rnd" cmpd="sng">
+                <a:solidFill>
+                  <a:schemeClr val="lt2"/>
+                </a:solidFill>
+                <a:prstDash val="solid"/>
+                <a:miter lim="32519"/>
+                <a:headEnd type="none" w="sm" len="sm"/>
+                <a:tailEnd type="none" w="sm" len="sm"/>
+              </a:ln>
+            </p:spPr>
+            <p:txBody>
+              <a:bodyPr spcFirstLastPara="1" wrap="square" lIns="91425" tIns="91425" rIns="91425" bIns="91425" anchor="ctr" anchorCtr="0">
+                <a:noAutofit/>
+              </a:bodyPr>
+              <a:lstStyle/>
+              <a:p>
+                <a:pPr marL="0" lvl="0" indent="0" algn="l" rtl="0">
+                  <a:spcBef>
+                    <a:spcPts val="0"/>
+                  </a:spcBef>
+                  <a:spcAft>
+                    <a:spcPts val="0"/>
+                  </a:spcAft>
+                  <a:buNone/>
+                </a:pPr>
+                <a:endParaRPr>
+                  <a:latin typeface="Inter"/>
+                  <a:ea typeface="Inter"/>
+                  <a:cs typeface="Inter"/>
+                  <a:sym typeface="Inter"/>
+                </a:endParaRPr>
+              </a:p>
+            </p:txBody>
+          </p:sp>
+          <p:sp>
+            <p:nvSpPr>
+              <p:cNvPr id="1240" name="Google Shape;1240;p28"/>
+              <p:cNvSpPr/>
+              <p:nvPr/>
+            </p:nvSpPr>
+            <p:spPr>
+              <a:xfrm>
+                <a:off x="1828936" y="1767251"/>
+                <a:ext cx="1113203" cy="1126369"/>
+              </a:xfrm>
+              <a:custGeom>
+                <a:avLst/>
+                <a:gdLst/>
+                <a:ahLst/>
+                <a:cxnLst/>
+                <a:rect l="l" t="t" r="r" b="b"/>
+                <a:pathLst>
+                  <a:path w="75870" h="75837" fill="none" extrusionOk="0">
+                    <a:moveTo>
+                      <a:pt x="1" y="75836"/>
+                    </a:moveTo>
+                    <a:lnTo>
+                      <a:pt x="75869" y="1"/>
+                    </a:lnTo>
+                  </a:path>
+                </a:pathLst>
+              </a:custGeom>
+              <a:noFill/>
+              <a:ln w="19050" cap="rnd" cmpd="sng">
+                <a:solidFill>
+                  <a:schemeClr val="lt2"/>
+                </a:solidFill>
+                <a:prstDash val="solid"/>
+                <a:miter lim="32519"/>
+                <a:headEnd type="none" w="sm" len="sm"/>
+                <a:tailEnd type="none" w="sm" len="sm"/>
+              </a:ln>
+            </p:spPr>
+            <p:txBody>
+              <a:bodyPr spcFirstLastPara="1" wrap="square" lIns="91425" tIns="91425" rIns="91425" bIns="91425" anchor="ctr" anchorCtr="0">
+                <a:noAutofit/>
+              </a:bodyPr>
+              <a:lstStyle/>
+              <a:p>
+                <a:pPr marL="0" lvl="0" indent="0" algn="l" rtl="0">
+                  <a:spcBef>
+                    <a:spcPts val="0"/>
+                  </a:spcBef>
+                  <a:spcAft>
+                    <a:spcPts val="0"/>
+                  </a:spcAft>
+                  <a:buNone/>
+                </a:pPr>
+                <a:endParaRPr>
+                  <a:latin typeface="Inter"/>
+                  <a:ea typeface="Inter"/>
+                  <a:cs typeface="Inter"/>
+                  <a:sym typeface="Inter"/>
+                </a:endParaRPr>
+              </a:p>
+            </p:txBody>
+          </p:sp>
+          <p:sp>
+            <p:nvSpPr>
+              <p:cNvPr id="1241" name="Google Shape;1241;p28"/>
+              <p:cNvSpPr/>
+              <p:nvPr/>
+            </p:nvSpPr>
+            <p:spPr>
+              <a:xfrm>
+                <a:off x="1929499" y="1863204"/>
+                <a:ext cx="1082574" cy="1112692"/>
+              </a:xfrm>
+              <a:custGeom>
+                <a:avLst/>
+                <a:gdLst/>
+                <a:ahLst/>
+                <a:cxnLst/>
+                <a:rect l="l" t="t" r="r" b="b"/>
+                <a:pathLst>
+                  <a:path w="74828" h="74828" fill="none" extrusionOk="0">
+                    <a:moveTo>
+                      <a:pt x="0" y="74828"/>
+                    </a:moveTo>
+                    <a:lnTo>
+                      <a:pt x="74828" y="0"/>
+                    </a:lnTo>
+                  </a:path>
+                </a:pathLst>
+              </a:custGeom>
+              <a:noFill/>
+              <a:ln w="19050" cap="rnd" cmpd="sng">
+                <a:solidFill>
+                  <a:schemeClr val="lt2"/>
+                </a:solidFill>
+                <a:prstDash val="solid"/>
+                <a:miter lim="32519"/>
+                <a:headEnd type="none" w="sm" len="sm"/>
+                <a:tailEnd type="none" w="sm" len="sm"/>
+              </a:ln>
+            </p:spPr>
+            <p:txBody>
+              <a:bodyPr spcFirstLastPara="1" wrap="square" lIns="91425" tIns="91425" rIns="91425" bIns="91425" anchor="ctr" anchorCtr="0">
+                <a:noAutofit/>
+              </a:bodyPr>
+              <a:lstStyle/>
+              <a:p>
+                <a:pPr marL="0" lvl="0" indent="0" algn="l" rtl="0">
+                  <a:spcBef>
+                    <a:spcPts val="0"/>
+                  </a:spcBef>
+                  <a:spcAft>
+                    <a:spcPts val="0"/>
+                  </a:spcAft>
+                  <a:buNone/>
+                </a:pPr>
+                <a:endParaRPr>
+                  <a:latin typeface="Inter"/>
+                  <a:ea typeface="Inter"/>
+                  <a:cs typeface="Inter"/>
+                  <a:sym typeface="Inter"/>
+                </a:endParaRPr>
+              </a:p>
+            </p:txBody>
+          </p:sp>
+          <p:sp>
+            <p:nvSpPr>
+              <p:cNvPr id="1242" name="Google Shape;1242;p28"/>
+              <p:cNvSpPr/>
+              <p:nvPr/>
+            </p:nvSpPr>
+            <p:spPr>
+              <a:xfrm>
+                <a:off x="2027500" y="1971325"/>
+                <a:ext cx="1042275" cy="1042275"/>
+              </a:xfrm>
+              <a:custGeom>
+                <a:avLst/>
+                <a:gdLst/>
+                <a:ahLst/>
+                <a:cxnLst/>
+                <a:rect l="l" t="t" r="r" b="b"/>
+                <a:pathLst>
+                  <a:path w="41691" h="41691" fill="none" extrusionOk="0">
+                    <a:moveTo>
+                      <a:pt x="41691" y="0"/>
+                    </a:moveTo>
+                    <a:lnTo>
+                      <a:pt x="1" y="41690"/>
+                    </a:lnTo>
+                  </a:path>
+                </a:pathLst>
+              </a:custGeom>
+              <a:noFill/>
+              <a:ln w="19050" cap="rnd" cmpd="sng">
+                <a:solidFill>
+                  <a:schemeClr val="lt2"/>
+                </a:solidFill>
+                <a:prstDash val="solid"/>
+                <a:miter lim="32519"/>
+                <a:headEnd type="none" w="sm" len="sm"/>
+                <a:tailEnd type="none" w="sm" len="sm"/>
+              </a:ln>
+            </p:spPr>
+            <p:txBody>
+              <a:bodyPr spcFirstLastPara="1" wrap="square" lIns="91425" tIns="91425" rIns="91425" bIns="91425" anchor="ctr" anchorCtr="0">
+                <a:noAutofit/>
+              </a:bodyPr>
+              <a:lstStyle/>
+              <a:p>
+                <a:pPr marL="0" lvl="0" indent="0" algn="l" rtl="0">
+                  <a:spcBef>
+                    <a:spcPts val="0"/>
+                  </a:spcBef>
+                  <a:spcAft>
+                    <a:spcPts val="0"/>
+                  </a:spcAft>
+                  <a:buNone/>
+                </a:pPr>
+                <a:endParaRPr>
+                  <a:latin typeface="Inter"/>
+                  <a:ea typeface="Inter"/>
+                  <a:cs typeface="Inter"/>
+                  <a:sym typeface="Inter"/>
+                </a:endParaRPr>
+              </a:p>
+            </p:txBody>
+          </p:sp>
+          <p:sp>
+            <p:nvSpPr>
+              <p:cNvPr id="1243" name="Google Shape;1243;p28"/>
+              <p:cNvSpPr/>
+              <p:nvPr/>
+            </p:nvSpPr>
+            <p:spPr>
+              <a:xfrm>
+                <a:off x="2152700" y="2096525"/>
+                <a:ext cx="958550" cy="958525"/>
+              </a:xfrm>
+              <a:custGeom>
+                <a:avLst/>
+                <a:gdLst/>
+                <a:ahLst/>
+                <a:cxnLst/>
+                <a:rect l="l" t="t" r="r" b="b"/>
+                <a:pathLst>
+                  <a:path w="38342" h="38341" fill="none" extrusionOk="0">
+                    <a:moveTo>
+                      <a:pt x="38341" y="0"/>
+                    </a:moveTo>
+                    <a:lnTo>
+                      <a:pt x="1" y="38341"/>
+                    </a:lnTo>
+                  </a:path>
+                </a:pathLst>
+              </a:custGeom>
+              <a:noFill/>
+              <a:ln w="19050" cap="rnd" cmpd="sng">
+                <a:solidFill>
+                  <a:schemeClr val="lt2"/>
+                </a:solidFill>
+                <a:prstDash val="solid"/>
+                <a:miter lim="32519"/>
+                <a:headEnd type="none" w="sm" len="sm"/>
+                <a:tailEnd type="none" w="sm" len="sm"/>
+              </a:ln>
+            </p:spPr>
+            <p:txBody>
+              <a:bodyPr spcFirstLastPara="1" wrap="square" lIns="91425" tIns="91425" rIns="91425" bIns="91425" anchor="ctr" anchorCtr="0">
+                <a:noAutofit/>
+              </a:bodyPr>
+              <a:lstStyle/>
+              <a:p>
+                <a:pPr marL="0" lvl="0" indent="0" algn="l" rtl="0">
+                  <a:spcBef>
+                    <a:spcPts val="0"/>
+                  </a:spcBef>
+                  <a:spcAft>
+                    <a:spcPts val="0"/>
+                  </a:spcAft>
+                  <a:buNone/>
+                </a:pPr>
+                <a:endParaRPr>
+                  <a:latin typeface="Inter"/>
+                  <a:ea typeface="Inter"/>
+                  <a:cs typeface="Inter"/>
+                  <a:sym typeface="Inter"/>
+                </a:endParaRPr>
+              </a:p>
+            </p:txBody>
+          </p:sp>
+          <p:sp>
+            <p:nvSpPr>
+              <p:cNvPr id="1244" name="Google Shape;1244;p28"/>
+              <p:cNvSpPr/>
+              <p:nvPr/>
+            </p:nvSpPr>
+            <p:spPr>
+              <a:xfrm>
+                <a:off x="2298225" y="2241225"/>
+                <a:ext cx="834150" cy="834975"/>
+              </a:xfrm>
+              <a:custGeom>
+                <a:avLst/>
+                <a:gdLst/>
+                <a:ahLst/>
+                <a:cxnLst/>
+                <a:rect l="l" t="t" r="r" b="b"/>
+                <a:pathLst>
+                  <a:path w="33366" h="33399" fill="none" extrusionOk="0">
+                    <a:moveTo>
+                      <a:pt x="33366" y="1"/>
+                    </a:moveTo>
+                    <a:lnTo>
+                      <a:pt x="1" y="33398"/>
+                    </a:lnTo>
+                  </a:path>
+                </a:pathLst>
+              </a:custGeom>
+              <a:noFill/>
+              <a:ln w="19050" cap="rnd" cmpd="sng">
+                <a:solidFill>
+                  <a:schemeClr val="lt2"/>
+                </a:solidFill>
+                <a:prstDash val="solid"/>
+                <a:miter lim="32519"/>
+                <a:headEnd type="none" w="sm" len="sm"/>
+                <a:tailEnd type="none" w="sm" len="sm"/>
+              </a:ln>
+            </p:spPr>
+            <p:txBody>
+              <a:bodyPr spcFirstLastPara="1" wrap="square" lIns="91425" tIns="91425" rIns="91425" bIns="91425" anchor="ctr" anchorCtr="0">
+                <a:noAutofit/>
+              </a:bodyPr>
+              <a:lstStyle/>
+              <a:p>
+                <a:pPr marL="0" lvl="0" indent="0" algn="l" rtl="0">
+                  <a:spcBef>
+                    <a:spcPts val="0"/>
+                  </a:spcBef>
+                  <a:spcAft>
+                    <a:spcPts val="0"/>
+                  </a:spcAft>
+                  <a:buNone/>
+                </a:pPr>
+                <a:endParaRPr>
+                  <a:latin typeface="Inter"/>
+                  <a:ea typeface="Inter"/>
+                  <a:cs typeface="Inter"/>
+                  <a:sym typeface="Inter"/>
+                </a:endParaRPr>
+              </a:p>
+            </p:txBody>
+          </p:sp>
+          <p:sp>
+            <p:nvSpPr>
+              <p:cNvPr id="1245" name="Google Shape;1245;p28"/>
+              <p:cNvSpPr/>
+              <p:nvPr/>
+            </p:nvSpPr>
+            <p:spPr>
+              <a:xfrm>
+                <a:off x="2473825" y="2417650"/>
+                <a:ext cx="648800" cy="648800"/>
+              </a:xfrm>
+              <a:custGeom>
+                <a:avLst/>
+                <a:gdLst/>
+                <a:ahLst/>
+                <a:cxnLst/>
+                <a:rect l="l" t="t" r="r" b="b"/>
+                <a:pathLst>
+                  <a:path w="25952" h="25952" fill="none" extrusionOk="0">
+                    <a:moveTo>
+                      <a:pt x="25952" y="0"/>
+                    </a:moveTo>
+                    <a:lnTo>
+                      <a:pt x="1" y="25951"/>
+                    </a:lnTo>
+                  </a:path>
+                </a:pathLst>
+              </a:custGeom>
+              <a:noFill/>
+              <a:ln w="19050" cap="rnd" cmpd="sng">
+                <a:solidFill>
+                  <a:schemeClr val="lt2"/>
+                </a:solidFill>
+                <a:prstDash val="solid"/>
+                <a:miter lim="32519"/>
+                <a:headEnd type="none" w="sm" len="sm"/>
+                <a:tailEnd type="none" w="sm" len="sm"/>
+              </a:ln>
+            </p:spPr>
+            <p:txBody>
+              <a:bodyPr spcFirstLastPara="1" wrap="square" lIns="91425" tIns="91425" rIns="91425" bIns="91425" anchor="ctr" anchorCtr="0">
+                <a:noAutofit/>
+              </a:bodyPr>
+              <a:lstStyle/>
+              <a:p>
+                <a:pPr marL="0" lvl="0" indent="0" algn="l" rtl="0">
+                  <a:spcBef>
+                    <a:spcPts val="0"/>
+                  </a:spcBef>
+                  <a:spcAft>
+                    <a:spcPts val="0"/>
+                  </a:spcAft>
+                  <a:buNone/>
+                </a:pPr>
+                <a:endParaRPr>
+                  <a:latin typeface="Inter"/>
+                  <a:ea typeface="Inter"/>
+                  <a:cs typeface="Inter"/>
+                  <a:sym typeface="Inter"/>
+                </a:endParaRPr>
+              </a:p>
+            </p:txBody>
+          </p:sp>
+          <p:sp>
+            <p:nvSpPr>
+              <p:cNvPr id="1246" name="Google Shape;1246;p28"/>
+              <p:cNvSpPr/>
+              <p:nvPr/>
+            </p:nvSpPr>
+            <p:spPr>
+              <a:xfrm>
+                <a:off x="2730750" y="2674550"/>
+                <a:ext cx="300825" cy="300825"/>
+              </a:xfrm>
+              <a:custGeom>
+                <a:avLst/>
+                <a:gdLst/>
+                <a:ahLst/>
+                <a:cxnLst/>
+                <a:rect l="l" t="t" r="r" b="b"/>
+                <a:pathLst>
+                  <a:path w="12033" h="12033" fill="none" extrusionOk="0">
+                    <a:moveTo>
+                      <a:pt x="12032" y="1"/>
+                    </a:moveTo>
+                    <a:lnTo>
+                      <a:pt x="0" y="12033"/>
+                    </a:lnTo>
+                  </a:path>
+                </a:pathLst>
+              </a:custGeom>
+              <a:noFill/>
+              <a:ln w="19050" cap="rnd" cmpd="sng">
+                <a:solidFill>
+                  <a:schemeClr val="lt2"/>
+                </a:solidFill>
+                <a:prstDash val="solid"/>
+                <a:miter lim="32519"/>
+                <a:headEnd type="none" w="sm" len="sm"/>
+                <a:tailEnd type="none" w="sm" len="sm"/>
+              </a:ln>
+            </p:spPr>
+            <p:txBody>
+              <a:bodyPr spcFirstLastPara="1" wrap="square" lIns="91425" tIns="91425" rIns="91425" bIns="91425" anchor="ctr" anchorCtr="0">
+                <a:noAutofit/>
+              </a:bodyPr>
+              <a:lstStyle/>
+              <a:p>
+                <a:pPr marL="0" lvl="0" indent="0" algn="l" rtl="0">
+                  <a:spcBef>
+                    <a:spcPts val="0"/>
+                  </a:spcBef>
+                  <a:spcAft>
+                    <a:spcPts val="0"/>
+                  </a:spcAft>
+                  <a:buNone/>
+                </a:pPr>
+                <a:endParaRPr>
+                  <a:latin typeface="Inter"/>
+                  <a:ea typeface="Inter"/>
+                  <a:cs typeface="Inter"/>
+                  <a:sym typeface="Inter"/>
+                </a:endParaRPr>
+              </a:p>
+            </p:txBody>
+          </p:sp>
+        </p:grpSp>
+      </p:grpSp>
+      <p:grpSp>
+        <p:nvGrpSpPr>
+          <p:cNvPr id="1247" name="Google Shape;1247;p28"/>
+          <p:cNvGrpSpPr/>
+          <p:nvPr/>
+        </p:nvGrpSpPr>
+        <p:grpSpPr>
+          <a:xfrm flipH="1">
+            <a:off x="7500411" y="4566019"/>
+            <a:ext cx="2577160" cy="2638569"/>
+            <a:chOff x="-1115775" y="4467744"/>
+            <a:chExt cx="2577160" cy="2638569"/>
+          </a:xfrm>
+        </p:grpSpPr>
+        <p:sp>
+          <p:nvSpPr>
+            <p:cNvPr id="1248" name="Google Shape;1248;p28"/>
+            <p:cNvSpPr/>
+            <p:nvPr/>
+          </p:nvSpPr>
+          <p:spPr>
+            <a:xfrm>
+              <a:off x="-961762" y="4467744"/>
+              <a:ext cx="1751700" cy="1751700"/>
+            </a:xfrm>
+            <a:prstGeom prst="ellipse">
+              <a:avLst/>
+            </a:prstGeom>
+            <a:solidFill>
+              <a:schemeClr val="accent1"/>
+            </a:solidFill>
+            <a:ln>
+              <a:noFill/>
+            </a:ln>
+          </p:spPr>
+          <p:txBody>
+            <a:bodyPr spcFirstLastPara="1" wrap="square" lIns="91425" tIns="91425" rIns="91425" bIns="91425" anchor="ctr" anchorCtr="0">
+              <a:noAutofit/>
+            </a:bodyPr>
+            <a:lstStyle/>
+            <a:p>
+              <a:pPr marL="0" lvl="0" indent="0" algn="l" rtl="0">
+                <a:spcBef>
+                  <a:spcPts val="0"/>
+                </a:spcBef>
+                <a:spcAft>
+                  <a:spcPts val="0"/>
+                </a:spcAft>
+                <a:buNone/>
+              </a:pPr>
+              <a:endParaRPr>
+                <a:latin typeface="Inter"/>
+                <a:ea typeface="Inter"/>
+                <a:cs typeface="Inter"/>
+                <a:sym typeface="Inter"/>
+              </a:endParaRPr>
+            </a:p>
+          </p:txBody>
+        </p:sp>
+        <p:grpSp>
+          <p:nvGrpSpPr>
+            <p:cNvPr id="1249" name="Google Shape;1249;p28"/>
+            <p:cNvGrpSpPr/>
+            <p:nvPr/>
+          </p:nvGrpSpPr>
+          <p:grpSpPr>
+            <a:xfrm rot="5400000" flipH="1">
+              <a:off x="-1115103" y="4529824"/>
+              <a:ext cx="2575817" cy="2577160"/>
+              <a:chOff x="1550275" y="1493275"/>
+              <a:chExt cx="1582100" cy="1582925"/>
+            </a:xfrm>
+          </p:grpSpPr>
+          <p:sp>
+            <p:nvSpPr>
+              <p:cNvPr id="1250" name="Google Shape;1250;p28"/>
+              <p:cNvSpPr/>
+              <p:nvPr/>
+            </p:nvSpPr>
+            <p:spPr>
+              <a:xfrm>
+                <a:off x="1650275" y="1594100"/>
+                <a:ext cx="301650" cy="300825"/>
+              </a:xfrm>
+              <a:custGeom>
+                <a:avLst/>
+                <a:gdLst/>
+                <a:ahLst/>
+                <a:cxnLst/>
+                <a:rect l="l" t="t" r="r" b="b"/>
+                <a:pathLst>
+                  <a:path w="12066" h="12033" fill="none" extrusionOk="0">
+                    <a:moveTo>
+                      <a:pt x="1" y="12032"/>
+                    </a:moveTo>
+                    <a:lnTo>
+                      <a:pt x="12065" y="0"/>
+                    </a:lnTo>
+                  </a:path>
+                </a:pathLst>
+              </a:custGeom>
+              <a:noFill/>
+              <a:ln w="19050" cap="rnd" cmpd="sng">
+                <a:solidFill>
+                  <a:schemeClr val="lt2"/>
+                </a:solidFill>
+                <a:prstDash val="solid"/>
+                <a:miter lim="32519"/>
+                <a:headEnd type="none" w="sm" len="sm"/>
+                <a:tailEnd type="none" w="sm" len="sm"/>
+              </a:ln>
+            </p:spPr>
+            <p:txBody>
+              <a:bodyPr spcFirstLastPara="1" wrap="square" lIns="91425" tIns="91425" rIns="91425" bIns="91425" anchor="ctr" anchorCtr="0">
+                <a:noAutofit/>
+              </a:bodyPr>
+              <a:lstStyle/>
+              <a:p>
+                <a:pPr marL="0" lvl="0" indent="0" algn="l" rtl="0">
+                  <a:spcBef>
+                    <a:spcPts val="0"/>
+                  </a:spcBef>
+                  <a:spcAft>
+                    <a:spcPts val="0"/>
+                  </a:spcAft>
+                  <a:buNone/>
+                </a:pPr>
+                <a:endParaRPr>
+                  <a:latin typeface="Inter"/>
+                  <a:ea typeface="Inter"/>
+                  <a:cs typeface="Inter"/>
+                  <a:sym typeface="Inter"/>
+                </a:endParaRPr>
+              </a:p>
+            </p:txBody>
+          </p:sp>
+          <p:sp>
+            <p:nvSpPr>
+              <p:cNvPr id="1251" name="Google Shape;1251;p28"/>
+              <p:cNvSpPr/>
+              <p:nvPr/>
+            </p:nvSpPr>
+            <p:spPr>
+              <a:xfrm>
+                <a:off x="1560025" y="1503850"/>
+                <a:ext cx="648800" cy="647975"/>
+              </a:xfrm>
+              <a:custGeom>
+                <a:avLst/>
+                <a:gdLst/>
+                <a:ahLst/>
+                <a:cxnLst/>
+                <a:rect l="l" t="t" r="r" b="b"/>
+                <a:pathLst>
+                  <a:path w="25952" h="25919" fill="none" extrusionOk="0">
+                    <a:moveTo>
+                      <a:pt x="1" y="25919"/>
+                    </a:moveTo>
+                    <a:lnTo>
+                      <a:pt x="25952" y="0"/>
+                    </a:lnTo>
+                  </a:path>
+                </a:pathLst>
+              </a:custGeom>
+              <a:noFill/>
+              <a:ln w="19050" cap="rnd" cmpd="sng">
+                <a:solidFill>
+                  <a:schemeClr val="lt2"/>
+                </a:solidFill>
+                <a:prstDash val="solid"/>
+                <a:miter lim="32519"/>
+                <a:headEnd type="none" w="sm" len="sm"/>
+                <a:tailEnd type="none" w="sm" len="sm"/>
+              </a:ln>
+            </p:spPr>
+            <p:txBody>
+              <a:bodyPr spcFirstLastPara="1" wrap="square" lIns="91425" tIns="91425" rIns="91425" bIns="91425" anchor="ctr" anchorCtr="0">
+                <a:noAutofit/>
+              </a:bodyPr>
+              <a:lstStyle/>
+              <a:p>
+                <a:pPr marL="0" lvl="0" indent="0" algn="l" rtl="0">
+                  <a:spcBef>
+                    <a:spcPts val="0"/>
+                  </a:spcBef>
+                  <a:spcAft>
+                    <a:spcPts val="0"/>
+                  </a:spcAft>
+                  <a:buNone/>
+                </a:pPr>
+                <a:endParaRPr>
+                  <a:latin typeface="Inter"/>
+                  <a:ea typeface="Inter"/>
+                  <a:cs typeface="Inter"/>
+                  <a:sym typeface="Inter"/>
+                </a:endParaRPr>
+              </a:p>
+            </p:txBody>
+          </p:sp>
+          <p:sp>
+            <p:nvSpPr>
+              <p:cNvPr id="1252" name="Google Shape;1252;p28"/>
+              <p:cNvSpPr/>
+              <p:nvPr/>
+            </p:nvSpPr>
+            <p:spPr>
+              <a:xfrm>
+                <a:off x="1550275" y="1493275"/>
+                <a:ext cx="834150" cy="834975"/>
+              </a:xfrm>
+              <a:custGeom>
+                <a:avLst/>
+                <a:gdLst/>
+                <a:ahLst/>
+                <a:cxnLst/>
+                <a:rect l="l" t="t" r="r" b="b"/>
+                <a:pathLst>
+                  <a:path w="33366" h="33399" fill="none" extrusionOk="0">
+                    <a:moveTo>
+                      <a:pt x="1" y="33398"/>
+                    </a:moveTo>
+                    <a:lnTo>
+                      <a:pt x="33366" y="1"/>
+                    </a:lnTo>
+                  </a:path>
+                </a:pathLst>
+              </a:custGeom>
+              <a:noFill/>
+              <a:ln w="19050" cap="rnd" cmpd="sng">
+                <a:solidFill>
+                  <a:schemeClr val="lt2"/>
+                </a:solidFill>
+                <a:prstDash val="solid"/>
+                <a:miter lim="32519"/>
+                <a:headEnd type="none" w="sm" len="sm"/>
+                <a:tailEnd type="none" w="sm" len="sm"/>
+              </a:ln>
+            </p:spPr>
+            <p:txBody>
+              <a:bodyPr spcFirstLastPara="1" wrap="square" lIns="91425" tIns="91425" rIns="91425" bIns="91425" anchor="ctr" anchorCtr="0">
+                <a:noAutofit/>
+              </a:bodyPr>
+              <a:lstStyle/>
+              <a:p>
+                <a:pPr marL="0" lvl="0" indent="0" algn="l" rtl="0">
+                  <a:spcBef>
+                    <a:spcPts val="0"/>
+                  </a:spcBef>
+                  <a:spcAft>
+                    <a:spcPts val="0"/>
+                  </a:spcAft>
+                  <a:buNone/>
+                </a:pPr>
+                <a:endParaRPr>
+                  <a:latin typeface="Inter"/>
+                  <a:ea typeface="Inter"/>
+                  <a:cs typeface="Inter"/>
+                  <a:sym typeface="Inter"/>
+                </a:endParaRPr>
+              </a:p>
+            </p:txBody>
+          </p:sp>
+          <p:sp>
+            <p:nvSpPr>
+              <p:cNvPr id="1253" name="Google Shape;1253;p28"/>
+              <p:cNvSpPr/>
+              <p:nvPr/>
+            </p:nvSpPr>
+            <p:spPr>
+              <a:xfrm>
+                <a:off x="1571425" y="1514425"/>
+                <a:ext cx="957725" cy="958525"/>
+              </a:xfrm>
+              <a:custGeom>
+                <a:avLst/>
+                <a:gdLst/>
+                <a:ahLst/>
+                <a:cxnLst/>
+                <a:rect l="l" t="t" r="r" b="b"/>
+                <a:pathLst>
+                  <a:path w="38309" h="38341" fill="none" extrusionOk="0">
+                    <a:moveTo>
+                      <a:pt x="0" y="38341"/>
+                    </a:moveTo>
+                    <a:lnTo>
+                      <a:pt x="38308" y="0"/>
+                    </a:lnTo>
+                  </a:path>
+                </a:pathLst>
+              </a:custGeom>
+              <a:noFill/>
+              <a:ln w="19050" cap="rnd" cmpd="sng">
+                <a:solidFill>
+                  <a:schemeClr val="lt2"/>
+                </a:solidFill>
+                <a:prstDash val="solid"/>
+                <a:miter lim="32519"/>
+                <a:headEnd type="none" w="sm" len="sm"/>
+                <a:tailEnd type="none" w="sm" len="sm"/>
+              </a:ln>
+            </p:spPr>
+            <p:txBody>
+              <a:bodyPr spcFirstLastPara="1" wrap="square" lIns="91425" tIns="91425" rIns="91425" bIns="91425" anchor="ctr" anchorCtr="0">
+                <a:noAutofit/>
+              </a:bodyPr>
+              <a:lstStyle/>
+              <a:p>
+                <a:pPr marL="0" lvl="0" indent="0" algn="l" rtl="0">
+                  <a:spcBef>
+                    <a:spcPts val="0"/>
+                  </a:spcBef>
+                  <a:spcAft>
+                    <a:spcPts val="0"/>
+                  </a:spcAft>
+                  <a:buNone/>
+                </a:pPr>
+                <a:endParaRPr>
+                  <a:latin typeface="Inter"/>
+                  <a:ea typeface="Inter"/>
+                  <a:cs typeface="Inter"/>
+                  <a:sym typeface="Inter"/>
+                </a:endParaRPr>
+              </a:p>
+            </p:txBody>
+          </p:sp>
+          <p:sp>
+            <p:nvSpPr>
+              <p:cNvPr id="1254" name="Google Shape;1254;p28"/>
+              <p:cNvSpPr/>
+              <p:nvPr/>
+            </p:nvSpPr>
+            <p:spPr>
+              <a:xfrm>
+                <a:off x="1612875" y="1555875"/>
+                <a:ext cx="1041475" cy="1042275"/>
+              </a:xfrm>
+              <a:custGeom>
+                <a:avLst/>
+                <a:gdLst/>
+                <a:ahLst/>
+                <a:cxnLst/>
+                <a:rect l="l" t="t" r="r" b="b"/>
+                <a:pathLst>
+                  <a:path w="41659" h="41691" fill="none" extrusionOk="0">
+                    <a:moveTo>
+                      <a:pt x="1" y="41691"/>
+                    </a:moveTo>
+                    <a:lnTo>
+                      <a:pt x="41658" y="1"/>
+                    </a:lnTo>
+                  </a:path>
+                </a:pathLst>
+              </a:custGeom>
+              <a:noFill/>
+              <a:ln w="19050" cap="rnd" cmpd="sng">
+                <a:solidFill>
+                  <a:schemeClr val="lt2"/>
+                </a:solidFill>
+                <a:prstDash val="solid"/>
+                <a:miter lim="32519"/>
+                <a:headEnd type="none" w="sm" len="sm"/>
+                <a:tailEnd type="none" w="sm" len="sm"/>
+              </a:ln>
+            </p:spPr>
+            <p:txBody>
+              <a:bodyPr spcFirstLastPara="1" wrap="square" lIns="91425" tIns="91425" rIns="91425" bIns="91425" anchor="ctr" anchorCtr="0">
+                <a:noAutofit/>
+              </a:bodyPr>
+              <a:lstStyle/>
+              <a:p>
+                <a:pPr marL="0" lvl="0" indent="0" algn="l" rtl="0">
+                  <a:spcBef>
+                    <a:spcPts val="0"/>
+                  </a:spcBef>
+                  <a:spcAft>
+                    <a:spcPts val="0"/>
+                  </a:spcAft>
+                  <a:buNone/>
+                </a:pPr>
+                <a:endParaRPr>
+                  <a:latin typeface="Inter"/>
+                  <a:ea typeface="Inter"/>
+                  <a:cs typeface="Inter"/>
+                  <a:sym typeface="Inter"/>
+                </a:endParaRPr>
+              </a:p>
+            </p:txBody>
+          </p:sp>
+          <p:sp>
+            <p:nvSpPr>
+              <p:cNvPr id="1255" name="Google Shape;1255;p28"/>
+              <p:cNvSpPr/>
+              <p:nvPr/>
+            </p:nvSpPr>
+            <p:spPr>
+              <a:xfrm>
+                <a:off x="1669800" y="1613600"/>
+                <a:ext cx="1093475" cy="1092675"/>
+              </a:xfrm>
+              <a:custGeom>
+                <a:avLst/>
+                <a:gdLst/>
+                <a:ahLst/>
+                <a:cxnLst/>
+                <a:rect l="l" t="t" r="r" b="b"/>
+                <a:pathLst>
+                  <a:path w="43739" h="43707" fill="none" extrusionOk="0">
+                    <a:moveTo>
+                      <a:pt x="0" y="43707"/>
+                    </a:moveTo>
+                    <a:lnTo>
+                      <a:pt x="43739" y="1"/>
+                    </a:lnTo>
+                  </a:path>
+                </a:pathLst>
+              </a:custGeom>
+              <a:noFill/>
+              <a:ln w="19050" cap="rnd" cmpd="sng">
+                <a:solidFill>
+                  <a:schemeClr val="lt2"/>
+                </a:solidFill>
+                <a:prstDash val="solid"/>
+                <a:miter lim="32519"/>
+                <a:headEnd type="none" w="sm" len="sm"/>
+                <a:tailEnd type="none" w="sm" len="sm"/>
+              </a:ln>
+            </p:spPr>
+            <p:txBody>
+              <a:bodyPr spcFirstLastPara="1" wrap="square" lIns="91425" tIns="91425" rIns="91425" bIns="91425" anchor="ctr" anchorCtr="0">
+                <a:noAutofit/>
+              </a:bodyPr>
+              <a:lstStyle/>
+              <a:p>
+                <a:pPr marL="0" lvl="0" indent="0" algn="l" rtl="0">
+                  <a:spcBef>
+                    <a:spcPts val="0"/>
+                  </a:spcBef>
+                  <a:spcAft>
+                    <a:spcPts val="0"/>
+                  </a:spcAft>
+                  <a:buNone/>
+                </a:pPr>
+                <a:endParaRPr>
+                  <a:latin typeface="Inter"/>
+                  <a:ea typeface="Inter"/>
+                  <a:cs typeface="Inter"/>
+                  <a:sym typeface="Inter"/>
+                </a:endParaRPr>
+              </a:p>
+            </p:txBody>
+          </p:sp>
+          <p:sp>
+            <p:nvSpPr>
+              <p:cNvPr id="1256" name="Google Shape;1256;p28"/>
+              <p:cNvSpPr/>
+              <p:nvPr/>
+            </p:nvSpPr>
+            <p:spPr>
+              <a:xfrm>
+                <a:off x="1710100" y="1684329"/>
+                <a:ext cx="1148362" cy="1145328"/>
+              </a:xfrm>
+              <a:custGeom>
+                <a:avLst/>
+                <a:gdLst/>
+                <a:ahLst/>
+                <a:cxnLst/>
+                <a:rect l="l" t="t" r="r" b="b"/>
+                <a:pathLst>
+                  <a:path w="75837" h="75837" fill="none" extrusionOk="0">
+                    <a:moveTo>
+                      <a:pt x="1" y="75836"/>
+                    </a:moveTo>
+                    <a:lnTo>
+                      <a:pt x="75837" y="1"/>
+                    </a:lnTo>
+                  </a:path>
+                </a:pathLst>
+              </a:custGeom>
+              <a:noFill/>
+              <a:ln w="19050" cap="rnd" cmpd="sng">
+                <a:solidFill>
+                  <a:schemeClr val="lt2"/>
+                </a:solidFill>
+                <a:prstDash val="solid"/>
+                <a:miter lim="32519"/>
+                <a:headEnd type="none" w="sm" len="sm"/>
+                <a:tailEnd type="none" w="sm" len="sm"/>
+              </a:ln>
+            </p:spPr>
+            <p:txBody>
+              <a:bodyPr spcFirstLastPara="1" wrap="square" lIns="91425" tIns="91425" rIns="91425" bIns="91425" anchor="ctr" anchorCtr="0">
+                <a:noAutofit/>
+              </a:bodyPr>
+              <a:lstStyle/>
+              <a:p>
+                <a:pPr marL="0" lvl="0" indent="0" algn="l" rtl="0">
+                  <a:spcBef>
+                    <a:spcPts val="0"/>
+                  </a:spcBef>
+                  <a:spcAft>
+                    <a:spcPts val="0"/>
+                  </a:spcAft>
+                  <a:buNone/>
+                </a:pPr>
+                <a:endParaRPr>
+                  <a:latin typeface="Inter"/>
+                  <a:ea typeface="Inter"/>
+                  <a:cs typeface="Inter"/>
+                  <a:sym typeface="Inter"/>
+                </a:endParaRPr>
+              </a:p>
+            </p:txBody>
+          </p:sp>
+          <p:sp>
+            <p:nvSpPr>
+              <p:cNvPr id="1257" name="Google Shape;1257;p28"/>
+              <p:cNvSpPr/>
+              <p:nvPr/>
+            </p:nvSpPr>
+            <p:spPr>
+              <a:xfrm>
+                <a:off x="1828936" y="1767251"/>
+                <a:ext cx="1113203" cy="1126369"/>
+              </a:xfrm>
+              <a:custGeom>
+                <a:avLst/>
+                <a:gdLst/>
+                <a:ahLst/>
+                <a:cxnLst/>
+                <a:rect l="l" t="t" r="r" b="b"/>
+                <a:pathLst>
+                  <a:path w="75870" h="75837" fill="none" extrusionOk="0">
+                    <a:moveTo>
+                      <a:pt x="1" y="75836"/>
+                    </a:moveTo>
+                    <a:lnTo>
+                      <a:pt x="75869" y="1"/>
+                    </a:lnTo>
+                  </a:path>
+                </a:pathLst>
+              </a:custGeom>
+              <a:noFill/>
+              <a:ln w="19050" cap="rnd" cmpd="sng">
+                <a:solidFill>
+                  <a:schemeClr val="lt2"/>
+                </a:solidFill>
+                <a:prstDash val="solid"/>
+                <a:miter lim="32519"/>
+                <a:headEnd type="none" w="sm" len="sm"/>
+                <a:tailEnd type="none" w="sm" len="sm"/>
+              </a:ln>
+            </p:spPr>
+            <p:txBody>
+              <a:bodyPr spcFirstLastPara="1" wrap="square" lIns="91425" tIns="91425" rIns="91425" bIns="91425" anchor="ctr" anchorCtr="0">
+                <a:noAutofit/>
+              </a:bodyPr>
+              <a:lstStyle/>
+              <a:p>
+                <a:pPr marL="0" lvl="0" indent="0" algn="l" rtl="0">
+                  <a:spcBef>
+                    <a:spcPts val="0"/>
+                  </a:spcBef>
+                  <a:spcAft>
+                    <a:spcPts val="0"/>
+                  </a:spcAft>
+                  <a:buNone/>
+                </a:pPr>
+                <a:endParaRPr>
+                  <a:latin typeface="Inter"/>
+                  <a:ea typeface="Inter"/>
+                  <a:cs typeface="Inter"/>
+                  <a:sym typeface="Inter"/>
+                </a:endParaRPr>
+              </a:p>
+            </p:txBody>
+          </p:sp>
+          <p:sp>
+            <p:nvSpPr>
+              <p:cNvPr id="1258" name="Google Shape;1258;p28"/>
+              <p:cNvSpPr/>
+              <p:nvPr/>
+            </p:nvSpPr>
+            <p:spPr>
+              <a:xfrm>
+                <a:off x="1929499" y="1863204"/>
+                <a:ext cx="1082574" cy="1112692"/>
+              </a:xfrm>
+              <a:custGeom>
+                <a:avLst/>
+                <a:gdLst/>
+                <a:ahLst/>
+                <a:cxnLst/>
+                <a:rect l="l" t="t" r="r" b="b"/>
+                <a:pathLst>
+                  <a:path w="74828" h="74828" fill="none" extrusionOk="0">
+                    <a:moveTo>
+                      <a:pt x="0" y="74828"/>
+                    </a:moveTo>
+                    <a:lnTo>
+                      <a:pt x="74828" y="0"/>
+                    </a:lnTo>
+                  </a:path>
+                </a:pathLst>
+              </a:custGeom>
+              <a:noFill/>
+              <a:ln w="19050" cap="rnd" cmpd="sng">
+                <a:solidFill>
+                  <a:schemeClr val="lt2"/>
+                </a:solidFill>
+                <a:prstDash val="solid"/>
+                <a:miter lim="32519"/>
+                <a:headEnd type="none" w="sm" len="sm"/>
+                <a:tailEnd type="none" w="sm" len="sm"/>
+              </a:ln>
+            </p:spPr>
+            <p:txBody>
+              <a:bodyPr spcFirstLastPara="1" wrap="square" lIns="91425" tIns="91425" rIns="91425" bIns="91425" anchor="ctr" anchorCtr="0">
+                <a:noAutofit/>
+              </a:bodyPr>
+              <a:lstStyle/>
+              <a:p>
+                <a:pPr marL="0" lvl="0" indent="0" algn="l" rtl="0">
+                  <a:spcBef>
+                    <a:spcPts val="0"/>
+                  </a:spcBef>
+                  <a:spcAft>
+                    <a:spcPts val="0"/>
+                  </a:spcAft>
+                  <a:buNone/>
+                </a:pPr>
+                <a:endParaRPr>
+                  <a:latin typeface="Inter"/>
+                  <a:ea typeface="Inter"/>
+                  <a:cs typeface="Inter"/>
+                  <a:sym typeface="Inter"/>
+                </a:endParaRPr>
+              </a:p>
+            </p:txBody>
+          </p:sp>
+          <p:sp>
+            <p:nvSpPr>
+              <p:cNvPr id="1259" name="Google Shape;1259;p28"/>
+              <p:cNvSpPr/>
+              <p:nvPr/>
+            </p:nvSpPr>
+            <p:spPr>
+              <a:xfrm>
+                <a:off x="2027500" y="1971325"/>
+                <a:ext cx="1042275" cy="1042275"/>
+              </a:xfrm>
+              <a:custGeom>
+                <a:avLst/>
+                <a:gdLst/>
+                <a:ahLst/>
+                <a:cxnLst/>
+                <a:rect l="l" t="t" r="r" b="b"/>
+                <a:pathLst>
+                  <a:path w="41691" h="41691" fill="none" extrusionOk="0">
+                    <a:moveTo>
+                      <a:pt x="41691" y="0"/>
+                    </a:moveTo>
+                    <a:lnTo>
+                      <a:pt x="1" y="41690"/>
+                    </a:lnTo>
+                  </a:path>
+                </a:pathLst>
+              </a:custGeom>
+              <a:noFill/>
+              <a:ln w="19050" cap="rnd" cmpd="sng">
+                <a:solidFill>
+                  <a:schemeClr val="lt2"/>
+                </a:solidFill>
+                <a:prstDash val="solid"/>
+                <a:miter lim="32519"/>
+                <a:headEnd type="none" w="sm" len="sm"/>
+                <a:tailEnd type="none" w="sm" len="sm"/>
+              </a:ln>
+            </p:spPr>
+            <p:txBody>
+              <a:bodyPr spcFirstLastPara="1" wrap="square" lIns="91425" tIns="91425" rIns="91425" bIns="91425" anchor="ctr" anchorCtr="0">
+                <a:noAutofit/>
+              </a:bodyPr>
+              <a:lstStyle/>
+              <a:p>
+                <a:pPr marL="0" lvl="0" indent="0" algn="l" rtl="0">
+                  <a:spcBef>
+                    <a:spcPts val="0"/>
+                  </a:spcBef>
+                  <a:spcAft>
+                    <a:spcPts val="0"/>
+                  </a:spcAft>
+                  <a:buNone/>
+                </a:pPr>
+                <a:endParaRPr>
+                  <a:latin typeface="Inter"/>
+                  <a:ea typeface="Inter"/>
+                  <a:cs typeface="Inter"/>
+                  <a:sym typeface="Inter"/>
+                </a:endParaRPr>
+              </a:p>
+            </p:txBody>
+          </p:sp>
+          <p:sp>
+            <p:nvSpPr>
+              <p:cNvPr id="1260" name="Google Shape;1260;p28"/>
+              <p:cNvSpPr/>
+              <p:nvPr/>
+            </p:nvSpPr>
+            <p:spPr>
+              <a:xfrm>
+                <a:off x="2152700" y="2096525"/>
+                <a:ext cx="958550" cy="958525"/>
+              </a:xfrm>
+              <a:custGeom>
+                <a:avLst/>
+                <a:gdLst/>
+                <a:ahLst/>
+                <a:cxnLst/>
+                <a:rect l="l" t="t" r="r" b="b"/>
+                <a:pathLst>
+                  <a:path w="38342" h="38341" fill="none" extrusionOk="0">
+                    <a:moveTo>
+                      <a:pt x="38341" y="0"/>
+                    </a:moveTo>
+                    <a:lnTo>
+                      <a:pt x="1" y="38341"/>
+                    </a:lnTo>
+                  </a:path>
+                </a:pathLst>
+              </a:custGeom>
+              <a:noFill/>
+              <a:ln w="19050" cap="rnd" cmpd="sng">
+                <a:solidFill>
+                  <a:schemeClr val="lt2"/>
+                </a:solidFill>
+                <a:prstDash val="solid"/>
+                <a:miter lim="32519"/>
+                <a:headEnd type="none" w="sm" len="sm"/>
+                <a:tailEnd type="none" w="sm" len="sm"/>
+              </a:ln>
+            </p:spPr>
+            <p:txBody>
+              <a:bodyPr spcFirstLastPara="1" wrap="square" lIns="91425" tIns="91425" rIns="91425" bIns="91425" anchor="ctr" anchorCtr="0">
+                <a:noAutofit/>
+              </a:bodyPr>
+              <a:lstStyle/>
+              <a:p>
+                <a:pPr marL="0" lvl="0" indent="0" algn="l" rtl="0">
+                  <a:spcBef>
+                    <a:spcPts val="0"/>
+                  </a:spcBef>
+                  <a:spcAft>
+                    <a:spcPts val="0"/>
+                  </a:spcAft>
+                  <a:buNone/>
+                </a:pPr>
+                <a:endParaRPr>
+                  <a:latin typeface="Inter"/>
+                  <a:ea typeface="Inter"/>
+                  <a:cs typeface="Inter"/>
+                  <a:sym typeface="Inter"/>
+                </a:endParaRPr>
+              </a:p>
+            </p:txBody>
+          </p:sp>
+          <p:sp>
+            <p:nvSpPr>
+              <p:cNvPr id="1261" name="Google Shape;1261;p28"/>
+              <p:cNvSpPr/>
+              <p:nvPr/>
+            </p:nvSpPr>
+            <p:spPr>
+              <a:xfrm>
+                <a:off x="2298225" y="2241225"/>
+                <a:ext cx="834150" cy="834975"/>
+              </a:xfrm>
+              <a:custGeom>
+                <a:avLst/>
+                <a:gdLst/>
+                <a:ahLst/>
+                <a:cxnLst/>
+                <a:rect l="l" t="t" r="r" b="b"/>
+                <a:pathLst>
+                  <a:path w="33366" h="33399" fill="none" extrusionOk="0">
+                    <a:moveTo>
+                      <a:pt x="33366" y="1"/>
+                    </a:moveTo>
+                    <a:lnTo>
+                      <a:pt x="1" y="33398"/>
+                    </a:lnTo>
+                  </a:path>
+                </a:pathLst>
+              </a:custGeom>
+              <a:noFill/>
+              <a:ln w="19050" cap="rnd" cmpd="sng">
+                <a:solidFill>
+                  <a:schemeClr val="lt2"/>
+                </a:solidFill>
+                <a:prstDash val="solid"/>
+                <a:miter lim="32519"/>
+                <a:headEnd type="none" w="sm" len="sm"/>
+                <a:tailEnd type="none" w="sm" len="sm"/>
+              </a:ln>
+            </p:spPr>
+            <p:txBody>
+              <a:bodyPr spcFirstLastPara="1" wrap="square" lIns="91425" tIns="91425" rIns="91425" bIns="91425" anchor="ctr" anchorCtr="0">
+                <a:noAutofit/>
+              </a:bodyPr>
+              <a:lstStyle/>
+              <a:p>
+                <a:pPr marL="0" lvl="0" indent="0" algn="l" rtl="0">
+                  <a:spcBef>
+                    <a:spcPts val="0"/>
+                  </a:spcBef>
+                  <a:spcAft>
+                    <a:spcPts val="0"/>
+                  </a:spcAft>
+                  <a:buNone/>
+                </a:pPr>
+                <a:endParaRPr>
+                  <a:latin typeface="Inter"/>
+                  <a:ea typeface="Inter"/>
+                  <a:cs typeface="Inter"/>
+                  <a:sym typeface="Inter"/>
+                </a:endParaRPr>
+              </a:p>
+            </p:txBody>
+          </p:sp>
+          <p:sp>
+            <p:nvSpPr>
+              <p:cNvPr id="1262" name="Google Shape;1262;p28"/>
+              <p:cNvSpPr/>
+              <p:nvPr/>
+            </p:nvSpPr>
+            <p:spPr>
+              <a:xfrm>
+                <a:off x="2473825" y="2417650"/>
+                <a:ext cx="648800" cy="648800"/>
+              </a:xfrm>
+              <a:custGeom>
+                <a:avLst/>
+                <a:gdLst/>
+                <a:ahLst/>
+                <a:cxnLst/>
+                <a:rect l="l" t="t" r="r" b="b"/>
+                <a:pathLst>
+                  <a:path w="25952" h="25952" fill="none" extrusionOk="0">
+                    <a:moveTo>
+                      <a:pt x="25952" y="0"/>
+                    </a:moveTo>
+                    <a:lnTo>
+                      <a:pt x="1" y="25951"/>
+                    </a:lnTo>
+                  </a:path>
+                </a:pathLst>
+              </a:custGeom>
+              <a:noFill/>
+              <a:ln w="19050" cap="rnd" cmpd="sng">
+                <a:solidFill>
+                  <a:schemeClr val="lt2"/>
+                </a:solidFill>
+                <a:prstDash val="solid"/>
+                <a:miter lim="32519"/>
+                <a:headEnd type="none" w="sm" len="sm"/>
+                <a:tailEnd type="none" w="sm" len="sm"/>
+              </a:ln>
+            </p:spPr>
+            <p:txBody>
+              <a:bodyPr spcFirstLastPara="1" wrap="square" lIns="91425" tIns="91425" rIns="91425" bIns="91425" anchor="ctr" anchorCtr="0">
+                <a:noAutofit/>
+              </a:bodyPr>
+              <a:lstStyle/>
+              <a:p>
+                <a:pPr marL="0" lvl="0" indent="0" algn="l" rtl="0">
+                  <a:spcBef>
+                    <a:spcPts val="0"/>
+                  </a:spcBef>
+                  <a:spcAft>
+                    <a:spcPts val="0"/>
+                  </a:spcAft>
+                  <a:buNone/>
+                </a:pPr>
+                <a:endParaRPr>
+                  <a:latin typeface="Inter"/>
+                  <a:ea typeface="Inter"/>
+                  <a:cs typeface="Inter"/>
+                  <a:sym typeface="Inter"/>
+                </a:endParaRPr>
+              </a:p>
+            </p:txBody>
+          </p:sp>
+          <p:sp>
+            <p:nvSpPr>
+              <p:cNvPr id="1263" name="Google Shape;1263;p28"/>
+              <p:cNvSpPr/>
+              <p:nvPr/>
+            </p:nvSpPr>
+            <p:spPr>
+              <a:xfrm>
+                <a:off x="2730750" y="2674550"/>
+                <a:ext cx="300825" cy="300825"/>
+              </a:xfrm>
+              <a:custGeom>
+                <a:avLst/>
+                <a:gdLst/>
+                <a:ahLst/>
+                <a:cxnLst/>
+                <a:rect l="l" t="t" r="r" b="b"/>
+                <a:pathLst>
+                  <a:path w="12033" h="12033" fill="none" extrusionOk="0">
+                    <a:moveTo>
+                      <a:pt x="12032" y="1"/>
+                    </a:moveTo>
+                    <a:lnTo>
+                      <a:pt x="0" y="12033"/>
+                    </a:lnTo>
+                  </a:path>
+                </a:pathLst>
+              </a:custGeom>
+              <a:noFill/>
+              <a:ln w="19050" cap="rnd" cmpd="sng">
+                <a:solidFill>
+                  <a:schemeClr val="lt2"/>
+                </a:solidFill>
+                <a:prstDash val="solid"/>
+                <a:miter lim="32519"/>
+                <a:headEnd type="none" w="sm" len="sm"/>
+                <a:tailEnd type="none" w="sm" len="sm"/>
+              </a:ln>
+            </p:spPr>
+            <p:txBody>
+              <a:bodyPr spcFirstLastPara="1" wrap="square" lIns="91425" tIns="91425" rIns="91425" bIns="91425" anchor="ctr" anchorCtr="0">
+                <a:noAutofit/>
+              </a:bodyPr>
+              <a:lstStyle/>
+              <a:p>
+                <a:pPr marL="0" lvl="0" indent="0" algn="l" rtl="0">
+                  <a:spcBef>
+                    <a:spcPts val="0"/>
+                  </a:spcBef>
+                  <a:spcAft>
+                    <a:spcPts val="0"/>
+                  </a:spcAft>
+                  <a:buNone/>
+                </a:pPr>
+                <a:endParaRPr>
+                  <a:latin typeface="Inter"/>
+                  <a:ea typeface="Inter"/>
+                  <a:cs typeface="Inter"/>
+                  <a:sym typeface="Inter"/>
+                </a:endParaRPr>
+              </a:p>
+            </p:txBody>
+          </p:sp>
+        </p:grpSp>
+      </p:grpSp>
+    </p:spTree>
+  </p:cSld>
+  <p:clrMapOvr>
+    <a:masterClrMapping/>
+  </p:clrMapOvr>
+</p:sldLayout>
+</file>
+
+<file path=ppt/slideLayouts/slideLayout5.xml><?xml version="1.0" encoding="utf-8"?>
 <p:sldLayout xmlns:a="http://schemas.openxmlformats.org/drawingml/2006/main" xmlns:r="http://schemas.openxmlformats.org/officeDocument/2006/relationships" xmlns:p="http://schemas.openxmlformats.org/presentationml/2006/main" matchingName="Background">
   <p:cSld name="CUSTOM_9">
     <p:spTree>
@@ -9255,7 +12531,7 @@
 </p:sldLayout>
 </file>
 
-<file path=ppt/slideLayouts/slideLayout5.xml><?xml version="1.0" encoding="utf-8"?>
+<file path=ppt/slideLayouts/slideLayout6.xml><?xml version="1.0" encoding="utf-8"?>
 <p:sldLayout xmlns:a="http://schemas.openxmlformats.org/drawingml/2006/main" xmlns:r="http://schemas.openxmlformats.org/officeDocument/2006/relationships" xmlns:p="http://schemas.openxmlformats.org/presentationml/2006/main" matchingName="Background 1">
   <p:cSld name="CUSTOM_10">
     <p:spTree>
@@ -13653,8 +16929,9 @@
     <p:sldLayoutId id="2147483648" r:id="rId1"/>
     <p:sldLayoutId id="2147483658" r:id="rId2"/>
     <p:sldLayoutId id="2147483670" r:id="rId3"/>
-    <p:sldLayoutId id="2147483679" r:id="rId4"/>
-    <p:sldLayoutId id="2147483680" r:id="rId5"/>
+    <p:sldLayoutId id="2147483674" r:id="rId4"/>
+    <p:sldLayoutId id="2147483679" r:id="rId5"/>
+    <p:sldLayoutId id="2147483680" r:id="rId6"/>
   </p:sldLayoutIdLst>
   <p:hf sldNum="0" hdr="0" ftr="0" dt="0"/>
   <p:txStyles>
@@ -22145,6 +25422,635 @@
   <p:cSld>
     <p:spTree>
       <p:nvGrpSpPr>
+        <p:cNvPr id="1" name="Shape 2561"/>
+        <p:cNvGrpSpPr/>
+        <p:nvPr/>
+      </p:nvGrpSpPr>
+      <p:grpSpPr>
+        <a:xfrm>
+          <a:off x="0" y="0"/>
+          <a:ext cx="0" cy="0"/>
+          <a:chOff x="0" y="0"/>
+          <a:chExt cx="0" cy="0"/>
+        </a:xfrm>
+      </p:grpSpPr>
+      <p:sp>
+        <p:nvSpPr>
+          <p:cNvPr id="2562" name="Google Shape;2562;p71"/>
+          <p:cNvSpPr txBox="1">
+            <a:spLocks noGrp="1"/>
+          </p:cNvSpPr>
+          <p:nvPr>
+            <p:ph type="title"/>
+          </p:nvPr>
+        </p:nvSpPr>
+        <p:spPr>
+          <a:xfrm>
+            <a:off x="1850647" y="357376"/>
+            <a:ext cx="3026151" cy="708000"/>
+          </a:xfrm>
+          <a:prstGeom prst="rect">
+            <a:avLst/>
+          </a:prstGeom>
+        </p:spPr>
+        <p:txBody>
+          <a:bodyPr spcFirstLastPara="1" wrap="square" lIns="91425" tIns="91425" rIns="91425" bIns="91425" anchor="t" anchorCtr="0">
+            <a:noAutofit/>
+          </a:bodyPr>
+          <a:lstStyle/>
+          <a:p>
+            <a:pPr marL="0" lvl="0" indent="0" algn="ctr" rtl="0">
+              <a:spcBef>
+                <a:spcPts val="0"/>
+              </a:spcBef>
+              <a:spcAft>
+                <a:spcPts val="0"/>
+              </a:spcAft>
+              <a:buNone/>
+            </a:pPr>
+            <a:r>
+              <a:rPr lang="en" dirty="0"/>
+              <a:t>NOSSO TIME</a:t>
+            </a:r>
+            <a:endParaRPr dirty="0"/>
+          </a:p>
+        </p:txBody>
+      </p:sp>
+      <p:sp>
+        <p:nvSpPr>
+          <p:cNvPr id="2564" name="Google Shape;2564;p71"/>
+          <p:cNvSpPr txBox="1">
+            <a:spLocks noGrp="1"/>
+          </p:cNvSpPr>
+          <p:nvPr>
+            <p:ph type="subTitle" idx="2"/>
+          </p:nvPr>
+        </p:nvSpPr>
+        <p:spPr>
+          <a:xfrm>
+            <a:off x="985295" y="2782895"/>
+            <a:ext cx="768318" cy="554100"/>
+          </a:xfrm>
+          <a:prstGeom prst="rect">
+            <a:avLst/>
+          </a:prstGeom>
+        </p:spPr>
+        <p:txBody>
+          <a:bodyPr spcFirstLastPara="1" wrap="square" lIns="91425" tIns="91425" rIns="91425" bIns="91425" anchor="b" anchorCtr="0">
+            <a:noAutofit/>
+          </a:bodyPr>
+          <a:lstStyle/>
+          <a:p>
+            <a:pPr marL="0" lvl="0" indent="0" algn="ctr" rtl="0">
+              <a:spcBef>
+                <a:spcPts val="0"/>
+              </a:spcBef>
+              <a:spcAft>
+                <a:spcPts val="0"/>
+              </a:spcAft>
+              <a:buNone/>
+            </a:pPr>
+            <a:r>
+              <a:rPr lang="en" sz="2200" dirty="0"/>
+              <a:t>Luiz</a:t>
+            </a:r>
+            <a:endParaRPr sz="2200" dirty="0"/>
+          </a:p>
+        </p:txBody>
+      </p:sp>
+      <p:sp>
+        <p:nvSpPr>
+          <p:cNvPr id="2566" name="Google Shape;2566;p71"/>
+          <p:cNvSpPr txBox="1">
+            <a:spLocks noGrp="1"/>
+          </p:cNvSpPr>
+          <p:nvPr>
+            <p:ph type="subTitle" idx="4"/>
+          </p:nvPr>
+        </p:nvSpPr>
+        <p:spPr>
+          <a:xfrm>
+            <a:off x="4785421" y="2741233"/>
+            <a:ext cx="1304400" cy="554100"/>
+          </a:xfrm>
+          <a:prstGeom prst="rect">
+            <a:avLst/>
+          </a:prstGeom>
+        </p:spPr>
+        <p:txBody>
+          <a:bodyPr spcFirstLastPara="1" wrap="square" lIns="91425" tIns="91425" rIns="91425" bIns="91425" anchor="b" anchorCtr="0">
+            <a:noAutofit/>
+          </a:bodyPr>
+          <a:lstStyle/>
+          <a:p>
+            <a:pPr marL="0" lvl="0" indent="0" algn="ctr" rtl="0">
+              <a:spcBef>
+                <a:spcPts val="0"/>
+              </a:spcBef>
+              <a:spcAft>
+                <a:spcPts val="0"/>
+              </a:spcAft>
+              <a:buNone/>
+            </a:pPr>
+            <a:r>
+              <a:rPr lang="en" sz="2200" dirty="0"/>
+              <a:t>Douglas</a:t>
+            </a:r>
+            <a:endParaRPr sz="2200" dirty="0"/>
+          </a:p>
+        </p:txBody>
+      </p:sp>
+      <p:pic>
+        <p:nvPicPr>
+          <p:cNvPr id="15" name="Imagem 14" descr="Uma imagem contendo pessoa, no interior, mulher, jovem&#10;&#10;Descrição gerada automaticamente">
+            <a:extLst>
+              <a:ext uri="{FF2B5EF4-FFF2-40B4-BE49-F238E27FC236}">
+                <a16:creationId xmlns:a16="http://schemas.microsoft.com/office/drawing/2014/main" id="{A4F105AE-ED64-497E-4704-ADC94CE2F312}"/>
+              </a:ext>
+            </a:extLst>
+          </p:cNvPr>
+          <p:cNvPicPr>
+            <a:picLocks noChangeAspect="1"/>
+          </p:cNvPicPr>
+          <p:nvPr/>
+        </p:nvPicPr>
+        <p:blipFill>
+          <a:blip r:embed="rId3"/>
+          <a:stretch>
+            <a:fillRect/>
+          </a:stretch>
+        </p:blipFill>
+        <p:spPr>
+          <a:xfrm>
+            <a:off x="716237" y="1409466"/>
+            <a:ext cx="1331767" cy="1331767"/>
+          </a:xfrm>
+          <a:prstGeom prst="ellipse">
+            <a:avLst/>
+          </a:prstGeom>
+        </p:spPr>
+      </p:pic>
+      <p:sp>
+        <p:nvSpPr>
+          <p:cNvPr id="2568" name="Google Shape;2568;p71"/>
+          <p:cNvSpPr txBox="1">
+            <a:spLocks noGrp="1"/>
+          </p:cNvSpPr>
+          <p:nvPr>
+            <p:ph type="subTitle" idx="6"/>
+          </p:nvPr>
+        </p:nvSpPr>
+        <p:spPr>
+          <a:xfrm>
+            <a:off x="2678619" y="3778767"/>
+            <a:ext cx="1304400" cy="554100"/>
+          </a:xfrm>
+          <a:prstGeom prst="rect">
+            <a:avLst/>
+          </a:prstGeom>
+        </p:spPr>
+        <p:txBody>
+          <a:bodyPr spcFirstLastPara="1" wrap="square" lIns="91425" tIns="91425" rIns="91425" bIns="91425" anchor="b" anchorCtr="0">
+            <a:noAutofit/>
+          </a:bodyPr>
+          <a:lstStyle/>
+          <a:p>
+            <a:pPr marL="0" lvl="0" indent="0" algn="ctr" rtl="0">
+              <a:spcBef>
+                <a:spcPts val="0"/>
+              </a:spcBef>
+              <a:spcAft>
+                <a:spcPts val="0"/>
+              </a:spcAft>
+              <a:buNone/>
+            </a:pPr>
+            <a:r>
+              <a:rPr lang="en" sz="2200" dirty="0"/>
+              <a:t>Rafaella</a:t>
+            </a:r>
+            <a:endParaRPr sz="2200" dirty="0"/>
+          </a:p>
+        </p:txBody>
+      </p:sp>
+      <p:pic>
+        <p:nvPicPr>
+          <p:cNvPr id="13" name="Imagem 12" descr="Homem de camisa preta sorrindo&#10;&#10;Descrição gerada automaticamente">
+            <a:extLst>
+              <a:ext uri="{FF2B5EF4-FFF2-40B4-BE49-F238E27FC236}">
+                <a16:creationId xmlns:a16="http://schemas.microsoft.com/office/drawing/2014/main" id="{D5217C5E-97D6-EEB9-C741-222069F95706}"/>
+              </a:ext>
+            </a:extLst>
+          </p:cNvPr>
+          <p:cNvPicPr>
+            <a:picLocks noChangeAspect="1"/>
+          </p:cNvPicPr>
+          <p:nvPr/>
+        </p:nvPicPr>
+        <p:blipFill>
+          <a:blip r:embed="rId4"/>
+          <a:stretch>
+            <a:fillRect/>
+          </a:stretch>
+        </p:blipFill>
+        <p:spPr>
+          <a:xfrm>
+            <a:off x="4759001" y="1409465"/>
+            <a:ext cx="1318084" cy="1318084"/>
+          </a:xfrm>
+          <a:prstGeom prst="ellipse">
+            <a:avLst/>
+          </a:prstGeom>
+        </p:spPr>
+      </p:pic>
+      <p:pic>
+        <p:nvPicPr>
+          <p:cNvPr id="11" name="Imagem 10" descr="Mulher com cabelos longos&#10;&#10;Descrição gerada automaticamente">
+            <a:extLst>
+              <a:ext uri="{FF2B5EF4-FFF2-40B4-BE49-F238E27FC236}">
+                <a16:creationId xmlns:a16="http://schemas.microsoft.com/office/drawing/2014/main" id="{E2B1A0EE-E228-D28A-2B05-A8AF7554CD97}"/>
+              </a:ext>
+            </a:extLst>
+          </p:cNvPr>
+          <p:cNvPicPr>
+            <a:picLocks noChangeAspect="1"/>
+          </p:cNvPicPr>
+          <p:nvPr/>
+        </p:nvPicPr>
+        <p:blipFill>
+          <a:blip r:embed="rId5"/>
+          <a:stretch>
+            <a:fillRect/>
+          </a:stretch>
+        </p:blipFill>
+        <p:spPr>
+          <a:xfrm>
+            <a:off x="2659614" y="2401923"/>
+            <a:ext cx="1304400" cy="1304400"/>
+          </a:xfrm>
+          <a:prstGeom prst="ellipse">
+            <a:avLst/>
+          </a:prstGeom>
+        </p:spPr>
+      </p:pic>
+      <p:pic>
+        <p:nvPicPr>
+          <p:cNvPr id="17" name="Imagem 16" descr="Rosto de homem sorrindo&#10;&#10;Descrição gerada automaticamente">
+            <a:extLst>
+              <a:ext uri="{FF2B5EF4-FFF2-40B4-BE49-F238E27FC236}">
+                <a16:creationId xmlns:a16="http://schemas.microsoft.com/office/drawing/2014/main" id="{45E55BBB-BF94-89A1-F7DB-4A59AE333838}"/>
+              </a:ext>
+            </a:extLst>
+          </p:cNvPr>
+          <p:cNvPicPr>
+            <a:picLocks noChangeAspect="1"/>
+          </p:cNvPicPr>
+          <p:nvPr/>
+        </p:nvPicPr>
+        <p:blipFill rotWithShape="1">
+          <a:blip r:embed="rId6"/>
+          <a:srcRect t="20690" b="29173"/>
+          <a:stretch/>
+        </p:blipFill>
+        <p:spPr>
+          <a:xfrm>
+            <a:off x="6844269" y="2404124"/>
+            <a:ext cx="1304400" cy="1302200"/>
+          </a:xfrm>
+          <a:prstGeom prst="ellipse">
+            <a:avLst/>
+          </a:prstGeom>
+        </p:spPr>
+      </p:pic>
+      <p:sp>
+        <p:nvSpPr>
+          <p:cNvPr id="9" name="Google Shape;2566;p71">
+            <a:extLst>
+              <a:ext uri="{FF2B5EF4-FFF2-40B4-BE49-F238E27FC236}">
+                <a16:creationId xmlns:a16="http://schemas.microsoft.com/office/drawing/2014/main" id="{ABB22279-7228-5C1B-16B8-B62A6E487B7A}"/>
+              </a:ext>
+            </a:extLst>
+          </p:cNvPr>
+          <p:cNvSpPr txBox="1">
+            <a:spLocks/>
+          </p:cNvSpPr>
+          <p:nvPr/>
+        </p:nvSpPr>
+        <p:spPr>
+          <a:xfrm>
+            <a:off x="6829854" y="3755996"/>
+            <a:ext cx="1399746" cy="554100"/>
+          </a:xfrm>
+          <a:prstGeom prst="rect">
+            <a:avLst/>
+          </a:prstGeom>
+          <a:noFill/>
+          <a:ln>
+            <a:noFill/>
+          </a:ln>
+        </p:spPr>
+        <p:txBody>
+          <a:bodyPr spcFirstLastPara="1" wrap="square" lIns="91425" tIns="91425" rIns="91425" bIns="91425" anchor="b" anchorCtr="0">
+            <a:noAutofit/>
+          </a:bodyPr>
+          <a:lstStyle>
+            <a:defPPr marR="0" lvl="0" algn="l" rtl="0">
+              <a:lnSpc>
+                <a:spcPct val="100000"/>
+              </a:lnSpc>
+              <a:spcBef>
+                <a:spcPts val="0"/>
+              </a:spcBef>
+              <a:spcAft>
+                <a:spcPts val="0"/>
+              </a:spcAft>
+            </a:defPPr>
+            <a:lvl1pPr marL="457200" marR="0" lvl="0" indent="-304800" algn="ctr" rtl="0">
+              <a:lnSpc>
+                <a:spcPct val="100000"/>
+              </a:lnSpc>
+              <a:spcBef>
+                <a:spcPts val="0"/>
+              </a:spcBef>
+              <a:spcAft>
+                <a:spcPts val="0"/>
+              </a:spcAft>
+              <a:buClr>
+                <a:schemeClr val="dk1"/>
+              </a:buClr>
+              <a:buSzPts val="2400"/>
+              <a:buFont typeface="Manrope SemiBold"/>
+              <a:buNone/>
+              <a:defRPr sz="2400" b="0" i="0" u="none" strike="noStrike" cap="none">
+                <a:solidFill>
+                  <a:schemeClr val="dk1"/>
+                </a:solidFill>
+                <a:latin typeface="Manrope SemiBold"/>
+                <a:ea typeface="Manrope SemiBold"/>
+                <a:cs typeface="Manrope SemiBold"/>
+                <a:sym typeface="Manrope SemiBold"/>
+              </a:defRPr>
+            </a:lvl1pPr>
+            <a:lvl2pPr marL="914400" marR="0" lvl="1" indent="-304800" algn="ctr" rtl="0">
+              <a:lnSpc>
+                <a:spcPct val="100000"/>
+              </a:lnSpc>
+              <a:spcBef>
+                <a:spcPts val="0"/>
+              </a:spcBef>
+              <a:spcAft>
+                <a:spcPts val="0"/>
+              </a:spcAft>
+              <a:buClr>
+                <a:schemeClr val="dk1"/>
+              </a:buClr>
+              <a:buSzPts val="2400"/>
+              <a:buFont typeface="Manrope SemiBold"/>
+              <a:buNone/>
+              <a:defRPr sz="2400" b="0" i="0" u="none" strike="noStrike" cap="none">
+                <a:solidFill>
+                  <a:schemeClr val="dk1"/>
+                </a:solidFill>
+                <a:latin typeface="Manrope SemiBold"/>
+                <a:ea typeface="Manrope SemiBold"/>
+                <a:cs typeface="Manrope SemiBold"/>
+                <a:sym typeface="Manrope SemiBold"/>
+              </a:defRPr>
+            </a:lvl2pPr>
+            <a:lvl3pPr marL="1371600" marR="0" lvl="2" indent="-304800" algn="ctr" rtl="0">
+              <a:lnSpc>
+                <a:spcPct val="100000"/>
+              </a:lnSpc>
+              <a:spcBef>
+                <a:spcPts val="0"/>
+              </a:spcBef>
+              <a:spcAft>
+                <a:spcPts val="0"/>
+              </a:spcAft>
+              <a:buClr>
+                <a:schemeClr val="dk1"/>
+              </a:buClr>
+              <a:buSzPts val="2400"/>
+              <a:buFont typeface="Manrope SemiBold"/>
+              <a:buNone/>
+              <a:defRPr sz="2400" b="0" i="0" u="none" strike="noStrike" cap="none">
+                <a:solidFill>
+                  <a:schemeClr val="dk1"/>
+                </a:solidFill>
+                <a:latin typeface="Manrope SemiBold"/>
+                <a:ea typeface="Manrope SemiBold"/>
+                <a:cs typeface="Manrope SemiBold"/>
+                <a:sym typeface="Manrope SemiBold"/>
+              </a:defRPr>
+            </a:lvl3pPr>
+            <a:lvl4pPr marL="1828800" marR="0" lvl="3" indent="-304800" algn="ctr" rtl="0">
+              <a:lnSpc>
+                <a:spcPct val="100000"/>
+              </a:lnSpc>
+              <a:spcBef>
+                <a:spcPts val="0"/>
+              </a:spcBef>
+              <a:spcAft>
+                <a:spcPts val="0"/>
+              </a:spcAft>
+              <a:buClr>
+                <a:schemeClr val="dk1"/>
+              </a:buClr>
+              <a:buSzPts val="2400"/>
+              <a:buFont typeface="Manrope SemiBold"/>
+              <a:buNone/>
+              <a:defRPr sz="2400" b="0" i="0" u="none" strike="noStrike" cap="none">
+                <a:solidFill>
+                  <a:schemeClr val="dk1"/>
+                </a:solidFill>
+                <a:latin typeface="Manrope SemiBold"/>
+                <a:ea typeface="Manrope SemiBold"/>
+                <a:cs typeface="Manrope SemiBold"/>
+                <a:sym typeface="Manrope SemiBold"/>
+              </a:defRPr>
+            </a:lvl4pPr>
+            <a:lvl5pPr marL="2286000" marR="0" lvl="4" indent="-304800" algn="ctr" rtl="0">
+              <a:lnSpc>
+                <a:spcPct val="100000"/>
+              </a:lnSpc>
+              <a:spcBef>
+                <a:spcPts val="0"/>
+              </a:spcBef>
+              <a:spcAft>
+                <a:spcPts val="0"/>
+              </a:spcAft>
+              <a:buClr>
+                <a:schemeClr val="dk1"/>
+              </a:buClr>
+              <a:buSzPts val="2400"/>
+              <a:buFont typeface="Manrope SemiBold"/>
+              <a:buNone/>
+              <a:defRPr sz="2400" b="0" i="0" u="none" strike="noStrike" cap="none">
+                <a:solidFill>
+                  <a:schemeClr val="dk1"/>
+                </a:solidFill>
+                <a:latin typeface="Manrope SemiBold"/>
+                <a:ea typeface="Manrope SemiBold"/>
+                <a:cs typeface="Manrope SemiBold"/>
+                <a:sym typeface="Manrope SemiBold"/>
+              </a:defRPr>
+            </a:lvl5pPr>
+            <a:lvl6pPr marL="2743200" marR="0" lvl="5" indent="-304800" algn="ctr" rtl="0">
+              <a:lnSpc>
+                <a:spcPct val="100000"/>
+              </a:lnSpc>
+              <a:spcBef>
+                <a:spcPts val="0"/>
+              </a:spcBef>
+              <a:spcAft>
+                <a:spcPts val="0"/>
+              </a:spcAft>
+              <a:buClr>
+                <a:schemeClr val="dk1"/>
+              </a:buClr>
+              <a:buSzPts val="2400"/>
+              <a:buFont typeface="Manrope SemiBold"/>
+              <a:buNone/>
+              <a:defRPr sz="2400" b="0" i="0" u="none" strike="noStrike" cap="none">
+                <a:solidFill>
+                  <a:schemeClr val="dk1"/>
+                </a:solidFill>
+                <a:latin typeface="Manrope SemiBold"/>
+                <a:ea typeface="Manrope SemiBold"/>
+                <a:cs typeface="Manrope SemiBold"/>
+                <a:sym typeface="Manrope SemiBold"/>
+              </a:defRPr>
+            </a:lvl6pPr>
+            <a:lvl7pPr marL="3200400" marR="0" lvl="6" indent="-304800" algn="ctr" rtl="0">
+              <a:lnSpc>
+                <a:spcPct val="100000"/>
+              </a:lnSpc>
+              <a:spcBef>
+                <a:spcPts val="0"/>
+              </a:spcBef>
+              <a:spcAft>
+                <a:spcPts val="0"/>
+              </a:spcAft>
+              <a:buClr>
+                <a:schemeClr val="dk1"/>
+              </a:buClr>
+              <a:buSzPts val="2400"/>
+              <a:buFont typeface="Manrope SemiBold"/>
+              <a:buNone/>
+              <a:defRPr sz="2400" b="0" i="0" u="none" strike="noStrike" cap="none">
+                <a:solidFill>
+                  <a:schemeClr val="dk1"/>
+                </a:solidFill>
+                <a:latin typeface="Manrope SemiBold"/>
+                <a:ea typeface="Manrope SemiBold"/>
+                <a:cs typeface="Manrope SemiBold"/>
+                <a:sym typeface="Manrope SemiBold"/>
+              </a:defRPr>
+            </a:lvl7pPr>
+            <a:lvl8pPr marL="3657600" marR="0" lvl="7" indent="-304800" algn="ctr" rtl="0">
+              <a:lnSpc>
+                <a:spcPct val="100000"/>
+              </a:lnSpc>
+              <a:spcBef>
+                <a:spcPts val="0"/>
+              </a:spcBef>
+              <a:spcAft>
+                <a:spcPts val="0"/>
+              </a:spcAft>
+              <a:buClr>
+                <a:schemeClr val="dk1"/>
+              </a:buClr>
+              <a:buSzPts val="2400"/>
+              <a:buFont typeface="Manrope SemiBold"/>
+              <a:buNone/>
+              <a:defRPr sz="2400" b="0" i="0" u="none" strike="noStrike" cap="none">
+                <a:solidFill>
+                  <a:schemeClr val="dk1"/>
+                </a:solidFill>
+                <a:latin typeface="Manrope SemiBold"/>
+                <a:ea typeface="Manrope SemiBold"/>
+                <a:cs typeface="Manrope SemiBold"/>
+                <a:sym typeface="Manrope SemiBold"/>
+              </a:defRPr>
+            </a:lvl8pPr>
+            <a:lvl9pPr marL="4114800" marR="0" lvl="8" indent="-304800" algn="ctr" rtl="0">
+              <a:lnSpc>
+                <a:spcPct val="100000"/>
+              </a:lnSpc>
+              <a:spcBef>
+                <a:spcPts val="0"/>
+              </a:spcBef>
+              <a:spcAft>
+                <a:spcPts val="0"/>
+              </a:spcAft>
+              <a:buClr>
+                <a:schemeClr val="dk1"/>
+              </a:buClr>
+              <a:buSzPts val="2400"/>
+              <a:buFont typeface="Manrope SemiBold"/>
+              <a:buNone/>
+              <a:defRPr sz="2400" b="0" i="0" u="none" strike="noStrike" cap="none">
+                <a:solidFill>
+                  <a:schemeClr val="dk1"/>
+                </a:solidFill>
+                <a:latin typeface="Manrope SemiBold"/>
+                <a:ea typeface="Manrope SemiBold"/>
+                <a:cs typeface="Manrope SemiBold"/>
+                <a:sym typeface="Manrope SemiBold"/>
+              </a:defRPr>
+            </a:lvl9pPr>
+          </a:lstStyle>
+          <a:p>
+            <a:pPr marL="0" indent="0"/>
+            <a:r>
+              <a:rPr lang="pt-BR" sz="2200" dirty="0"/>
+              <a:t>Gustavo</a:t>
+            </a:r>
+          </a:p>
+        </p:txBody>
+      </p:sp>
+      <p:pic>
+        <p:nvPicPr>
+          <p:cNvPr id="7" name="Imagem 6" descr="Mulher com cabelos longos&#10;&#10;Descrição gerada automaticamente com confiança média">
+            <a:extLst>
+              <a:ext uri="{FF2B5EF4-FFF2-40B4-BE49-F238E27FC236}">
+                <a16:creationId xmlns:a16="http://schemas.microsoft.com/office/drawing/2014/main" id="{90FCF98D-DFE5-4416-EF70-B96C9DE4425E}"/>
+              </a:ext>
+            </a:extLst>
+          </p:cNvPr>
+          <p:cNvPicPr>
+            <a:picLocks noChangeAspect="1"/>
+          </p:cNvPicPr>
+          <p:nvPr/>
+        </p:nvPicPr>
+        <p:blipFill>
+          <a:blip r:embed="rId7"/>
+          <a:stretch>
+            <a:fillRect/>
+          </a:stretch>
+        </p:blipFill>
+        <p:spPr>
+          <a:xfrm>
+            <a:off x="2678619" y="2401923"/>
+            <a:ext cx="1304400" cy="1304400"/>
+          </a:xfrm>
+          <a:prstGeom prst="ellipse">
+            <a:avLst/>
+          </a:prstGeom>
+        </p:spPr>
+      </p:pic>
+    </p:spTree>
+  </p:cSld>
+  <p:clrMapOvr>
+    <a:masterClrMapping/>
+  </p:clrMapOvr>
+</p:sld>
+</file>
+
+<file path=ppt/slides/slide3.xml><?xml version="1.0" encoding="utf-8"?>
+<p:sld xmlns:a="http://schemas.openxmlformats.org/drawingml/2006/main" xmlns:r="http://schemas.openxmlformats.org/officeDocument/2006/relationships" xmlns:p="http://schemas.openxmlformats.org/presentationml/2006/main">
+  <p:cSld>
+    <p:spTree>
+      <p:nvGrpSpPr>
         <p:cNvPr id="1" name="Shape 2412"/>
         <p:cNvGrpSpPr/>
         <p:nvPr/>

</xml_diff>

<commit_message>
Slide com explicação da solução
</commit_message>
<xml_diff>
--- a/Pitch-SavvyFix.pptx
+++ b/Pitch-SavvyFix.pptx
@@ -5,31 +5,32 @@
     <p:sldMasterId id="2147483683" r:id="rId1"/>
   </p:sldMasterIdLst>
   <p:notesMasterIdLst>
-    <p:notesMasterId r:id="rId6"/>
+    <p:notesMasterId r:id="rId7"/>
   </p:notesMasterIdLst>
   <p:sldIdLst>
     <p:sldId id="256" r:id="rId2"/>
     <p:sldId id="289" r:id="rId3"/>
     <p:sldId id="261" r:id="rId4"/>
-    <p:sldId id="281" r:id="rId5"/>
+    <p:sldId id="282" r:id="rId5"/>
+    <p:sldId id="281" r:id="rId6"/>
   </p:sldIdLst>
   <p:sldSz cx="9144000" cy="5143500" type="screen16x9"/>
   <p:notesSz cx="6858000" cy="9144000"/>
   <p:embeddedFontLst>
     <p:embeddedFont>
       <p:font typeface="Inter" panose="020B0604020202020204" charset="0"/>
-      <p:regular r:id="rId7"/>
-      <p:bold r:id="rId8"/>
+      <p:regular r:id="rId8"/>
+      <p:bold r:id="rId9"/>
     </p:embeddedFont>
     <p:embeddedFont>
       <p:font typeface="Manrope Medium" panose="020B0604020202020204" charset="0"/>
-      <p:regular r:id="rId9"/>
-      <p:bold r:id="rId10"/>
+      <p:regular r:id="rId10"/>
+      <p:bold r:id="rId11"/>
     </p:embeddedFont>
     <p:embeddedFont>
       <p:font typeface="Manrope SemiBold" panose="020B0604020202020204" charset="0"/>
-      <p:regular r:id="rId11"/>
-      <p:bold r:id="rId12"/>
+      <p:regular r:id="rId12"/>
+      <p:bold r:id="rId13"/>
     </p:embeddedFont>
   </p:embeddedFontLst>
   <p:defaultTextStyle>
@@ -1027,6 +1028,110 @@
   <p:cSld>
     <p:spTree>
       <p:nvGrpSpPr>
+        <p:cNvPr id="1" name="Shape 2421"/>
+        <p:cNvGrpSpPr/>
+        <p:nvPr/>
+      </p:nvGrpSpPr>
+      <p:grpSpPr>
+        <a:xfrm>
+          <a:off x="0" y="0"/>
+          <a:ext cx="0" cy="0"/>
+          <a:chOff x="0" y="0"/>
+          <a:chExt cx="0" cy="0"/>
+        </a:xfrm>
+      </p:grpSpPr>
+      <p:sp>
+        <p:nvSpPr>
+          <p:cNvPr id="2422" name="Google Shape;2422;g2373d9b03a5_0_17767:notes"/>
+          <p:cNvSpPr>
+            <a:spLocks noGrp="1" noRot="1" noChangeAspect="1"/>
+          </p:cNvSpPr>
+          <p:nvPr>
+            <p:ph type="sldImg" idx="2"/>
+          </p:nvPr>
+        </p:nvSpPr>
+        <p:spPr>
+          <a:xfrm>
+            <a:off x="381000" y="685800"/>
+            <a:ext cx="6096000" cy="3429000"/>
+          </a:xfrm>
+          <a:custGeom>
+            <a:avLst/>
+            <a:gdLst/>
+            <a:ahLst/>
+            <a:cxnLst/>
+            <a:rect l="l" t="t" r="r" b="b"/>
+            <a:pathLst>
+              <a:path w="120000" h="120000" extrusionOk="0">
+                <a:moveTo>
+                  <a:pt x="0" y="0"/>
+                </a:moveTo>
+                <a:lnTo>
+                  <a:pt x="120000" y="0"/>
+                </a:lnTo>
+                <a:lnTo>
+                  <a:pt x="120000" y="120000"/>
+                </a:lnTo>
+                <a:lnTo>
+                  <a:pt x="0" y="120000"/>
+                </a:lnTo>
+                <a:close/>
+              </a:path>
+            </a:pathLst>
+          </a:custGeom>
+        </p:spPr>
+      </p:sp>
+      <p:sp>
+        <p:nvSpPr>
+          <p:cNvPr id="2423" name="Google Shape;2423;g2373d9b03a5_0_17767:notes"/>
+          <p:cNvSpPr txBox="1">
+            <a:spLocks noGrp="1"/>
+          </p:cNvSpPr>
+          <p:nvPr>
+            <p:ph type="body" idx="1"/>
+          </p:nvPr>
+        </p:nvSpPr>
+        <p:spPr>
+          <a:xfrm>
+            <a:off x="685800" y="4343400"/>
+            <a:ext cx="5486400" cy="4114800"/>
+          </a:xfrm>
+          <a:prstGeom prst="rect">
+            <a:avLst/>
+          </a:prstGeom>
+        </p:spPr>
+        <p:txBody>
+          <a:bodyPr spcFirstLastPara="1" wrap="square" lIns="91425" tIns="91425" rIns="91425" bIns="91425" anchor="t" anchorCtr="0">
+            <a:noAutofit/>
+          </a:bodyPr>
+          <a:lstStyle/>
+          <a:p>
+            <a:pPr marL="0" lvl="0" indent="0" algn="l" rtl="0">
+              <a:spcBef>
+                <a:spcPts val="0"/>
+              </a:spcBef>
+              <a:spcAft>
+                <a:spcPts val="0"/>
+              </a:spcAft>
+              <a:buNone/>
+            </a:pPr>
+            <a:endParaRPr/>
+          </a:p>
+        </p:txBody>
+      </p:sp>
+    </p:spTree>
+  </p:cSld>
+  <p:clrMapOvr>
+    <a:masterClrMapping/>
+  </p:clrMapOvr>
+</p:notes>
+</file>
+
+<file path=ppt/notesSlides/notesSlide5.xml><?xml version="1.0" encoding="utf-8"?>
+<p:notes xmlns:a="http://schemas.openxmlformats.org/drawingml/2006/main" xmlns:r="http://schemas.openxmlformats.org/officeDocument/2006/relationships" xmlns:p="http://schemas.openxmlformats.org/presentationml/2006/main" showMasterSp="0" showMasterPhAnim="0">
+  <p:cSld>
+    <p:spTree>
+      <p:nvGrpSpPr>
         <p:cNvPr id="1" name="Shape 2409"/>
         <p:cNvGrpSpPr/>
         <p:nvPr/>
@@ -19688,6 +19793,3196 @@
 </p:sldLayout>
 </file>
 
+<file path=ppt/slideLayouts/slideLayout8.xml><?xml version="1.0" encoding="utf-8"?>
+<p:sldLayout xmlns:a="http://schemas.openxmlformats.org/drawingml/2006/main" xmlns:r="http://schemas.openxmlformats.org/officeDocument/2006/relationships" xmlns:p="http://schemas.openxmlformats.org/presentationml/2006/main" matchingName="Title and text 3">
+  <p:cSld name="Title and text 3">
+    <p:spTree>
+      <p:nvGrpSpPr>
+        <p:cNvPr id="1" name="Shape 978"/>
+        <p:cNvGrpSpPr/>
+        <p:nvPr/>
+      </p:nvGrpSpPr>
+      <p:grpSpPr>
+        <a:xfrm>
+          <a:off x="0" y="0"/>
+          <a:ext cx="0" cy="0"/>
+          <a:chOff x="0" y="0"/>
+          <a:chExt cx="0" cy="0"/>
+        </a:xfrm>
+      </p:grpSpPr>
+      <p:sp>
+        <p:nvSpPr>
+          <p:cNvPr id="979" name="Google Shape;979;p23"/>
+          <p:cNvSpPr txBox="1">
+            <a:spLocks noGrp="1"/>
+          </p:cNvSpPr>
+          <p:nvPr>
+            <p:ph type="title"/>
+          </p:nvPr>
+        </p:nvSpPr>
+        <p:spPr>
+          <a:xfrm>
+            <a:off x="907175" y="1319225"/>
+            <a:ext cx="2720400" cy="1231500"/>
+          </a:xfrm>
+          <a:prstGeom prst="rect">
+            <a:avLst/>
+          </a:prstGeom>
+        </p:spPr>
+        <p:txBody>
+          <a:bodyPr spcFirstLastPara="1" wrap="square" lIns="91425" tIns="91425" rIns="91425" bIns="91425" anchor="t" anchorCtr="0">
+            <a:noAutofit/>
+          </a:bodyPr>
+          <a:lstStyle>
+            <a:lvl1pPr lvl="0" algn="l" rtl="0">
+              <a:spcBef>
+                <a:spcPts val="0"/>
+              </a:spcBef>
+              <a:spcAft>
+                <a:spcPts val="0"/>
+              </a:spcAft>
+              <a:buSzPts val="3200"/>
+              <a:buNone/>
+              <a:defRPr/>
+            </a:lvl1pPr>
+            <a:lvl2pPr lvl="1" rtl="0">
+              <a:spcBef>
+                <a:spcPts val="0"/>
+              </a:spcBef>
+              <a:spcAft>
+                <a:spcPts val="0"/>
+              </a:spcAft>
+              <a:buSzPts val="3200"/>
+              <a:buNone/>
+              <a:defRPr/>
+            </a:lvl2pPr>
+            <a:lvl3pPr lvl="2" rtl="0">
+              <a:spcBef>
+                <a:spcPts val="0"/>
+              </a:spcBef>
+              <a:spcAft>
+                <a:spcPts val="0"/>
+              </a:spcAft>
+              <a:buSzPts val="3200"/>
+              <a:buNone/>
+              <a:defRPr/>
+            </a:lvl3pPr>
+            <a:lvl4pPr lvl="3" rtl="0">
+              <a:spcBef>
+                <a:spcPts val="0"/>
+              </a:spcBef>
+              <a:spcAft>
+                <a:spcPts val="0"/>
+              </a:spcAft>
+              <a:buSzPts val="3200"/>
+              <a:buNone/>
+              <a:defRPr/>
+            </a:lvl4pPr>
+            <a:lvl5pPr lvl="4" rtl="0">
+              <a:spcBef>
+                <a:spcPts val="0"/>
+              </a:spcBef>
+              <a:spcAft>
+                <a:spcPts val="0"/>
+              </a:spcAft>
+              <a:buSzPts val="3200"/>
+              <a:buNone/>
+              <a:defRPr/>
+            </a:lvl5pPr>
+            <a:lvl6pPr lvl="5" rtl="0">
+              <a:spcBef>
+                <a:spcPts val="0"/>
+              </a:spcBef>
+              <a:spcAft>
+                <a:spcPts val="0"/>
+              </a:spcAft>
+              <a:buSzPts val="3200"/>
+              <a:buNone/>
+              <a:defRPr/>
+            </a:lvl6pPr>
+            <a:lvl7pPr lvl="6" rtl="0">
+              <a:spcBef>
+                <a:spcPts val="0"/>
+              </a:spcBef>
+              <a:spcAft>
+                <a:spcPts val="0"/>
+              </a:spcAft>
+              <a:buSzPts val="3200"/>
+              <a:buNone/>
+              <a:defRPr/>
+            </a:lvl7pPr>
+            <a:lvl8pPr lvl="7" rtl="0">
+              <a:spcBef>
+                <a:spcPts val="0"/>
+              </a:spcBef>
+              <a:spcAft>
+                <a:spcPts val="0"/>
+              </a:spcAft>
+              <a:buSzPts val="3200"/>
+              <a:buNone/>
+              <a:defRPr/>
+            </a:lvl8pPr>
+            <a:lvl9pPr lvl="8" rtl="0">
+              <a:spcBef>
+                <a:spcPts val="0"/>
+              </a:spcBef>
+              <a:spcAft>
+                <a:spcPts val="0"/>
+              </a:spcAft>
+              <a:buSzPts val="3200"/>
+              <a:buNone/>
+              <a:defRPr/>
+            </a:lvl9pPr>
+          </a:lstStyle>
+          <a:p>
+            <a:endParaRPr/>
+          </a:p>
+        </p:txBody>
+      </p:sp>
+      <p:sp>
+        <p:nvSpPr>
+          <p:cNvPr id="980" name="Google Shape;980;p23"/>
+          <p:cNvSpPr txBox="1">
+            <a:spLocks noGrp="1"/>
+          </p:cNvSpPr>
+          <p:nvPr>
+            <p:ph type="subTitle" idx="1"/>
+          </p:nvPr>
+        </p:nvSpPr>
+        <p:spPr>
+          <a:xfrm>
+            <a:off x="907175" y="2724672"/>
+            <a:ext cx="2720400" cy="1046700"/>
+          </a:xfrm>
+          <a:prstGeom prst="rect">
+            <a:avLst/>
+          </a:prstGeom>
+        </p:spPr>
+        <p:txBody>
+          <a:bodyPr spcFirstLastPara="1" wrap="square" lIns="91425" tIns="91425" rIns="91425" bIns="91425" anchor="t" anchorCtr="0">
+            <a:noAutofit/>
+          </a:bodyPr>
+          <a:lstStyle>
+            <a:lvl1pPr lvl="0" rtl="0">
+              <a:lnSpc>
+                <a:spcPct val="100000"/>
+              </a:lnSpc>
+              <a:spcBef>
+                <a:spcPts val="0"/>
+              </a:spcBef>
+              <a:spcAft>
+                <a:spcPts val="0"/>
+              </a:spcAft>
+              <a:buSzPts val="1200"/>
+              <a:buNone/>
+              <a:defRPr/>
+            </a:lvl1pPr>
+            <a:lvl2pPr lvl="1" algn="ctr" rtl="0">
+              <a:lnSpc>
+                <a:spcPct val="100000"/>
+              </a:lnSpc>
+              <a:spcBef>
+                <a:spcPts val="0"/>
+              </a:spcBef>
+              <a:spcAft>
+                <a:spcPts val="0"/>
+              </a:spcAft>
+              <a:buSzPts val="1200"/>
+              <a:buNone/>
+              <a:defRPr/>
+            </a:lvl2pPr>
+            <a:lvl3pPr lvl="2" algn="ctr" rtl="0">
+              <a:lnSpc>
+                <a:spcPct val="100000"/>
+              </a:lnSpc>
+              <a:spcBef>
+                <a:spcPts val="0"/>
+              </a:spcBef>
+              <a:spcAft>
+                <a:spcPts val="0"/>
+              </a:spcAft>
+              <a:buSzPts val="1200"/>
+              <a:buNone/>
+              <a:defRPr/>
+            </a:lvl3pPr>
+            <a:lvl4pPr lvl="3" algn="ctr" rtl="0">
+              <a:lnSpc>
+                <a:spcPct val="100000"/>
+              </a:lnSpc>
+              <a:spcBef>
+                <a:spcPts val="0"/>
+              </a:spcBef>
+              <a:spcAft>
+                <a:spcPts val="0"/>
+              </a:spcAft>
+              <a:buSzPts val="1200"/>
+              <a:buNone/>
+              <a:defRPr/>
+            </a:lvl4pPr>
+            <a:lvl5pPr lvl="4" algn="ctr" rtl="0">
+              <a:lnSpc>
+                <a:spcPct val="100000"/>
+              </a:lnSpc>
+              <a:spcBef>
+                <a:spcPts val="0"/>
+              </a:spcBef>
+              <a:spcAft>
+                <a:spcPts val="0"/>
+              </a:spcAft>
+              <a:buSzPts val="1200"/>
+              <a:buNone/>
+              <a:defRPr/>
+            </a:lvl5pPr>
+            <a:lvl6pPr lvl="5" algn="ctr" rtl="0">
+              <a:lnSpc>
+                <a:spcPct val="100000"/>
+              </a:lnSpc>
+              <a:spcBef>
+                <a:spcPts val="0"/>
+              </a:spcBef>
+              <a:spcAft>
+                <a:spcPts val="0"/>
+              </a:spcAft>
+              <a:buSzPts val="1200"/>
+              <a:buNone/>
+              <a:defRPr/>
+            </a:lvl6pPr>
+            <a:lvl7pPr lvl="6" algn="ctr" rtl="0">
+              <a:lnSpc>
+                <a:spcPct val="100000"/>
+              </a:lnSpc>
+              <a:spcBef>
+                <a:spcPts val="0"/>
+              </a:spcBef>
+              <a:spcAft>
+                <a:spcPts val="0"/>
+              </a:spcAft>
+              <a:buSzPts val="1200"/>
+              <a:buNone/>
+              <a:defRPr/>
+            </a:lvl7pPr>
+            <a:lvl8pPr lvl="7" algn="ctr" rtl="0">
+              <a:lnSpc>
+                <a:spcPct val="100000"/>
+              </a:lnSpc>
+              <a:spcBef>
+                <a:spcPts val="0"/>
+              </a:spcBef>
+              <a:spcAft>
+                <a:spcPts val="0"/>
+              </a:spcAft>
+              <a:buSzPts val="1200"/>
+              <a:buNone/>
+              <a:defRPr/>
+            </a:lvl8pPr>
+            <a:lvl9pPr lvl="8" algn="ctr" rtl="0">
+              <a:lnSpc>
+                <a:spcPct val="100000"/>
+              </a:lnSpc>
+              <a:spcBef>
+                <a:spcPts val="0"/>
+              </a:spcBef>
+              <a:spcAft>
+                <a:spcPts val="0"/>
+              </a:spcAft>
+              <a:buSzPts val="1200"/>
+              <a:buNone/>
+              <a:defRPr/>
+            </a:lvl9pPr>
+          </a:lstStyle>
+          <a:p>
+            <a:endParaRPr/>
+          </a:p>
+        </p:txBody>
+      </p:sp>
+      <p:grpSp>
+        <p:nvGrpSpPr>
+          <p:cNvPr id="981" name="Google Shape;981;p23"/>
+          <p:cNvGrpSpPr/>
+          <p:nvPr/>
+        </p:nvGrpSpPr>
+        <p:grpSpPr>
+          <a:xfrm rot="-5400000" flipH="1">
+            <a:off x="7673050" y="-2221824"/>
+            <a:ext cx="2744275" cy="2727763"/>
+            <a:chOff x="5985575" y="4420825"/>
+            <a:chExt cx="2744275" cy="2727763"/>
+          </a:xfrm>
+        </p:grpSpPr>
+        <p:sp>
+          <p:nvSpPr>
+            <p:cNvPr id="982" name="Google Shape;982;p23"/>
+            <p:cNvSpPr/>
+            <p:nvPr/>
+          </p:nvSpPr>
+          <p:spPr>
+            <a:xfrm>
+              <a:off x="6115050" y="4420825"/>
+              <a:ext cx="2614800" cy="2599800"/>
+            </a:xfrm>
+            <a:prstGeom prst="ellipse">
+              <a:avLst/>
+            </a:prstGeom>
+            <a:solidFill>
+              <a:srgbClr val="FFFFFF">
+                <a:alpha val="35850"/>
+              </a:srgbClr>
+            </a:solidFill>
+            <a:ln>
+              <a:noFill/>
+            </a:ln>
+          </p:spPr>
+          <p:txBody>
+            <a:bodyPr spcFirstLastPara="1" wrap="square" lIns="91425" tIns="91425" rIns="91425" bIns="91425" anchor="ctr" anchorCtr="0">
+              <a:noAutofit/>
+            </a:bodyPr>
+            <a:lstStyle/>
+            <a:p>
+              <a:pPr marL="0" lvl="0" indent="0" algn="l" rtl="0">
+                <a:spcBef>
+                  <a:spcPts val="0"/>
+                </a:spcBef>
+                <a:spcAft>
+                  <a:spcPts val="0"/>
+                </a:spcAft>
+                <a:buNone/>
+              </a:pPr>
+              <a:endParaRPr>
+                <a:latin typeface="Inter"/>
+                <a:ea typeface="Inter"/>
+                <a:cs typeface="Inter"/>
+                <a:sym typeface="Inter"/>
+              </a:endParaRPr>
+            </a:p>
+          </p:txBody>
+        </p:sp>
+        <p:grpSp>
+          <p:nvGrpSpPr>
+            <p:cNvPr id="983" name="Google Shape;983;p23"/>
+            <p:cNvGrpSpPr/>
+            <p:nvPr/>
+          </p:nvGrpSpPr>
+          <p:grpSpPr>
+            <a:xfrm rot="5400000" flipH="1">
+              <a:off x="5986247" y="4572099"/>
+              <a:ext cx="2575817" cy="2577160"/>
+              <a:chOff x="1550275" y="1493275"/>
+              <a:chExt cx="1582100" cy="1582925"/>
+            </a:xfrm>
+          </p:grpSpPr>
+          <p:sp>
+            <p:nvSpPr>
+              <p:cNvPr id="984" name="Google Shape;984;p23"/>
+              <p:cNvSpPr/>
+              <p:nvPr/>
+            </p:nvSpPr>
+            <p:spPr>
+              <a:xfrm>
+                <a:off x="1650275" y="1594100"/>
+                <a:ext cx="301650" cy="300825"/>
+              </a:xfrm>
+              <a:custGeom>
+                <a:avLst/>
+                <a:gdLst/>
+                <a:ahLst/>
+                <a:cxnLst/>
+                <a:rect l="l" t="t" r="r" b="b"/>
+                <a:pathLst>
+                  <a:path w="12066" h="12033" fill="none" extrusionOk="0">
+                    <a:moveTo>
+                      <a:pt x="1" y="12032"/>
+                    </a:moveTo>
+                    <a:lnTo>
+                      <a:pt x="12065" y="0"/>
+                    </a:lnTo>
+                  </a:path>
+                </a:pathLst>
+              </a:custGeom>
+              <a:noFill/>
+              <a:ln w="19050" cap="rnd" cmpd="sng">
+                <a:solidFill>
+                  <a:schemeClr val="accent1"/>
+                </a:solidFill>
+                <a:prstDash val="solid"/>
+                <a:miter lim="32519"/>
+                <a:headEnd type="none" w="sm" len="sm"/>
+                <a:tailEnd type="none" w="sm" len="sm"/>
+              </a:ln>
+            </p:spPr>
+            <p:txBody>
+              <a:bodyPr spcFirstLastPara="1" wrap="square" lIns="91425" tIns="91425" rIns="91425" bIns="91425" anchor="ctr" anchorCtr="0">
+                <a:noAutofit/>
+              </a:bodyPr>
+              <a:lstStyle/>
+              <a:p>
+                <a:pPr marL="0" lvl="0" indent="0" algn="l" rtl="0">
+                  <a:spcBef>
+                    <a:spcPts val="0"/>
+                  </a:spcBef>
+                  <a:spcAft>
+                    <a:spcPts val="0"/>
+                  </a:spcAft>
+                  <a:buNone/>
+                </a:pPr>
+                <a:endParaRPr>
+                  <a:latin typeface="Inter"/>
+                  <a:ea typeface="Inter"/>
+                  <a:cs typeface="Inter"/>
+                  <a:sym typeface="Inter"/>
+                </a:endParaRPr>
+              </a:p>
+            </p:txBody>
+          </p:sp>
+          <p:sp>
+            <p:nvSpPr>
+              <p:cNvPr id="985" name="Google Shape;985;p23"/>
+              <p:cNvSpPr/>
+              <p:nvPr/>
+            </p:nvSpPr>
+            <p:spPr>
+              <a:xfrm>
+                <a:off x="1560025" y="1503850"/>
+                <a:ext cx="648800" cy="647975"/>
+              </a:xfrm>
+              <a:custGeom>
+                <a:avLst/>
+                <a:gdLst/>
+                <a:ahLst/>
+                <a:cxnLst/>
+                <a:rect l="l" t="t" r="r" b="b"/>
+                <a:pathLst>
+                  <a:path w="25952" h="25919" fill="none" extrusionOk="0">
+                    <a:moveTo>
+                      <a:pt x="1" y="25919"/>
+                    </a:moveTo>
+                    <a:lnTo>
+                      <a:pt x="25952" y="0"/>
+                    </a:lnTo>
+                  </a:path>
+                </a:pathLst>
+              </a:custGeom>
+              <a:noFill/>
+              <a:ln w="19050" cap="rnd" cmpd="sng">
+                <a:solidFill>
+                  <a:schemeClr val="accent1"/>
+                </a:solidFill>
+                <a:prstDash val="solid"/>
+                <a:miter lim="32519"/>
+                <a:headEnd type="none" w="sm" len="sm"/>
+                <a:tailEnd type="none" w="sm" len="sm"/>
+              </a:ln>
+            </p:spPr>
+            <p:txBody>
+              <a:bodyPr spcFirstLastPara="1" wrap="square" lIns="91425" tIns="91425" rIns="91425" bIns="91425" anchor="ctr" anchorCtr="0">
+                <a:noAutofit/>
+              </a:bodyPr>
+              <a:lstStyle/>
+              <a:p>
+                <a:pPr marL="0" lvl="0" indent="0" algn="l" rtl="0">
+                  <a:spcBef>
+                    <a:spcPts val="0"/>
+                  </a:spcBef>
+                  <a:spcAft>
+                    <a:spcPts val="0"/>
+                  </a:spcAft>
+                  <a:buNone/>
+                </a:pPr>
+                <a:endParaRPr>
+                  <a:latin typeface="Inter"/>
+                  <a:ea typeface="Inter"/>
+                  <a:cs typeface="Inter"/>
+                  <a:sym typeface="Inter"/>
+                </a:endParaRPr>
+              </a:p>
+            </p:txBody>
+          </p:sp>
+          <p:sp>
+            <p:nvSpPr>
+              <p:cNvPr id="986" name="Google Shape;986;p23"/>
+              <p:cNvSpPr/>
+              <p:nvPr/>
+            </p:nvSpPr>
+            <p:spPr>
+              <a:xfrm>
+                <a:off x="1550275" y="1493275"/>
+                <a:ext cx="834150" cy="834975"/>
+              </a:xfrm>
+              <a:custGeom>
+                <a:avLst/>
+                <a:gdLst/>
+                <a:ahLst/>
+                <a:cxnLst/>
+                <a:rect l="l" t="t" r="r" b="b"/>
+                <a:pathLst>
+                  <a:path w="33366" h="33399" fill="none" extrusionOk="0">
+                    <a:moveTo>
+                      <a:pt x="1" y="33398"/>
+                    </a:moveTo>
+                    <a:lnTo>
+                      <a:pt x="33366" y="1"/>
+                    </a:lnTo>
+                  </a:path>
+                </a:pathLst>
+              </a:custGeom>
+              <a:noFill/>
+              <a:ln w="19050" cap="rnd" cmpd="sng">
+                <a:solidFill>
+                  <a:schemeClr val="accent1"/>
+                </a:solidFill>
+                <a:prstDash val="solid"/>
+                <a:miter lim="32519"/>
+                <a:headEnd type="none" w="sm" len="sm"/>
+                <a:tailEnd type="none" w="sm" len="sm"/>
+              </a:ln>
+            </p:spPr>
+            <p:txBody>
+              <a:bodyPr spcFirstLastPara="1" wrap="square" lIns="91425" tIns="91425" rIns="91425" bIns="91425" anchor="ctr" anchorCtr="0">
+                <a:noAutofit/>
+              </a:bodyPr>
+              <a:lstStyle/>
+              <a:p>
+                <a:pPr marL="0" lvl="0" indent="0" algn="l" rtl="0">
+                  <a:spcBef>
+                    <a:spcPts val="0"/>
+                  </a:spcBef>
+                  <a:spcAft>
+                    <a:spcPts val="0"/>
+                  </a:spcAft>
+                  <a:buNone/>
+                </a:pPr>
+                <a:endParaRPr>
+                  <a:latin typeface="Inter"/>
+                  <a:ea typeface="Inter"/>
+                  <a:cs typeface="Inter"/>
+                  <a:sym typeface="Inter"/>
+                </a:endParaRPr>
+              </a:p>
+            </p:txBody>
+          </p:sp>
+          <p:sp>
+            <p:nvSpPr>
+              <p:cNvPr id="987" name="Google Shape;987;p23"/>
+              <p:cNvSpPr/>
+              <p:nvPr/>
+            </p:nvSpPr>
+            <p:spPr>
+              <a:xfrm>
+                <a:off x="1571425" y="1514425"/>
+                <a:ext cx="957725" cy="958525"/>
+              </a:xfrm>
+              <a:custGeom>
+                <a:avLst/>
+                <a:gdLst/>
+                <a:ahLst/>
+                <a:cxnLst/>
+                <a:rect l="l" t="t" r="r" b="b"/>
+                <a:pathLst>
+                  <a:path w="38309" h="38341" fill="none" extrusionOk="0">
+                    <a:moveTo>
+                      <a:pt x="0" y="38341"/>
+                    </a:moveTo>
+                    <a:lnTo>
+                      <a:pt x="38308" y="0"/>
+                    </a:lnTo>
+                  </a:path>
+                </a:pathLst>
+              </a:custGeom>
+              <a:noFill/>
+              <a:ln w="19050" cap="rnd" cmpd="sng">
+                <a:solidFill>
+                  <a:schemeClr val="accent1"/>
+                </a:solidFill>
+                <a:prstDash val="solid"/>
+                <a:miter lim="32519"/>
+                <a:headEnd type="none" w="sm" len="sm"/>
+                <a:tailEnd type="none" w="sm" len="sm"/>
+              </a:ln>
+            </p:spPr>
+            <p:txBody>
+              <a:bodyPr spcFirstLastPara="1" wrap="square" lIns="91425" tIns="91425" rIns="91425" bIns="91425" anchor="ctr" anchorCtr="0">
+                <a:noAutofit/>
+              </a:bodyPr>
+              <a:lstStyle/>
+              <a:p>
+                <a:pPr marL="0" lvl="0" indent="0" algn="l" rtl="0">
+                  <a:spcBef>
+                    <a:spcPts val="0"/>
+                  </a:spcBef>
+                  <a:spcAft>
+                    <a:spcPts val="0"/>
+                  </a:spcAft>
+                  <a:buNone/>
+                </a:pPr>
+                <a:endParaRPr>
+                  <a:latin typeface="Inter"/>
+                  <a:ea typeface="Inter"/>
+                  <a:cs typeface="Inter"/>
+                  <a:sym typeface="Inter"/>
+                </a:endParaRPr>
+              </a:p>
+            </p:txBody>
+          </p:sp>
+          <p:sp>
+            <p:nvSpPr>
+              <p:cNvPr id="988" name="Google Shape;988;p23"/>
+              <p:cNvSpPr/>
+              <p:nvPr/>
+            </p:nvSpPr>
+            <p:spPr>
+              <a:xfrm>
+                <a:off x="1612875" y="1555875"/>
+                <a:ext cx="1041475" cy="1042275"/>
+              </a:xfrm>
+              <a:custGeom>
+                <a:avLst/>
+                <a:gdLst/>
+                <a:ahLst/>
+                <a:cxnLst/>
+                <a:rect l="l" t="t" r="r" b="b"/>
+                <a:pathLst>
+                  <a:path w="41659" h="41691" fill="none" extrusionOk="0">
+                    <a:moveTo>
+                      <a:pt x="1" y="41691"/>
+                    </a:moveTo>
+                    <a:lnTo>
+                      <a:pt x="41658" y="1"/>
+                    </a:lnTo>
+                  </a:path>
+                </a:pathLst>
+              </a:custGeom>
+              <a:noFill/>
+              <a:ln w="19050" cap="rnd" cmpd="sng">
+                <a:solidFill>
+                  <a:schemeClr val="accent1"/>
+                </a:solidFill>
+                <a:prstDash val="solid"/>
+                <a:miter lim="32519"/>
+                <a:headEnd type="none" w="sm" len="sm"/>
+                <a:tailEnd type="none" w="sm" len="sm"/>
+              </a:ln>
+            </p:spPr>
+            <p:txBody>
+              <a:bodyPr spcFirstLastPara="1" wrap="square" lIns="91425" tIns="91425" rIns="91425" bIns="91425" anchor="ctr" anchorCtr="0">
+                <a:noAutofit/>
+              </a:bodyPr>
+              <a:lstStyle/>
+              <a:p>
+                <a:pPr marL="0" lvl="0" indent="0" algn="l" rtl="0">
+                  <a:spcBef>
+                    <a:spcPts val="0"/>
+                  </a:spcBef>
+                  <a:spcAft>
+                    <a:spcPts val="0"/>
+                  </a:spcAft>
+                  <a:buNone/>
+                </a:pPr>
+                <a:endParaRPr>
+                  <a:latin typeface="Inter"/>
+                  <a:ea typeface="Inter"/>
+                  <a:cs typeface="Inter"/>
+                  <a:sym typeface="Inter"/>
+                </a:endParaRPr>
+              </a:p>
+            </p:txBody>
+          </p:sp>
+          <p:sp>
+            <p:nvSpPr>
+              <p:cNvPr id="989" name="Google Shape;989;p23"/>
+              <p:cNvSpPr/>
+              <p:nvPr/>
+            </p:nvSpPr>
+            <p:spPr>
+              <a:xfrm>
+                <a:off x="1669800" y="1613600"/>
+                <a:ext cx="1093475" cy="1092675"/>
+              </a:xfrm>
+              <a:custGeom>
+                <a:avLst/>
+                <a:gdLst/>
+                <a:ahLst/>
+                <a:cxnLst/>
+                <a:rect l="l" t="t" r="r" b="b"/>
+                <a:pathLst>
+                  <a:path w="43739" h="43707" fill="none" extrusionOk="0">
+                    <a:moveTo>
+                      <a:pt x="0" y="43707"/>
+                    </a:moveTo>
+                    <a:lnTo>
+                      <a:pt x="43739" y="1"/>
+                    </a:lnTo>
+                  </a:path>
+                </a:pathLst>
+              </a:custGeom>
+              <a:noFill/>
+              <a:ln w="19050" cap="rnd" cmpd="sng">
+                <a:solidFill>
+                  <a:schemeClr val="accent1"/>
+                </a:solidFill>
+                <a:prstDash val="solid"/>
+                <a:miter lim="32519"/>
+                <a:headEnd type="none" w="sm" len="sm"/>
+                <a:tailEnd type="none" w="sm" len="sm"/>
+              </a:ln>
+            </p:spPr>
+            <p:txBody>
+              <a:bodyPr spcFirstLastPara="1" wrap="square" lIns="91425" tIns="91425" rIns="91425" bIns="91425" anchor="ctr" anchorCtr="0">
+                <a:noAutofit/>
+              </a:bodyPr>
+              <a:lstStyle/>
+              <a:p>
+                <a:pPr marL="0" lvl="0" indent="0" algn="l" rtl="0">
+                  <a:spcBef>
+                    <a:spcPts val="0"/>
+                  </a:spcBef>
+                  <a:spcAft>
+                    <a:spcPts val="0"/>
+                  </a:spcAft>
+                  <a:buNone/>
+                </a:pPr>
+                <a:endParaRPr>
+                  <a:latin typeface="Inter"/>
+                  <a:ea typeface="Inter"/>
+                  <a:cs typeface="Inter"/>
+                  <a:sym typeface="Inter"/>
+                </a:endParaRPr>
+              </a:p>
+            </p:txBody>
+          </p:sp>
+          <p:sp>
+            <p:nvSpPr>
+              <p:cNvPr id="990" name="Google Shape;990;p23"/>
+              <p:cNvSpPr/>
+              <p:nvPr/>
+            </p:nvSpPr>
+            <p:spPr>
+              <a:xfrm>
+                <a:off x="1724445" y="1684323"/>
+                <a:ext cx="1133953" cy="1137555"/>
+              </a:xfrm>
+              <a:custGeom>
+                <a:avLst/>
+                <a:gdLst/>
+                <a:ahLst/>
+                <a:cxnLst/>
+                <a:rect l="l" t="t" r="r" b="b"/>
+                <a:pathLst>
+                  <a:path w="75837" h="75837" fill="none" extrusionOk="0">
+                    <a:moveTo>
+                      <a:pt x="1" y="75836"/>
+                    </a:moveTo>
+                    <a:lnTo>
+                      <a:pt x="75837" y="1"/>
+                    </a:lnTo>
+                  </a:path>
+                </a:pathLst>
+              </a:custGeom>
+              <a:noFill/>
+              <a:ln w="19050" cap="rnd" cmpd="sng">
+                <a:solidFill>
+                  <a:schemeClr val="accent1"/>
+                </a:solidFill>
+                <a:prstDash val="solid"/>
+                <a:miter lim="32519"/>
+                <a:headEnd type="none" w="sm" len="sm"/>
+                <a:tailEnd type="none" w="sm" len="sm"/>
+              </a:ln>
+            </p:spPr>
+            <p:txBody>
+              <a:bodyPr spcFirstLastPara="1" wrap="square" lIns="91425" tIns="91425" rIns="91425" bIns="91425" anchor="ctr" anchorCtr="0">
+                <a:noAutofit/>
+              </a:bodyPr>
+              <a:lstStyle/>
+              <a:p>
+                <a:pPr marL="0" lvl="0" indent="0" algn="l" rtl="0">
+                  <a:spcBef>
+                    <a:spcPts val="0"/>
+                  </a:spcBef>
+                  <a:spcAft>
+                    <a:spcPts val="0"/>
+                  </a:spcAft>
+                  <a:buNone/>
+                </a:pPr>
+                <a:endParaRPr>
+                  <a:latin typeface="Inter"/>
+                  <a:ea typeface="Inter"/>
+                  <a:cs typeface="Inter"/>
+                  <a:sym typeface="Inter"/>
+                </a:endParaRPr>
+              </a:p>
+            </p:txBody>
+          </p:sp>
+          <p:sp>
+            <p:nvSpPr>
+              <p:cNvPr id="991" name="Google Shape;991;p23"/>
+              <p:cNvSpPr/>
+              <p:nvPr/>
+            </p:nvSpPr>
+            <p:spPr>
+              <a:xfrm>
+                <a:off x="1802230" y="1767248"/>
+                <a:ext cx="1139947" cy="1128455"/>
+              </a:xfrm>
+              <a:custGeom>
+                <a:avLst/>
+                <a:gdLst/>
+                <a:ahLst/>
+                <a:cxnLst/>
+                <a:rect l="l" t="t" r="r" b="b"/>
+                <a:pathLst>
+                  <a:path w="75870" h="75837" fill="none" extrusionOk="0">
+                    <a:moveTo>
+                      <a:pt x="1" y="75836"/>
+                    </a:moveTo>
+                    <a:lnTo>
+                      <a:pt x="75869" y="1"/>
+                    </a:lnTo>
+                  </a:path>
+                </a:pathLst>
+              </a:custGeom>
+              <a:noFill/>
+              <a:ln w="19050" cap="rnd" cmpd="sng">
+                <a:solidFill>
+                  <a:schemeClr val="accent1"/>
+                </a:solidFill>
+                <a:prstDash val="solid"/>
+                <a:miter lim="32519"/>
+                <a:headEnd type="none" w="sm" len="sm"/>
+                <a:tailEnd type="none" w="sm" len="sm"/>
+              </a:ln>
+            </p:spPr>
+            <p:txBody>
+              <a:bodyPr spcFirstLastPara="1" wrap="square" lIns="91425" tIns="91425" rIns="91425" bIns="91425" anchor="ctr" anchorCtr="0">
+                <a:noAutofit/>
+              </a:bodyPr>
+              <a:lstStyle/>
+              <a:p>
+                <a:pPr marL="0" lvl="0" indent="0" algn="l" rtl="0">
+                  <a:spcBef>
+                    <a:spcPts val="0"/>
+                  </a:spcBef>
+                  <a:spcAft>
+                    <a:spcPts val="0"/>
+                  </a:spcAft>
+                  <a:buNone/>
+                </a:pPr>
+                <a:endParaRPr>
+                  <a:latin typeface="Inter"/>
+                  <a:ea typeface="Inter"/>
+                  <a:cs typeface="Inter"/>
+                  <a:sym typeface="Inter"/>
+                </a:endParaRPr>
+              </a:p>
+            </p:txBody>
+          </p:sp>
+          <p:sp>
+            <p:nvSpPr>
+              <p:cNvPr id="992" name="Google Shape;992;p23"/>
+              <p:cNvSpPr/>
+              <p:nvPr/>
+            </p:nvSpPr>
+            <p:spPr>
+              <a:xfrm>
+                <a:off x="1902777" y="1863204"/>
+                <a:ext cx="1109325" cy="1105584"/>
+              </a:xfrm>
+              <a:custGeom>
+                <a:avLst/>
+                <a:gdLst/>
+                <a:ahLst/>
+                <a:cxnLst/>
+                <a:rect l="l" t="t" r="r" b="b"/>
+                <a:pathLst>
+                  <a:path w="74828" h="74828" fill="none" extrusionOk="0">
+                    <a:moveTo>
+                      <a:pt x="0" y="74828"/>
+                    </a:moveTo>
+                    <a:lnTo>
+                      <a:pt x="74828" y="0"/>
+                    </a:lnTo>
+                  </a:path>
+                </a:pathLst>
+              </a:custGeom>
+              <a:noFill/>
+              <a:ln w="19050" cap="rnd" cmpd="sng">
+                <a:solidFill>
+                  <a:schemeClr val="accent1"/>
+                </a:solidFill>
+                <a:prstDash val="solid"/>
+                <a:miter lim="32519"/>
+                <a:headEnd type="none" w="sm" len="sm"/>
+                <a:tailEnd type="none" w="sm" len="sm"/>
+              </a:ln>
+            </p:spPr>
+            <p:txBody>
+              <a:bodyPr spcFirstLastPara="1" wrap="square" lIns="91425" tIns="91425" rIns="91425" bIns="91425" anchor="ctr" anchorCtr="0">
+                <a:noAutofit/>
+              </a:bodyPr>
+              <a:lstStyle/>
+              <a:p>
+                <a:pPr marL="0" lvl="0" indent="0" algn="l" rtl="0">
+                  <a:spcBef>
+                    <a:spcPts val="0"/>
+                  </a:spcBef>
+                  <a:spcAft>
+                    <a:spcPts val="0"/>
+                  </a:spcAft>
+                  <a:buNone/>
+                </a:pPr>
+                <a:endParaRPr>
+                  <a:latin typeface="Inter"/>
+                  <a:ea typeface="Inter"/>
+                  <a:cs typeface="Inter"/>
+                  <a:sym typeface="Inter"/>
+                </a:endParaRPr>
+              </a:p>
+            </p:txBody>
+          </p:sp>
+          <p:sp>
+            <p:nvSpPr>
+              <p:cNvPr id="993" name="Google Shape;993;p23"/>
+              <p:cNvSpPr/>
+              <p:nvPr/>
+            </p:nvSpPr>
+            <p:spPr>
+              <a:xfrm>
+                <a:off x="2027500" y="1971325"/>
+                <a:ext cx="1042275" cy="1042275"/>
+              </a:xfrm>
+              <a:custGeom>
+                <a:avLst/>
+                <a:gdLst/>
+                <a:ahLst/>
+                <a:cxnLst/>
+                <a:rect l="l" t="t" r="r" b="b"/>
+                <a:pathLst>
+                  <a:path w="41691" h="41691" fill="none" extrusionOk="0">
+                    <a:moveTo>
+                      <a:pt x="41691" y="0"/>
+                    </a:moveTo>
+                    <a:lnTo>
+                      <a:pt x="1" y="41690"/>
+                    </a:lnTo>
+                  </a:path>
+                </a:pathLst>
+              </a:custGeom>
+              <a:noFill/>
+              <a:ln w="19050" cap="rnd" cmpd="sng">
+                <a:solidFill>
+                  <a:schemeClr val="accent1"/>
+                </a:solidFill>
+                <a:prstDash val="solid"/>
+                <a:miter lim="32519"/>
+                <a:headEnd type="none" w="sm" len="sm"/>
+                <a:tailEnd type="none" w="sm" len="sm"/>
+              </a:ln>
+            </p:spPr>
+            <p:txBody>
+              <a:bodyPr spcFirstLastPara="1" wrap="square" lIns="91425" tIns="91425" rIns="91425" bIns="91425" anchor="ctr" anchorCtr="0">
+                <a:noAutofit/>
+              </a:bodyPr>
+              <a:lstStyle/>
+              <a:p>
+                <a:pPr marL="0" lvl="0" indent="0" algn="l" rtl="0">
+                  <a:spcBef>
+                    <a:spcPts val="0"/>
+                  </a:spcBef>
+                  <a:spcAft>
+                    <a:spcPts val="0"/>
+                  </a:spcAft>
+                  <a:buNone/>
+                </a:pPr>
+                <a:endParaRPr>
+                  <a:latin typeface="Inter"/>
+                  <a:ea typeface="Inter"/>
+                  <a:cs typeface="Inter"/>
+                  <a:sym typeface="Inter"/>
+                </a:endParaRPr>
+              </a:p>
+            </p:txBody>
+          </p:sp>
+          <p:sp>
+            <p:nvSpPr>
+              <p:cNvPr id="994" name="Google Shape;994;p23"/>
+              <p:cNvSpPr/>
+              <p:nvPr/>
+            </p:nvSpPr>
+            <p:spPr>
+              <a:xfrm>
+                <a:off x="2152700" y="2096525"/>
+                <a:ext cx="958550" cy="958525"/>
+              </a:xfrm>
+              <a:custGeom>
+                <a:avLst/>
+                <a:gdLst/>
+                <a:ahLst/>
+                <a:cxnLst/>
+                <a:rect l="l" t="t" r="r" b="b"/>
+                <a:pathLst>
+                  <a:path w="38342" h="38341" fill="none" extrusionOk="0">
+                    <a:moveTo>
+                      <a:pt x="38341" y="0"/>
+                    </a:moveTo>
+                    <a:lnTo>
+                      <a:pt x="1" y="38341"/>
+                    </a:lnTo>
+                  </a:path>
+                </a:pathLst>
+              </a:custGeom>
+              <a:noFill/>
+              <a:ln w="19050" cap="rnd" cmpd="sng">
+                <a:solidFill>
+                  <a:schemeClr val="accent1"/>
+                </a:solidFill>
+                <a:prstDash val="solid"/>
+                <a:miter lim="32519"/>
+                <a:headEnd type="none" w="sm" len="sm"/>
+                <a:tailEnd type="none" w="sm" len="sm"/>
+              </a:ln>
+            </p:spPr>
+            <p:txBody>
+              <a:bodyPr spcFirstLastPara="1" wrap="square" lIns="91425" tIns="91425" rIns="91425" bIns="91425" anchor="ctr" anchorCtr="0">
+                <a:noAutofit/>
+              </a:bodyPr>
+              <a:lstStyle/>
+              <a:p>
+                <a:pPr marL="0" lvl="0" indent="0" algn="l" rtl="0">
+                  <a:spcBef>
+                    <a:spcPts val="0"/>
+                  </a:spcBef>
+                  <a:spcAft>
+                    <a:spcPts val="0"/>
+                  </a:spcAft>
+                  <a:buNone/>
+                </a:pPr>
+                <a:endParaRPr>
+                  <a:latin typeface="Inter"/>
+                  <a:ea typeface="Inter"/>
+                  <a:cs typeface="Inter"/>
+                  <a:sym typeface="Inter"/>
+                </a:endParaRPr>
+              </a:p>
+            </p:txBody>
+          </p:sp>
+          <p:sp>
+            <p:nvSpPr>
+              <p:cNvPr id="995" name="Google Shape;995;p23"/>
+              <p:cNvSpPr/>
+              <p:nvPr/>
+            </p:nvSpPr>
+            <p:spPr>
+              <a:xfrm>
+                <a:off x="2298225" y="2241225"/>
+                <a:ext cx="834150" cy="834975"/>
+              </a:xfrm>
+              <a:custGeom>
+                <a:avLst/>
+                <a:gdLst/>
+                <a:ahLst/>
+                <a:cxnLst/>
+                <a:rect l="l" t="t" r="r" b="b"/>
+                <a:pathLst>
+                  <a:path w="33366" h="33399" fill="none" extrusionOk="0">
+                    <a:moveTo>
+                      <a:pt x="33366" y="1"/>
+                    </a:moveTo>
+                    <a:lnTo>
+                      <a:pt x="1" y="33398"/>
+                    </a:lnTo>
+                  </a:path>
+                </a:pathLst>
+              </a:custGeom>
+              <a:noFill/>
+              <a:ln w="19050" cap="rnd" cmpd="sng">
+                <a:solidFill>
+                  <a:schemeClr val="accent1"/>
+                </a:solidFill>
+                <a:prstDash val="solid"/>
+                <a:miter lim="32519"/>
+                <a:headEnd type="none" w="sm" len="sm"/>
+                <a:tailEnd type="none" w="sm" len="sm"/>
+              </a:ln>
+            </p:spPr>
+            <p:txBody>
+              <a:bodyPr spcFirstLastPara="1" wrap="square" lIns="91425" tIns="91425" rIns="91425" bIns="91425" anchor="ctr" anchorCtr="0">
+                <a:noAutofit/>
+              </a:bodyPr>
+              <a:lstStyle/>
+              <a:p>
+                <a:pPr marL="0" lvl="0" indent="0" algn="l" rtl="0">
+                  <a:spcBef>
+                    <a:spcPts val="0"/>
+                  </a:spcBef>
+                  <a:spcAft>
+                    <a:spcPts val="0"/>
+                  </a:spcAft>
+                  <a:buNone/>
+                </a:pPr>
+                <a:endParaRPr>
+                  <a:latin typeface="Inter"/>
+                  <a:ea typeface="Inter"/>
+                  <a:cs typeface="Inter"/>
+                  <a:sym typeface="Inter"/>
+                </a:endParaRPr>
+              </a:p>
+            </p:txBody>
+          </p:sp>
+          <p:sp>
+            <p:nvSpPr>
+              <p:cNvPr id="996" name="Google Shape;996;p23"/>
+              <p:cNvSpPr/>
+              <p:nvPr/>
+            </p:nvSpPr>
+            <p:spPr>
+              <a:xfrm>
+                <a:off x="2473825" y="2417650"/>
+                <a:ext cx="648800" cy="648800"/>
+              </a:xfrm>
+              <a:custGeom>
+                <a:avLst/>
+                <a:gdLst/>
+                <a:ahLst/>
+                <a:cxnLst/>
+                <a:rect l="l" t="t" r="r" b="b"/>
+                <a:pathLst>
+                  <a:path w="25952" h="25952" fill="none" extrusionOk="0">
+                    <a:moveTo>
+                      <a:pt x="25952" y="0"/>
+                    </a:moveTo>
+                    <a:lnTo>
+                      <a:pt x="1" y="25951"/>
+                    </a:lnTo>
+                  </a:path>
+                </a:pathLst>
+              </a:custGeom>
+              <a:noFill/>
+              <a:ln w="19050" cap="rnd" cmpd="sng">
+                <a:solidFill>
+                  <a:schemeClr val="accent1"/>
+                </a:solidFill>
+                <a:prstDash val="solid"/>
+                <a:miter lim="32519"/>
+                <a:headEnd type="none" w="sm" len="sm"/>
+                <a:tailEnd type="none" w="sm" len="sm"/>
+              </a:ln>
+            </p:spPr>
+            <p:txBody>
+              <a:bodyPr spcFirstLastPara="1" wrap="square" lIns="91425" tIns="91425" rIns="91425" bIns="91425" anchor="ctr" anchorCtr="0">
+                <a:noAutofit/>
+              </a:bodyPr>
+              <a:lstStyle/>
+              <a:p>
+                <a:pPr marL="0" lvl="0" indent="0" algn="l" rtl="0">
+                  <a:spcBef>
+                    <a:spcPts val="0"/>
+                  </a:spcBef>
+                  <a:spcAft>
+                    <a:spcPts val="0"/>
+                  </a:spcAft>
+                  <a:buNone/>
+                </a:pPr>
+                <a:endParaRPr>
+                  <a:latin typeface="Inter"/>
+                  <a:ea typeface="Inter"/>
+                  <a:cs typeface="Inter"/>
+                  <a:sym typeface="Inter"/>
+                </a:endParaRPr>
+              </a:p>
+            </p:txBody>
+          </p:sp>
+          <p:sp>
+            <p:nvSpPr>
+              <p:cNvPr id="997" name="Google Shape;997;p23"/>
+              <p:cNvSpPr/>
+              <p:nvPr/>
+            </p:nvSpPr>
+            <p:spPr>
+              <a:xfrm>
+                <a:off x="2730750" y="2674550"/>
+                <a:ext cx="300825" cy="300825"/>
+              </a:xfrm>
+              <a:custGeom>
+                <a:avLst/>
+                <a:gdLst/>
+                <a:ahLst/>
+                <a:cxnLst/>
+                <a:rect l="l" t="t" r="r" b="b"/>
+                <a:pathLst>
+                  <a:path w="12033" h="12033" fill="none" extrusionOk="0">
+                    <a:moveTo>
+                      <a:pt x="12032" y="1"/>
+                    </a:moveTo>
+                    <a:lnTo>
+                      <a:pt x="0" y="12033"/>
+                    </a:lnTo>
+                  </a:path>
+                </a:pathLst>
+              </a:custGeom>
+              <a:noFill/>
+              <a:ln w="19050" cap="rnd" cmpd="sng">
+                <a:solidFill>
+                  <a:schemeClr val="accent1"/>
+                </a:solidFill>
+                <a:prstDash val="solid"/>
+                <a:miter lim="32519"/>
+                <a:headEnd type="none" w="sm" len="sm"/>
+                <a:tailEnd type="none" w="sm" len="sm"/>
+              </a:ln>
+            </p:spPr>
+            <p:txBody>
+              <a:bodyPr spcFirstLastPara="1" wrap="square" lIns="91425" tIns="91425" rIns="91425" bIns="91425" anchor="ctr" anchorCtr="0">
+                <a:noAutofit/>
+              </a:bodyPr>
+              <a:lstStyle/>
+              <a:p>
+                <a:pPr marL="0" lvl="0" indent="0" algn="l" rtl="0">
+                  <a:spcBef>
+                    <a:spcPts val="0"/>
+                  </a:spcBef>
+                  <a:spcAft>
+                    <a:spcPts val="0"/>
+                  </a:spcAft>
+                  <a:buNone/>
+                </a:pPr>
+                <a:endParaRPr>
+                  <a:latin typeface="Inter"/>
+                  <a:ea typeface="Inter"/>
+                  <a:cs typeface="Inter"/>
+                  <a:sym typeface="Inter"/>
+                </a:endParaRPr>
+              </a:p>
+            </p:txBody>
+          </p:sp>
+        </p:grpSp>
+      </p:grpSp>
+      <p:grpSp>
+        <p:nvGrpSpPr>
+          <p:cNvPr id="998" name="Google Shape;998;p23"/>
+          <p:cNvGrpSpPr/>
+          <p:nvPr/>
+        </p:nvGrpSpPr>
+        <p:grpSpPr>
+          <a:xfrm rot="10800000" flipH="1">
+            <a:off x="2970850" y="4539526"/>
+            <a:ext cx="2744275" cy="2727763"/>
+            <a:chOff x="5985575" y="4420825"/>
+            <a:chExt cx="2744275" cy="2727763"/>
+          </a:xfrm>
+        </p:grpSpPr>
+        <p:sp>
+          <p:nvSpPr>
+            <p:cNvPr id="999" name="Google Shape;999;p23"/>
+            <p:cNvSpPr/>
+            <p:nvPr/>
+          </p:nvSpPr>
+          <p:spPr>
+            <a:xfrm>
+              <a:off x="6115050" y="4420825"/>
+              <a:ext cx="2614800" cy="2599800"/>
+            </a:xfrm>
+            <a:prstGeom prst="ellipse">
+              <a:avLst/>
+            </a:prstGeom>
+            <a:solidFill>
+              <a:srgbClr val="FFFFFF">
+                <a:alpha val="35850"/>
+              </a:srgbClr>
+            </a:solidFill>
+            <a:ln>
+              <a:noFill/>
+            </a:ln>
+          </p:spPr>
+          <p:txBody>
+            <a:bodyPr spcFirstLastPara="1" wrap="square" lIns="91425" tIns="91425" rIns="91425" bIns="91425" anchor="ctr" anchorCtr="0">
+              <a:noAutofit/>
+            </a:bodyPr>
+            <a:lstStyle/>
+            <a:p>
+              <a:pPr marL="0" lvl="0" indent="0" algn="l" rtl="0">
+                <a:spcBef>
+                  <a:spcPts val="0"/>
+                </a:spcBef>
+                <a:spcAft>
+                  <a:spcPts val="0"/>
+                </a:spcAft>
+                <a:buNone/>
+              </a:pPr>
+              <a:endParaRPr>
+                <a:latin typeface="Inter"/>
+                <a:ea typeface="Inter"/>
+                <a:cs typeface="Inter"/>
+                <a:sym typeface="Inter"/>
+              </a:endParaRPr>
+            </a:p>
+          </p:txBody>
+        </p:sp>
+        <p:grpSp>
+          <p:nvGrpSpPr>
+            <p:cNvPr id="1000" name="Google Shape;1000;p23"/>
+            <p:cNvGrpSpPr/>
+            <p:nvPr/>
+          </p:nvGrpSpPr>
+          <p:grpSpPr>
+            <a:xfrm rot="5400000" flipH="1">
+              <a:off x="5986247" y="4572099"/>
+              <a:ext cx="2575817" cy="2577160"/>
+              <a:chOff x="1550275" y="1493275"/>
+              <a:chExt cx="1582100" cy="1582925"/>
+            </a:xfrm>
+          </p:grpSpPr>
+          <p:sp>
+            <p:nvSpPr>
+              <p:cNvPr id="1001" name="Google Shape;1001;p23"/>
+              <p:cNvSpPr/>
+              <p:nvPr/>
+            </p:nvSpPr>
+            <p:spPr>
+              <a:xfrm>
+                <a:off x="1650275" y="1594100"/>
+                <a:ext cx="301650" cy="300825"/>
+              </a:xfrm>
+              <a:custGeom>
+                <a:avLst/>
+                <a:gdLst/>
+                <a:ahLst/>
+                <a:cxnLst/>
+                <a:rect l="l" t="t" r="r" b="b"/>
+                <a:pathLst>
+                  <a:path w="12066" h="12033" fill="none" extrusionOk="0">
+                    <a:moveTo>
+                      <a:pt x="1" y="12032"/>
+                    </a:moveTo>
+                    <a:lnTo>
+                      <a:pt x="12065" y="0"/>
+                    </a:lnTo>
+                  </a:path>
+                </a:pathLst>
+              </a:custGeom>
+              <a:noFill/>
+              <a:ln w="19050" cap="rnd" cmpd="sng">
+                <a:solidFill>
+                  <a:schemeClr val="accent1"/>
+                </a:solidFill>
+                <a:prstDash val="solid"/>
+                <a:miter lim="32519"/>
+                <a:headEnd type="none" w="sm" len="sm"/>
+                <a:tailEnd type="none" w="sm" len="sm"/>
+              </a:ln>
+            </p:spPr>
+            <p:txBody>
+              <a:bodyPr spcFirstLastPara="1" wrap="square" lIns="91425" tIns="91425" rIns="91425" bIns="91425" anchor="ctr" anchorCtr="0">
+                <a:noAutofit/>
+              </a:bodyPr>
+              <a:lstStyle/>
+              <a:p>
+                <a:pPr marL="0" lvl="0" indent="0" algn="l" rtl="0">
+                  <a:spcBef>
+                    <a:spcPts val="0"/>
+                  </a:spcBef>
+                  <a:spcAft>
+                    <a:spcPts val="0"/>
+                  </a:spcAft>
+                  <a:buNone/>
+                </a:pPr>
+                <a:endParaRPr>
+                  <a:latin typeface="Inter"/>
+                  <a:ea typeface="Inter"/>
+                  <a:cs typeface="Inter"/>
+                  <a:sym typeface="Inter"/>
+                </a:endParaRPr>
+              </a:p>
+            </p:txBody>
+          </p:sp>
+          <p:sp>
+            <p:nvSpPr>
+              <p:cNvPr id="1002" name="Google Shape;1002;p23"/>
+              <p:cNvSpPr/>
+              <p:nvPr/>
+            </p:nvSpPr>
+            <p:spPr>
+              <a:xfrm>
+                <a:off x="1560025" y="1503850"/>
+                <a:ext cx="648800" cy="647975"/>
+              </a:xfrm>
+              <a:custGeom>
+                <a:avLst/>
+                <a:gdLst/>
+                <a:ahLst/>
+                <a:cxnLst/>
+                <a:rect l="l" t="t" r="r" b="b"/>
+                <a:pathLst>
+                  <a:path w="25952" h="25919" fill="none" extrusionOk="0">
+                    <a:moveTo>
+                      <a:pt x="1" y="25919"/>
+                    </a:moveTo>
+                    <a:lnTo>
+                      <a:pt x="25952" y="0"/>
+                    </a:lnTo>
+                  </a:path>
+                </a:pathLst>
+              </a:custGeom>
+              <a:noFill/>
+              <a:ln w="19050" cap="rnd" cmpd="sng">
+                <a:solidFill>
+                  <a:schemeClr val="accent1"/>
+                </a:solidFill>
+                <a:prstDash val="solid"/>
+                <a:miter lim="32519"/>
+                <a:headEnd type="none" w="sm" len="sm"/>
+                <a:tailEnd type="none" w="sm" len="sm"/>
+              </a:ln>
+            </p:spPr>
+            <p:txBody>
+              <a:bodyPr spcFirstLastPara="1" wrap="square" lIns="91425" tIns="91425" rIns="91425" bIns="91425" anchor="ctr" anchorCtr="0">
+                <a:noAutofit/>
+              </a:bodyPr>
+              <a:lstStyle/>
+              <a:p>
+                <a:pPr marL="0" lvl="0" indent="0" algn="l" rtl="0">
+                  <a:spcBef>
+                    <a:spcPts val="0"/>
+                  </a:spcBef>
+                  <a:spcAft>
+                    <a:spcPts val="0"/>
+                  </a:spcAft>
+                  <a:buNone/>
+                </a:pPr>
+                <a:endParaRPr>
+                  <a:latin typeface="Inter"/>
+                  <a:ea typeface="Inter"/>
+                  <a:cs typeface="Inter"/>
+                  <a:sym typeface="Inter"/>
+                </a:endParaRPr>
+              </a:p>
+            </p:txBody>
+          </p:sp>
+          <p:sp>
+            <p:nvSpPr>
+              <p:cNvPr id="1003" name="Google Shape;1003;p23"/>
+              <p:cNvSpPr/>
+              <p:nvPr/>
+            </p:nvSpPr>
+            <p:spPr>
+              <a:xfrm>
+                <a:off x="1550275" y="1493275"/>
+                <a:ext cx="834150" cy="834975"/>
+              </a:xfrm>
+              <a:custGeom>
+                <a:avLst/>
+                <a:gdLst/>
+                <a:ahLst/>
+                <a:cxnLst/>
+                <a:rect l="l" t="t" r="r" b="b"/>
+                <a:pathLst>
+                  <a:path w="33366" h="33399" fill="none" extrusionOk="0">
+                    <a:moveTo>
+                      <a:pt x="1" y="33398"/>
+                    </a:moveTo>
+                    <a:lnTo>
+                      <a:pt x="33366" y="1"/>
+                    </a:lnTo>
+                  </a:path>
+                </a:pathLst>
+              </a:custGeom>
+              <a:noFill/>
+              <a:ln w="19050" cap="rnd" cmpd="sng">
+                <a:solidFill>
+                  <a:schemeClr val="accent1"/>
+                </a:solidFill>
+                <a:prstDash val="solid"/>
+                <a:miter lim="32519"/>
+                <a:headEnd type="none" w="sm" len="sm"/>
+                <a:tailEnd type="none" w="sm" len="sm"/>
+              </a:ln>
+            </p:spPr>
+            <p:txBody>
+              <a:bodyPr spcFirstLastPara="1" wrap="square" lIns="91425" tIns="91425" rIns="91425" bIns="91425" anchor="ctr" anchorCtr="0">
+                <a:noAutofit/>
+              </a:bodyPr>
+              <a:lstStyle/>
+              <a:p>
+                <a:pPr marL="0" lvl="0" indent="0" algn="l" rtl="0">
+                  <a:spcBef>
+                    <a:spcPts val="0"/>
+                  </a:spcBef>
+                  <a:spcAft>
+                    <a:spcPts val="0"/>
+                  </a:spcAft>
+                  <a:buNone/>
+                </a:pPr>
+                <a:endParaRPr>
+                  <a:latin typeface="Inter"/>
+                  <a:ea typeface="Inter"/>
+                  <a:cs typeface="Inter"/>
+                  <a:sym typeface="Inter"/>
+                </a:endParaRPr>
+              </a:p>
+            </p:txBody>
+          </p:sp>
+          <p:sp>
+            <p:nvSpPr>
+              <p:cNvPr id="1004" name="Google Shape;1004;p23"/>
+              <p:cNvSpPr/>
+              <p:nvPr/>
+            </p:nvSpPr>
+            <p:spPr>
+              <a:xfrm>
+                <a:off x="1571425" y="1514425"/>
+                <a:ext cx="957725" cy="958525"/>
+              </a:xfrm>
+              <a:custGeom>
+                <a:avLst/>
+                <a:gdLst/>
+                <a:ahLst/>
+                <a:cxnLst/>
+                <a:rect l="l" t="t" r="r" b="b"/>
+                <a:pathLst>
+                  <a:path w="38309" h="38341" fill="none" extrusionOk="0">
+                    <a:moveTo>
+                      <a:pt x="0" y="38341"/>
+                    </a:moveTo>
+                    <a:lnTo>
+                      <a:pt x="38308" y="0"/>
+                    </a:lnTo>
+                  </a:path>
+                </a:pathLst>
+              </a:custGeom>
+              <a:noFill/>
+              <a:ln w="19050" cap="rnd" cmpd="sng">
+                <a:solidFill>
+                  <a:schemeClr val="accent1"/>
+                </a:solidFill>
+                <a:prstDash val="solid"/>
+                <a:miter lim="32519"/>
+                <a:headEnd type="none" w="sm" len="sm"/>
+                <a:tailEnd type="none" w="sm" len="sm"/>
+              </a:ln>
+            </p:spPr>
+            <p:txBody>
+              <a:bodyPr spcFirstLastPara="1" wrap="square" lIns="91425" tIns="91425" rIns="91425" bIns="91425" anchor="ctr" anchorCtr="0">
+                <a:noAutofit/>
+              </a:bodyPr>
+              <a:lstStyle/>
+              <a:p>
+                <a:pPr marL="0" lvl="0" indent="0" algn="l" rtl="0">
+                  <a:spcBef>
+                    <a:spcPts val="0"/>
+                  </a:spcBef>
+                  <a:spcAft>
+                    <a:spcPts val="0"/>
+                  </a:spcAft>
+                  <a:buNone/>
+                </a:pPr>
+                <a:endParaRPr>
+                  <a:latin typeface="Inter"/>
+                  <a:ea typeface="Inter"/>
+                  <a:cs typeface="Inter"/>
+                  <a:sym typeface="Inter"/>
+                </a:endParaRPr>
+              </a:p>
+            </p:txBody>
+          </p:sp>
+          <p:sp>
+            <p:nvSpPr>
+              <p:cNvPr id="1005" name="Google Shape;1005;p23"/>
+              <p:cNvSpPr/>
+              <p:nvPr/>
+            </p:nvSpPr>
+            <p:spPr>
+              <a:xfrm>
+                <a:off x="1612875" y="1555875"/>
+                <a:ext cx="1041475" cy="1042275"/>
+              </a:xfrm>
+              <a:custGeom>
+                <a:avLst/>
+                <a:gdLst/>
+                <a:ahLst/>
+                <a:cxnLst/>
+                <a:rect l="l" t="t" r="r" b="b"/>
+                <a:pathLst>
+                  <a:path w="41659" h="41691" fill="none" extrusionOk="0">
+                    <a:moveTo>
+                      <a:pt x="1" y="41691"/>
+                    </a:moveTo>
+                    <a:lnTo>
+                      <a:pt x="41658" y="1"/>
+                    </a:lnTo>
+                  </a:path>
+                </a:pathLst>
+              </a:custGeom>
+              <a:noFill/>
+              <a:ln w="19050" cap="rnd" cmpd="sng">
+                <a:solidFill>
+                  <a:schemeClr val="accent1"/>
+                </a:solidFill>
+                <a:prstDash val="solid"/>
+                <a:miter lim="32519"/>
+                <a:headEnd type="none" w="sm" len="sm"/>
+                <a:tailEnd type="none" w="sm" len="sm"/>
+              </a:ln>
+            </p:spPr>
+            <p:txBody>
+              <a:bodyPr spcFirstLastPara="1" wrap="square" lIns="91425" tIns="91425" rIns="91425" bIns="91425" anchor="ctr" anchorCtr="0">
+                <a:noAutofit/>
+              </a:bodyPr>
+              <a:lstStyle/>
+              <a:p>
+                <a:pPr marL="0" lvl="0" indent="0" algn="l" rtl="0">
+                  <a:spcBef>
+                    <a:spcPts val="0"/>
+                  </a:spcBef>
+                  <a:spcAft>
+                    <a:spcPts val="0"/>
+                  </a:spcAft>
+                  <a:buNone/>
+                </a:pPr>
+                <a:endParaRPr>
+                  <a:latin typeface="Inter"/>
+                  <a:ea typeface="Inter"/>
+                  <a:cs typeface="Inter"/>
+                  <a:sym typeface="Inter"/>
+                </a:endParaRPr>
+              </a:p>
+            </p:txBody>
+          </p:sp>
+          <p:sp>
+            <p:nvSpPr>
+              <p:cNvPr id="1006" name="Google Shape;1006;p23"/>
+              <p:cNvSpPr/>
+              <p:nvPr/>
+            </p:nvSpPr>
+            <p:spPr>
+              <a:xfrm>
+                <a:off x="1669800" y="1613600"/>
+                <a:ext cx="1093475" cy="1092675"/>
+              </a:xfrm>
+              <a:custGeom>
+                <a:avLst/>
+                <a:gdLst/>
+                <a:ahLst/>
+                <a:cxnLst/>
+                <a:rect l="l" t="t" r="r" b="b"/>
+                <a:pathLst>
+                  <a:path w="43739" h="43707" fill="none" extrusionOk="0">
+                    <a:moveTo>
+                      <a:pt x="0" y="43707"/>
+                    </a:moveTo>
+                    <a:lnTo>
+                      <a:pt x="43739" y="1"/>
+                    </a:lnTo>
+                  </a:path>
+                </a:pathLst>
+              </a:custGeom>
+              <a:noFill/>
+              <a:ln w="19050" cap="rnd" cmpd="sng">
+                <a:solidFill>
+                  <a:schemeClr val="accent1"/>
+                </a:solidFill>
+                <a:prstDash val="solid"/>
+                <a:miter lim="32519"/>
+                <a:headEnd type="none" w="sm" len="sm"/>
+                <a:tailEnd type="none" w="sm" len="sm"/>
+              </a:ln>
+            </p:spPr>
+            <p:txBody>
+              <a:bodyPr spcFirstLastPara="1" wrap="square" lIns="91425" tIns="91425" rIns="91425" bIns="91425" anchor="ctr" anchorCtr="0">
+                <a:noAutofit/>
+              </a:bodyPr>
+              <a:lstStyle/>
+              <a:p>
+                <a:pPr marL="0" lvl="0" indent="0" algn="l" rtl="0">
+                  <a:spcBef>
+                    <a:spcPts val="0"/>
+                  </a:spcBef>
+                  <a:spcAft>
+                    <a:spcPts val="0"/>
+                  </a:spcAft>
+                  <a:buNone/>
+                </a:pPr>
+                <a:endParaRPr>
+                  <a:latin typeface="Inter"/>
+                  <a:ea typeface="Inter"/>
+                  <a:cs typeface="Inter"/>
+                  <a:sym typeface="Inter"/>
+                </a:endParaRPr>
+              </a:p>
+            </p:txBody>
+          </p:sp>
+          <p:sp>
+            <p:nvSpPr>
+              <p:cNvPr id="1007" name="Google Shape;1007;p23"/>
+              <p:cNvSpPr/>
+              <p:nvPr/>
+            </p:nvSpPr>
+            <p:spPr>
+              <a:xfrm>
+                <a:off x="1724445" y="1684323"/>
+                <a:ext cx="1133953" cy="1137555"/>
+              </a:xfrm>
+              <a:custGeom>
+                <a:avLst/>
+                <a:gdLst/>
+                <a:ahLst/>
+                <a:cxnLst/>
+                <a:rect l="l" t="t" r="r" b="b"/>
+                <a:pathLst>
+                  <a:path w="75837" h="75837" fill="none" extrusionOk="0">
+                    <a:moveTo>
+                      <a:pt x="1" y="75836"/>
+                    </a:moveTo>
+                    <a:lnTo>
+                      <a:pt x="75837" y="1"/>
+                    </a:lnTo>
+                  </a:path>
+                </a:pathLst>
+              </a:custGeom>
+              <a:noFill/>
+              <a:ln w="19050" cap="rnd" cmpd="sng">
+                <a:solidFill>
+                  <a:schemeClr val="accent1"/>
+                </a:solidFill>
+                <a:prstDash val="solid"/>
+                <a:miter lim="32519"/>
+                <a:headEnd type="none" w="sm" len="sm"/>
+                <a:tailEnd type="none" w="sm" len="sm"/>
+              </a:ln>
+            </p:spPr>
+            <p:txBody>
+              <a:bodyPr spcFirstLastPara="1" wrap="square" lIns="91425" tIns="91425" rIns="91425" bIns="91425" anchor="ctr" anchorCtr="0">
+                <a:noAutofit/>
+              </a:bodyPr>
+              <a:lstStyle/>
+              <a:p>
+                <a:pPr marL="0" lvl="0" indent="0" algn="l" rtl="0">
+                  <a:spcBef>
+                    <a:spcPts val="0"/>
+                  </a:spcBef>
+                  <a:spcAft>
+                    <a:spcPts val="0"/>
+                  </a:spcAft>
+                  <a:buNone/>
+                </a:pPr>
+                <a:endParaRPr>
+                  <a:latin typeface="Inter"/>
+                  <a:ea typeface="Inter"/>
+                  <a:cs typeface="Inter"/>
+                  <a:sym typeface="Inter"/>
+                </a:endParaRPr>
+              </a:p>
+            </p:txBody>
+          </p:sp>
+          <p:sp>
+            <p:nvSpPr>
+              <p:cNvPr id="1008" name="Google Shape;1008;p23"/>
+              <p:cNvSpPr/>
+              <p:nvPr/>
+            </p:nvSpPr>
+            <p:spPr>
+              <a:xfrm>
+                <a:off x="1802230" y="1767248"/>
+                <a:ext cx="1139947" cy="1128455"/>
+              </a:xfrm>
+              <a:custGeom>
+                <a:avLst/>
+                <a:gdLst/>
+                <a:ahLst/>
+                <a:cxnLst/>
+                <a:rect l="l" t="t" r="r" b="b"/>
+                <a:pathLst>
+                  <a:path w="75870" h="75837" fill="none" extrusionOk="0">
+                    <a:moveTo>
+                      <a:pt x="1" y="75836"/>
+                    </a:moveTo>
+                    <a:lnTo>
+                      <a:pt x="75869" y="1"/>
+                    </a:lnTo>
+                  </a:path>
+                </a:pathLst>
+              </a:custGeom>
+              <a:noFill/>
+              <a:ln w="19050" cap="rnd" cmpd="sng">
+                <a:solidFill>
+                  <a:schemeClr val="accent1"/>
+                </a:solidFill>
+                <a:prstDash val="solid"/>
+                <a:miter lim="32519"/>
+                <a:headEnd type="none" w="sm" len="sm"/>
+                <a:tailEnd type="none" w="sm" len="sm"/>
+              </a:ln>
+            </p:spPr>
+            <p:txBody>
+              <a:bodyPr spcFirstLastPara="1" wrap="square" lIns="91425" tIns="91425" rIns="91425" bIns="91425" anchor="ctr" anchorCtr="0">
+                <a:noAutofit/>
+              </a:bodyPr>
+              <a:lstStyle/>
+              <a:p>
+                <a:pPr marL="0" lvl="0" indent="0" algn="l" rtl="0">
+                  <a:spcBef>
+                    <a:spcPts val="0"/>
+                  </a:spcBef>
+                  <a:spcAft>
+                    <a:spcPts val="0"/>
+                  </a:spcAft>
+                  <a:buNone/>
+                </a:pPr>
+                <a:endParaRPr>
+                  <a:latin typeface="Inter"/>
+                  <a:ea typeface="Inter"/>
+                  <a:cs typeface="Inter"/>
+                  <a:sym typeface="Inter"/>
+                </a:endParaRPr>
+              </a:p>
+            </p:txBody>
+          </p:sp>
+          <p:sp>
+            <p:nvSpPr>
+              <p:cNvPr id="1009" name="Google Shape;1009;p23"/>
+              <p:cNvSpPr/>
+              <p:nvPr/>
+            </p:nvSpPr>
+            <p:spPr>
+              <a:xfrm>
+                <a:off x="1902777" y="1863204"/>
+                <a:ext cx="1109325" cy="1105584"/>
+              </a:xfrm>
+              <a:custGeom>
+                <a:avLst/>
+                <a:gdLst/>
+                <a:ahLst/>
+                <a:cxnLst/>
+                <a:rect l="l" t="t" r="r" b="b"/>
+                <a:pathLst>
+                  <a:path w="74828" h="74828" fill="none" extrusionOk="0">
+                    <a:moveTo>
+                      <a:pt x="0" y="74828"/>
+                    </a:moveTo>
+                    <a:lnTo>
+                      <a:pt x="74828" y="0"/>
+                    </a:lnTo>
+                  </a:path>
+                </a:pathLst>
+              </a:custGeom>
+              <a:noFill/>
+              <a:ln w="19050" cap="rnd" cmpd="sng">
+                <a:solidFill>
+                  <a:schemeClr val="accent1"/>
+                </a:solidFill>
+                <a:prstDash val="solid"/>
+                <a:miter lim="32519"/>
+                <a:headEnd type="none" w="sm" len="sm"/>
+                <a:tailEnd type="none" w="sm" len="sm"/>
+              </a:ln>
+            </p:spPr>
+            <p:txBody>
+              <a:bodyPr spcFirstLastPara="1" wrap="square" lIns="91425" tIns="91425" rIns="91425" bIns="91425" anchor="ctr" anchorCtr="0">
+                <a:noAutofit/>
+              </a:bodyPr>
+              <a:lstStyle/>
+              <a:p>
+                <a:pPr marL="0" lvl="0" indent="0" algn="l" rtl="0">
+                  <a:spcBef>
+                    <a:spcPts val="0"/>
+                  </a:spcBef>
+                  <a:spcAft>
+                    <a:spcPts val="0"/>
+                  </a:spcAft>
+                  <a:buNone/>
+                </a:pPr>
+                <a:endParaRPr>
+                  <a:latin typeface="Inter"/>
+                  <a:ea typeface="Inter"/>
+                  <a:cs typeface="Inter"/>
+                  <a:sym typeface="Inter"/>
+                </a:endParaRPr>
+              </a:p>
+            </p:txBody>
+          </p:sp>
+          <p:sp>
+            <p:nvSpPr>
+              <p:cNvPr id="1010" name="Google Shape;1010;p23"/>
+              <p:cNvSpPr/>
+              <p:nvPr/>
+            </p:nvSpPr>
+            <p:spPr>
+              <a:xfrm>
+                <a:off x="2027500" y="1971325"/>
+                <a:ext cx="1042275" cy="1042275"/>
+              </a:xfrm>
+              <a:custGeom>
+                <a:avLst/>
+                <a:gdLst/>
+                <a:ahLst/>
+                <a:cxnLst/>
+                <a:rect l="l" t="t" r="r" b="b"/>
+                <a:pathLst>
+                  <a:path w="41691" h="41691" fill="none" extrusionOk="0">
+                    <a:moveTo>
+                      <a:pt x="41691" y="0"/>
+                    </a:moveTo>
+                    <a:lnTo>
+                      <a:pt x="1" y="41690"/>
+                    </a:lnTo>
+                  </a:path>
+                </a:pathLst>
+              </a:custGeom>
+              <a:noFill/>
+              <a:ln w="19050" cap="rnd" cmpd="sng">
+                <a:solidFill>
+                  <a:schemeClr val="accent1"/>
+                </a:solidFill>
+                <a:prstDash val="solid"/>
+                <a:miter lim="32519"/>
+                <a:headEnd type="none" w="sm" len="sm"/>
+                <a:tailEnd type="none" w="sm" len="sm"/>
+              </a:ln>
+            </p:spPr>
+            <p:txBody>
+              <a:bodyPr spcFirstLastPara="1" wrap="square" lIns="91425" tIns="91425" rIns="91425" bIns="91425" anchor="ctr" anchorCtr="0">
+                <a:noAutofit/>
+              </a:bodyPr>
+              <a:lstStyle/>
+              <a:p>
+                <a:pPr marL="0" lvl="0" indent="0" algn="l" rtl="0">
+                  <a:spcBef>
+                    <a:spcPts val="0"/>
+                  </a:spcBef>
+                  <a:spcAft>
+                    <a:spcPts val="0"/>
+                  </a:spcAft>
+                  <a:buNone/>
+                </a:pPr>
+                <a:endParaRPr>
+                  <a:latin typeface="Inter"/>
+                  <a:ea typeface="Inter"/>
+                  <a:cs typeface="Inter"/>
+                  <a:sym typeface="Inter"/>
+                </a:endParaRPr>
+              </a:p>
+            </p:txBody>
+          </p:sp>
+          <p:sp>
+            <p:nvSpPr>
+              <p:cNvPr id="1011" name="Google Shape;1011;p23"/>
+              <p:cNvSpPr/>
+              <p:nvPr/>
+            </p:nvSpPr>
+            <p:spPr>
+              <a:xfrm>
+                <a:off x="2152700" y="2096525"/>
+                <a:ext cx="958550" cy="958525"/>
+              </a:xfrm>
+              <a:custGeom>
+                <a:avLst/>
+                <a:gdLst/>
+                <a:ahLst/>
+                <a:cxnLst/>
+                <a:rect l="l" t="t" r="r" b="b"/>
+                <a:pathLst>
+                  <a:path w="38342" h="38341" fill="none" extrusionOk="0">
+                    <a:moveTo>
+                      <a:pt x="38341" y="0"/>
+                    </a:moveTo>
+                    <a:lnTo>
+                      <a:pt x="1" y="38341"/>
+                    </a:lnTo>
+                  </a:path>
+                </a:pathLst>
+              </a:custGeom>
+              <a:noFill/>
+              <a:ln w="19050" cap="rnd" cmpd="sng">
+                <a:solidFill>
+                  <a:schemeClr val="accent1"/>
+                </a:solidFill>
+                <a:prstDash val="solid"/>
+                <a:miter lim="32519"/>
+                <a:headEnd type="none" w="sm" len="sm"/>
+                <a:tailEnd type="none" w="sm" len="sm"/>
+              </a:ln>
+            </p:spPr>
+            <p:txBody>
+              <a:bodyPr spcFirstLastPara="1" wrap="square" lIns="91425" tIns="91425" rIns="91425" bIns="91425" anchor="ctr" anchorCtr="0">
+                <a:noAutofit/>
+              </a:bodyPr>
+              <a:lstStyle/>
+              <a:p>
+                <a:pPr marL="0" lvl="0" indent="0" algn="l" rtl="0">
+                  <a:spcBef>
+                    <a:spcPts val="0"/>
+                  </a:spcBef>
+                  <a:spcAft>
+                    <a:spcPts val="0"/>
+                  </a:spcAft>
+                  <a:buNone/>
+                </a:pPr>
+                <a:endParaRPr>
+                  <a:latin typeface="Inter"/>
+                  <a:ea typeface="Inter"/>
+                  <a:cs typeface="Inter"/>
+                  <a:sym typeface="Inter"/>
+                </a:endParaRPr>
+              </a:p>
+            </p:txBody>
+          </p:sp>
+          <p:sp>
+            <p:nvSpPr>
+              <p:cNvPr id="1012" name="Google Shape;1012;p23"/>
+              <p:cNvSpPr/>
+              <p:nvPr/>
+            </p:nvSpPr>
+            <p:spPr>
+              <a:xfrm>
+                <a:off x="2298225" y="2241225"/>
+                <a:ext cx="834150" cy="834975"/>
+              </a:xfrm>
+              <a:custGeom>
+                <a:avLst/>
+                <a:gdLst/>
+                <a:ahLst/>
+                <a:cxnLst/>
+                <a:rect l="l" t="t" r="r" b="b"/>
+                <a:pathLst>
+                  <a:path w="33366" h="33399" fill="none" extrusionOk="0">
+                    <a:moveTo>
+                      <a:pt x="33366" y="1"/>
+                    </a:moveTo>
+                    <a:lnTo>
+                      <a:pt x="1" y="33398"/>
+                    </a:lnTo>
+                  </a:path>
+                </a:pathLst>
+              </a:custGeom>
+              <a:noFill/>
+              <a:ln w="19050" cap="rnd" cmpd="sng">
+                <a:solidFill>
+                  <a:schemeClr val="accent1"/>
+                </a:solidFill>
+                <a:prstDash val="solid"/>
+                <a:miter lim="32519"/>
+                <a:headEnd type="none" w="sm" len="sm"/>
+                <a:tailEnd type="none" w="sm" len="sm"/>
+              </a:ln>
+            </p:spPr>
+            <p:txBody>
+              <a:bodyPr spcFirstLastPara="1" wrap="square" lIns="91425" tIns="91425" rIns="91425" bIns="91425" anchor="ctr" anchorCtr="0">
+                <a:noAutofit/>
+              </a:bodyPr>
+              <a:lstStyle/>
+              <a:p>
+                <a:pPr marL="0" lvl="0" indent="0" algn="l" rtl="0">
+                  <a:spcBef>
+                    <a:spcPts val="0"/>
+                  </a:spcBef>
+                  <a:spcAft>
+                    <a:spcPts val="0"/>
+                  </a:spcAft>
+                  <a:buNone/>
+                </a:pPr>
+                <a:endParaRPr>
+                  <a:latin typeface="Inter"/>
+                  <a:ea typeface="Inter"/>
+                  <a:cs typeface="Inter"/>
+                  <a:sym typeface="Inter"/>
+                </a:endParaRPr>
+              </a:p>
+            </p:txBody>
+          </p:sp>
+          <p:sp>
+            <p:nvSpPr>
+              <p:cNvPr id="1013" name="Google Shape;1013;p23"/>
+              <p:cNvSpPr/>
+              <p:nvPr/>
+            </p:nvSpPr>
+            <p:spPr>
+              <a:xfrm>
+                <a:off x="2473825" y="2417650"/>
+                <a:ext cx="648800" cy="648800"/>
+              </a:xfrm>
+              <a:custGeom>
+                <a:avLst/>
+                <a:gdLst/>
+                <a:ahLst/>
+                <a:cxnLst/>
+                <a:rect l="l" t="t" r="r" b="b"/>
+                <a:pathLst>
+                  <a:path w="25952" h="25952" fill="none" extrusionOk="0">
+                    <a:moveTo>
+                      <a:pt x="25952" y="0"/>
+                    </a:moveTo>
+                    <a:lnTo>
+                      <a:pt x="1" y="25951"/>
+                    </a:lnTo>
+                  </a:path>
+                </a:pathLst>
+              </a:custGeom>
+              <a:noFill/>
+              <a:ln w="19050" cap="rnd" cmpd="sng">
+                <a:solidFill>
+                  <a:schemeClr val="accent1"/>
+                </a:solidFill>
+                <a:prstDash val="solid"/>
+                <a:miter lim="32519"/>
+                <a:headEnd type="none" w="sm" len="sm"/>
+                <a:tailEnd type="none" w="sm" len="sm"/>
+              </a:ln>
+            </p:spPr>
+            <p:txBody>
+              <a:bodyPr spcFirstLastPara="1" wrap="square" lIns="91425" tIns="91425" rIns="91425" bIns="91425" anchor="ctr" anchorCtr="0">
+                <a:noAutofit/>
+              </a:bodyPr>
+              <a:lstStyle/>
+              <a:p>
+                <a:pPr marL="0" lvl="0" indent="0" algn="l" rtl="0">
+                  <a:spcBef>
+                    <a:spcPts val="0"/>
+                  </a:spcBef>
+                  <a:spcAft>
+                    <a:spcPts val="0"/>
+                  </a:spcAft>
+                  <a:buNone/>
+                </a:pPr>
+                <a:endParaRPr>
+                  <a:latin typeface="Inter"/>
+                  <a:ea typeface="Inter"/>
+                  <a:cs typeface="Inter"/>
+                  <a:sym typeface="Inter"/>
+                </a:endParaRPr>
+              </a:p>
+            </p:txBody>
+          </p:sp>
+          <p:sp>
+            <p:nvSpPr>
+              <p:cNvPr id="1014" name="Google Shape;1014;p23"/>
+              <p:cNvSpPr/>
+              <p:nvPr/>
+            </p:nvSpPr>
+            <p:spPr>
+              <a:xfrm>
+                <a:off x="2730750" y="2674550"/>
+                <a:ext cx="300825" cy="300825"/>
+              </a:xfrm>
+              <a:custGeom>
+                <a:avLst/>
+                <a:gdLst/>
+                <a:ahLst/>
+                <a:cxnLst/>
+                <a:rect l="l" t="t" r="r" b="b"/>
+                <a:pathLst>
+                  <a:path w="12033" h="12033" fill="none" extrusionOk="0">
+                    <a:moveTo>
+                      <a:pt x="12032" y="1"/>
+                    </a:moveTo>
+                    <a:lnTo>
+                      <a:pt x="0" y="12033"/>
+                    </a:lnTo>
+                  </a:path>
+                </a:pathLst>
+              </a:custGeom>
+              <a:noFill/>
+              <a:ln w="19050" cap="rnd" cmpd="sng">
+                <a:solidFill>
+                  <a:schemeClr val="accent1"/>
+                </a:solidFill>
+                <a:prstDash val="solid"/>
+                <a:miter lim="32519"/>
+                <a:headEnd type="none" w="sm" len="sm"/>
+                <a:tailEnd type="none" w="sm" len="sm"/>
+              </a:ln>
+            </p:spPr>
+            <p:txBody>
+              <a:bodyPr spcFirstLastPara="1" wrap="square" lIns="91425" tIns="91425" rIns="91425" bIns="91425" anchor="ctr" anchorCtr="0">
+                <a:noAutofit/>
+              </a:bodyPr>
+              <a:lstStyle/>
+              <a:p>
+                <a:pPr marL="0" lvl="0" indent="0" algn="l" rtl="0">
+                  <a:spcBef>
+                    <a:spcPts val="0"/>
+                  </a:spcBef>
+                  <a:spcAft>
+                    <a:spcPts val="0"/>
+                  </a:spcAft>
+                  <a:buNone/>
+                </a:pPr>
+                <a:endParaRPr>
+                  <a:latin typeface="Inter"/>
+                  <a:ea typeface="Inter"/>
+                  <a:cs typeface="Inter"/>
+                  <a:sym typeface="Inter"/>
+                </a:endParaRPr>
+              </a:p>
+            </p:txBody>
+          </p:sp>
+        </p:grpSp>
+      </p:grpSp>
+      <p:grpSp>
+        <p:nvGrpSpPr>
+          <p:cNvPr id="1015" name="Google Shape;1015;p23"/>
+          <p:cNvGrpSpPr/>
+          <p:nvPr/>
+        </p:nvGrpSpPr>
+        <p:grpSpPr>
+          <a:xfrm rot="10800000" flipH="1">
+            <a:off x="-1281564" y="-1968506"/>
+            <a:ext cx="2577160" cy="2638569"/>
+            <a:chOff x="-1115775" y="4467744"/>
+            <a:chExt cx="2577160" cy="2638569"/>
+          </a:xfrm>
+        </p:grpSpPr>
+        <p:sp>
+          <p:nvSpPr>
+            <p:cNvPr id="1016" name="Google Shape;1016;p23"/>
+            <p:cNvSpPr/>
+            <p:nvPr/>
+          </p:nvSpPr>
+          <p:spPr>
+            <a:xfrm>
+              <a:off x="-961762" y="4467744"/>
+              <a:ext cx="1751700" cy="1751700"/>
+            </a:xfrm>
+            <a:prstGeom prst="ellipse">
+              <a:avLst/>
+            </a:prstGeom>
+            <a:solidFill>
+              <a:schemeClr val="accent1"/>
+            </a:solidFill>
+            <a:ln>
+              <a:noFill/>
+            </a:ln>
+          </p:spPr>
+          <p:txBody>
+            <a:bodyPr spcFirstLastPara="1" wrap="square" lIns="91425" tIns="91425" rIns="91425" bIns="91425" anchor="ctr" anchorCtr="0">
+              <a:noAutofit/>
+            </a:bodyPr>
+            <a:lstStyle/>
+            <a:p>
+              <a:pPr marL="0" lvl="0" indent="0" algn="l" rtl="0">
+                <a:spcBef>
+                  <a:spcPts val="0"/>
+                </a:spcBef>
+                <a:spcAft>
+                  <a:spcPts val="0"/>
+                </a:spcAft>
+                <a:buNone/>
+              </a:pPr>
+              <a:endParaRPr>
+                <a:latin typeface="Inter"/>
+                <a:ea typeface="Inter"/>
+                <a:cs typeface="Inter"/>
+                <a:sym typeface="Inter"/>
+              </a:endParaRPr>
+            </a:p>
+          </p:txBody>
+        </p:sp>
+        <p:grpSp>
+          <p:nvGrpSpPr>
+            <p:cNvPr id="1017" name="Google Shape;1017;p23"/>
+            <p:cNvGrpSpPr/>
+            <p:nvPr/>
+          </p:nvGrpSpPr>
+          <p:grpSpPr>
+            <a:xfrm rot="5400000" flipH="1">
+              <a:off x="-1115103" y="4529824"/>
+              <a:ext cx="2575817" cy="2577160"/>
+              <a:chOff x="1550275" y="1493275"/>
+              <a:chExt cx="1582100" cy="1582925"/>
+            </a:xfrm>
+          </p:grpSpPr>
+          <p:sp>
+            <p:nvSpPr>
+              <p:cNvPr id="1018" name="Google Shape;1018;p23"/>
+              <p:cNvSpPr/>
+              <p:nvPr/>
+            </p:nvSpPr>
+            <p:spPr>
+              <a:xfrm>
+                <a:off x="1650275" y="1594100"/>
+                <a:ext cx="301650" cy="300825"/>
+              </a:xfrm>
+              <a:custGeom>
+                <a:avLst/>
+                <a:gdLst/>
+                <a:ahLst/>
+                <a:cxnLst/>
+                <a:rect l="l" t="t" r="r" b="b"/>
+                <a:pathLst>
+                  <a:path w="12066" h="12033" fill="none" extrusionOk="0">
+                    <a:moveTo>
+                      <a:pt x="1" y="12032"/>
+                    </a:moveTo>
+                    <a:lnTo>
+                      <a:pt x="12065" y="0"/>
+                    </a:lnTo>
+                  </a:path>
+                </a:pathLst>
+              </a:custGeom>
+              <a:noFill/>
+              <a:ln w="19050" cap="rnd" cmpd="sng">
+                <a:solidFill>
+                  <a:schemeClr val="lt2"/>
+                </a:solidFill>
+                <a:prstDash val="solid"/>
+                <a:miter lim="32519"/>
+                <a:headEnd type="none" w="sm" len="sm"/>
+                <a:tailEnd type="none" w="sm" len="sm"/>
+              </a:ln>
+            </p:spPr>
+            <p:txBody>
+              <a:bodyPr spcFirstLastPara="1" wrap="square" lIns="91425" tIns="91425" rIns="91425" bIns="91425" anchor="ctr" anchorCtr="0">
+                <a:noAutofit/>
+              </a:bodyPr>
+              <a:lstStyle/>
+              <a:p>
+                <a:pPr marL="0" lvl="0" indent="0" algn="l" rtl="0">
+                  <a:spcBef>
+                    <a:spcPts val="0"/>
+                  </a:spcBef>
+                  <a:spcAft>
+                    <a:spcPts val="0"/>
+                  </a:spcAft>
+                  <a:buNone/>
+                </a:pPr>
+                <a:endParaRPr>
+                  <a:latin typeface="Inter"/>
+                  <a:ea typeface="Inter"/>
+                  <a:cs typeface="Inter"/>
+                  <a:sym typeface="Inter"/>
+                </a:endParaRPr>
+              </a:p>
+            </p:txBody>
+          </p:sp>
+          <p:sp>
+            <p:nvSpPr>
+              <p:cNvPr id="1019" name="Google Shape;1019;p23"/>
+              <p:cNvSpPr/>
+              <p:nvPr/>
+            </p:nvSpPr>
+            <p:spPr>
+              <a:xfrm>
+                <a:off x="1560025" y="1503850"/>
+                <a:ext cx="648800" cy="647975"/>
+              </a:xfrm>
+              <a:custGeom>
+                <a:avLst/>
+                <a:gdLst/>
+                <a:ahLst/>
+                <a:cxnLst/>
+                <a:rect l="l" t="t" r="r" b="b"/>
+                <a:pathLst>
+                  <a:path w="25952" h="25919" fill="none" extrusionOk="0">
+                    <a:moveTo>
+                      <a:pt x="1" y="25919"/>
+                    </a:moveTo>
+                    <a:lnTo>
+                      <a:pt x="25952" y="0"/>
+                    </a:lnTo>
+                  </a:path>
+                </a:pathLst>
+              </a:custGeom>
+              <a:noFill/>
+              <a:ln w="19050" cap="rnd" cmpd="sng">
+                <a:solidFill>
+                  <a:schemeClr val="lt2"/>
+                </a:solidFill>
+                <a:prstDash val="solid"/>
+                <a:miter lim="32519"/>
+                <a:headEnd type="none" w="sm" len="sm"/>
+                <a:tailEnd type="none" w="sm" len="sm"/>
+              </a:ln>
+            </p:spPr>
+            <p:txBody>
+              <a:bodyPr spcFirstLastPara="1" wrap="square" lIns="91425" tIns="91425" rIns="91425" bIns="91425" anchor="ctr" anchorCtr="0">
+                <a:noAutofit/>
+              </a:bodyPr>
+              <a:lstStyle/>
+              <a:p>
+                <a:pPr marL="0" lvl="0" indent="0" algn="l" rtl="0">
+                  <a:spcBef>
+                    <a:spcPts val="0"/>
+                  </a:spcBef>
+                  <a:spcAft>
+                    <a:spcPts val="0"/>
+                  </a:spcAft>
+                  <a:buNone/>
+                </a:pPr>
+                <a:endParaRPr>
+                  <a:latin typeface="Inter"/>
+                  <a:ea typeface="Inter"/>
+                  <a:cs typeface="Inter"/>
+                  <a:sym typeface="Inter"/>
+                </a:endParaRPr>
+              </a:p>
+            </p:txBody>
+          </p:sp>
+          <p:sp>
+            <p:nvSpPr>
+              <p:cNvPr id="1020" name="Google Shape;1020;p23"/>
+              <p:cNvSpPr/>
+              <p:nvPr/>
+            </p:nvSpPr>
+            <p:spPr>
+              <a:xfrm>
+                <a:off x="1550275" y="1493275"/>
+                <a:ext cx="834150" cy="834975"/>
+              </a:xfrm>
+              <a:custGeom>
+                <a:avLst/>
+                <a:gdLst/>
+                <a:ahLst/>
+                <a:cxnLst/>
+                <a:rect l="l" t="t" r="r" b="b"/>
+                <a:pathLst>
+                  <a:path w="33366" h="33399" fill="none" extrusionOk="0">
+                    <a:moveTo>
+                      <a:pt x="1" y="33398"/>
+                    </a:moveTo>
+                    <a:lnTo>
+                      <a:pt x="33366" y="1"/>
+                    </a:lnTo>
+                  </a:path>
+                </a:pathLst>
+              </a:custGeom>
+              <a:noFill/>
+              <a:ln w="19050" cap="rnd" cmpd="sng">
+                <a:solidFill>
+                  <a:schemeClr val="lt2"/>
+                </a:solidFill>
+                <a:prstDash val="solid"/>
+                <a:miter lim="32519"/>
+                <a:headEnd type="none" w="sm" len="sm"/>
+                <a:tailEnd type="none" w="sm" len="sm"/>
+              </a:ln>
+            </p:spPr>
+            <p:txBody>
+              <a:bodyPr spcFirstLastPara="1" wrap="square" lIns="91425" tIns="91425" rIns="91425" bIns="91425" anchor="ctr" anchorCtr="0">
+                <a:noAutofit/>
+              </a:bodyPr>
+              <a:lstStyle/>
+              <a:p>
+                <a:pPr marL="0" lvl="0" indent="0" algn="l" rtl="0">
+                  <a:spcBef>
+                    <a:spcPts val="0"/>
+                  </a:spcBef>
+                  <a:spcAft>
+                    <a:spcPts val="0"/>
+                  </a:spcAft>
+                  <a:buNone/>
+                </a:pPr>
+                <a:endParaRPr>
+                  <a:latin typeface="Inter"/>
+                  <a:ea typeface="Inter"/>
+                  <a:cs typeface="Inter"/>
+                  <a:sym typeface="Inter"/>
+                </a:endParaRPr>
+              </a:p>
+            </p:txBody>
+          </p:sp>
+          <p:sp>
+            <p:nvSpPr>
+              <p:cNvPr id="1021" name="Google Shape;1021;p23"/>
+              <p:cNvSpPr/>
+              <p:nvPr/>
+            </p:nvSpPr>
+            <p:spPr>
+              <a:xfrm>
+                <a:off x="1571425" y="1514425"/>
+                <a:ext cx="957725" cy="958525"/>
+              </a:xfrm>
+              <a:custGeom>
+                <a:avLst/>
+                <a:gdLst/>
+                <a:ahLst/>
+                <a:cxnLst/>
+                <a:rect l="l" t="t" r="r" b="b"/>
+                <a:pathLst>
+                  <a:path w="38309" h="38341" fill="none" extrusionOk="0">
+                    <a:moveTo>
+                      <a:pt x="0" y="38341"/>
+                    </a:moveTo>
+                    <a:lnTo>
+                      <a:pt x="38308" y="0"/>
+                    </a:lnTo>
+                  </a:path>
+                </a:pathLst>
+              </a:custGeom>
+              <a:noFill/>
+              <a:ln w="19050" cap="rnd" cmpd="sng">
+                <a:solidFill>
+                  <a:schemeClr val="lt2"/>
+                </a:solidFill>
+                <a:prstDash val="solid"/>
+                <a:miter lim="32519"/>
+                <a:headEnd type="none" w="sm" len="sm"/>
+                <a:tailEnd type="none" w="sm" len="sm"/>
+              </a:ln>
+            </p:spPr>
+            <p:txBody>
+              <a:bodyPr spcFirstLastPara="1" wrap="square" lIns="91425" tIns="91425" rIns="91425" bIns="91425" anchor="ctr" anchorCtr="0">
+                <a:noAutofit/>
+              </a:bodyPr>
+              <a:lstStyle/>
+              <a:p>
+                <a:pPr marL="0" lvl="0" indent="0" algn="l" rtl="0">
+                  <a:spcBef>
+                    <a:spcPts val="0"/>
+                  </a:spcBef>
+                  <a:spcAft>
+                    <a:spcPts val="0"/>
+                  </a:spcAft>
+                  <a:buNone/>
+                </a:pPr>
+                <a:endParaRPr>
+                  <a:latin typeface="Inter"/>
+                  <a:ea typeface="Inter"/>
+                  <a:cs typeface="Inter"/>
+                  <a:sym typeface="Inter"/>
+                </a:endParaRPr>
+              </a:p>
+            </p:txBody>
+          </p:sp>
+          <p:sp>
+            <p:nvSpPr>
+              <p:cNvPr id="1022" name="Google Shape;1022;p23"/>
+              <p:cNvSpPr/>
+              <p:nvPr/>
+            </p:nvSpPr>
+            <p:spPr>
+              <a:xfrm>
+                <a:off x="1612875" y="1555875"/>
+                <a:ext cx="1041475" cy="1042275"/>
+              </a:xfrm>
+              <a:custGeom>
+                <a:avLst/>
+                <a:gdLst/>
+                <a:ahLst/>
+                <a:cxnLst/>
+                <a:rect l="l" t="t" r="r" b="b"/>
+                <a:pathLst>
+                  <a:path w="41659" h="41691" fill="none" extrusionOk="0">
+                    <a:moveTo>
+                      <a:pt x="1" y="41691"/>
+                    </a:moveTo>
+                    <a:lnTo>
+                      <a:pt x="41658" y="1"/>
+                    </a:lnTo>
+                  </a:path>
+                </a:pathLst>
+              </a:custGeom>
+              <a:noFill/>
+              <a:ln w="19050" cap="rnd" cmpd="sng">
+                <a:solidFill>
+                  <a:schemeClr val="lt2"/>
+                </a:solidFill>
+                <a:prstDash val="solid"/>
+                <a:miter lim="32519"/>
+                <a:headEnd type="none" w="sm" len="sm"/>
+                <a:tailEnd type="none" w="sm" len="sm"/>
+              </a:ln>
+            </p:spPr>
+            <p:txBody>
+              <a:bodyPr spcFirstLastPara="1" wrap="square" lIns="91425" tIns="91425" rIns="91425" bIns="91425" anchor="ctr" anchorCtr="0">
+                <a:noAutofit/>
+              </a:bodyPr>
+              <a:lstStyle/>
+              <a:p>
+                <a:pPr marL="0" lvl="0" indent="0" algn="l" rtl="0">
+                  <a:spcBef>
+                    <a:spcPts val="0"/>
+                  </a:spcBef>
+                  <a:spcAft>
+                    <a:spcPts val="0"/>
+                  </a:spcAft>
+                  <a:buNone/>
+                </a:pPr>
+                <a:endParaRPr>
+                  <a:latin typeface="Inter"/>
+                  <a:ea typeface="Inter"/>
+                  <a:cs typeface="Inter"/>
+                  <a:sym typeface="Inter"/>
+                </a:endParaRPr>
+              </a:p>
+            </p:txBody>
+          </p:sp>
+          <p:sp>
+            <p:nvSpPr>
+              <p:cNvPr id="1023" name="Google Shape;1023;p23"/>
+              <p:cNvSpPr/>
+              <p:nvPr/>
+            </p:nvSpPr>
+            <p:spPr>
+              <a:xfrm>
+                <a:off x="1669800" y="1613600"/>
+                <a:ext cx="1093475" cy="1092675"/>
+              </a:xfrm>
+              <a:custGeom>
+                <a:avLst/>
+                <a:gdLst/>
+                <a:ahLst/>
+                <a:cxnLst/>
+                <a:rect l="l" t="t" r="r" b="b"/>
+                <a:pathLst>
+                  <a:path w="43739" h="43707" fill="none" extrusionOk="0">
+                    <a:moveTo>
+                      <a:pt x="0" y="43707"/>
+                    </a:moveTo>
+                    <a:lnTo>
+                      <a:pt x="43739" y="1"/>
+                    </a:lnTo>
+                  </a:path>
+                </a:pathLst>
+              </a:custGeom>
+              <a:noFill/>
+              <a:ln w="19050" cap="rnd" cmpd="sng">
+                <a:solidFill>
+                  <a:schemeClr val="lt2"/>
+                </a:solidFill>
+                <a:prstDash val="solid"/>
+                <a:miter lim="32519"/>
+                <a:headEnd type="none" w="sm" len="sm"/>
+                <a:tailEnd type="none" w="sm" len="sm"/>
+              </a:ln>
+            </p:spPr>
+            <p:txBody>
+              <a:bodyPr spcFirstLastPara="1" wrap="square" lIns="91425" tIns="91425" rIns="91425" bIns="91425" anchor="ctr" anchorCtr="0">
+                <a:noAutofit/>
+              </a:bodyPr>
+              <a:lstStyle/>
+              <a:p>
+                <a:pPr marL="0" lvl="0" indent="0" algn="l" rtl="0">
+                  <a:spcBef>
+                    <a:spcPts val="0"/>
+                  </a:spcBef>
+                  <a:spcAft>
+                    <a:spcPts val="0"/>
+                  </a:spcAft>
+                  <a:buNone/>
+                </a:pPr>
+                <a:endParaRPr>
+                  <a:latin typeface="Inter"/>
+                  <a:ea typeface="Inter"/>
+                  <a:cs typeface="Inter"/>
+                  <a:sym typeface="Inter"/>
+                </a:endParaRPr>
+              </a:p>
+            </p:txBody>
+          </p:sp>
+          <p:sp>
+            <p:nvSpPr>
+              <p:cNvPr id="1024" name="Google Shape;1024;p23"/>
+              <p:cNvSpPr/>
+              <p:nvPr/>
+            </p:nvSpPr>
+            <p:spPr>
+              <a:xfrm>
+                <a:off x="1710100" y="1684329"/>
+                <a:ext cx="1148362" cy="1145328"/>
+              </a:xfrm>
+              <a:custGeom>
+                <a:avLst/>
+                <a:gdLst/>
+                <a:ahLst/>
+                <a:cxnLst/>
+                <a:rect l="l" t="t" r="r" b="b"/>
+                <a:pathLst>
+                  <a:path w="75837" h="75837" fill="none" extrusionOk="0">
+                    <a:moveTo>
+                      <a:pt x="1" y="75836"/>
+                    </a:moveTo>
+                    <a:lnTo>
+                      <a:pt x="75837" y="1"/>
+                    </a:lnTo>
+                  </a:path>
+                </a:pathLst>
+              </a:custGeom>
+              <a:noFill/>
+              <a:ln w="19050" cap="rnd" cmpd="sng">
+                <a:solidFill>
+                  <a:schemeClr val="lt2"/>
+                </a:solidFill>
+                <a:prstDash val="solid"/>
+                <a:miter lim="32519"/>
+                <a:headEnd type="none" w="sm" len="sm"/>
+                <a:tailEnd type="none" w="sm" len="sm"/>
+              </a:ln>
+            </p:spPr>
+            <p:txBody>
+              <a:bodyPr spcFirstLastPara="1" wrap="square" lIns="91425" tIns="91425" rIns="91425" bIns="91425" anchor="ctr" anchorCtr="0">
+                <a:noAutofit/>
+              </a:bodyPr>
+              <a:lstStyle/>
+              <a:p>
+                <a:pPr marL="0" lvl="0" indent="0" algn="l" rtl="0">
+                  <a:spcBef>
+                    <a:spcPts val="0"/>
+                  </a:spcBef>
+                  <a:spcAft>
+                    <a:spcPts val="0"/>
+                  </a:spcAft>
+                  <a:buNone/>
+                </a:pPr>
+                <a:endParaRPr>
+                  <a:latin typeface="Inter"/>
+                  <a:ea typeface="Inter"/>
+                  <a:cs typeface="Inter"/>
+                  <a:sym typeface="Inter"/>
+                </a:endParaRPr>
+              </a:p>
+            </p:txBody>
+          </p:sp>
+          <p:sp>
+            <p:nvSpPr>
+              <p:cNvPr id="1025" name="Google Shape;1025;p23"/>
+              <p:cNvSpPr/>
+              <p:nvPr/>
+            </p:nvSpPr>
+            <p:spPr>
+              <a:xfrm>
+                <a:off x="1828936" y="1767251"/>
+                <a:ext cx="1113203" cy="1126369"/>
+              </a:xfrm>
+              <a:custGeom>
+                <a:avLst/>
+                <a:gdLst/>
+                <a:ahLst/>
+                <a:cxnLst/>
+                <a:rect l="l" t="t" r="r" b="b"/>
+                <a:pathLst>
+                  <a:path w="75870" h="75837" fill="none" extrusionOk="0">
+                    <a:moveTo>
+                      <a:pt x="1" y="75836"/>
+                    </a:moveTo>
+                    <a:lnTo>
+                      <a:pt x="75869" y="1"/>
+                    </a:lnTo>
+                  </a:path>
+                </a:pathLst>
+              </a:custGeom>
+              <a:noFill/>
+              <a:ln w="19050" cap="rnd" cmpd="sng">
+                <a:solidFill>
+                  <a:schemeClr val="lt2"/>
+                </a:solidFill>
+                <a:prstDash val="solid"/>
+                <a:miter lim="32519"/>
+                <a:headEnd type="none" w="sm" len="sm"/>
+                <a:tailEnd type="none" w="sm" len="sm"/>
+              </a:ln>
+            </p:spPr>
+            <p:txBody>
+              <a:bodyPr spcFirstLastPara="1" wrap="square" lIns="91425" tIns="91425" rIns="91425" bIns="91425" anchor="ctr" anchorCtr="0">
+                <a:noAutofit/>
+              </a:bodyPr>
+              <a:lstStyle/>
+              <a:p>
+                <a:pPr marL="0" lvl="0" indent="0" algn="l" rtl="0">
+                  <a:spcBef>
+                    <a:spcPts val="0"/>
+                  </a:spcBef>
+                  <a:spcAft>
+                    <a:spcPts val="0"/>
+                  </a:spcAft>
+                  <a:buNone/>
+                </a:pPr>
+                <a:endParaRPr>
+                  <a:latin typeface="Inter"/>
+                  <a:ea typeface="Inter"/>
+                  <a:cs typeface="Inter"/>
+                  <a:sym typeface="Inter"/>
+                </a:endParaRPr>
+              </a:p>
+            </p:txBody>
+          </p:sp>
+          <p:sp>
+            <p:nvSpPr>
+              <p:cNvPr id="1026" name="Google Shape;1026;p23"/>
+              <p:cNvSpPr/>
+              <p:nvPr/>
+            </p:nvSpPr>
+            <p:spPr>
+              <a:xfrm>
+                <a:off x="1929499" y="1863204"/>
+                <a:ext cx="1082574" cy="1112692"/>
+              </a:xfrm>
+              <a:custGeom>
+                <a:avLst/>
+                <a:gdLst/>
+                <a:ahLst/>
+                <a:cxnLst/>
+                <a:rect l="l" t="t" r="r" b="b"/>
+                <a:pathLst>
+                  <a:path w="74828" h="74828" fill="none" extrusionOk="0">
+                    <a:moveTo>
+                      <a:pt x="0" y="74828"/>
+                    </a:moveTo>
+                    <a:lnTo>
+                      <a:pt x="74828" y="0"/>
+                    </a:lnTo>
+                  </a:path>
+                </a:pathLst>
+              </a:custGeom>
+              <a:noFill/>
+              <a:ln w="19050" cap="rnd" cmpd="sng">
+                <a:solidFill>
+                  <a:schemeClr val="lt2"/>
+                </a:solidFill>
+                <a:prstDash val="solid"/>
+                <a:miter lim="32519"/>
+                <a:headEnd type="none" w="sm" len="sm"/>
+                <a:tailEnd type="none" w="sm" len="sm"/>
+              </a:ln>
+            </p:spPr>
+            <p:txBody>
+              <a:bodyPr spcFirstLastPara="1" wrap="square" lIns="91425" tIns="91425" rIns="91425" bIns="91425" anchor="ctr" anchorCtr="0">
+                <a:noAutofit/>
+              </a:bodyPr>
+              <a:lstStyle/>
+              <a:p>
+                <a:pPr marL="0" lvl="0" indent="0" algn="l" rtl="0">
+                  <a:spcBef>
+                    <a:spcPts val="0"/>
+                  </a:spcBef>
+                  <a:spcAft>
+                    <a:spcPts val="0"/>
+                  </a:spcAft>
+                  <a:buNone/>
+                </a:pPr>
+                <a:endParaRPr>
+                  <a:latin typeface="Inter"/>
+                  <a:ea typeface="Inter"/>
+                  <a:cs typeface="Inter"/>
+                  <a:sym typeface="Inter"/>
+                </a:endParaRPr>
+              </a:p>
+            </p:txBody>
+          </p:sp>
+          <p:sp>
+            <p:nvSpPr>
+              <p:cNvPr id="1027" name="Google Shape;1027;p23"/>
+              <p:cNvSpPr/>
+              <p:nvPr/>
+            </p:nvSpPr>
+            <p:spPr>
+              <a:xfrm>
+                <a:off x="2027500" y="1971325"/>
+                <a:ext cx="1042275" cy="1042275"/>
+              </a:xfrm>
+              <a:custGeom>
+                <a:avLst/>
+                <a:gdLst/>
+                <a:ahLst/>
+                <a:cxnLst/>
+                <a:rect l="l" t="t" r="r" b="b"/>
+                <a:pathLst>
+                  <a:path w="41691" h="41691" fill="none" extrusionOk="0">
+                    <a:moveTo>
+                      <a:pt x="41691" y="0"/>
+                    </a:moveTo>
+                    <a:lnTo>
+                      <a:pt x="1" y="41690"/>
+                    </a:lnTo>
+                  </a:path>
+                </a:pathLst>
+              </a:custGeom>
+              <a:noFill/>
+              <a:ln w="19050" cap="rnd" cmpd="sng">
+                <a:solidFill>
+                  <a:schemeClr val="lt2"/>
+                </a:solidFill>
+                <a:prstDash val="solid"/>
+                <a:miter lim="32519"/>
+                <a:headEnd type="none" w="sm" len="sm"/>
+                <a:tailEnd type="none" w="sm" len="sm"/>
+              </a:ln>
+            </p:spPr>
+            <p:txBody>
+              <a:bodyPr spcFirstLastPara="1" wrap="square" lIns="91425" tIns="91425" rIns="91425" bIns="91425" anchor="ctr" anchorCtr="0">
+                <a:noAutofit/>
+              </a:bodyPr>
+              <a:lstStyle/>
+              <a:p>
+                <a:pPr marL="0" lvl="0" indent="0" algn="l" rtl="0">
+                  <a:spcBef>
+                    <a:spcPts val="0"/>
+                  </a:spcBef>
+                  <a:spcAft>
+                    <a:spcPts val="0"/>
+                  </a:spcAft>
+                  <a:buNone/>
+                </a:pPr>
+                <a:endParaRPr>
+                  <a:latin typeface="Inter"/>
+                  <a:ea typeface="Inter"/>
+                  <a:cs typeface="Inter"/>
+                  <a:sym typeface="Inter"/>
+                </a:endParaRPr>
+              </a:p>
+            </p:txBody>
+          </p:sp>
+          <p:sp>
+            <p:nvSpPr>
+              <p:cNvPr id="1028" name="Google Shape;1028;p23"/>
+              <p:cNvSpPr/>
+              <p:nvPr/>
+            </p:nvSpPr>
+            <p:spPr>
+              <a:xfrm>
+                <a:off x="2152700" y="2096525"/>
+                <a:ext cx="958550" cy="958525"/>
+              </a:xfrm>
+              <a:custGeom>
+                <a:avLst/>
+                <a:gdLst/>
+                <a:ahLst/>
+                <a:cxnLst/>
+                <a:rect l="l" t="t" r="r" b="b"/>
+                <a:pathLst>
+                  <a:path w="38342" h="38341" fill="none" extrusionOk="0">
+                    <a:moveTo>
+                      <a:pt x="38341" y="0"/>
+                    </a:moveTo>
+                    <a:lnTo>
+                      <a:pt x="1" y="38341"/>
+                    </a:lnTo>
+                  </a:path>
+                </a:pathLst>
+              </a:custGeom>
+              <a:noFill/>
+              <a:ln w="19050" cap="rnd" cmpd="sng">
+                <a:solidFill>
+                  <a:schemeClr val="lt2"/>
+                </a:solidFill>
+                <a:prstDash val="solid"/>
+                <a:miter lim="32519"/>
+                <a:headEnd type="none" w="sm" len="sm"/>
+                <a:tailEnd type="none" w="sm" len="sm"/>
+              </a:ln>
+            </p:spPr>
+            <p:txBody>
+              <a:bodyPr spcFirstLastPara="1" wrap="square" lIns="91425" tIns="91425" rIns="91425" bIns="91425" anchor="ctr" anchorCtr="0">
+                <a:noAutofit/>
+              </a:bodyPr>
+              <a:lstStyle/>
+              <a:p>
+                <a:pPr marL="0" lvl="0" indent="0" algn="l" rtl="0">
+                  <a:spcBef>
+                    <a:spcPts val="0"/>
+                  </a:spcBef>
+                  <a:spcAft>
+                    <a:spcPts val="0"/>
+                  </a:spcAft>
+                  <a:buNone/>
+                </a:pPr>
+                <a:endParaRPr>
+                  <a:latin typeface="Inter"/>
+                  <a:ea typeface="Inter"/>
+                  <a:cs typeface="Inter"/>
+                  <a:sym typeface="Inter"/>
+                </a:endParaRPr>
+              </a:p>
+            </p:txBody>
+          </p:sp>
+          <p:sp>
+            <p:nvSpPr>
+              <p:cNvPr id="1029" name="Google Shape;1029;p23"/>
+              <p:cNvSpPr/>
+              <p:nvPr/>
+            </p:nvSpPr>
+            <p:spPr>
+              <a:xfrm>
+                <a:off x="2298225" y="2241225"/>
+                <a:ext cx="834150" cy="834975"/>
+              </a:xfrm>
+              <a:custGeom>
+                <a:avLst/>
+                <a:gdLst/>
+                <a:ahLst/>
+                <a:cxnLst/>
+                <a:rect l="l" t="t" r="r" b="b"/>
+                <a:pathLst>
+                  <a:path w="33366" h="33399" fill="none" extrusionOk="0">
+                    <a:moveTo>
+                      <a:pt x="33366" y="1"/>
+                    </a:moveTo>
+                    <a:lnTo>
+                      <a:pt x="1" y="33398"/>
+                    </a:lnTo>
+                  </a:path>
+                </a:pathLst>
+              </a:custGeom>
+              <a:noFill/>
+              <a:ln w="19050" cap="rnd" cmpd="sng">
+                <a:solidFill>
+                  <a:schemeClr val="lt2"/>
+                </a:solidFill>
+                <a:prstDash val="solid"/>
+                <a:miter lim="32519"/>
+                <a:headEnd type="none" w="sm" len="sm"/>
+                <a:tailEnd type="none" w="sm" len="sm"/>
+              </a:ln>
+            </p:spPr>
+            <p:txBody>
+              <a:bodyPr spcFirstLastPara="1" wrap="square" lIns="91425" tIns="91425" rIns="91425" bIns="91425" anchor="ctr" anchorCtr="0">
+                <a:noAutofit/>
+              </a:bodyPr>
+              <a:lstStyle/>
+              <a:p>
+                <a:pPr marL="0" lvl="0" indent="0" algn="l" rtl="0">
+                  <a:spcBef>
+                    <a:spcPts val="0"/>
+                  </a:spcBef>
+                  <a:spcAft>
+                    <a:spcPts val="0"/>
+                  </a:spcAft>
+                  <a:buNone/>
+                </a:pPr>
+                <a:endParaRPr>
+                  <a:latin typeface="Inter"/>
+                  <a:ea typeface="Inter"/>
+                  <a:cs typeface="Inter"/>
+                  <a:sym typeface="Inter"/>
+                </a:endParaRPr>
+              </a:p>
+            </p:txBody>
+          </p:sp>
+          <p:sp>
+            <p:nvSpPr>
+              <p:cNvPr id="1030" name="Google Shape;1030;p23"/>
+              <p:cNvSpPr/>
+              <p:nvPr/>
+            </p:nvSpPr>
+            <p:spPr>
+              <a:xfrm>
+                <a:off x="2473825" y="2417650"/>
+                <a:ext cx="648800" cy="648800"/>
+              </a:xfrm>
+              <a:custGeom>
+                <a:avLst/>
+                <a:gdLst/>
+                <a:ahLst/>
+                <a:cxnLst/>
+                <a:rect l="l" t="t" r="r" b="b"/>
+                <a:pathLst>
+                  <a:path w="25952" h="25952" fill="none" extrusionOk="0">
+                    <a:moveTo>
+                      <a:pt x="25952" y="0"/>
+                    </a:moveTo>
+                    <a:lnTo>
+                      <a:pt x="1" y="25951"/>
+                    </a:lnTo>
+                  </a:path>
+                </a:pathLst>
+              </a:custGeom>
+              <a:noFill/>
+              <a:ln w="19050" cap="rnd" cmpd="sng">
+                <a:solidFill>
+                  <a:schemeClr val="lt2"/>
+                </a:solidFill>
+                <a:prstDash val="solid"/>
+                <a:miter lim="32519"/>
+                <a:headEnd type="none" w="sm" len="sm"/>
+                <a:tailEnd type="none" w="sm" len="sm"/>
+              </a:ln>
+            </p:spPr>
+            <p:txBody>
+              <a:bodyPr spcFirstLastPara="1" wrap="square" lIns="91425" tIns="91425" rIns="91425" bIns="91425" anchor="ctr" anchorCtr="0">
+                <a:noAutofit/>
+              </a:bodyPr>
+              <a:lstStyle/>
+              <a:p>
+                <a:pPr marL="0" lvl="0" indent="0" algn="l" rtl="0">
+                  <a:spcBef>
+                    <a:spcPts val="0"/>
+                  </a:spcBef>
+                  <a:spcAft>
+                    <a:spcPts val="0"/>
+                  </a:spcAft>
+                  <a:buNone/>
+                </a:pPr>
+                <a:endParaRPr>
+                  <a:latin typeface="Inter"/>
+                  <a:ea typeface="Inter"/>
+                  <a:cs typeface="Inter"/>
+                  <a:sym typeface="Inter"/>
+                </a:endParaRPr>
+              </a:p>
+            </p:txBody>
+          </p:sp>
+          <p:sp>
+            <p:nvSpPr>
+              <p:cNvPr id="1031" name="Google Shape;1031;p23"/>
+              <p:cNvSpPr/>
+              <p:nvPr/>
+            </p:nvSpPr>
+            <p:spPr>
+              <a:xfrm>
+                <a:off x="2730750" y="2674550"/>
+                <a:ext cx="300825" cy="300825"/>
+              </a:xfrm>
+              <a:custGeom>
+                <a:avLst/>
+                <a:gdLst/>
+                <a:ahLst/>
+                <a:cxnLst/>
+                <a:rect l="l" t="t" r="r" b="b"/>
+                <a:pathLst>
+                  <a:path w="12033" h="12033" fill="none" extrusionOk="0">
+                    <a:moveTo>
+                      <a:pt x="12032" y="1"/>
+                    </a:moveTo>
+                    <a:lnTo>
+                      <a:pt x="0" y="12033"/>
+                    </a:lnTo>
+                  </a:path>
+                </a:pathLst>
+              </a:custGeom>
+              <a:noFill/>
+              <a:ln w="19050" cap="rnd" cmpd="sng">
+                <a:solidFill>
+                  <a:schemeClr val="lt2"/>
+                </a:solidFill>
+                <a:prstDash val="solid"/>
+                <a:miter lim="32519"/>
+                <a:headEnd type="none" w="sm" len="sm"/>
+                <a:tailEnd type="none" w="sm" len="sm"/>
+              </a:ln>
+            </p:spPr>
+            <p:txBody>
+              <a:bodyPr spcFirstLastPara="1" wrap="square" lIns="91425" tIns="91425" rIns="91425" bIns="91425" anchor="ctr" anchorCtr="0">
+                <a:noAutofit/>
+              </a:bodyPr>
+              <a:lstStyle/>
+              <a:p>
+                <a:pPr marL="0" lvl="0" indent="0" algn="l" rtl="0">
+                  <a:spcBef>
+                    <a:spcPts val="0"/>
+                  </a:spcBef>
+                  <a:spcAft>
+                    <a:spcPts val="0"/>
+                  </a:spcAft>
+                  <a:buNone/>
+                </a:pPr>
+                <a:endParaRPr>
+                  <a:latin typeface="Inter"/>
+                  <a:ea typeface="Inter"/>
+                  <a:cs typeface="Inter"/>
+                  <a:sym typeface="Inter"/>
+                </a:endParaRPr>
+              </a:p>
+            </p:txBody>
+          </p:sp>
+        </p:grpSp>
+      </p:grpSp>
+    </p:spTree>
+    <p:extLst>
+      <p:ext uri="{BB962C8B-B14F-4D97-AF65-F5344CB8AC3E}">
+        <p14:creationId xmlns:p14="http://schemas.microsoft.com/office/powerpoint/2010/main" val="2400562814"/>
+      </p:ext>
+    </p:extLst>
+  </p:cSld>
+  <p:clrMapOvr>
+    <a:masterClrMapping/>
+  </p:clrMapOvr>
+</p:sldLayout>
+</file>
+
 <file path=ppt/slideMasters/slideMaster1.xml><?xml version="1.0" encoding="utf-8"?>
 <p:sldMaster xmlns:a="http://schemas.openxmlformats.org/drawingml/2006/main" xmlns:r="http://schemas.openxmlformats.org/officeDocument/2006/relationships" xmlns:p="http://schemas.openxmlformats.org/presentationml/2006/main">
   <p:cSld name="simple-light-2">
@@ -20233,6 +23528,7 @@
     <p:sldLayoutId id="2147483680" r:id="rId5"/>
     <p:sldLayoutId id="2147483684" r:id="rId6"/>
     <p:sldLayoutId id="2147483685" r:id="rId7"/>
+    <p:sldLayoutId id="2147483686" r:id="rId8"/>
   </p:sldLayoutIdLst>
   <p:hf sldNum="0" hdr="0" ftr="0" dt="0"/>
   <p:txStyles>
@@ -35018,6 +38314,335 @@
   <p:cSld>
     <p:spTree>
       <p:nvGrpSpPr>
+        <p:cNvPr id="1" name="Shape 2424"/>
+        <p:cNvGrpSpPr/>
+        <p:nvPr/>
+      </p:nvGrpSpPr>
+      <p:grpSpPr>
+        <a:xfrm>
+          <a:off x="0" y="0"/>
+          <a:ext cx="0" cy="0"/>
+          <a:chOff x="0" y="0"/>
+          <a:chExt cx="0" cy="0"/>
+        </a:xfrm>
+      </p:grpSpPr>
+      <p:grpSp>
+        <p:nvGrpSpPr>
+          <p:cNvPr id="2425" name="Google Shape;2425;p64"/>
+          <p:cNvGrpSpPr/>
+          <p:nvPr/>
+        </p:nvGrpSpPr>
+        <p:grpSpPr>
+          <a:xfrm>
+            <a:off x="4992199" y="1023600"/>
+            <a:ext cx="2782105" cy="3204299"/>
+            <a:chOff x="4992199" y="1023600"/>
+            <a:chExt cx="2782105" cy="3204299"/>
+          </a:xfrm>
+        </p:grpSpPr>
+        <p:sp>
+          <p:nvSpPr>
+            <p:cNvPr id="2426" name="Google Shape;2426;p64"/>
+            <p:cNvSpPr/>
+            <p:nvPr/>
+          </p:nvSpPr>
+          <p:spPr>
+            <a:xfrm>
+              <a:off x="4992199" y="4055100"/>
+              <a:ext cx="2782105" cy="172799"/>
+            </a:xfrm>
+            <a:custGeom>
+              <a:avLst/>
+              <a:gdLst/>
+              <a:ahLst/>
+              <a:cxnLst/>
+              <a:rect l="l" t="t" r="r" b="b"/>
+              <a:pathLst>
+                <a:path w="14022" h="1134" extrusionOk="0">
+                  <a:moveTo>
+                    <a:pt x="7006" y="0"/>
+                  </a:moveTo>
+                  <a:cubicBezTo>
+                    <a:pt x="3135" y="0"/>
+                    <a:pt x="0" y="253"/>
+                    <a:pt x="0" y="572"/>
+                  </a:cubicBezTo>
+                  <a:cubicBezTo>
+                    <a:pt x="0" y="880"/>
+                    <a:pt x="3135" y="1133"/>
+                    <a:pt x="7006" y="1133"/>
+                  </a:cubicBezTo>
+                  <a:cubicBezTo>
+                    <a:pt x="10877" y="1133"/>
+                    <a:pt x="14022" y="880"/>
+                    <a:pt x="14022" y="572"/>
+                  </a:cubicBezTo>
+                  <a:cubicBezTo>
+                    <a:pt x="14022" y="253"/>
+                    <a:pt x="10877" y="0"/>
+                    <a:pt x="7006" y="0"/>
+                  </a:cubicBezTo>
+                  <a:close/>
+                </a:path>
+              </a:pathLst>
+            </a:custGeom>
+            <a:solidFill>
+              <a:srgbClr val="000000">
+                <a:alpha val="11950"/>
+              </a:srgbClr>
+            </a:solidFill>
+            <a:ln>
+              <a:noFill/>
+            </a:ln>
+          </p:spPr>
+          <p:txBody>
+            <a:bodyPr spcFirstLastPara="1" wrap="square" lIns="91425" tIns="91425" rIns="91425" bIns="91425" anchor="ctr" anchorCtr="0">
+              <a:noAutofit/>
+            </a:bodyPr>
+            <a:lstStyle/>
+            <a:p>
+              <a:pPr marL="0" lvl="0" indent="0" algn="l" rtl="0">
+                <a:spcBef>
+                  <a:spcPts val="0"/>
+                </a:spcBef>
+                <a:spcAft>
+                  <a:spcPts val="0"/>
+                </a:spcAft>
+                <a:buNone/>
+              </a:pPr>
+              <a:endParaRPr/>
+            </a:p>
+          </p:txBody>
+        </p:sp>
+        <p:sp>
+          <p:nvSpPr>
+            <p:cNvPr id="2427" name="Google Shape;2427;p64"/>
+            <p:cNvSpPr/>
+            <p:nvPr/>
+          </p:nvSpPr>
+          <p:spPr>
+            <a:xfrm>
+              <a:off x="5216700" y="1023600"/>
+              <a:ext cx="2333100" cy="3096300"/>
+            </a:xfrm>
+            <a:prstGeom prst="roundRect">
+              <a:avLst>
+                <a:gd name="adj" fmla="val 9247"/>
+              </a:avLst>
+            </a:prstGeom>
+            <a:solidFill>
+              <a:schemeClr val="lt2"/>
+            </a:solidFill>
+            <a:ln>
+              <a:noFill/>
+            </a:ln>
+          </p:spPr>
+          <p:txBody>
+            <a:bodyPr spcFirstLastPara="1" wrap="square" lIns="91425" tIns="91425" rIns="91425" bIns="91425" anchor="ctr" anchorCtr="0">
+              <a:noAutofit/>
+            </a:bodyPr>
+            <a:lstStyle/>
+            <a:p>
+              <a:pPr marL="0" lvl="0" indent="0" algn="l" rtl="0">
+                <a:spcBef>
+                  <a:spcPts val="0"/>
+                </a:spcBef>
+                <a:spcAft>
+                  <a:spcPts val="0"/>
+                </a:spcAft>
+                <a:buNone/>
+              </a:pPr>
+              <a:endParaRPr/>
+            </a:p>
+          </p:txBody>
+        </p:sp>
+        <p:cxnSp>
+          <p:nvCxnSpPr>
+            <p:cNvPr id="2428" name="Google Shape;2428;p64"/>
+            <p:cNvCxnSpPr/>
+            <p:nvPr/>
+          </p:nvCxnSpPr>
+          <p:spPr>
+            <a:xfrm>
+              <a:off x="6113700" y="3950550"/>
+              <a:ext cx="539100" cy="0"/>
+            </a:xfrm>
+            <a:prstGeom prst="straightConnector1">
+              <a:avLst/>
+            </a:prstGeom>
+            <a:noFill/>
+            <a:ln w="28575" cap="flat" cmpd="sng">
+              <a:solidFill>
+                <a:schemeClr val="dk1"/>
+              </a:solidFill>
+              <a:prstDash val="solid"/>
+              <a:round/>
+              <a:headEnd type="none" w="med" len="med"/>
+              <a:tailEnd type="none" w="med" len="med"/>
+            </a:ln>
+          </p:spPr>
+        </p:cxnSp>
+      </p:grpSp>
+      <p:sp>
+        <p:nvSpPr>
+          <p:cNvPr id="2429" name="Google Shape;2429;p64"/>
+          <p:cNvSpPr txBox="1">
+            <a:spLocks noGrp="1"/>
+          </p:cNvSpPr>
+          <p:nvPr>
+            <p:ph type="title"/>
+          </p:nvPr>
+        </p:nvSpPr>
+        <p:spPr>
+          <a:xfrm>
+            <a:off x="907175" y="1393565"/>
+            <a:ext cx="2720400" cy="740032"/>
+          </a:xfrm>
+          <a:prstGeom prst="rect">
+            <a:avLst/>
+          </a:prstGeom>
+        </p:spPr>
+        <p:txBody>
+          <a:bodyPr spcFirstLastPara="1" wrap="square" lIns="91425" tIns="91425" rIns="91425" bIns="91425" anchor="t" anchorCtr="0">
+            <a:noAutofit/>
+          </a:bodyPr>
+          <a:lstStyle/>
+          <a:p>
+            <a:pPr marL="0" lvl="0" indent="0" algn="l" rtl="0">
+              <a:spcBef>
+                <a:spcPts val="0"/>
+              </a:spcBef>
+              <a:spcAft>
+                <a:spcPts val="0"/>
+              </a:spcAft>
+              <a:buNone/>
+            </a:pPr>
+            <a:r>
+              <a:rPr lang="en" dirty="0"/>
+              <a:t>SOLUÇÃO</a:t>
+            </a:r>
+            <a:endParaRPr dirty="0">
+              <a:solidFill>
+                <a:schemeClr val="lt2"/>
+              </a:solidFill>
+            </a:endParaRPr>
+          </a:p>
+        </p:txBody>
+      </p:sp>
+      <p:sp>
+        <p:nvSpPr>
+          <p:cNvPr id="2430" name="Google Shape;2430;p64"/>
+          <p:cNvSpPr txBox="1">
+            <a:spLocks noGrp="1"/>
+          </p:cNvSpPr>
+          <p:nvPr>
+            <p:ph type="subTitle" idx="1"/>
+          </p:nvPr>
+        </p:nvSpPr>
+        <p:spPr>
+          <a:xfrm>
+            <a:off x="907174" y="2330665"/>
+            <a:ext cx="3020127" cy="1046700"/>
+          </a:xfrm>
+          <a:prstGeom prst="rect">
+            <a:avLst/>
+          </a:prstGeom>
+        </p:spPr>
+        <p:txBody>
+          <a:bodyPr spcFirstLastPara="1" wrap="square" lIns="91425" tIns="91425" rIns="91425" bIns="91425" anchor="t" anchorCtr="0">
+            <a:noAutofit/>
+          </a:bodyPr>
+          <a:lstStyle/>
+          <a:p>
+            <a:pPr marL="0" lvl="0" indent="0" algn="l" rtl="0">
+              <a:spcBef>
+                <a:spcPts val="0"/>
+              </a:spcBef>
+              <a:spcAft>
+                <a:spcPts val="0"/>
+              </a:spcAft>
+              <a:buNone/>
+            </a:pPr>
+            <a:r>
+              <a:rPr lang="en" dirty="0"/>
+              <a:t>Trazer preços dinâmicos aos produtos de acordo com demandas e condições a partir do comportamento de um ou mais clientes.</a:t>
+            </a:r>
+            <a:endParaRPr dirty="0"/>
+          </a:p>
+        </p:txBody>
+      </p:sp>
+      <p:cxnSp>
+        <p:nvCxnSpPr>
+          <p:cNvPr id="2431" name="Google Shape;2431;p64"/>
+          <p:cNvCxnSpPr/>
+          <p:nvPr/>
+        </p:nvCxnSpPr>
+        <p:spPr>
+          <a:xfrm>
+            <a:off x="999050" y="2153183"/>
+            <a:ext cx="2628600" cy="0"/>
+          </a:xfrm>
+          <a:prstGeom prst="straightConnector1">
+            <a:avLst/>
+          </a:prstGeom>
+          <a:noFill/>
+          <a:ln w="28575" cap="flat" cmpd="sng">
+            <a:solidFill>
+              <a:schemeClr val="dk1"/>
+            </a:solidFill>
+            <a:prstDash val="solid"/>
+            <a:round/>
+            <a:headEnd type="none" w="med" len="med"/>
+            <a:tailEnd type="none" w="med" len="med"/>
+          </a:ln>
+        </p:spPr>
+      </p:cxnSp>
+      <p:pic>
+        <p:nvPicPr>
+          <p:cNvPr id="2432" name="Google Shape;2432;p64"/>
+          <p:cNvPicPr preferRelativeResize="0"/>
+          <p:nvPr/>
+        </p:nvPicPr>
+        <p:blipFill rotWithShape="1">
+          <a:blip r:embed="rId3">
+            <a:alphaModFix/>
+          </a:blip>
+          <a:srcRect l="4765" r="51639"/>
+          <a:stretch/>
+        </p:blipFill>
+        <p:spPr>
+          <a:xfrm>
+            <a:off x="5390712" y="1198500"/>
+            <a:ext cx="1985076" cy="2561250"/>
+          </a:xfrm>
+          <a:prstGeom prst="rect">
+            <a:avLst/>
+          </a:prstGeom>
+          <a:noFill/>
+          <a:ln w="28575" cap="flat" cmpd="sng">
+            <a:solidFill>
+              <a:schemeClr val="dk1"/>
+            </a:solidFill>
+            <a:prstDash val="solid"/>
+            <a:round/>
+            <a:headEnd type="none" w="sm" len="sm"/>
+            <a:tailEnd type="none" w="sm" len="sm"/>
+          </a:ln>
+        </p:spPr>
+      </p:pic>
+    </p:spTree>
+  </p:cSld>
+  <p:clrMapOvr>
+    <a:masterClrMapping/>
+  </p:clrMapOvr>
+</p:sld>
+</file>
+
+<file path=ppt/slides/slide5.xml><?xml version="1.0" encoding="utf-8"?>
+<p:sld xmlns:a="http://schemas.openxmlformats.org/drawingml/2006/main" xmlns:r="http://schemas.openxmlformats.org/officeDocument/2006/relationships" xmlns:p="http://schemas.openxmlformats.org/presentationml/2006/main">
+  <p:cSld>
+    <p:spTree>
+      <p:nvGrpSpPr>
         <p:cNvPr id="1" name="Shape 2412"/>
         <p:cNvGrpSpPr/>
         <p:nvPr/>

</xml_diff>

<commit_message>
Slide com definição do público-alvo
</commit_message>
<xml_diff>
--- a/Pitch-SavvyFix.pptx
+++ b/Pitch-SavvyFix.pptx
@@ -5,7 +5,7 @@
     <p:sldMasterId id="2147483683" r:id="rId1"/>
   </p:sldMasterIdLst>
   <p:notesMasterIdLst>
-    <p:notesMasterId r:id="rId8"/>
+    <p:notesMasterId r:id="rId9"/>
   </p:notesMasterIdLst>
   <p:sldIdLst>
     <p:sldId id="256" r:id="rId2"/>
@@ -13,25 +13,26 @@
     <p:sldId id="261" r:id="rId4"/>
     <p:sldId id="282" r:id="rId5"/>
     <p:sldId id="269" r:id="rId6"/>
-    <p:sldId id="281" r:id="rId7"/>
+    <p:sldId id="283" r:id="rId7"/>
+    <p:sldId id="281" r:id="rId8"/>
   </p:sldIdLst>
   <p:sldSz cx="9144000" cy="5143500" type="screen16x9"/>
   <p:notesSz cx="6858000" cy="9144000"/>
   <p:embeddedFontLst>
     <p:embeddedFont>
       <p:font typeface="Inter" panose="020B0604020202020204" charset="0"/>
-      <p:regular r:id="rId9"/>
-      <p:bold r:id="rId10"/>
+      <p:regular r:id="rId10"/>
+      <p:bold r:id="rId11"/>
     </p:embeddedFont>
     <p:embeddedFont>
       <p:font typeface="Manrope Medium" panose="020B0604020202020204" charset="0"/>
-      <p:regular r:id="rId11"/>
-      <p:bold r:id="rId12"/>
+      <p:regular r:id="rId12"/>
+      <p:bold r:id="rId13"/>
     </p:embeddedFont>
     <p:embeddedFont>
       <p:font typeface="Manrope SemiBold" panose="020B0604020202020204" charset="0"/>
-      <p:regular r:id="rId13"/>
-      <p:bold r:id="rId14"/>
+      <p:regular r:id="rId14"/>
+      <p:bold r:id="rId15"/>
     </p:embeddedFont>
   </p:embeddedFontLst>
   <p:defaultTextStyle>
@@ -1237,6 +1238,110 @@
   <p:cSld>
     <p:spTree>
       <p:nvGrpSpPr>
+        <p:cNvPr id="1" name="Shape 2433"/>
+        <p:cNvGrpSpPr/>
+        <p:nvPr/>
+      </p:nvGrpSpPr>
+      <p:grpSpPr>
+        <a:xfrm>
+          <a:off x="0" y="0"/>
+          <a:ext cx="0" cy="0"/>
+          <a:chOff x="0" y="0"/>
+          <a:chExt cx="0" cy="0"/>
+        </a:xfrm>
+      </p:grpSpPr>
+      <p:sp>
+        <p:nvSpPr>
+          <p:cNvPr id="2434" name="Google Shape;2434;g131ff7c0f5b_0_14337:notes"/>
+          <p:cNvSpPr>
+            <a:spLocks noGrp="1" noRot="1" noChangeAspect="1"/>
+          </p:cNvSpPr>
+          <p:nvPr>
+            <p:ph type="sldImg" idx="2"/>
+          </p:nvPr>
+        </p:nvSpPr>
+        <p:spPr>
+          <a:xfrm>
+            <a:off x="381000" y="685800"/>
+            <a:ext cx="6096000" cy="3429000"/>
+          </a:xfrm>
+          <a:custGeom>
+            <a:avLst/>
+            <a:gdLst/>
+            <a:ahLst/>
+            <a:cxnLst/>
+            <a:rect l="l" t="t" r="r" b="b"/>
+            <a:pathLst>
+              <a:path w="120000" h="120000" extrusionOk="0">
+                <a:moveTo>
+                  <a:pt x="0" y="0"/>
+                </a:moveTo>
+                <a:lnTo>
+                  <a:pt x="120000" y="0"/>
+                </a:lnTo>
+                <a:lnTo>
+                  <a:pt x="120000" y="120000"/>
+                </a:lnTo>
+                <a:lnTo>
+                  <a:pt x="0" y="120000"/>
+                </a:lnTo>
+                <a:close/>
+              </a:path>
+            </a:pathLst>
+          </a:custGeom>
+        </p:spPr>
+      </p:sp>
+      <p:sp>
+        <p:nvSpPr>
+          <p:cNvPr id="2435" name="Google Shape;2435;g131ff7c0f5b_0_14337:notes"/>
+          <p:cNvSpPr txBox="1">
+            <a:spLocks noGrp="1"/>
+          </p:cNvSpPr>
+          <p:nvPr>
+            <p:ph type="body" idx="1"/>
+          </p:nvPr>
+        </p:nvSpPr>
+        <p:spPr>
+          <a:xfrm>
+            <a:off x="685800" y="4343400"/>
+            <a:ext cx="5486400" cy="4114800"/>
+          </a:xfrm>
+          <a:prstGeom prst="rect">
+            <a:avLst/>
+          </a:prstGeom>
+        </p:spPr>
+        <p:txBody>
+          <a:bodyPr spcFirstLastPara="1" wrap="square" lIns="91425" tIns="91425" rIns="91425" bIns="91425" anchor="t" anchorCtr="0">
+            <a:noAutofit/>
+          </a:bodyPr>
+          <a:lstStyle/>
+          <a:p>
+            <a:pPr marL="0" lvl="0" indent="0" algn="l" rtl="0">
+              <a:spcBef>
+                <a:spcPts val="0"/>
+              </a:spcBef>
+              <a:spcAft>
+                <a:spcPts val="0"/>
+              </a:spcAft>
+              <a:buNone/>
+            </a:pPr>
+            <a:endParaRPr/>
+          </a:p>
+        </p:txBody>
+      </p:sp>
+    </p:spTree>
+  </p:cSld>
+  <p:clrMapOvr>
+    <a:masterClrMapping/>
+  </p:clrMapOvr>
+</p:notes>
+</file>
+
+<file path=ppt/notesSlides/notesSlide7.xml><?xml version="1.0" encoding="utf-8"?>
+<p:notes xmlns:a="http://schemas.openxmlformats.org/drawingml/2006/main" xmlns:r="http://schemas.openxmlformats.org/officeDocument/2006/relationships" xmlns:p="http://schemas.openxmlformats.org/presentationml/2006/main" showMasterSp="0" showMasterPhAnim="0">
+  <p:cSld>
+    <p:spTree>
+      <p:nvGrpSpPr>
         <p:cNvPr id="1" name="Shape 2409"/>
         <p:cNvGrpSpPr/>
         <p:nvPr/>
@@ -3555,6 +3660,2083 @@
         </p:grpSp>
       </p:grpSp>
     </p:spTree>
+  </p:cSld>
+  <p:clrMapOvr>
+    <a:masterClrMapping/>
+  </p:clrMapOvr>
+</p:sldLayout>
+</file>
+
+<file path=ppt/slideLayouts/slideLayout10.xml><?xml version="1.0" encoding="utf-8"?>
+<p:sldLayout xmlns:a="http://schemas.openxmlformats.org/drawingml/2006/main" xmlns:r="http://schemas.openxmlformats.org/officeDocument/2006/relationships" xmlns:p="http://schemas.openxmlformats.org/presentationml/2006/main" matchingName="Title only 1">
+  <p:cSld name="Title only 1">
+    <p:spTree>
+      <p:nvGrpSpPr>
+        <p:cNvPr id="1" name="Shape 797"/>
+        <p:cNvGrpSpPr/>
+        <p:nvPr/>
+      </p:nvGrpSpPr>
+      <p:grpSpPr>
+        <a:xfrm>
+          <a:off x="0" y="0"/>
+          <a:ext cx="0" cy="0"/>
+          <a:chOff x="0" y="0"/>
+          <a:chExt cx="0" cy="0"/>
+        </a:xfrm>
+      </p:grpSpPr>
+      <p:sp>
+        <p:nvSpPr>
+          <p:cNvPr id="798" name="Google Shape;798;p19"/>
+          <p:cNvSpPr txBox="1">
+            <a:spLocks noGrp="1"/>
+          </p:cNvSpPr>
+          <p:nvPr>
+            <p:ph type="title"/>
+          </p:nvPr>
+        </p:nvSpPr>
+        <p:spPr>
+          <a:xfrm>
+            <a:off x="713225" y="520925"/>
+            <a:ext cx="7717500" cy="708000"/>
+          </a:xfrm>
+          <a:prstGeom prst="rect">
+            <a:avLst/>
+          </a:prstGeom>
+        </p:spPr>
+        <p:txBody>
+          <a:bodyPr spcFirstLastPara="1" wrap="square" lIns="91425" tIns="91425" rIns="91425" bIns="91425" anchor="t" anchorCtr="0">
+            <a:noAutofit/>
+          </a:bodyPr>
+          <a:lstStyle>
+            <a:lvl1pPr lvl="0" rtl="0">
+              <a:spcBef>
+                <a:spcPts val="0"/>
+              </a:spcBef>
+              <a:spcAft>
+                <a:spcPts val="0"/>
+              </a:spcAft>
+              <a:buSzPts val="3200"/>
+              <a:buNone/>
+              <a:defRPr/>
+            </a:lvl1pPr>
+            <a:lvl2pPr lvl="1" rtl="0">
+              <a:spcBef>
+                <a:spcPts val="0"/>
+              </a:spcBef>
+              <a:spcAft>
+                <a:spcPts val="0"/>
+              </a:spcAft>
+              <a:buSzPts val="3200"/>
+              <a:buNone/>
+              <a:defRPr/>
+            </a:lvl2pPr>
+            <a:lvl3pPr lvl="2" rtl="0">
+              <a:spcBef>
+                <a:spcPts val="0"/>
+              </a:spcBef>
+              <a:spcAft>
+                <a:spcPts val="0"/>
+              </a:spcAft>
+              <a:buSzPts val="3200"/>
+              <a:buNone/>
+              <a:defRPr/>
+            </a:lvl3pPr>
+            <a:lvl4pPr lvl="3" rtl="0">
+              <a:spcBef>
+                <a:spcPts val="0"/>
+              </a:spcBef>
+              <a:spcAft>
+                <a:spcPts val="0"/>
+              </a:spcAft>
+              <a:buSzPts val="3200"/>
+              <a:buNone/>
+              <a:defRPr/>
+            </a:lvl4pPr>
+            <a:lvl5pPr lvl="4" rtl="0">
+              <a:spcBef>
+                <a:spcPts val="0"/>
+              </a:spcBef>
+              <a:spcAft>
+                <a:spcPts val="0"/>
+              </a:spcAft>
+              <a:buSzPts val="3200"/>
+              <a:buNone/>
+              <a:defRPr/>
+            </a:lvl5pPr>
+            <a:lvl6pPr lvl="5" rtl="0">
+              <a:spcBef>
+                <a:spcPts val="0"/>
+              </a:spcBef>
+              <a:spcAft>
+                <a:spcPts val="0"/>
+              </a:spcAft>
+              <a:buSzPts val="3200"/>
+              <a:buNone/>
+              <a:defRPr/>
+            </a:lvl6pPr>
+            <a:lvl7pPr lvl="6" rtl="0">
+              <a:spcBef>
+                <a:spcPts val="0"/>
+              </a:spcBef>
+              <a:spcAft>
+                <a:spcPts val="0"/>
+              </a:spcAft>
+              <a:buSzPts val="3200"/>
+              <a:buNone/>
+              <a:defRPr/>
+            </a:lvl7pPr>
+            <a:lvl8pPr lvl="7" rtl="0">
+              <a:spcBef>
+                <a:spcPts val="0"/>
+              </a:spcBef>
+              <a:spcAft>
+                <a:spcPts val="0"/>
+              </a:spcAft>
+              <a:buSzPts val="3200"/>
+              <a:buNone/>
+              <a:defRPr/>
+            </a:lvl8pPr>
+            <a:lvl9pPr lvl="8" rtl="0">
+              <a:spcBef>
+                <a:spcPts val="0"/>
+              </a:spcBef>
+              <a:spcAft>
+                <a:spcPts val="0"/>
+              </a:spcAft>
+              <a:buSzPts val="3200"/>
+              <a:buNone/>
+              <a:defRPr/>
+            </a:lvl9pPr>
+          </a:lstStyle>
+          <a:p>
+            <a:endParaRPr/>
+          </a:p>
+        </p:txBody>
+      </p:sp>
+      <p:grpSp>
+        <p:nvGrpSpPr>
+          <p:cNvPr id="799" name="Google Shape;799;p19"/>
+          <p:cNvGrpSpPr/>
+          <p:nvPr/>
+        </p:nvGrpSpPr>
+        <p:grpSpPr>
+          <a:xfrm flipH="1">
+            <a:off x="8162268" y="4327483"/>
+            <a:ext cx="2744275" cy="2727763"/>
+            <a:chOff x="5985575" y="4420825"/>
+            <a:chExt cx="2744275" cy="2727763"/>
+          </a:xfrm>
+        </p:grpSpPr>
+        <p:sp>
+          <p:nvSpPr>
+            <p:cNvPr id="800" name="Google Shape;800;p19"/>
+            <p:cNvSpPr/>
+            <p:nvPr/>
+          </p:nvSpPr>
+          <p:spPr>
+            <a:xfrm>
+              <a:off x="6115050" y="4420825"/>
+              <a:ext cx="2614800" cy="2599800"/>
+            </a:xfrm>
+            <a:prstGeom prst="ellipse">
+              <a:avLst/>
+            </a:prstGeom>
+            <a:solidFill>
+              <a:srgbClr val="FFFFFF">
+                <a:alpha val="35850"/>
+              </a:srgbClr>
+            </a:solidFill>
+            <a:ln>
+              <a:noFill/>
+            </a:ln>
+          </p:spPr>
+          <p:txBody>
+            <a:bodyPr spcFirstLastPara="1" wrap="square" lIns="91425" tIns="91425" rIns="91425" bIns="91425" anchor="ctr" anchorCtr="0">
+              <a:noAutofit/>
+            </a:bodyPr>
+            <a:lstStyle/>
+            <a:p>
+              <a:pPr marL="0" lvl="0" indent="0" algn="l" rtl="0">
+                <a:spcBef>
+                  <a:spcPts val="0"/>
+                </a:spcBef>
+                <a:spcAft>
+                  <a:spcPts val="0"/>
+                </a:spcAft>
+                <a:buNone/>
+              </a:pPr>
+              <a:endParaRPr>
+                <a:latin typeface="Inter"/>
+                <a:ea typeface="Inter"/>
+                <a:cs typeface="Inter"/>
+                <a:sym typeface="Inter"/>
+              </a:endParaRPr>
+            </a:p>
+          </p:txBody>
+        </p:sp>
+        <p:grpSp>
+          <p:nvGrpSpPr>
+            <p:cNvPr id="801" name="Google Shape;801;p19"/>
+            <p:cNvGrpSpPr/>
+            <p:nvPr/>
+          </p:nvGrpSpPr>
+          <p:grpSpPr>
+            <a:xfrm rot="5400000" flipH="1">
+              <a:off x="5986247" y="4572099"/>
+              <a:ext cx="2575817" cy="2577160"/>
+              <a:chOff x="1550275" y="1493275"/>
+              <a:chExt cx="1582100" cy="1582925"/>
+            </a:xfrm>
+          </p:grpSpPr>
+          <p:sp>
+            <p:nvSpPr>
+              <p:cNvPr id="802" name="Google Shape;802;p19"/>
+              <p:cNvSpPr/>
+              <p:nvPr/>
+            </p:nvSpPr>
+            <p:spPr>
+              <a:xfrm>
+                <a:off x="1650275" y="1594100"/>
+                <a:ext cx="301650" cy="300825"/>
+              </a:xfrm>
+              <a:custGeom>
+                <a:avLst/>
+                <a:gdLst/>
+                <a:ahLst/>
+                <a:cxnLst/>
+                <a:rect l="l" t="t" r="r" b="b"/>
+                <a:pathLst>
+                  <a:path w="12066" h="12033" fill="none" extrusionOk="0">
+                    <a:moveTo>
+                      <a:pt x="1" y="12032"/>
+                    </a:moveTo>
+                    <a:lnTo>
+                      <a:pt x="12065" y="0"/>
+                    </a:lnTo>
+                  </a:path>
+                </a:pathLst>
+              </a:custGeom>
+              <a:noFill/>
+              <a:ln w="19050" cap="rnd" cmpd="sng">
+                <a:solidFill>
+                  <a:schemeClr val="accent1"/>
+                </a:solidFill>
+                <a:prstDash val="solid"/>
+                <a:miter lim="32519"/>
+                <a:headEnd type="none" w="sm" len="sm"/>
+                <a:tailEnd type="none" w="sm" len="sm"/>
+              </a:ln>
+            </p:spPr>
+            <p:txBody>
+              <a:bodyPr spcFirstLastPara="1" wrap="square" lIns="91425" tIns="91425" rIns="91425" bIns="91425" anchor="ctr" anchorCtr="0">
+                <a:noAutofit/>
+              </a:bodyPr>
+              <a:lstStyle/>
+              <a:p>
+                <a:pPr marL="0" lvl="0" indent="0" algn="l" rtl="0">
+                  <a:spcBef>
+                    <a:spcPts val="0"/>
+                  </a:spcBef>
+                  <a:spcAft>
+                    <a:spcPts val="0"/>
+                  </a:spcAft>
+                  <a:buNone/>
+                </a:pPr>
+                <a:endParaRPr>
+                  <a:latin typeface="Inter"/>
+                  <a:ea typeface="Inter"/>
+                  <a:cs typeface="Inter"/>
+                  <a:sym typeface="Inter"/>
+                </a:endParaRPr>
+              </a:p>
+            </p:txBody>
+          </p:sp>
+          <p:sp>
+            <p:nvSpPr>
+              <p:cNvPr id="803" name="Google Shape;803;p19"/>
+              <p:cNvSpPr/>
+              <p:nvPr/>
+            </p:nvSpPr>
+            <p:spPr>
+              <a:xfrm>
+                <a:off x="1560025" y="1503850"/>
+                <a:ext cx="648800" cy="647975"/>
+              </a:xfrm>
+              <a:custGeom>
+                <a:avLst/>
+                <a:gdLst/>
+                <a:ahLst/>
+                <a:cxnLst/>
+                <a:rect l="l" t="t" r="r" b="b"/>
+                <a:pathLst>
+                  <a:path w="25952" h="25919" fill="none" extrusionOk="0">
+                    <a:moveTo>
+                      <a:pt x="1" y="25919"/>
+                    </a:moveTo>
+                    <a:lnTo>
+                      <a:pt x="25952" y="0"/>
+                    </a:lnTo>
+                  </a:path>
+                </a:pathLst>
+              </a:custGeom>
+              <a:noFill/>
+              <a:ln w="19050" cap="rnd" cmpd="sng">
+                <a:solidFill>
+                  <a:schemeClr val="accent1"/>
+                </a:solidFill>
+                <a:prstDash val="solid"/>
+                <a:miter lim="32519"/>
+                <a:headEnd type="none" w="sm" len="sm"/>
+                <a:tailEnd type="none" w="sm" len="sm"/>
+              </a:ln>
+            </p:spPr>
+            <p:txBody>
+              <a:bodyPr spcFirstLastPara="1" wrap="square" lIns="91425" tIns="91425" rIns="91425" bIns="91425" anchor="ctr" anchorCtr="0">
+                <a:noAutofit/>
+              </a:bodyPr>
+              <a:lstStyle/>
+              <a:p>
+                <a:pPr marL="0" lvl="0" indent="0" algn="l" rtl="0">
+                  <a:spcBef>
+                    <a:spcPts val="0"/>
+                  </a:spcBef>
+                  <a:spcAft>
+                    <a:spcPts val="0"/>
+                  </a:spcAft>
+                  <a:buNone/>
+                </a:pPr>
+                <a:endParaRPr>
+                  <a:latin typeface="Inter"/>
+                  <a:ea typeface="Inter"/>
+                  <a:cs typeface="Inter"/>
+                  <a:sym typeface="Inter"/>
+                </a:endParaRPr>
+              </a:p>
+            </p:txBody>
+          </p:sp>
+          <p:sp>
+            <p:nvSpPr>
+              <p:cNvPr id="804" name="Google Shape;804;p19"/>
+              <p:cNvSpPr/>
+              <p:nvPr/>
+            </p:nvSpPr>
+            <p:spPr>
+              <a:xfrm>
+                <a:off x="1550275" y="1493275"/>
+                <a:ext cx="834150" cy="834975"/>
+              </a:xfrm>
+              <a:custGeom>
+                <a:avLst/>
+                <a:gdLst/>
+                <a:ahLst/>
+                <a:cxnLst/>
+                <a:rect l="l" t="t" r="r" b="b"/>
+                <a:pathLst>
+                  <a:path w="33366" h="33399" fill="none" extrusionOk="0">
+                    <a:moveTo>
+                      <a:pt x="1" y="33398"/>
+                    </a:moveTo>
+                    <a:lnTo>
+                      <a:pt x="33366" y="1"/>
+                    </a:lnTo>
+                  </a:path>
+                </a:pathLst>
+              </a:custGeom>
+              <a:noFill/>
+              <a:ln w="19050" cap="rnd" cmpd="sng">
+                <a:solidFill>
+                  <a:schemeClr val="accent1"/>
+                </a:solidFill>
+                <a:prstDash val="solid"/>
+                <a:miter lim="32519"/>
+                <a:headEnd type="none" w="sm" len="sm"/>
+                <a:tailEnd type="none" w="sm" len="sm"/>
+              </a:ln>
+            </p:spPr>
+            <p:txBody>
+              <a:bodyPr spcFirstLastPara="1" wrap="square" lIns="91425" tIns="91425" rIns="91425" bIns="91425" anchor="ctr" anchorCtr="0">
+                <a:noAutofit/>
+              </a:bodyPr>
+              <a:lstStyle/>
+              <a:p>
+                <a:pPr marL="0" lvl="0" indent="0" algn="l" rtl="0">
+                  <a:spcBef>
+                    <a:spcPts val="0"/>
+                  </a:spcBef>
+                  <a:spcAft>
+                    <a:spcPts val="0"/>
+                  </a:spcAft>
+                  <a:buNone/>
+                </a:pPr>
+                <a:endParaRPr>
+                  <a:latin typeface="Inter"/>
+                  <a:ea typeface="Inter"/>
+                  <a:cs typeface="Inter"/>
+                  <a:sym typeface="Inter"/>
+                </a:endParaRPr>
+              </a:p>
+            </p:txBody>
+          </p:sp>
+          <p:sp>
+            <p:nvSpPr>
+              <p:cNvPr id="805" name="Google Shape;805;p19"/>
+              <p:cNvSpPr/>
+              <p:nvPr/>
+            </p:nvSpPr>
+            <p:spPr>
+              <a:xfrm>
+                <a:off x="1571425" y="1514425"/>
+                <a:ext cx="957725" cy="958525"/>
+              </a:xfrm>
+              <a:custGeom>
+                <a:avLst/>
+                <a:gdLst/>
+                <a:ahLst/>
+                <a:cxnLst/>
+                <a:rect l="l" t="t" r="r" b="b"/>
+                <a:pathLst>
+                  <a:path w="38309" h="38341" fill="none" extrusionOk="0">
+                    <a:moveTo>
+                      <a:pt x="0" y="38341"/>
+                    </a:moveTo>
+                    <a:lnTo>
+                      <a:pt x="38308" y="0"/>
+                    </a:lnTo>
+                  </a:path>
+                </a:pathLst>
+              </a:custGeom>
+              <a:noFill/>
+              <a:ln w="19050" cap="rnd" cmpd="sng">
+                <a:solidFill>
+                  <a:schemeClr val="accent1"/>
+                </a:solidFill>
+                <a:prstDash val="solid"/>
+                <a:miter lim="32519"/>
+                <a:headEnd type="none" w="sm" len="sm"/>
+                <a:tailEnd type="none" w="sm" len="sm"/>
+              </a:ln>
+            </p:spPr>
+            <p:txBody>
+              <a:bodyPr spcFirstLastPara="1" wrap="square" lIns="91425" tIns="91425" rIns="91425" bIns="91425" anchor="ctr" anchorCtr="0">
+                <a:noAutofit/>
+              </a:bodyPr>
+              <a:lstStyle/>
+              <a:p>
+                <a:pPr marL="0" lvl="0" indent="0" algn="l" rtl="0">
+                  <a:spcBef>
+                    <a:spcPts val="0"/>
+                  </a:spcBef>
+                  <a:spcAft>
+                    <a:spcPts val="0"/>
+                  </a:spcAft>
+                  <a:buNone/>
+                </a:pPr>
+                <a:endParaRPr>
+                  <a:latin typeface="Inter"/>
+                  <a:ea typeface="Inter"/>
+                  <a:cs typeface="Inter"/>
+                  <a:sym typeface="Inter"/>
+                </a:endParaRPr>
+              </a:p>
+            </p:txBody>
+          </p:sp>
+          <p:sp>
+            <p:nvSpPr>
+              <p:cNvPr id="806" name="Google Shape;806;p19"/>
+              <p:cNvSpPr/>
+              <p:nvPr/>
+            </p:nvSpPr>
+            <p:spPr>
+              <a:xfrm>
+                <a:off x="1612875" y="1555875"/>
+                <a:ext cx="1041475" cy="1042275"/>
+              </a:xfrm>
+              <a:custGeom>
+                <a:avLst/>
+                <a:gdLst/>
+                <a:ahLst/>
+                <a:cxnLst/>
+                <a:rect l="l" t="t" r="r" b="b"/>
+                <a:pathLst>
+                  <a:path w="41659" h="41691" fill="none" extrusionOk="0">
+                    <a:moveTo>
+                      <a:pt x="1" y="41691"/>
+                    </a:moveTo>
+                    <a:lnTo>
+                      <a:pt x="41658" y="1"/>
+                    </a:lnTo>
+                  </a:path>
+                </a:pathLst>
+              </a:custGeom>
+              <a:noFill/>
+              <a:ln w="19050" cap="rnd" cmpd="sng">
+                <a:solidFill>
+                  <a:schemeClr val="accent1"/>
+                </a:solidFill>
+                <a:prstDash val="solid"/>
+                <a:miter lim="32519"/>
+                <a:headEnd type="none" w="sm" len="sm"/>
+                <a:tailEnd type="none" w="sm" len="sm"/>
+              </a:ln>
+            </p:spPr>
+            <p:txBody>
+              <a:bodyPr spcFirstLastPara="1" wrap="square" lIns="91425" tIns="91425" rIns="91425" bIns="91425" anchor="ctr" anchorCtr="0">
+                <a:noAutofit/>
+              </a:bodyPr>
+              <a:lstStyle/>
+              <a:p>
+                <a:pPr marL="0" lvl="0" indent="0" algn="l" rtl="0">
+                  <a:spcBef>
+                    <a:spcPts val="0"/>
+                  </a:spcBef>
+                  <a:spcAft>
+                    <a:spcPts val="0"/>
+                  </a:spcAft>
+                  <a:buNone/>
+                </a:pPr>
+                <a:endParaRPr>
+                  <a:latin typeface="Inter"/>
+                  <a:ea typeface="Inter"/>
+                  <a:cs typeface="Inter"/>
+                  <a:sym typeface="Inter"/>
+                </a:endParaRPr>
+              </a:p>
+            </p:txBody>
+          </p:sp>
+          <p:sp>
+            <p:nvSpPr>
+              <p:cNvPr id="807" name="Google Shape;807;p19"/>
+              <p:cNvSpPr/>
+              <p:nvPr/>
+            </p:nvSpPr>
+            <p:spPr>
+              <a:xfrm>
+                <a:off x="1669800" y="1613600"/>
+                <a:ext cx="1093475" cy="1092675"/>
+              </a:xfrm>
+              <a:custGeom>
+                <a:avLst/>
+                <a:gdLst/>
+                <a:ahLst/>
+                <a:cxnLst/>
+                <a:rect l="l" t="t" r="r" b="b"/>
+                <a:pathLst>
+                  <a:path w="43739" h="43707" fill="none" extrusionOk="0">
+                    <a:moveTo>
+                      <a:pt x="0" y="43707"/>
+                    </a:moveTo>
+                    <a:lnTo>
+                      <a:pt x="43739" y="1"/>
+                    </a:lnTo>
+                  </a:path>
+                </a:pathLst>
+              </a:custGeom>
+              <a:noFill/>
+              <a:ln w="19050" cap="rnd" cmpd="sng">
+                <a:solidFill>
+                  <a:schemeClr val="accent1"/>
+                </a:solidFill>
+                <a:prstDash val="solid"/>
+                <a:miter lim="32519"/>
+                <a:headEnd type="none" w="sm" len="sm"/>
+                <a:tailEnd type="none" w="sm" len="sm"/>
+              </a:ln>
+            </p:spPr>
+            <p:txBody>
+              <a:bodyPr spcFirstLastPara="1" wrap="square" lIns="91425" tIns="91425" rIns="91425" bIns="91425" anchor="ctr" anchorCtr="0">
+                <a:noAutofit/>
+              </a:bodyPr>
+              <a:lstStyle/>
+              <a:p>
+                <a:pPr marL="0" lvl="0" indent="0" algn="l" rtl="0">
+                  <a:spcBef>
+                    <a:spcPts val="0"/>
+                  </a:spcBef>
+                  <a:spcAft>
+                    <a:spcPts val="0"/>
+                  </a:spcAft>
+                  <a:buNone/>
+                </a:pPr>
+                <a:endParaRPr>
+                  <a:latin typeface="Inter"/>
+                  <a:ea typeface="Inter"/>
+                  <a:cs typeface="Inter"/>
+                  <a:sym typeface="Inter"/>
+                </a:endParaRPr>
+              </a:p>
+            </p:txBody>
+          </p:sp>
+          <p:sp>
+            <p:nvSpPr>
+              <p:cNvPr id="808" name="Google Shape;808;p19"/>
+              <p:cNvSpPr/>
+              <p:nvPr/>
+            </p:nvSpPr>
+            <p:spPr>
+              <a:xfrm>
+                <a:off x="1724445" y="1684323"/>
+                <a:ext cx="1133953" cy="1137555"/>
+              </a:xfrm>
+              <a:custGeom>
+                <a:avLst/>
+                <a:gdLst/>
+                <a:ahLst/>
+                <a:cxnLst/>
+                <a:rect l="l" t="t" r="r" b="b"/>
+                <a:pathLst>
+                  <a:path w="75837" h="75837" fill="none" extrusionOk="0">
+                    <a:moveTo>
+                      <a:pt x="1" y="75836"/>
+                    </a:moveTo>
+                    <a:lnTo>
+                      <a:pt x="75837" y="1"/>
+                    </a:lnTo>
+                  </a:path>
+                </a:pathLst>
+              </a:custGeom>
+              <a:noFill/>
+              <a:ln w="19050" cap="rnd" cmpd="sng">
+                <a:solidFill>
+                  <a:schemeClr val="accent1"/>
+                </a:solidFill>
+                <a:prstDash val="solid"/>
+                <a:miter lim="32519"/>
+                <a:headEnd type="none" w="sm" len="sm"/>
+                <a:tailEnd type="none" w="sm" len="sm"/>
+              </a:ln>
+            </p:spPr>
+            <p:txBody>
+              <a:bodyPr spcFirstLastPara="1" wrap="square" lIns="91425" tIns="91425" rIns="91425" bIns="91425" anchor="ctr" anchorCtr="0">
+                <a:noAutofit/>
+              </a:bodyPr>
+              <a:lstStyle/>
+              <a:p>
+                <a:pPr marL="0" lvl="0" indent="0" algn="l" rtl="0">
+                  <a:spcBef>
+                    <a:spcPts val="0"/>
+                  </a:spcBef>
+                  <a:spcAft>
+                    <a:spcPts val="0"/>
+                  </a:spcAft>
+                  <a:buNone/>
+                </a:pPr>
+                <a:endParaRPr>
+                  <a:latin typeface="Inter"/>
+                  <a:ea typeface="Inter"/>
+                  <a:cs typeface="Inter"/>
+                  <a:sym typeface="Inter"/>
+                </a:endParaRPr>
+              </a:p>
+            </p:txBody>
+          </p:sp>
+          <p:sp>
+            <p:nvSpPr>
+              <p:cNvPr id="809" name="Google Shape;809;p19"/>
+              <p:cNvSpPr/>
+              <p:nvPr/>
+            </p:nvSpPr>
+            <p:spPr>
+              <a:xfrm>
+                <a:off x="1861553" y="1767253"/>
+                <a:ext cx="1080578" cy="1082004"/>
+              </a:xfrm>
+              <a:custGeom>
+                <a:avLst/>
+                <a:gdLst/>
+                <a:ahLst/>
+                <a:cxnLst/>
+                <a:rect l="l" t="t" r="r" b="b"/>
+                <a:pathLst>
+                  <a:path w="75870" h="75837" fill="none" extrusionOk="0">
+                    <a:moveTo>
+                      <a:pt x="1" y="75836"/>
+                    </a:moveTo>
+                    <a:lnTo>
+                      <a:pt x="75869" y="1"/>
+                    </a:lnTo>
+                  </a:path>
+                </a:pathLst>
+              </a:custGeom>
+              <a:noFill/>
+              <a:ln w="19050" cap="rnd" cmpd="sng">
+                <a:solidFill>
+                  <a:schemeClr val="accent1"/>
+                </a:solidFill>
+                <a:prstDash val="solid"/>
+                <a:miter lim="32519"/>
+                <a:headEnd type="none" w="sm" len="sm"/>
+                <a:tailEnd type="none" w="sm" len="sm"/>
+              </a:ln>
+            </p:spPr>
+            <p:txBody>
+              <a:bodyPr spcFirstLastPara="1" wrap="square" lIns="91425" tIns="91425" rIns="91425" bIns="91425" anchor="ctr" anchorCtr="0">
+                <a:noAutofit/>
+              </a:bodyPr>
+              <a:lstStyle/>
+              <a:p>
+                <a:pPr marL="0" lvl="0" indent="0" algn="l" rtl="0">
+                  <a:spcBef>
+                    <a:spcPts val="0"/>
+                  </a:spcBef>
+                  <a:spcAft>
+                    <a:spcPts val="0"/>
+                  </a:spcAft>
+                  <a:buNone/>
+                </a:pPr>
+                <a:endParaRPr>
+                  <a:latin typeface="Inter"/>
+                  <a:ea typeface="Inter"/>
+                  <a:cs typeface="Inter"/>
+                  <a:sym typeface="Inter"/>
+                </a:endParaRPr>
+              </a:p>
+            </p:txBody>
+          </p:sp>
+          <p:sp>
+            <p:nvSpPr>
+              <p:cNvPr id="810" name="Google Shape;810;p19"/>
+              <p:cNvSpPr/>
+              <p:nvPr/>
+            </p:nvSpPr>
+            <p:spPr>
+              <a:xfrm>
+                <a:off x="1898130" y="1863198"/>
+                <a:ext cx="1114002" cy="1086690"/>
+              </a:xfrm>
+              <a:custGeom>
+                <a:avLst/>
+                <a:gdLst/>
+                <a:ahLst/>
+                <a:cxnLst/>
+                <a:rect l="l" t="t" r="r" b="b"/>
+                <a:pathLst>
+                  <a:path w="74828" h="74828" fill="none" extrusionOk="0">
+                    <a:moveTo>
+                      <a:pt x="0" y="74828"/>
+                    </a:moveTo>
+                    <a:lnTo>
+                      <a:pt x="74828" y="0"/>
+                    </a:lnTo>
+                  </a:path>
+                </a:pathLst>
+              </a:custGeom>
+              <a:noFill/>
+              <a:ln w="19050" cap="rnd" cmpd="sng">
+                <a:solidFill>
+                  <a:schemeClr val="accent1"/>
+                </a:solidFill>
+                <a:prstDash val="solid"/>
+                <a:miter lim="32519"/>
+                <a:headEnd type="none" w="sm" len="sm"/>
+                <a:tailEnd type="none" w="sm" len="sm"/>
+              </a:ln>
+            </p:spPr>
+            <p:txBody>
+              <a:bodyPr spcFirstLastPara="1" wrap="square" lIns="91425" tIns="91425" rIns="91425" bIns="91425" anchor="ctr" anchorCtr="0">
+                <a:noAutofit/>
+              </a:bodyPr>
+              <a:lstStyle/>
+              <a:p>
+                <a:pPr marL="0" lvl="0" indent="0" algn="l" rtl="0">
+                  <a:spcBef>
+                    <a:spcPts val="0"/>
+                  </a:spcBef>
+                  <a:spcAft>
+                    <a:spcPts val="0"/>
+                  </a:spcAft>
+                  <a:buNone/>
+                </a:pPr>
+                <a:endParaRPr>
+                  <a:latin typeface="Inter"/>
+                  <a:ea typeface="Inter"/>
+                  <a:cs typeface="Inter"/>
+                  <a:sym typeface="Inter"/>
+                </a:endParaRPr>
+              </a:p>
+            </p:txBody>
+          </p:sp>
+          <p:sp>
+            <p:nvSpPr>
+              <p:cNvPr id="811" name="Google Shape;811;p19"/>
+              <p:cNvSpPr/>
+              <p:nvPr/>
+            </p:nvSpPr>
+            <p:spPr>
+              <a:xfrm>
+                <a:off x="2027500" y="1971325"/>
+                <a:ext cx="1042275" cy="1042275"/>
+              </a:xfrm>
+              <a:custGeom>
+                <a:avLst/>
+                <a:gdLst/>
+                <a:ahLst/>
+                <a:cxnLst/>
+                <a:rect l="l" t="t" r="r" b="b"/>
+                <a:pathLst>
+                  <a:path w="41691" h="41691" fill="none" extrusionOk="0">
+                    <a:moveTo>
+                      <a:pt x="41691" y="0"/>
+                    </a:moveTo>
+                    <a:lnTo>
+                      <a:pt x="1" y="41690"/>
+                    </a:lnTo>
+                  </a:path>
+                </a:pathLst>
+              </a:custGeom>
+              <a:noFill/>
+              <a:ln w="19050" cap="rnd" cmpd="sng">
+                <a:solidFill>
+                  <a:schemeClr val="accent1"/>
+                </a:solidFill>
+                <a:prstDash val="solid"/>
+                <a:miter lim="32519"/>
+                <a:headEnd type="none" w="sm" len="sm"/>
+                <a:tailEnd type="none" w="sm" len="sm"/>
+              </a:ln>
+            </p:spPr>
+            <p:txBody>
+              <a:bodyPr spcFirstLastPara="1" wrap="square" lIns="91425" tIns="91425" rIns="91425" bIns="91425" anchor="ctr" anchorCtr="0">
+                <a:noAutofit/>
+              </a:bodyPr>
+              <a:lstStyle/>
+              <a:p>
+                <a:pPr marL="0" lvl="0" indent="0" algn="l" rtl="0">
+                  <a:spcBef>
+                    <a:spcPts val="0"/>
+                  </a:spcBef>
+                  <a:spcAft>
+                    <a:spcPts val="0"/>
+                  </a:spcAft>
+                  <a:buNone/>
+                </a:pPr>
+                <a:endParaRPr>
+                  <a:latin typeface="Inter"/>
+                  <a:ea typeface="Inter"/>
+                  <a:cs typeface="Inter"/>
+                  <a:sym typeface="Inter"/>
+                </a:endParaRPr>
+              </a:p>
+            </p:txBody>
+          </p:sp>
+          <p:sp>
+            <p:nvSpPr>
+              <p:cNvPr id="812" name="Google Shape;812;p19"/>
+              <p:cNvSpPr/>
+              <p:nvPr/>
+            </p:nvSpPr>
+            <p:spPr>
+              <a:xfrm>
+                <a:off x="2152700" y="2096525"/>
+                <a:ext cx="958550" cy="958525"/>
+              </a:xfrm>
+              <a:custGeom>
+                <a:avLst/>
+                <a:gdLst/>
+                <a:ahLst/>
+                <a:cxnLst/>
+                <a:rect l="l" t="t" r="r" b="b"/>
+                <a:pathLst>
+                  <a:path w="38342" h="38341" fill="none" extrusionOk="0">
+                    <a:moveTo>
+                      <a:pt x="38341" y="0"/>
+                    </a:moveTo>
+                    <a:lnTo>
+                      <a:pt x="1" y="38341"/>
+                    </a:lnTo>
+                  </a:path>
+                </a:pathLst>
+              </a:custGeom>
+              <a:noFill/>
+              <a:ln w="19050" cap="rnd" cmpd="sng">
+                <a:solidFill>
+                  <a:schemeClr val="accent1"/>
+                </a:solidFill>
+                <a:prstDash val="solid"/>
+                <a:miter lim="32519"/>
+                <a:headEnd type="none" w="sm" len="sm"/>
+                <a:tailEnd type="none" w="sm" len="sm"/>
+              </a:ln>
+            </p:spPr>
+            <p:txBody>
+              <a:bodyPr spcFirstLastPara="1" wrap="square" lIns="91425" tIns="91425" rIns="91425" bIns="91425" anchor="ctr" anchorCtr="0">
+                <a:noAutofit/>
+              </a:bodyPr>
+              <a:lstStyle/>
+              <a:p>
+                <a:pPr marL="0" lvl="0" indent="0" algn="l" rtl="0">
+                  <a:spcBef>
+                    <a:spcPts val="0"/>
+                  </a:spcBef>
+                  <a:spcAft>
+                    <a:spcPts val="0"/>
+                  </a:spcAft>
+                  <a:buNone/>
+                </a:pPr>
+                <a:endParaRPr>
+                  <a:latin typeface="Inter"/>
+                  <a:ea typeface="Inter"/>
+                  <a:cs typeface="Inter"/>
+                  <a:sym typeface="Inter"/>
+                </a:endParaRPr>
+              </a:p>
+            </p:txBody>
+          </p:sp>
+          <p:sp>
+            <p:nvSpPr>
+              <p:cNvPr id="813" name="Google Shape;813;p19"/>
+              <p:cNvSpPr/>
+              <p:nvPr/>
+            </p:nvSpPr>
+            <p:spPr>
+              <a:xfrm>
+                <a:off x="2298225" y="2241225"/>
+                <a:ext cx="834150" cy="834975"/>
+              </a:xfrm>
+              <a:custGeom>
+                <a:avLst/>
+                <a:gdLst/>
+                <a:ahLst/>
+                <a:cxnLst/>
+                <a:rect l="l" t="t" r="r" b="b"/>
+                <a:pathLst>
+                  <a:path w="33366" h="33399" fill="none" extrusionOk="0">
+                    <a:moveTo>
+                      <a:pt x="33366" y="1"/>
+                    </a:moveTo>
+                    <a:lnTo>
+                      <a:pt x="1" y="33398"/>
+                    </a:lnTo>
+                  </a:path>
+                </a:pathLst>
+              </a:custGeom>
+              <a:noFill/>
+              <a:ln w="19050" cap="rnd" cmpd="sng">
+                <a:solidFill>
+                  <a:schemeClr val="accent1"/>
+                </a:solidFill>
+                <a:prstDash val="solid"/>
+                <a:miter lim="32519"/>
+                <a:headEnd type="none" w="sm" len="sm"/>
+                <a:tailEnd type="none" w="sm" len="sm"/>
+              </a:ln>
+            </p:spPr>
+            <p:txBody>
+              <a:bodyPr spcFirstLastPara="1" wrap="square" lIns="91425" tIns="91425" rIns="91425" bIns="91425" anchor="ctr" anchorCtr="0">
+                <a:noAutofit/>
+              </a:bodyPr>
+              <a:lstStyle/>
+              <a:p>
+                <a:pPr marL="0" lvl="0" indent="0" algn="l" rtl="0">
+                  <a:spcBef>
+                    <a:spcPts val="0"/>
+                  </a:spcBef>
+                  <a:spcAft>
+                    <a:spcPts val="0"/>
+                  </a:spcAft>
+                  <a:buNone/>
+                </a:pPr>
+                <a:endParaRPr>
+                  <a:latin typeface="Inter"/>
+                  <a:ea typeface="Inter"/>
+                  <a:cs typeface="Inter"/>
+                  <a:sym typeface="Inter"/>
+                </a:endParaRPr>
+              </a:p>
+            </p:txBody>
+          </p:sp>
+          <p:sp>
+            <p:nvSpPr>
+              <p:cNvPr id="814" name="Google Shape;814;p19"/>
+              <p:cNvSpPr/>
+              <p:nvPr/>
+            </p:nvSpPr>
+            <p:spPr>
+              <a:xfrm>
+                <a:off x="2473825" y="2417650"/>
+                <a:ext cx="648800" cy="648800"/>
+              </a:xfrm>
+              <a:custGeom>
+                <a:avLst/>
+                <a:gdLst/>
+                <a:ahLst/>
+                <a:cxnLst/>
+                <a:rect l="l" t="t" r="r" b="b"/>
+                <a:pathLst>
+                  <a:path w="25952" h="25952" fill="none" extrusionOk="0">
+                    <a:moveTo>
+                      <a:pt x="25952" y="0"/>
+                    </a:moveTo>
+                    <a:lnTo>
+                      <a:pt x="1" y="25951"/>
+                    </a:lnTo>
+                  </a:path>
+                </a:pathLst>
+              </a:custGeom>
+              <a:noFill/>
+              <a:ln w="19050" cap="rnd" cmpd="sng">
+                <a:solidFill>
+                  <a:schemeClr val="accent1"/>
+                </a:solidFill>
+                <a:prstDash val="solid"/>
+                <a:miter lim="32519"/>
+                <a:headEnd type="none" w="sm" len="sm"/>
+                <a:tailEnd type="none" w="sm" len="sm"/>
+              </a:ln>
+            </p:spPr>
+            <p:txBody>
+              <a:bodyPr spcFirstLastPara="1" wrap="square" lIns="91425" tIns="91425" rIns="91425" bIns="91425" anchor="ctr" anchorCtr="0">
+                <a:noAutofit/>
+              </a:bodyPr>
+              <a:lstStyle/>
+              <a:p>
+                <a:pPr marL="0" lvl="0" indent="0" algn="l" rtl="0">
+                  <a:spcBef>
+                    <a:spcPts val="0"/>
+                  </a:spcBef>
+                  <a:spcAft>
+                    <a:spcPts val="0"/>
+                  </a:spcAft>
+                  <a:buNone/>
+                </a:pPr>
+                <a:endParaRPr>
+                  <a:latin typeface="Inter"/>
+                  <a:ea typeface="Inter"/>
+                  <a:cs typeface="Inter"/>
+                  <a:sym typeface="Inter"/>
+                </a:endParaRPr>
+              </a:p>
+            </p:txBody>
+          </p:sp>
+          <p:sp>
+            <p:nvSpPr>
+              <p:cNvPr id="815" name="Google Shape;815;p19"/>
+              <p:cNvSpPr/>
+              <p:nvPr/>
+            </p:nvSpPr>
+            <p:spPr>
+              <a:xfrm>
+                <a:off x="2730750" y="2674550"/>
+                <a:ext cx="300825" cy="300825"/>
+              </a:xfrm>
+              <a:custGeom>
+                <a:avLst/>
+                <a:gdLst/>
+                <a:ahLst/>
+                <a:cxnLst/>
+                <a:rect l="l" t="t" r="r" b="b"/>
+                <a:pathLst>
+                  <a:path w="12033" h="12033" fill="none" extrusionOk="0">
+                    <a:moveTo>
+                      <a:pt x="12032" y="1"/>
+                    </a:moveTo>
+                    <a:lnTo>
+                      <a:pt x="0" y="12033"/>
+                    </a:lnTo>
+                  </a:path>
+                </a:pathLst>
+              </a:custGeom>
+              <a:noFill/>
+              <a:ln w="19050" cap="rnd" cmpd="sng">
+                <a:solidFill>
+                  <a:schemeClr val="accent1"/>
+                </a:solidFill>
+                <a:prstDash val="solid"/>
+                <a:miter lim="32519"/>
+                <a:headEnd type="none" w="sm" len="sm"/>
+                <a:tailEnd type="none" w="sm" len="sm"/>
+              </a:ln>
+            </p:spPr>
+            <p:txBody>
+              <a:bodyPr spcFirstLastPara="1" wrap="square" lIns="91425" tIns="91425" rIns="91425" bIns="91425" anchor="ctr" anchorCtr="0">
+                <a:noAutofit/>
+              </a:bodyPr>
+              <a:lstStyle/>
+              <a:p>
+                <a:pPr marL="0" lvl="0" indent="0" algn="l" rtl="0">
+                  <a:spcBef>
+                    <a:spcPts val="0"/>
+                  </a:spcBef>
+                  <a:spcAft>
+                    <a:spcPts val="0"/>
+                  </a:spcAft>
+                  <a:buNone/>
+                </a:pPr>
+                <a:endParaRPr>
+                  <a:latin typeface="Inter"/>
+                  <a:ea typeface="Inter"/>
+                  <a:cs typeface="Inter"/>
+                  <a:sym typeface="Inter"/>
+                </a:endParaRPr>
+              </a:p>
+            </p:txBody>
+          </p:sp>
+        </p:grpSp>
+      </p:grpSp>
+      <p:grpSp>
+        <p:nvGrpSpPr>
+          <p:cNvPr id="816" name="Google Shape;816;p19"/>
+          <p:cNvGrpSpPr/>
+          <p:nvPr/>
+        </p:nvGrpSpPr>
+        <p:grpSpPr>
+          <a:xfrm flipH="1">
+            <a:off x="-1718107" y="-1806042"/>
+            <a:ext cx="2744275" cy="2727763"/>
+            <a:chOff x="5985575" y="4420825"/>
+            <a:chExt cx="2744275" cy="2727763"/>
+          </a:xfrm>
+        </p:grpSpPr>
+        <p:sp>
+          <p:nvSpPr>
+            <p:cNvPr id="817" name="Google Shape;817;p19"/>
+            <p:cNvSpPr/>
+            <p:nvPr/>
+          </p:nvSpPr>
+          <p:spPr>
+            <a:xfrm>
+              <a:off x="6115050" y="4420825"/>
+              <a:ext cx="2614800" cy="2599800"/>
+            </a:xfrm>
+            <a:prstGeom prst="ellipse">
+              <a:avLst/>
+            </a:prstGeom>
+            <a:solidFill>
+              <a:srgbClr val="FFFFFF">
+                <a:alpha val="35850"/>
+              </a:srgbClr>
+            </a:solidFill>
+            <a:ln>
+              <a:noFill/>
+            </a:ln>
+          </p:spPr>
+          <p:txBody>
+            <a:bodyPr spcFirstLastPara="1" wrap="square" lIns="91425" tIns="91425" rIns="91425" bIns="91425" anchor="ctr" anchorCtr="0">
+              <a:noAutofit/>
+            </a:bodyPr>
+            <a:lstStyle/>
+            <a:p>
+              <a:pPr marL="0" lvl="0" indent="0" algn="l" rtl="0">
+                <a:spcBef>
+                  <a:spcPts val="0"/>
+                </a:spcBef>
+                <a:spcAft>
+                  <a:spcPts val="0"/>
+                </a:spcAft>
+                <a:buNone/>
+              </a:pPr>
+              <a:endParaRPr>
+                <a:latin typeface="Inter"/>
+                <a:ea typeface="Inter"/>
+                <a:cs typeface="Inter"/>
+                <a:sym typeface="Inter"/>
+              </a:endParaRPr>
+            </a:p>
+          </p:txBody>
+        </p:sp>
+        <p:grpSp>
+          <p:nvGrpSpPr>
+            <p:cNvPr id="818" name="Google Shape;818;p19"/>
+            <p:cNvGrpSpPr/>
+            <p:nvPr/>
+          </p:nvGrpSpPr>
+          <p:grpSpPr>
+            <a:xfrm rot="5400000" flipH="1">
+              <a:off x="5986247" y="4572099"/>
+              <a:ext cx="2575817" cy="2577160"/>
+              <a:chOff x="1550275" y="1493275"/>
+              <a:chExt cx="1582100" cy="1582925"/>
+            </a:xfrm>
+          </p:grpSpPr>
+          <p:sp>
+            <p:nvSpPr>
+              <p:cNvPr id="819" name="Google Shape;819;p19"/>
+              <p:cNvSpPr/>
+              <p:nvPr/>
+            </p:nvSpPr>
+            <p:spPr>
+              <a:xfrm>
+                <a:off x="1650275" y="1594100"/>
+                <a:ext cx="301650" cy="300825"/>
+              </a:xfrm>
+              <a:custGeom>
+                <a:avLst/>
+                <a:gdLst/>
+                <a:ahLst/>
+                <a:cxnLst/>
+                <a:rect l="l" t="t" r="r" b="b"/>
+                <a:pathLst>
+                  <a:path w="12066" h="12033" fill="none" extrusionOk="0">
+                    <a:moveTo>
+                      <a:pt x="1" y="12032"/>
+                    </a:moveTo>
+                    <a:lnTo>
+                      <a:pt x="12065" y="0"/>
+                    </a:lnTo>
+                  </a:path>
+                </a:pathLst>
+              </a:custGeom>
+              <a:noFill/>
+              <a:ln w="19050" cap="rnd" cmpd="sng">
+                <a:solidFill>
+                  <a:schemeClr val="accent1"/>
+                </a:solidFill>
+                <a:prstDash val="solid"/>
+                <a:miter lim="32519"/>
+                <a:headEnd type="none" w="sm" len="sm"/>
+                <a:tailEnd type="none" w="sm" len="sm"/>
+              </a:ln>
+            </p:spPr>
+            <p:txBody>
+              <a:bodyPr spcFirstLastPara="1" wrap="square" lIns="91425" tIns="91425" rIns="91425" bIns="91425" anchor="ctr" anchorCtr="0">
+                <a:noAutofit/>
+              </a:bodyPr>
+              <a:lstStyle/>
+              <a:p>
+                <a:pPr marL="0" lvl="0" indent="0" algn="l" rtl="0">
+                  <a:spcBef>
+                    <a:spcPts val="0"/>
+                  </a:spcBef>
+                  <a:spcAft>
+                    <a:spcPts val="0"/>
+                  </a:spcAft>
+                  <a:buNone/>
+                </a:pPr>
+                <a:endParaRPr>
+                  <a:latin typeface="Inter"/>
+                  <a:ea typeface="Inter"/>
+                  <a:cs typeface="Inter"/>
+                  <a:sym typeface="Inter"/>
+                </a:endParaRPr>
+              </a:p>
+            </p:txBody>
+          </p:sp>
+          <p:sp>
+            <p:nvSpPr>
+              <p:cNvPr id="820" name="Google Shape;820;p19"/>
+              <p:cNvSpPr/>
+              <p:nvPr/>
+            </p:nvSpPr>
+            <p:spPr>
+              <a:xfrm>
+                <a:off x="1560025" y="1503850"/>
+                <a:ext cx="648800" cy="647975"/>
+              </a:xfrm>
+              <a:custGeom>
+                <a:avLst/>
+                <a:gdLst/>
+                <a:ahLst/>
+                <a:cxnLst/>
+                <a:rect l="l" t="t" r="r" b="b"/>
+                <a:pathLst>
+                  <a:path w="25952" h="25919" fill="none" extrusionOk="0">
+                    <a:moveTo>
+                      <a:pt x="1" y="25919"/>
+                    </a:moveTo>
+                    <a:lnTo>
+                      <a:pt x="25952" y="0"/>
+                    </a:lnTo>
+                  </a:path>
+                </a:pathLst>
+              </a:custGeom>
+              <a:noFill/>
+              <a:ln w="19050" cap="rnd" cmpd="sng">
+                <a:solidFill>
+                  <a:schemeClr val="accent1"/>
+                </a:solidFill>
+                <a:prstDash val="solid"/>
+                <a:miter lim="32519"/>
+                <a:headEnd type="none" w="sm" len="sm"/>
+                <a:tailEnd type="none" w="sm" len="sm"/>
+              </a:ln>
+            </p:spPr>
+            <p:txBody>
+              <a:bodyPr spcFirstLastPara="1" wrap="square" lIns="91425" tIns="91425" rIns="91425" bIns="91425" anchor="ctr" anchorCtr="0">
+                <a:noAutofit/>
+              </a:bodyPr>
+              <a:lstStyle/>
+              <a:p>
+                <a:pPr marL="0" lvl="0" indent="0" algn="l" rtl="0">
+                  <a:spcBef>
+                    <a:spcPts val="0"/>
+                  </a:spcBef>
+                  <a:spcAft>
+                    <a:spcPts val="0"/>
+                  </a:spcAft>
+                  <a:buNone/>
+                </a:pPr>
+                <a:endParaRPr>
+                  <a:latin typeface="Inter"/>
+                  <a:ea typeface="Inter"/>
+                  <a:cs typeface="Inter"/>
+                  <a:sym typeface="Inter"/>
+                </a:endParaRPr>
+              </a:p>
+            </p:txBody>
+          </p:sp>
+          <p:sp>
+            <p:nvSpPr>
+              <p:cNvPr id="821" name="Google Shape;821;p19"/>
+              <p:cNvSpPr/>
+              <p:nvPr/>
+            </p:nvSpPr>
+            <p:spPr>
+              <a:xfrm>
+                <a:off x="1550275" y="1493275"/>
+                <a:ext cx="834150" cy="834975"/>
+              </a:xfrm>
+              <a:custGeom>
+                <a:avLst/>
+                <a:gdLst/>
+                <a:ahLst/>
+                <a:cxnLst/>
+                <a:rect l="l" t="t" r="r" b="b"/>
+                <a:pathLst>
+                  <a:path w="33366" h="33399" fill="none" extrusionOk="0">
+                    <a:moveTo>
+                      <a:pt x="1" y="33398"/>
+                    </a:moveTo>
+                    <a:lnTo>
+                      <a:pt x="33366" y="1"/>
+                    </a:lnTo>
+                  </a:path>
+                </a:pathLst>
+              </a:custGeom>
+              <a:noFill/>
+              <a:ln w="19050" cap="rnd" cmpd="sng">
+                <a:solidFill>
+                  <a:schemeClr val="accent1"/>
+                </a:solidFill>
+                <a:prstDash val="solid"/>
+                <a:miter lim="32519"/>
+                <a:headEnd type="none" w="sm" len="sm"/>
+                <a:tailEnd type="none" w="sm" len="sm"/>
+              </a:ln>
+            </p:spPr>
+            <p:txBody>
+              <a:bodyPr spcFirstLastPara="1" wrap="square" lIns="91425" tIns="91425" rIns="91425" bIns="91425" anchor="ctr" anchorCtr="0">
+                <a:noAutofit/>
+              </a:bodyPr>
+              <a:lstStyle/>
+              <a:p>
+                <a:pPr marL="0" lvl="0" indent="0" algn="l" rtl="0">
+                  <a:spcBef>
+                    <a:spcPts val="0"/>
+                  </a:spcBef>
+                  <a:spcAft>
+                    <a:spcPts val="0"/>
+                  </a:spcAft>
+                  <a:buNone/>
+                </a:pPr>
+                <a:endParaRPr>
+                  <a:latin typeface="Inter"/>
+                  <a:ea typeface="Inter"/>
+                  <a:cs typeface="Inter"/>
+                  <a:sym typeface="Inter"/>
+                </a:endParaRPr>
+              </a:p>
+            </p:txBody>
+          </p:sp>
+          <p:sp>
+            <p:nvSpPr>
+              <p:cNvPr id="822" name="Google Shape;822;p19"/>
+              <p:cNvSpPr/>
+              <p:nvPr/>
+            </p:nvSpPr>
+            <p:spPr>
+              <a:xfrm>
+                <a:off x="1571425" y="1514425"/>
+                <a:ext cx="957725" cy="958525"/>
+              </a:xfrm>
+              <a:custGeom>
+                <a:avLst/>
+                <a:gdLst/>
+                <a:ahLst/>
+                <a:cxnLst/>
+                <a:rect l="l" t="t" r="r" b="b"/>
+                <a:pathLst>
+                  <a:path w="38309" h="38341" fill="none" extrusionOk="0">
+                    <a:moveTo>
+                      <a:pt x="0" y="38341"/>
+                    </a:moveTo>
+                    <a:lnTo>
+                      <a:pt x="38308" y="0"/>
+                    </a:lnTo>
+                  </a:path>
+                </a:pathLst>
+              </a:custGeom>
+              <a:noFill/>
+              <a:ln w="19050" cap="rnd" cmpd="sng">
+                <a:solidFill>
+                  <a:schemeClr val="accent1"/>
+                </a:solidFill>
+                <a:prstDash val="solid"/>
+                <a:miter lim="32519"/>
+                <a:headEnd type="none" w="sm" len="sm"/>
+                <a:tailEnd type="none" w="sm" len="sm"/>
+              </a:ln>
+            </p:spPr>
+            <p:txBody>
+              <a:bodyPr spcFirstLastPara="1" wrap="square" lIns="91425" tIns="91425" rIns="91425" bIns="91425" anchor="ctr" anchorCtr="0">
+                <a:noAutofit/>
+              </a:bodyPr>
+              <a:lstStyle/>
+              <a:p>
+                <a:pPr marL="0" lvl="0" indent="0" algn="l" rtl="0">
+                  <a:spcBef>
+                    <a:spcPts val="0"/>
+                  </a:spcBef>
+                  <a:spcAft>
+                    <a:spcPts val="0"/>
+                  </a:spcAft>
+                  <a:buNone/>
+                </a:pPr>
+                <a:endParaRPr>
+                  <a:latin typeface="Inter"/>
+                  <a:ea typeface="Inter"/>
+                  <a:cs typeface="Inter"/>
+                  <a:sym typeface="Inter"/>
+                </a:endParaRPr>
+              </a:p>
+            </p:txBody>
+          </p:sp>
+          <p:sp>
+            <p:nvSpPr>
+              <p:cNvPr id="823" name="Google Shape;823;p19"/>
+              <p:cNvSpPr/>
+              <p:nvPr/>
+            </p:nvSpPr>
+            <p:spPr>
+              <a:xfrm>
+                <a:off x="1612875" y="1555875"/>
+                <a:ext cx="1041475" cy="1042275"/>
+              </a:xfrm>
+              <a:custGeom>
+                <a:avLst/>
+                <a:gdLst/>
+                <a:ahLst/>
+                <a:cxnLst/>
+                <a:rect l="l" t="t" r="r" b="b"/>
+                <a:pathLst>
+                  <a:path w="41659" h="41691" fill="none" extrusionOk="0">
+                    <a:moveTo>
+                      <a:pt x="1" y="41691"/>
+                    </a:moveTo>
+                    <a:lnTo>
+                      <a:pt x="41658" y="1"/>
+                    </a:lnTo>
+                  </a:path>
+                </a:pathLst>
+              </a:custGeom>
+              <a:noFill/>
+              <a:ln w="19050" cap="rnd" cmpd="sng">
+                <a:solidFill>
+                  <a:schemeClr val="accent1"/>
+                </a:solidFill>
+                <a:prstDash val="solid"/>
+                <a:miter lim="32519"/>
+                <a:headEnd type="none" w="sm" len="sm"/>
+                <a:tailEnd type="none" w="sm" len="sm"/>
+              </a:ln>
+            </p:spPr>
+            <p:txBody>
+              <a:bodyPr spcFirstLastPara="1" wrap="square" lIns="91425" tIns="91425" rIns="91425" bIns="91425" anchor="ctr" anchorCtr="0">
+                <a:noAutofit/>
+              </a:bodyPr>
+              <a:lstStyle/>
+              <a:p>
+                <a:pPr marL="0" lvl="0" indent="0" algn="l" rtl="0">
+                  <a:spcBef>
+                    <a:spcPts val="0"/>
+                  </a:spcBef>
+                  <a:spcAft>
+                    <a:spcPts val="0"/>
+                  </a:spcAft>
+                  <a:buNone/>
+                </a:pPr>
+                <a:endParaRPr>
+                  <a:latin typeface="Inter"/>
+                  <a:ea typeface="Inter"/>
+                  <a:cs typeface="Inter"/>
+                  <a:sym typeface="Inter"/>
+                </a:endParaRPr>
+              </a:p>
+            </p:txBody>
+          </p:sp>
+          <p:sp>
+            <p:nvSpPr>
+              <p:cNvPr id="824" name="Google Shape;824;p19"/>
+              <p:cNvSpPr/>
+              <p:nvPr/>
+            </p:nvSpPr>
+            <p:spPr>
+              <a:xfrm>
+                <a:off x="1669800" y="1613600"/>
+                <a:ext cx="1093475" cy="1092675"/>
+              </a:xfrm>
+              <a:custGeom>
+                <a:avLst/>
+                <a:gdLst/>
+                <a:ahLst/>
+                <a:cxnLst/>
+                <a:rect l="l" t="t" r="r" b="b"/>
+                <a:pathLst>
+                  <a:path w="43739" h="43707" fill="none" extrusionOk="0">
+                    <a:moveTo>
+                      <a:pt x="0" y="43707"/>
+                    </a:moveTo>
+                    <a:lnTo>
+                      <a:pt x="43739" y="1"/>
+                    </a:lnTo>
+                  </a:path>
+                </a:pathLst>
+              </a:custGeom>
+              <a:noFill/>
+              <a:ln w="19050" cap="rnd" cmpd="sng">
+                <a:solidFill>
+                  <a:schemeClr val="accent1"/>
+                </a:solidFill>
+                <a:prstDash val="solid"/>
+                <a:miter lim="32519"/>
+                <a:headEnd type="none" w="sm" len="sm"/>
+                <a:tailEnd type="none" w="sm" len="sm"/>
+              </a:ln>
+            </p:spPr>
+            <p:txBody>
+              <a:bodyPr spcFirstLastPara="1" wrap="square" lIns="91425" tIns="91425" rIns="91425" bIns="91425" anchor="ctr" anchorCtr="0">
+                <a:noAutofit/>
+              </a:bodyPr>
+              <a:lstStyle/>
+              <a:p>
+                <a:pPr marL="0" lvl="0" indent="0" algn="l" rtl="0">
+                  <a:spcBef>
+                    <a:spcPts val="0"/>
+                  </a:spcBef>
+                  <a:spcAft>
+                    <a:spcPts val="0"/>
+                  </a:spcAft>
+                  <a:buNone/>
+                </a:pPr>
+                <a:endParaRPr>
+                  <a:latin typeface="Inter"/>
+                  <a:ea typeface="Inter"/>
+                  <a:cs typeface="Inter"/>
+                  <a:sym typeface="Inter"/>
+                </a:endParaRPr>
+              </a:p>
+            </p:txBody>
+          </p:sp>
+          <p:sp>
+            <p:nvSpPr>
+              <p:cNvPr id="825" name="Google Shape;825;p19"/>
+              <p:cNvSpPr/>
+              <p:nvPr/>
+            </p:nvSpPr>
+            <p:spPr>
+              <a:xfrm>
+                <a:off x="1724445" y="1684323"/>
+                <a:ext cx="1133953" cy="1137555"/>
+              </a:xfrm>
+              <a:custGeom>
+                <a:avLst/>
+                <a:gdLst/>
+                <a:ahLst/>
+                <a:cxnLst/>
+                <a:rect l="l" t="t" r="r" b="b"/>
+                <a:pathLst>
+                  <a:path w="75837" h="75837" fill="none" extrusionOk="0">
+                    <a:moveTo>
+                      <a:pt x="1" y="75836"/>
+                    </a:moveTo>
+                    <a:lnTo>
+                      <a:pt x="75837" y="1"/>
+                    </a:lnTo>
+                  </a:path>
+                </a:pathLst>
+              </a:custGeom>
+              <a:noFill/>
+              <a:ln w="19050" cap="rnd" cmpd="sng">
+                <a:solidFill>
+                  <a:schemeClr val="accent1"/>
+                </a:solidFill>
+                <a:prstDash val="solid"/>
+                <a:miter lim="32519"/>
+                <a:headEnd type="none" w="sm" len="sm"/>
+                <a:tailEnd type="none" w="sm" len="sm"/>
+              </a:ln>
+            </p:spPr>
+            <p:txBody>
+              <a:bodyPr spcFirstLastPara="1" wrap="square" lIns="91425" tIns="91425" rIns="91425" bIns="91425" anchor="ctr" anchorCtr="0">
+                <a:noAutofit/>
+              </a:bodyPr>
+              <a:lstStyle/>
+              <a:p>
+                <a:pPr marL="0" lvl="0" indent="0" algn="l" rtl="0">
+                  <a:spcBef>
+                    <a:spcPts val="0"/>
+                  </a:spcBef>
+                  <a:spcAft>
+                    <a:spcPts val="0"/>
+                  </a:spcAft>
+                  <a:buNone/>
+                </a:pPr>
+                <a:endParaRPr>
+                  <a:latin typeface="Inter"/>
+                  <a:ea typeface="Inter"/>
+                  <a:cs typeface="Inter"/>
+                  <a:sym typeface="Inter"/>
+                </a:endParaRPr>
+              </a:p>
+            </p:txBody>
+          </p:sp>
+          <p:sp>
+            <p:nvSpPr>
+              <p:cNvPr id="826" name="Google Shape;826;p19"/>
+              <p:cNvSpPr/>
+              <p:nvPr/>
+            </p:nvSpPr>
+            <p:spPr>
+              <a:xfrm>
+                <a:off x="1787327" y="1767256"/>
+                <a:ext cx="1154741" cy="1144949"/>
+              </a:xfrm>
+              <a:custGeom>
+                <a:avLst/>
+                <a:gdLst/>
+                <a:ahLst/>
+                <a:cxnLst/>
+                <a:rect l="l" t="t" r="r" b="b"/>
+                <a:pathLst>
+                  <a:path w="75870" h="75837" fill="none" extrusionOk="0">
+                    <a:moveTo>
+                      <a:pt x="1" y="75836"/>
+                    </a:moveTo>
+                    <a:lnTo>
+                      <a:pt x="75869" y="1"/>
+                    </a:lnTo>
+                  </a:path>
+                </a:pathLst>
+              </a:custGeom>
+              <a:noFill/>
+              <a:ln w="19050" cap="rnd" cmpd="sng">
+                <a:solidFill>
+                  <a:schemeClr val="accent1"/>
+                </a:solidFill>
+                <a:prstDash val="solid"/>
+                <a:miter lim="32519"/>
+                <a:headEnd type="none" w="sm" len="sm"/>
+                <a:tailEnd type="none" w="sm" len="sm"/>
+              </a:ln>
+            </p:spPr>
+            <p:txBody>
+              <a:bodyPr spcFirstLastPara="1" wrap="square" lIns="91425" tIns="91425" rIns="91425" bIns="91425" anchor="ctr" anchorCtr="0">
+                <a:noAutofit/>
+              </a:bodyPr>
+              <a:lstStyle/>
+              <a:p>
+                <a:pPr marL="0" lvl="0" indent="0" algn="l" rtl="0">
+                  <a:spcBef>
+                    <a:spcPts val="0"/>
+                  </a:spcBef>
+                  <a:spcAft>
+                    <a:spcPts val="0"/>
+                  </a:spcAft>
+                  <a:buNone/>
+                </a:pPr>
+                <a:endParaRPr>
+                  <a:latin typeface="Inter"/>
+                  <a:ea typeface="Inter"/>
+                  <a:cs typeface="Inter"/>
+                  <a:sym typeface="Inter"/>
+                </a:endParaRPr>
+              </a:p>
+            </p:txBody>
+          </p:sp>
+          <p:sp>
+            <p:nvSpPr>
+              <p:cNvPr id="827" name="Google Shape;827;p19"/>
+              <p:cNvSpPr/>
+              <p:nvPr/>
+            </p:nvSpPr>
+            <p:spPr>
+              <a:xfrm>
+                <a:off x="1898130" y="1863198"/>
+                <a:ext cx="1114002" cy="1086690"/>
+              </a:xfrm>
+              <a:custGeom>
+                <a:avLst/>
+                <a:gdLst/>
+                <a:ahLst/>
+                <a:cxnLst/>
+                <a:rect l="l" t="t" r="r" b="b"/>
+                <a:pathLst>
+                  <a:path w="74828" h="74828" fill="none" extrusionOk="0">
+                    <a:moveTo>
+                      <a:pt x="0" y="74828"/>
+                    </a:moveTo>
+                    <a:lnTo>
+                      <a:pt x="74828" y="0"/>
+                    </a:lnTo>
+                  </a:path>
+                </a:pathLst>
+              </a:custGeom>
+              <a:noFill/>
+              <a:ln w="19050" cap="rnd" cmpd="sng">
+                <a:solidFill>
+                  <a:schemeClr val="accent1"/>
+                </a:solidFill>
+                <a:prstDash val="solid"/>
+                <a:miter lim="32519"/>
+                <a:headEnd type="none" w="sm" len="sm"/>
+                <a:tailEnd type="none" w="sm" len="sm"/>
+              </a:ln>
+            </p:spPr>
+            <p:txBody>
+              <a:bodyPr spcFirstLastPara="1" wrap="square" lIns="91425" tIns="91425" rIns="91425" bIns="91425" anchor="ctr" anchorCtr="0">
+                <a:noAutofit/>
+              </a:bodyPr>
+              <a:lstStyle/>
+              <a:p>
+                <a:pPr marL="0" lvl="0" indent="0" algn="l" rtl="0">
+                  <a:spcBef>
+                    <a:spcPts val="0"/>
+                  </a:spcBef>
+                  <a:spcAft>
+                    <a:spcPts val="0"/>
+                  </a:spcAft>
+                  <a:buNone/>
+                </a:pPr>
+                <a:endParaRPr>
+                  <a:latin typeface="Inter"/>
+                  <a:ea typeface="Inter"/>
+                  <a:cs typeface="Inter"/>
+                  <a:sym typeface="Inter"/>
+                </a:endParaRPr>
+              </a:p>
+            </p:txBody>
+          </p:sp>
+          <p:sp>
+            <p:nvSpPr>
+              <p:cNvPr id="828" name="Google Shape;828;p19"/>
+              <p:cNvSpPr/>
+              <p:nvPr/>
+            </p:nvSpPr>
+            <p:spPr>
+              <a:xfrm>
+                <a:off x="2027500" y="1971325"/>
+                <a:ext cx="1042275" cy="1042275"/>
+              </a:xfrm>
+              <a:custGeom>
+                <a:avLst/>
+                <a:gdLst/>
+                <a:ahLst/>
+                <a:cxnLst/>
+                <a:rect l="l" t="t" r="r" b="b"/>
+                <a:pathLst>
+                  <a:path w="41691" h="41691" fill="none" extrusionOk="0">
+                    <a:moveTo>
+                      <a:pt x="41691" y="0"/>
+                    </a:moveTo>
+                    <a:lnTo>
+                      <a:pt x="1" y="41690"/>
+                    </a:lnTo>
+                  </a:path>
+                </a:pathLst>
+              </a:custGeom>
+              <a:noFill/>
+              <a:ln w="19050" cap="rnd" cmpd="sng">
+                <a:solidFill>
+                  <a:schemeClr val="accent1"/>
+                </a:solidFill>
+                <a:prstDash val="solid"/>
+                <a:miter lim="32519"/>
+                <a:headEnd type="none" w="sm" len="sm"/>
+                <a:tailEnd type="none" w="sm" len="sm"/>
+              </a:ln>
+            </p:spPr>
+            <p:txBody>
+              <a:bodyPr spcFirstLastPara="1" wrap="square" lIns="91425" tIns="91425" rIns="91425" bIns="91425" anchor="ctr" anchorCtr="0">
+                <a:noAutofit/>
+              </a:bodyPr>
+              <a:lstStyle/>
+              <a:p>
+                <a:pPr marL="0" lvl="0" indent="0" algn="l" rtl="0">
+                  <a:spcBef>
+                    <a:spcPts val="0"/>
+                  </a:spcBef>
+                  <a:spcAft>
+                    <a:spcPts val="0"/>
+                  </a:spcAft>
+                  <a:buNone/>
+                </a:pPr>
+                <a:endParaRPr>
+                  <a:latin typeface="Inter"/>
+                  <a:ea typeface="Inter"/>
+                  <a:cs typeface="Inter"/>
+                  <a:sym typeface="Inter"/>
+                </a:endParaRPr>
+              </a:p>
+            </p:txBody>
+          </p:sp>
+          <p:sp>
+            <p:nvSpPr>
+              <p:cNvPr id="829" name="Google Shape;829;p19"/>
+              <p:cNvSpPr/>
+              <p:nvPr/>
+            </p:nvSpPr>
+            <p:spPr>
+              <a:xfrm>
+                <a:off x="2152700" y="2096525"/>
+                <a:ext cx="958550" cy="958525"/>
+              </a:xfrm>
+              <a:custGeom>
+                <a:avLst/>
+                <a:gdLst/>
+                <a:ahLst/>
+                <a:cxnLst/>
+                <a:rect l="l" t="t" r="r" b="b"/>
+                <a:pathLst>
+                  <a:path w="38342" h="38341" fill="none" extrusionOk="0">
+                    <a:moveTo>
+                      <a:pt x="38341" y="0"/>
+                    </a:moveTo>
+                    <a:lnTo>
+                      <a:pt x="1" y="38341"/>
+                    </a:lnTo>
+                  </a:path>
+                </a:pathLst>
+              </a:custGeom>
+              <a:noFill/>
+              <a:ln w="19050" cap="rnd" cmpd="sng">
+                <a:solidFill>
+                  <a:schemeClr val="accent1"/>
+                </a:solidFill>
+                <a:prstDash val="solid"/>
+                <a:miter lim="32519"/>
+                <a:headEnd type="none" w="sm" len="sm"/>
+                <a:tailEnd type="none" w="sm" len="sm"/>
+              </a:ln>
+            </p:spPr>
+            <p:txBody>
+              <a:bodyPr spcFirstLastPara="1" wrap="square" lIns="91425" tIns="91425" rIns="91425" bIns="91425" anchor="ctr" anchorCtr="0">
+                <a:noAutofit/>
+              </a:bodyPr>
+              <a:lstStyle/>
+              <a:p>
+                <a:pPr marL="0" lvl="0" indent="0" algn="l" rtl="0">
+                  <a:spcBef>
+                    <a:spcPts val="0"/>
+                  </a:spcBef>
+                  <a:spcAft>
+                    <a:spcPts val="0"/>
+                  </a:spcAft>
+                  <a:buNone/>
+                </a:pPr>
+                <a:endParaRPr>
+                  <a:latin typeface="Inter"/>
+                  <a:ea typeface="Inter"/>
+                  <a:cs typeface="Inter"/>
+                  <a:sym typeface="Inter"/>
+                </a:endParaRPr>
+              </a:p>
+            </p:txBody>
+          </p:sp>
+          <p:sp>
+            <p:nvSpPr>
+              <p:cNvPr id="830" name="Google Shape;830;p19"/>
+              <p:cNvSpPr/>
+              <p:nvPr/>
+            </p:nvSpPr>
+            <p:spPr>
+              <a:xfrm>
+                <a:off x="2298225" y="2241225"/>
+                <a:ext cx="834150" cy="834975"/>
+              </a:xfrm>
+              <a:custGeom>
+                <a:avLst/>
+                <a:gdLst/>
+                <a:ahLst/>
+                <a:cxnLst/>
+                <a:rect l="l" t="t" r="r" b="b"/>
+                <a:pathLst>
+                  <a:path w="33366" h="33399" fill="none" extrusionOk="0">
+                    <a:moveTo>
+                      <a:pt x="33366" y="1"/>
+                    </a:moveTo>
+                    <a:lnTo>
+                      <a:pt x="1" y="33398"/>
+                    </a:lnTo>
+                  </a:path>
+                </a:pathLst>
+              </a:custGeom>
+              <a:noFill/>
+              <a:ln w="19050" cap="rnd" cmpd="sng">
+                <a:solidFill>
+                  <a:schemeClr val="accent1"/>
+                </a:solidFill>
+                <a:prstDash val="solid"/>
+                <a:miter lim="32519"/>
+                <a:headEnd type="none" w="sm" len="sm"/>
+                <a:tailEnd type="none" w="sm" len="sm"/>
+              </a:ln>
+            </p:spPr>
+            <p:txBody>
+              <a:bodyPr spcFirstLastPara="1" wrap="square" lIns="91425" tIns="91425" rIns="91425" bIns="91425" anchor="ctr" anchorCtr="0">
+                <a:noAutofit/>
+              </a:bodyPr>
+              <a:lstStyle/>
+              <a:p>
+                <a:pPr marL="0" lvl="0" indent="0" algn="l" rtl="0">
+                  <a:spcBef>
+                    <a:spcPts val="0"/>
+                  </a:spcBef>
+                  <a:spcAft>
+                    <a:spcPts val="0"/>
+                  </a:spcAft>
+                  <a:buNone/>
+                </a:pPr>
+                <a:endParaRPr>
+                  <a:latin typeface="Inter"/>
+                  <a:ea typeface="Inter"/>
+                  <a:cs typeface="Inter"/>
+                  <a:sym typeface="Inter"/>
+                </a:endParaRPr>
+              </a:p>
+            </p:txBody>
+          </p:sp>
+          <p:sp>
+            <p:nvSpPr>
+              <p:cNvPr id="831" name="Google Shape;831;p19"/>
+              <p:cNvSpPr/>
+              <p:nvPr/>
+            </p:nvSpPr>
+            <p:spPr>
+              <a:xfrm>
+                <a:off x="2473825" y="2417650"/>
+                <a:ext cx="648800" cy="648800"/>
+              </a:xfrm>
+              <a:custGeom>
+                <a:avLst/>
+                <a:gdLst/>
+                <a:ahLst/>
+                <a:cxnLst/>
+                <a:rect l="l" t="t" r="r" b="b"/>
+                <a:pathLst>
+                  <a:path w="25952" h="25952" fill="none" extrusionOk="0">
+                    <a:moveTo>
+                      <a:pt x="25952" y="0"/>
+                    </a:moveTo>
+                    <a:lnTo>
+                      <a:pt x="1" y="25951"/>
+                    </a:lnTo>
+                  </a:path>
+                </a:pathLst>
+              </a:custGeom>
+              <a:noFill/>
+              <a:ln w="19050" cap="rnd" cmpd="sng">
+                <a:solidFill>
+                  <a:schemeClr val="accent1"/>
+                </a:solidFill>
+                <a:prstDash val="solid"/>
+                <a:miter lim="32519"/>
+                <a:headEnd type="none" w="sm" len="sm"/>
+                <a:tailEnd type="none" w="sm" len="sm"/>
+              </a:ln>
+            </p:spPr>
+            <p:txBody>
+              <a:bodyPr spcFirstLastPara="1" wrap="square" lIns="91425" tIns="91425" rIns="91425" bIns="91425" anchor="ctr" anchorCtr="0">
+                <a:noAutofit/>
+              </a:bodyPr>
+              <a:lstStyle/>
+              <a:p>
+                <a:pPr marL="0" lvl="0" indent="0" algn="l" rtl="0">
+                  <a:spcBef>
+                    <a:spcPts val="0"/>
+                  </a:spcBef>
+                  <a:spcAft>
+                    <a:spcPts val="0"/>
+                  </a:spcAft>
+                  <a:buNone/>
+                </a:pPr>
+                <a:endParaRPr>
+                  <a:latin typeface="Inter"/>
+                  <a:ea typeface="Inter"/>
+                  <a:cs typeface="Inter"/>
+                  <a:sym typeface="Inter"/>
+                </a:endParaRPr>
+              </a:p>
+            </p:txBody>
+          </p:sp>
+          <p:sp>
+            <p:nvSpPr>
+              <p:cNvPr id="832" name="Google Shape;832;p19"/>
+              <p:cNvSpPr/>
+              <p:nvPr/>
+            </p:nvSpPr>
+            <p:spPr>
+              <a:xfrm>
+                <a:off x="2730750" y="2674550"/>
+                <a:ext cx="300825" cy="300825"/>
+              </a:xfrm>
+              <a:custGeom>
+                <a:avLst/>
+                <a:gdLst/>
+                <a:ahLst/>
+                <a:cxnLst/>
+                <a:rect l="l" t="t" r="r" b="b"/>
+                <a:pathLst>
+                  <a:path w="12033" h="12033" fill="none" extrusionOk="0">
+                    <a:moveTo>
+                      <a:pt x="12032" y="1"/>
+                    </a:moveTo>
+                    <a:lnTo>
+                      <a:pt x="0" y="12033"/>
+                    </a:lnTo>
+                  </a:path>
+                </a:pathLst>
+              </a:custGeom>
+              <a:noFill/>
+              <a:ln w="19050" cap="rnd" cmpd="sng">
+                <a:solidFill>
+                  <a:schemeClr val="accent1"/>
+                </a:solidFill>
+                <a:prstDash val="solid"/>
+                <a:miter lim="32519"/>
+                <a:headEnd type="none" w="sm" len="sm"/>
+                <a:tailEnd type="none" w="sm" len="sm"/>
+              </a:ln>
+            </p:spPr>
+            <p:txBody>
+              <a:bodyPr spcFirstLastPara="1" wrap="square" lIns="91425" tIns="91425" rIns="91425" bIns="91425" anchor="ctr" anchorCtr="0">
+                <a:noAutofit/>
+              </a:bodyPr>
+              <a:lstStyle/>
+              <a:p>
+                <a:pPr marL="0" lvl="0" indent="0" algn="l" rtl="0">
+                  <a:spcBef>
+                    <a:spcPts val="0"/>
+                  </a:spcBef>
+                  <a:spcAft>
+                    <a:spcPts val="0"/>
+                  </a:spcAft>
+                  <a:buNone/>
+                </a:pPr>
+                <a:endParaRPr>
+                  <a:latin typeface="Inter"/>
+                  <a:ea typeface="Inter"/>
+                  <a:cs typeface="Inter"/>
+                  <a:sym typeface="Inter"/>
+                </a:endParaRPr>
+              </a:p>
+            </p:txBody>
+          </p:sp>
+        </p:grpSp>
+      </p:grpSp>
+    </p:spTree>
+    <p:extLst>
+      <p:ext uri="{BB962C8B-B14F-4D97-AF65-F5344CB8AC3E}">
+        <p14:creationId xmlns:p14="http://schemas.microsoft.com/office/powerpoint/2010/main" val="2474080787"/>
+      </p:ext>
+    </p:extLst>
   </p:cSld>
   <p:clrMapOvr>
     <a:masterClrMapping/>
@@ -27906,6 +30088,7 @@
     <p:sldLayoutId id="2147483685" r:id="rId7"/>
     <p:sldLayoutId id="2147483686" r:id="rId8"/>
     <p:sldLayoutId id="2147483687" r:id="rId9"/>
+    <p:sldLayoutId id="2147483688" r:id="rId10"/>
   </p:sldLayoutIdLst>
   <p:hf sldNum="0" hdr="0" ftr="0" dt="0"/>
   <p:txStyles>
@@ -46562,6 +48745,463 @@
   <p:cSld>
     <p:spTree>
       <p:nvGrpSpPr>
+        <p:cNvPr id="1" name="Shape 2436"/>
+        <p:cNvGrpSpPr/>
+        <p:nvPr/>
+      </p:nvGrpSpPr>
+      <p:grpSpPr>
+        <a:xfrm>
+          <a:off x="0" y="0"/>
+          <a:ext cx="0" cy="0"/>
+          <a:chOff x="0" y="0"/>
+          <a:chExt cx="0" cy="0"/>
+        </a:xfrm>
+      </p:grpSpPr>
+      <p:sp>
+        <p:nvSpPr>
+          <p:cNvPr id="2437" name="Google Shape;2437;p65"/>
+          <p:cNvSpPr/>
+          <p:nvPr/>
+        </p:nvSpPr>
+        <p:spPr>
+          <a:xfrm>
+            <a:off x="3729950" y="1367875"/>
+            <a:ext cx="4307100" cy="2820600"/>
+          </a:xfrm>
+          <a:prstGeom prst="roundRect">
+            <a:avLst>
+              <a:gd name="adj" fmla="val 9247"/>
+            </a:avLst>
+          </a:prstGeom>
+          <a:solidFill>
+            <a:schemeClr val="accent1"/>
+          </a:solidFill>
+          <a:ln>
+            <a:noFill/>
+          </a:ln>
+        </p:spPr>
+        <p:txBody>
+          <a:bodyPr spcFirstLastPara="1" wrap="square" lIns="91425" tIns="91425" rIns="91425" bIns="91425" anchor="ctr" anchorCtr="0">
+            <a:noAutofit/>
+          </a:bodyPr>
+          <a:lstStyle/>
+          <a:p>
+            <a:pPr marL="0" lvl="0" indent="0" algn="l" rtl="0">
+              <a:spcBef>
+                <a:spcPts val="0"/>
+              </a:spcBef>
+              <a:spcAft>
+                <a:spcPts val="0"/>
+              </a:spcAft>
+              <a:buNone/>
+            </a:pPr>
+            <a:endParaRPr/>
+          </a:p>
+        </p:txBody>
+      </p:sp>
+      <p:sp>
+        <p:nvSpPr>
+          <p:cNvPr id="2438" name="Google Shape;2438;p65"/>
+          <p:cNvSpPr txBox="1">
+            <a:spLocks noGrp="1"/>
+          </p:cNvSpPr>
+          <p:nvPr>
+            <p:ph type="title"/>
+          </p:nvPr>
+        </p:nvSpPr>
+        <p:spPr>
+          <a:xfrm>
+            <a:off x="713225" y="520925"/>
+            <a:ext cx="7717500" cy="708000"/>
+          </a:xfrm>
+          <a:prstGeom prst="rect">
+            <a:avLst/>
+          </a:prstGeom>
+        </p:spPr>
+        <p:txBody>
+          <a:bodyPr spcFirstLastPara="1" wrap="square" lIns="91425" tIns="91425" rIns="91425" bIns="91425" anchor="t" anchorCtr="0">
+            <a:noAutofit/>
+          </a:bodyPr>
+          <a:lstStyle/>
+          <a:p>
+            <a:pPr marL="0" lvl="0" indent="0" algn="ctr" rtl="0">
+              <a:spcBef>
+                <a:spcPts val="0"/>
+              </a:spcBef>
+              <a:spcAft>
+                <a:spcPts val="0"/>
+              </a:spcAft>
+              <a:buNone/>
+            </a:pPr>
+            <a:r>
+              <a:rPr lang="en" dirty="0"/>
+              <a:t>PÚBLICO-ALVO</a:t>
+            </a:r>
+            <a:endParaRPr dirty="0"/>
+          </a:p>
+        </p:txBody>
+      </p:sp>
+      <p:sp>
+        <p:nvSpPr>
+          <p:cNvPr id="2439" name="Google Shape;2439;p65"/>
+          <p:cNvSpPr txBox="1"/>
+          <p:nvPr/>
+        </p:nvSpPr>
+        <p:spPr>
+          <a:xfrm>
+            <a:off x="1010675" y="1214225"/>
+            <a:ext cx="2136300" cy="554100"/>
+          </a:xfrm>
+          <a:prstGeom prst="rect">
+            <a:avLst/>
+          </a:prstGeom>
+          <a:noFill/>
+          <a:ln>
+            <a:noFill/>
+          </a:ln>
+        </p:spPr>
+        <p:txBody>
+          <a:bodyPr spcFirstLastPara="1" wrap="square" lIns="91425" tIns="91425" rIns="91425" bIns="91425" anchor="t" anchorCtr="0">
+            <a:noAutofit/>
+          </a:bodyPr>
+          <a:lstStyle/>
+          <a:p>
+            <a:pPr marL="0" lvl="0" indent="0" algn="l" rtl="0">
+              <a:spcBef>
+                <a:spcPts val="0"/>
+              </a:spcBef>
+              <a:spcAft>
+                <a:spcPts val="0"/>
+              </a:spcAft>
+              <a:buNone/>
+            </a:pPr>
+            <a:r>
+              <a:rPr lang="en" sz="2200" dirty="0">
+                <a:solidFill>
+                  <a:schemeClr val="dk1"/>
+                </a:solidFill>
+                <a:latin typeface="Manrope SemiBold"/>
+                <a:ea typeface="Manrope SemiBold"/>
+                <a:cs typeface="Manrope SemiBold"/>
+                <a:sym typeface="Manrope SemiBold"/>
+              </a:rPr>
+              <a:t>Quem?</a:t>
+            </a:r>
+            <a:endParaRPr sz="2200" dirty="0">
+              <a:solidFill>
+                <a:schemeClr val="dk1"/>
+              </a:solidFill>
+              <a:latin typeface="Manrope SemiBold"/>
+              <a:ea typeface="Manrope SemiBold"/>
+              <a:cs typeface="Manrope SemiBold"/>
+              <a:sym typeface="Manrope SemiBold"/>
+            </a:endParaRPr>
+          </a:p>
+        </p:txBody>
+      </p:sp>
+      <p:sp>
+        <p:nvSpPr>
+          <p:cNvPr id="2440" name="Google Shape;2440;p65"/>
+          <p:cNvSpPr txBox="1"/>
+          <p:nvPr/>
+        </p:nvSpPr>
+        <p:spPr>
+          <a:xfrm>
+            <a:off x="1010675" y="1612824"/>
+            <a:ext cx="2136300" cy="772235"/>
+          </a:xfrm>
+          <a:prstGeom prst="rect">
+            <a:avLst/>
+          </a:prstGeom>
+          <a:noFill/>
+          <a:ln>
+            <a:noFill/>
+          </a:ln>
+        </p:spPr>
+        <p:txBody>
+          <a:bodyPr spcFirstLastPara="1" wrap="square" lIns="91425" tIns="91425" rIns="91425" bIns="91425" anchor="t" anchorCtr="0">
+            <a:noAutofit/>
+          </a:bodyPr>
+          <a:lstStyle/>
+          <a:p>
+            <a:pPr marL="0" lvl="0" indent="0" algn="l" rtl="0">
+              <a:spcBef>
+                <a:spcPts val="0"/>
+              </a:spcBef>
+              <a:spcAft>
+                <a:spcPts val="0"/>
+              </a:spcAft>
+              <a:buNone/>
+            </a:pPr>
+            <a:r>
+              <a:rPr lang="en" sz="1200" dirty="0">
+                <a:solidFill>
+                  <a:schemeClr val="dk1"/>
+                </a:solidFill>
+                <a:latin typeface="Inter"/>
+                <a:ea typeface="Inter"/>
+                <a:cs typeface="Inter"/>
+                <a:sym typeface="Inter"/>
+              </a:rPr>
+              <a:t>Empresas que trabalham com venda de produtos na internet.</a:t>
+            </a:r>
+            <a:endParaRPr sz="1200" dirty="0">
+              <a:solidFill>
+                <a:schemeClr val="dk1"/>
+              </a:solidFill>
+              <a:latin typeface="Inter"/>
+              <a:ea typeface="Inter"/>
+              <a:cs typeface="Inter"/>
+              <a:sym typeface="Inter"/>
+            </a:endParaRPr>
+          </a:p>
+        </p:txBody>
+      </p:sp>
+      <p:sp>
+        <p:nvSpPr>
+          <p:cNvPr id="2441" name="Google Shape;2441;p65"/>
+          <p:cNvSpPr/>
+          <p:nvPr/>
+        </p:nvSpPr>
+        <p:spPr>
+          <a:xfrm>
+            <a:off x="713225" y="1361225"/>
+            <a:ext cx="260100" cy="260100"/>
+          </a:xfrm>
+          <a:prstGeom prst="rect">
+            <a:avLst/>
+          </a:prstGeom>
+          <a:solidFill>
+            <a:schemeClr val="dk2"/>
+          </a:solidFill>
+          <a:ln>
+            <a:noFill/>
+          </a:ln>
+        </p:spPr>
+        <p:txBody>
+          <a:bodyPr spcFirstLastPara="1" wrap="square" lIns="91425" tIns="91425" rIns="91425" bIns="91425" anchor="ctr" anchorCtr="0">
+            <a:noAutofit/>
+          </a:bodyPr>
+          <a:lstStyle/>
+          <a:p>
+            <a:pPr marL="0" lvl="0" indent="0" algn="l" rtl="0">
+              <a:spcBef>
+                <a:spcPts val="0"/>
+              </a:spcBef>
+              <a:spcAft>
+                <a:spcPts val="0"/>
+              </a:spcAft>
+              <a:buNone/>
+            </a:pPr>
+            <a:endParaRPr/>
+          </a:p>
+        </p:txBody>
+      </p:sp>
+      <p:sp>
+        <p:nvSpPr>
+          <p:cNvPr id="2442" name="Google Shape;2442;p65"/>
+          <p:cNvSpPr txBox="1"/>
+          <p:nvPr/>
+        </p:nvSpPr>
+        <p:spPr>
+          <a:xfrm>
+            <a:off x="1010675" y="2544975"/>
+            <a:ext cx="2136300" cy="554100"/>
+          </a:xfrm>
+          <a:prstGeom prst="rect">
+            <a:avLst/>
+          </a:prstGeom>
+          <a:noFill/>
+          <a:ln>
+            <a:noFill/>
+          </a:ln>
+        </p:spPr>
+        <p:txBody>
+          <a:bodyPr spcFirstLastPara="1" wrap="square" lIns="91425" tIns="91425" rIns="91425" bIns="91425" anchor="t" anchorCtr="0">
+            <a:noAutofit/>
+          </a:bodyPr>
+          <a:lstStyle/>
+          <a:p>
+            <a:pPr marL="0" lvl="0" indent="0" algn="l" rtl="0">
+              <a:spcBef>
+                <a:spcPts val="0"/>
+              </a:spcBef>
+              <a:spcAft>
+                <a:spcPts val="0"/>
+              </a:spcAft>
+              <a:buNone/>
+            </a:pPr>
+            <a:r>
+              <a:rPr lang="en" sz="2200" dirty="0">
+                <a:solidFill>
+                  <a:schemeClr val="dk1"/>
+                </a:solidFill>
+                <a:latin typeface="Manrope SemiBold"/>
+                <a:ea typeface="Manrope SemiBold"/>
+                <a:cs typeface="Manrope SemiBold"/>
+                <a:sym typeface="Manrope SemiBold"/>
+              </a:rPr>
+              <a:t>Como?</a:t>
+            </a:r>
+            <a:endParaRPr sz="2200" dirty="0">
+              <a:solidFill>
+                <a:schemeClr val="dk1"/>
+              </a:solidFill>
+              <a:latin typeface="Manrope SemiBold"/>
+              <a:ea typeface="Manrope SemiBold"/>
+              <a:cs typeface="Manrope SemiBold"/>
+              <a:sym typeface="Manrope SemiBold"/>
+            </a:endParaRPr>
+          </a:p>
+        </p:txBody>
+      </p:sp>
+      <p:sp>
+        <p:nvSpPr>
+          <p:cNvPr id="2443" name="Google Shape;2443;p65"/>
+          <p:cNvSpPr txBox="1"/>
+          <p:nvPr/>
+        </p:nvSpPr>
+        <p:spPr>
+          <a:xfrm>
+            <a:off x="1010674" y="2958814"/>
+            <a:ext cx="2235445" cy="1087405"/>
+          </a:xfrm>
+          <a:prstGeom prst="rect">
+            <a:avLst/>
+          </a:prstGeom>
+          <a:noFill/>
+          <a:ln>
+            <a:noFill/>
+          </a:ln>
+        </p:spPr>
+        <p:txBody>
+          <a:bodyPr spcFirstLastPara="1" wrap="square" lIns="91425" tIns="91425" rIns="91425" bIns="91425" anchor="t" anchorCtr="0">
+            <a:noAutofit/>
+          </a:bodyPr>
+          <a:lstStyle/>
+          <a:p>
+            <a:pPr marL="0" lvl="0" indent="0" algn="l" rtl="0">
+              <a:spcBef>
+                <a:spcPts val="0"/>
+              </a:spcBef>
+              <a:spcAft>
+                <a:spcPts val="0"/>
+              </a:spcAft>
+              <a:buNone/>
+            </a:pPr>
+            <a:r>
+              <a:rPr lang="en" sz="1200" dirty="0">
+                <a:solidFill>
+                  <a:schemeClr val="dk1"/>
+                </a:solidFill>
+                <a:latin typeface="Inter"/>
+                <a:ea typeface="Inter"/>
+                <a:cs typeface="Inter"/>
+                <a:sym typeface="Inter"/>
+              </a:rPr>
+              <a:t>Clientes conquistados através da visualização dos resultados, automatização do processo e captação em locais estratégicos.</a:t>
+            </a:r>
+            <a:endParaRPr sz="1200" dirty="0">
+              <a:solidFill>
+                <a:schemeClr val="dk1"/>
+              </a:solidFill>
+              <a:latin typeface="Inter"/>
+              <a:ea typeface="Inter"/>
+              <a:cs typeface="Inter"/>
+              <a:sym typeface="Inter"/>
+            </a:endParaRPr>
+          </a:p>
+        </p:txBody>
+      </p:sp>
+      <p:sp>
+        <p:nvSpPr>
+          <p:cNvPr id="2444" name="Google Shape;2444;p65"/>
+          <p:cNvSpPr/>
+          <p:nvPr/>
+        </p:nvSpPr>
+        <p:spPr>
+          <a:xfrm>
+            <a:off x="713225" y="2653875"/>
+            <a:ext cx="260100" cy="260100"/>
+          </a:xfrm>
+          <a:prstGeom prst="rect">
+            <a:avLst/>
+          </a:prstGeom>
+          <a:solidFill>
+            <a:schemeClr val="accent1"/>
+          </a:solidFill>
+          <a:ln>
+            <a:noFill/>
+          </a:ln>
+        </p:spPr>
+        <p:txBody>
+          <a:bodyPr spcFirstLastPara="1" wrap="square" lIns="91425" tIns="91425" rIns="91425" bIns="91425" anchor="ctr" anchorCtr="0">
+            <a:noAutofit/>
+          </a:bodyPr>
+          <a:lstStyle/>
+          <a:p>
+            <a:pPr marL="0" lvl="0" indent="0" algn="l" rtl="0">
+              <a:spcBef>
+                <a:spcPts val="0"/>
+              </a:spcBef>
+              <a:spcAft>
+                <a:spcPts val="0"/>
+              </a:spcAft>
+              <a:buNone/>
+            </a:pPr>
+            <a:endParaRPr/>
+          </a:p>
+        </p:txBody>
+      </p:sp>
+      <p:pic>
+        <p:nvPicPr>
+          <p:cNvPr id="2449" name="Google Shape;2449;p65" title="Gráfico">
+            <a:hlinkClick r:id="rId3"/>
+          </p:cNvPr>
+          <p:cNvPicPr preferRelativeResize="0"/>
+          <p:nvPr/>
+        </p:nvPicPr>
+        <p:blipFill>
+          <a:blip r:embed="rId4">
+            <a:alphaModFix/>
+          </a:blip>
+          <a:stretch>
+            <a:fillRect/>
+          </a:stretch>
+        </p:blipFill>
+        <p:spPr>
+          <a:xfrm>
+            <a:off x="3933586" y="1578776"/>
+            <a:ext cx="3899824" cy="2409200"/>
+          </a:xfrm>
+          <a:prstGeom prst="rect">
+            <a:avLst/>
+          </a:prstGeom>
+          <a:noFill/>
+          <a:ln w="28575" cap="flat" cmpd="sng">
+            <a:solidFill>
+              <a:schemeClr val="lt2"/>
+            </a:solidFill>
+            <a:prstDash val="solid"/>
+            <a:round/>
+            <a:headEnd type="none" w="sm" len="sm"/>
+            <a:tailEnd type="none" w="sm" len="sm"/>
+          </a:ln>
+        </p:spPr>
+      </p:pic>
+    </p:spTree>
+  </p:cSld>
+  <p:clrMapOvr>
+    <a:masterClrMapping/>
+  </p:clrMapOvr>
+</p:sld>
+</file>
+
+<file path=ppt/slides/slide7.xml><?xml version="1.0" encoding="utf-8"?>
+<p:sld xmlns:a="http://schemas.openxmlformats.org/drawingml/2006/main" xmlns:r="http://schemas.openxmlformats.org/officeDocument/2006/relationships" xmlns:p="http://schemas.openxmlformats.org/presentationml/2006/main">
+  <p:cSld>
+    <p:spTree>
+      <p:nvGrpSpPr>
         <p:cNvPr id="1" name="Shape 2412"/>
         <p:cNvGrpSpPr/>
         <p:nvPr/>

</xml_diff>

<commit_message>
Slide que mostra a análise da concorreência - diretos ou indiretos
</commit_message>
<xml_diff>
--- a/Pitch-SavvyFix.pptx
+++ b/Pitch-SavvyFix.pptx
@@ -5,7 +5,7 @@
     <p:sldMasterId id="2147483683" r:id="rId1"/>
   </p:sldMasterIdLst>
   <p:notesMasterIdLst>
-    <p:notesMasterId r:id="rId9"/>
+    <p:notesMasterId r:id="rId10"/>
   </p:notesMasterIdLst>
   <p:sldIdLst>
     <p:sldId id="256" r:id="rId2"/>
@@ -14,25 +14,31 @@
     <p:sldId id="282" r:id="rId5"/>
     <p:sldId id="269" r:id="rId6"/>
     <p:sldId id="283" r:id="rId7"/>
-    <p:sldId id="281" r:id="rId8"/>
+    <p:sldId id="266" r:id="rId8"/>
+    <p:sldId id="281" r:id="rId9"/>
   </p:sldIdLst>
   <p:sldSz cx="9144000" cy="5143500" type="screen16x9"/>
   <p:notesSz cx="6858000" cy="9144000"/>
   <p:embeddedFontLst>
     <p:embeddedFont>
       <p:font typeface="Inter" panose="020B0604020202020204" charset="0"/>
-      <p:regular r:id="rId10"/>
-      <p:bold r:id="rId11"/>
+      <p:regular r:id="rId11"/>
+      <p:bold r:id="rId12"/>
+    </p:embeddedFont>
+    <p:embeddedFont>
+      <p:font typeface="Manrope" panose="020B0604020202020204" charset="0"/>
+      <p:regular r:id="rId13"/>
+      <p:bold r:id="rId14"/>
     </p:embeddedFont>
     <p:embeddedFont>
       <p:font typeface="Manrope Medium" panose="020B0604020202020204" charset="0"/>
-      <p:regular r:id="rId12"/>
-      <p:bold r:id="rId13"/>
+      <p:regular r:id="rId15"/>
+      <p:bold r:id="rId16"/>
     </p:embeddedFont>
     <p:embeddedFont>
       <p:font typeface="Manrope SemiBold" panose="020B0604020202020204" charset="0"/>
-      <p:regular r:id="rId14"/>
-      <p:bold r:id="rId15"/>
+      <p:regular r:id="rId17"/>
+      <p:bold r:id="rId18"/>
     </p:embeddedFont>
   </p:embeddedFontLst>
   <p:defaultTextStyle>
@@ -1338,6 +1344,110 @@
 </file>
 
 <file path=ppt/notesSlides/notesSlide7.xml><?xml version="1.0" encoding="utf-8"?>
+<p:notes xmlns:a="http://schemas.openxmlformats.org/drawingml/2006/main" xmlns:r="http://schemas.openxmlformats.org/officeDocument/2006/relationships" xmlns:p="http://schemas.openxmlformats.org/presentationml/2006/main" showMasterSp="0" showMasterPhAnim="0">
+  <p:cSld>
+    <p:spTree>
+      <p:nvGrpSpPr>
+        <p:cNvPr id="1" name="Shape 2047"/>
+        <p:cNvGrpSpPr/>
+        <p:nvPr/>
+      </p:nvGrpSpPr>
+      <p:grpSpPr>
+        <a:xfrm>
+          <a:off x="0" y="0"/>
+          <a:ext cx="0" cy="0"/>
+          <a:chOff x="0" y="0"/>
+          <a:chExt cx="0" cy="0"/>
+        </a:xfrm>
+      </p:grpSpPr>
+      <p:sp>
+        <p:nvSpPr>
+          <p:cNvPr id="2048" name="Google Shape;2048;g238dfbb53c3_0_613:notes"/>
+          <p:cNvSpPr>
+            <a:spLocks noGrp="1" noRot="1" noChangeAspect="1"/>
+          </p:cNvSpPr>
+          <p:nvPr>
+            <p:ph type="sldImg" idx="2"/>
+          </p:nvPr>
+        </p:nvSpPr>
+        <p:spPr>
+          <a:xfrm>
+            <a:off x="381000" y="685800"/>
+            <a:ext cx="6096000" cy="3429000"/>
+          </a:xfrm>
+          <a:custGeom>
+            <a:avLst/>
+            <a:gdLst/>
+            <a:ahLst/>
+            <a:cxnLst/>
+            <a:rect l="l" t="t" r="r" b="b"/>
+            <a:pathLst>
+              <a:path w="120000" h="120000" extrusionOk="0">
+                <a:moveTo>
+                  <a:pt x="0" y="0"/>
+                </a:moveTo>
+                <a:lnTo>
+                  <a:pt x="120000" y="0"/>
+                </a:lnTo>
+                <a:lnTo>
+                  <a:pt x="120000" y="120000"/>
+                </a:lnTo>
+                <a:lnTo>
+                  <a:pt x="0" y="120000"/>
+                </a:lnTo>
+                <a:close/>
+              </a:path>
+            </a:pathLst>
+          </a:custGeom>
+        </p:spPr>
+      </p:sp>
+      <p:sp>
+        <p:nvSpPr>
+          <p:cNvPr id="2049" name="Google Shape;2049;g238dfbb53c3_0_613:notes"/>
+          <p:cNvSpPr txBox="1">
+            <a:spLocks noGrp="1"/>
+          </p:cNvSpPr>
+          <p:nvPr>
+            <p:ph type="body" idx="1"/>
+          </p:nvPr>
+        </p:nvSpPr>
+        <p:spPr>
+          <a:xfrm>
+            <a:off x="685800" y="4343400"/>
+            <a:ext cx="5486400" cy="4114800"/>
+          </a:xfrm>
+          <a:prstGeom prst="rect">
+            <a:avLst/>
+          </a:prstGeom>
+        </p:spPr>
+        <p:txBody>
+          <a:bodyPr spcFirstLastPara="1" wrap="square" lIns="91425" tIns="91425" rIns="91425" bIns="91425" anchor="t" anchorCtr="0">
+            <a:noAutofit/>
+          </a:bodyPr>
+          <a:lstStyle/>
+          <a:p>
+            <a:pPr marL="0" lvl="0" indent="0" algn="l" rtl="0">
+              <a:spcBef>
+                <a:spcPts val="0"/>
+              </a:spcBef>
+              <a:spcAft>
+                <a:spcPts val="0"/>
+              </a:spcAft>
+              <a:buNone/>
+            </a:pPr>
+            <a:endParaRPr/>
+          </a:p>
+        </p:txBody>
+      </p:sp>
+    </p:spTree>
+  </p:cSld>
+  <p:clrMapOvr>
+    <a:masterClrMapping/>
+  </p:clrMapOvr>
+</p:notes>
+</file>
+
+<file path=ppt/notesSlides/notesSlide8.xml><?xml version="1.0" encoding="utf-8"?>
 <p:notes xmlns:a="http://schemas.openxmlformats.org/drawingml/2006/main" xmlns:r="http://schemas.openxmlformats.org/officeDocument/2006/relationships" xmlns:p="http://schemas.openxmlformats.org/presentationml/2006/main" showMasterSp="0" showMasterPhAnim="0">
   <p:cSld>
     <p:spTree>
@@ -49202,6 +49312,2309 @@
   <p:cSld>
     <p:spTree>
       <p:nvGrpSpPr>
+        <p:cNvPr id="1" name="Shape 2050"/>
+        <p:cNvGrpSpPr/>
+        <p:nvPr/>
+      </p:nvGrpSpPr>
+      <p:grpSpPr>
+        <a:xfrm>
+          <a:off x="0" y="0"/>
+          <a:ext cx="0" cy="0"/>
+          <a:chOff x="0" y="0"/>
+          <a:chExt cx="0" cy="0"/>
+        </a:xfrm>
+      </p:grpSpPr>
+      <p:sp>
+        <p:nvSpPr>
+          <p:cNvPr id="2051" name="Google Shape;2051;p48"/>
+          <p:cNvSpPr txBox="1">
+            <a:spLocks noGrp="1"/>
+          </p:cNvSpPr>
+          <p:nvPr>
+            <p:ph type="title"/>
+          </p:nvPr>
+        </p:nvSpPr>
+        <p:spPr>
+          <a:xfrm>
+            <a:off x="713225" y="520925"/>
+            <a:ext cx="7717500" cy="708000"/>
+          </a:xfrm>
+          <a:prstGeom prst="rect">
+            <a:avLst/>
+          </a:prstGeom>
+        </p:spPr>
+        <p:txBody>
+          <a:bodyPr spcFirstLastPara="1" wrap="square" lIns="91425" tIns="91425" rIns="91425" bIns="91425" anchor="t" anchorCtr="0">
+            <a:noAutofit/>
+          </a:bodyPr>
+          <a:lstStyle/>
+          <a:p>
+            <a:pPr marL="0" lvl="0" indent="0" algn="ctr" rtl="0">
+              <a:spcBef>
+                <a:spcPts val="0"/>
+              </a:spcBef>
+              <a:spcAft>
+                <a:spcPts val="0"/>
+              </a:spcAft>
+              <a:buNone/>
+            </a:pPr>
+            <a:r>
+              <a:rPr lang="pt-BR" dirty="0"/>
+              <a:t>ANÁLISE DA CONCORRÊNCIA</a:t>
+            </a:r>
+            <a:endParaRPr dirty="0"/>
+          </a:p>
+        </p:txBody>
+      </p:sp>
+      <p:sp>
+        <p:nvSpPr>
+          <p:cNvPr id="2053" name="Google Shape;2053;p48"/>
+          <p:cNvSpPr txBox="1"/>
+          <p:nvPr/>
+        </p:nvSpPr>
+        <p:spPr>
+          <a:xfrm>
+            <a:off x="1524908" y="2472445"/>
+            <a:ext cx="2495100" cy="704535"/>
+          </a:xfrm>
+          <a:prstGeom prst="rect">
+            <a:avLst/>
+          </a:prstGeom>
+          <a:noFill/>
+          <a:ln>
+            <a:noFill/>
+          </a:ln>
+        </p:spPr>
+        <p:txBody>
+          <a:bodyPr spcFirstLastPara="1" wrap="square" lIns="91425" tIns="91425" rIns="91425" bIns="91425" anchor="t" anchorCtr="0">
+            <a:noAutofit/>
+          </a:bodyPr>
+          <a:lstStyle/>
+          <a:p>
+            <a:pPr marL="0" lvl="0" indent="0" algn="l" rtl="0">
+              <a:spcBef>
+                <a:spcPts val="0"/>
+              </a:spcBef>
+              <a:spcAft>
+                <a:spcPts val="0"/>
+              </a:spcAft>
+              <a:buNone/>
+            </a:pPr>
+            <a:r>
+              <a:rPr lang="en" sz="1200" dirty="0">
+                <a:solidFill>
+                  <a:schemeClr val="dk1"/>
+                </a:solidFill>
+                <a:latin typeface="Inter"/>
+                <a:ea typeface="Inter"/>
+                <a:cs typeface="Inter"/>
+                <a:sym typeface="Inter"/>
+              </a:rPr>
+              <a:t>Empresas que oferecem serviços similares com precificação dinâmicas</a:t>
+            </a:r>
+            <a:endParaRPr sz="1200" dirty="0">
+              <a:solidFill>
+                <a:schemeClr val="dk1"/>
+              </a:solidFill>
+              <a:latin typeface="Inter"/>
+              <a:ea typeface="Inter"/>
+              <a:cs typeface="Inter"/>
+              <a:sym typeface="Inter"/>
+            </a:endParaRPr>
+          </a:p>
+        </p:txBody>
+      </p:sp>
+      <p:sp>
+        <p:nvSpPr>
+          <p:cNvPr id="2055" name="Google Shape;2055;p48"/>
+          <p:cNvSpPr txBox="1"/>
+          <p:nvPr/>
+        </p:nvSpPr>
+        <p:spPr>
+          <a:xfrm>
+            <a:off x="1520077" y="3874388"/>
+            <a:ext cx="2495100" cy="704533"/>
+          </a:xfrm>
+          <a:prstGeom prst="rect">
+            <a:avLst/>
+          </a:prstGeom>
+          <a:noFill/>
+          <a:ln>
+            <a:noFill/>
+          </a:ln>
+        </p:spPr>
+        <p:txBody>
+          <a:bodyPr spcFirstLastPara="1" wrap="square" lIns="91425" tIns="91425" rIns="91425" bIns="91425" anchor="t" anchorCtr="0">
+            <a:noAutofit/>
+          </a:bodyPr>
+          <a:lstStyle/>
+          <a:p>
+            <a:pPr marL="0" lvl="0" indent="0" algn="l" rtl="0">
+              <a:spcBef>
+                <a:spcPts val="0"/>
+              </a:spcBef>
+              <a:spcAft>
+                <a:spcPts val="0"/>
+              </a:spcAft>
+              <a:buNone/>
+            </a:pPr>
+            <a:r>
+              <a:rPr lang="en" sz="1200" dirty="0">
+                <a:solidFill>
+                  <a:schemeClr val="dk1"/>
+                </a:solidFill>
+                <a:latin typeface="Inter"/>
+                <a:ea typeface="Inter"/>
+                <a:cs typeface="Inter"/>
+                <a:sym typeface="Inter"/>
+              </a:rPr>
+              <a:t>Exemplos: Uber, Amazon, Walmart, Mercado Livre, Magazine Luiza</a:t>
+            </a:r>
+            <a:endParaRPr sz="1200" dirty="0">
+              <a:solidFill>
+                <a:schemeClr val="dk1"/>
+              </a:solidFill>
+              <a:latin typeface="Inter"/>
+              <a:ea typeface="Inter"/>
+              <a:cs typeface="Inter"/>
+              <a:sym typeface="Inter"/>
+            </a:endParaRPr>
+          </a:p>
+        </p:txBody>
+      </p:sp>
+      <p:sp>
+        <p:nvSpPr>
+          <p:cNvPr id="2057" name="Google Shape;2057;p48"/>
+          <p:cNvSpPr txBox="1"/>
+          <p:nvPr/>
+        </p:nvSpPr>
+        <p:spPr>
+          <a:xfrm>
+            <a:off x="5829256" y="2384976"/>
+            <a:ext cx="2781344" cy="922103"/>
+          </a:xfrm>
+          <a:prstGeom prst="rect">
+            <a:avLst/>
+          </a:prstGeom>
+          <a:noFill/>
+          <a:ln>
+            <a:noFill/>
+          </a:ln>
+        </p:spPr>
+        <p:txBody>
+          <a:bodyPr spcFirstLastPara="1" wrap="square" lIns="91425" tIns="91425" rIns="91425" bIns="91425" anchor="t" anchorCtr="0">
+            <a:noAutofit/>
+          </a:bodyPr>
+          <a:lstStyle/>
+          <a:p>
+            <a:pPr marL="0" lvl="0" indent="0" algn="l" rtl="0">
+              <a:spcBef>
+                <a:spcPts val="0"/>
+              </a:spcBef>
+              <a:spcAft>
+                <a:spcPts val="0"/>
+              </a:spcAft>
+              <a:buNone/>
+            </a:pPr>
+            <a:r>
+              <a:rPr lang="en" sz="1200" dirty="0">
+                <a:solidFill>
+                  <a:schemeClr val="dk1"/>
+                </a:solidFill>
+                <a:latin typeface="Inter"/>
+                <a:ea typeface="Inter"/>
+                <a:cs typeface="Inter"/>
+                <a:sym typeface="Inter"/>
+              </a:rPr>
+              <a:t>Empresas que oferecem serviços substitutos e que competem com a atenção, orçamento e decisão dos consumidores.</a:t>
+            </a:r>
+            <a:endParaRPr sz="1200" dirty="0">
+              <a:solidFill>
+                <a:schemeClr val="dk1"/>
+              </a:solidFill>
+              <a:latin typeface="Inter"/>
+              <a:ea typeface="Inter"/>
+              <a:cs typeface="Inter"/>
+              <a:sym typeface="Inter"/>
+            </a:endParaRPr>
+          </a:p>
+        </p:txBody>
+      </p:sp>
+      <p:sp>
+        <p:nvSpPr>
+          <p:cNvPr id="2059" name="Google Shape;2059;p48"/>
+          <p:cNvSpPr txBox="1"/>
+          <p:nvPr/>
+        </p:nvSpPr>
+        <p:spPr>
+          <a:xfrm>
+            <a:off x="5885204" y="3940175"/>
+            <a:ext cx="2494800" cy="554100"/>
+          </a:xfrm>
+          <a:prstGeom prst="rect">
+            <a:avLst/>
+          </a:prstGeom>
+          <a:noFill/>
+          <a:ln>
+            <a:noFill/>
+          </a:ln>
+        </p:spPr>
+        <p:txBody>
+          <a:bodyPr spcFirstLastPara="1" wrap="square" lIns="91425" tIns="91425" rIns="91425" bIns="91425" anchor="t" anchorCtr="0">
+            <a:noAutofit/>
+          </a:bodyPr>
+          <a:lstStyle/>
+          <a:p>
+            <a:pPr marL="0" lvl="0" indent="0" algn="l" rtl="0">
+              <a:spcBef>
+                <a:spcPts val="0"/>
+              </a:spcBef>
+              <a:spcAft>
+                <a:spcPts val="0"/>
+              </a:spcAft>
+              <a:buNone/>
+            </a:pPr>
+            <a:r>
+              <a:rPr lang="en" sz="1200" dirty="0">
+                <a:solidFill>
+                  <a:schemeClr val="dk1"/>
+                </a:solidFill>
+                <a:latin typeface="Inter"/>
+                <a:ea typeface="Inter"/>
+                <a:cs typeface="Inter"/>
+                <a:sym typeface="Inter"/>
+              </a:rPr>
+              <a:t>Exemplos: Netflix, Spotify, Airnbn, PlayStation, Udemy</a:t>
+            </a:r>
+            <a:endParaRPr sz="1200" dirty="0">
+              <a:solidFill>
+                <a:schemeClr val="dk1"/>
+              </a:solidFill>
+              <a:latin typeface="Inter"/>
+              <a:ea typeface="Inter"/>
+              <a:cs typeface="Inter"/>
+              <a:sym typeface="Inter"/>
+            </a:endParaRPr>
+          </a:p>
+        </p:txBody>
+      </p:sp>
+      <p:cxnSp>
+        <p:nvCxnSpPr>
+          <p:cNvPr id="2060" name="Google Shape;2060;p48"/>
+          <p:cNvCxnSpPr/>
+          <p:nvPr/>
+        </p:nvCxnSpPr>
+        <p:spPr>
+          <a:xfrm rot="10800000">
+            <a:off x="1071533" y="2067375"/>
+            <a:ext cx="0" cy="189900"/>
+          </a:xfrm>
+          <a:prstGeom prst="straightConnector1">
+            <a:avLst/>
+          </a:prstGeom>
+          <a:noFill/>
+          <a:ln w="28575" cap="flat" cmpd="sng">
+            <a:solidFill>
+              <a:schemeClr val="dk1"/>
+            </a:solidFill>
+            <a:prstDash val="solid"/>
+            <a:round/>
+            <a:headEnd type="none" w="med" len="med"/>
+            <a:tailEnd type="none" w="med" len="med"/>
+          </a:ln>
+        </p:spPr>
+      </p:cxnSp>
+      <p:cxnSp>
+        <p:nvCxnSpPr>
+          <p:cNvPr id="2061" name="Google Shape;2061;p48"/>
+          <p:cNvCxnSpPr/>
+          <p:nvPr/>
+        </p:nvCxnSpPr>
+        <p:spPr>
+          <a:xfrm rot="10800000">
+            <a:off x="1071533" y="3380275"/>
+            <a:ext cx="0" cy="189900"/>
+          </a:xfrm>
+          <a:prstGeom prst="straightConnector1">
+            <a:avLst/>
+          </a:prstGeom>
+          <a:noFill/>
+          <a:ln w="28575" cap="flat" cmpd="sng">
+            <a:solidFill>
+              <a:schemeClr val="dk1"/>
+            </a:solidFill>
+            <a:prstDash val="solid"/>
+            <a:round/>
+            <a:headEnd type="none" w="med" len="med"/>
+            <a:tailEnd type="none" w="med" len="med"/>
+          </a:ln>
+        </p:spPr>
+      </p:cxnSp>
+      <p:cxnSp>
+        <p:nvCxnSpPr>
+          <p:cNvPr id="2062" name="Google Shape;2062;p48"/>
+          <p:cNvCxnSpPr/>
+          <p:nvPr/>
+        </p:nvCxnSpPr>
+        <p:spPr>
+          <a:xfrm rot="10800000">
+            <a:off x="5315508" y="2067375"/>
+            <a:ext cx="0" cy="189900"/>
+          </a:xfrm>
+          <a:prstGeom prst="straightConnector1">
+            <a:avLst/>
+          </a:prstGeom>
+          <a:noFill/>
+          <a:ln w="28575" cap="flat" cmpd="sng">
+            <a:solidFill>
+              <a:schemeClr val="dk1"/>
+            </a:solidFill>
+            <a:prstDash val="solid"/>
+            <a:round/>
+            <a:headEnd type="none" w="med" len="med"/>
+            <a:tailEnd type="none" w="med" len="med"/>
+          </a:ln>
+        </p:spPr>
+      </p:cxnSp>
+      <p:cxnSp>
+        <p:nvCxnSpPr>
+          <p:cNvPr id="2063" name="Google Shape;2063;p48"/>
+          <p:cNvCxnSpPr/>
+          <p:nvPr/>
+        </p:nvCxnSpPr>
+        <p:spPr>
+          <a:xfrm rot="10800000">
+            <a:off x="5315508" y="3380275"/>
+            <a:ext cx="0" cy="189900"/>
+          </a:xfrm>
+          <a:prstGeom prst="straightConnector1">
+            <a:avLst/>
+          </a:prstGeom>
+          <a:noFill/>
+          <a:ln w="28575" cap="flat" cmpd="sng">
+            <a:solidFill>
+              <a:schemeClr val="dk1"/>
+            </a:solidFill>
+            <a:prstDash val="solid"/>
+            <a:round/>
+            <a:headEnd type="none" w="med" len="med"/>
+            <a:tailEnd type="none" w="med" len="med"/>
+          </a:ln>
+        </p:spPr>
+      </p:cxnSp>
+      <p:cxnSp>
+        <p:nvCxnSpPr>
+          <p:cNvPr id="2064" name="Google Shape;2064;p48"/>
+          <p:cNvCxnSpPr>
+            <a:stCxn id="2065" idx="3"/>
+            <a:endCxn id="2066" idx="1"/>
+          </p:cNvCxnSpPr>
+          <p:nvPr/>
+        </p:nvCxnSpPr>
+        <p:spPr>
+          <a:xfrm>
+            <a:off x="4136164" y="1792700"/>
+            <a:ext cx="871800" cy="0"/>
+          </a:xfrm>
+          <a:prstGeom prst="straightConnector1">
+            <a:avLst/>
+          </a:prstGeom>
+          <a:noFill/>
+          <a:ln w="28575" cap="flat" cmpd="sng">
+            <a:solidFill>
+              <a:schemeClr val="dk1"/>
+            </a:solidFill>
+            <a:prstDash val="solid"/>
+            <a:round/>
+            <a:headEnd type="none" w="med" len="med"/>
+            <a:tailEnd type="none" w="med" len="med"/>
+          </a:ln>
+        </p:spPr>
+      </p:cxnSp>
+      <p:grpSp>
+        <p:nvGrpSpPr>
+          <p:cNvPr id="2067" name="Google Shape;2067;p48"/>
+          <p:cNvGrpSpPr/>
+          <p:nvPr/>
+        </p:nvGrpSpPr>
+        <p:grpSpPr>
+          <a:xfrm>
+            <a:off x="5015992" y="2506362"/>
+            <a:ext cx="599025" cy="612638"/>
+            <a:chOff x="-4629392" y="1248613"/>
+            <a:chExt cx="399963" cy="414393"/>
+          </a:xfrm>
+        </p:grpSpPr>
+        <p:sp>
+          <p:nvSpPr>
+            <p:cNvPr id="2068" name="Google Shape;2068;p48"/>
+            <p:cNvSpPr/>
+            <p:nvPr/>
+          </p:nvSpPr>
+          <p:spPr>
+            <a:xfrm>
+              <a:off x="-4348018" y="1248613"/>
+              <a:ext cx="72772" cy="170748"/>
+            </a:xfrm>
+            <a:custGeom>
+              <a:avLst/>
+              <a:gdLst/>
+              <a:ahLst/>
+              <a:cxnLst/>
+              <a:rect l="l" t="t" r="r" b="b"/>
+              <a:pathLst>
+                <a:path w="2330" h="5467" extrusionOk="0">
+                  <a:moveTo>
+                    <a:pt x="785" y="0"/>
+                  </a:moveTo>
+                  <a:lnTo>
+                    <a:pt x="785" y="886"/>
+                  </a:lnTo>
+                  <a:cubicBezTo>
+                    <a:pt x="330" y="1038"/>
+                    <a:pt x="1" y="1468"/>
+                    <a:pt x="1" y="1974"/>
+                  </a:cubicBezTo>
+                  <a:lnTo>
+                    <a:pt x="1" y="3138"/>
+                  </a:lnTo>
+                  <a:lnTo>
+                    <a:pt x="1544" y="3138"/>
+                  </a:lnTo>
+                  <a:lnTo>
+                    <a:pt x="1544" y="3543"/>
+                  </a:lnTo>
+                  <a:cubicBezTo>
+                    <a:pt x="1544" y="3746"/>
+                    <a:pt x="1367" y="3923"/>
+                    <a:pt x="1165" y="3923"/>
+                  </a:cubicBezTo>
+                  <a:lnTo>
+                    <a:pt x="1" y="3923"/>
+                  </a:lnTo>
+                  <a:lnTo>
+                    <a:pt x="1" y="4707"/>
+                  </a:lnTo>
+                  <a:lnTo>
+                    <a:pt x="785" y="4707"/>
+                  </a:lnTo>
+                  <a:lnTo>
+                    <a:pt x="785" y="5467"/>
+                  </a:lnTo>
+                  <a:lnTo>
+                    <a:pt x="1544" y="5467"/>
+                  </a:lnTo>
+                  <a:lnTo>
+                    <a:pt x="1544" y="4631"/>
+                  </a:lnTo>
+                  <a:cubicBezTo>
+                    <a:pt x="2000" y="4480"/>
+                    <a:pt x="2329" y="4049"/>
+                    <a:pt x="2329" y="3543"/>
+                  </a:cubicBezTo>
+                  <a:lnTo>
+                    <a:pt x="2329" y="2379"/>
+                  </a:lnTo>
+                  <a:lnTo>
+                    <a:pt x="785" y="2379"/>
+                  </a:lnTo>
+                  <a:lnTo>
+                    <a:pt x="785" y="1974"/>
+                  </a:lnTo>
+                  <a:cubicBezTo>
+                    <a:pt x="785" y="1772"/>
+                    <a:pt x="962" y="1594"/>
+                    <a:pt x="1165" y="1594"/>
+                  </a:cubicBezTo>
+                  <a:lnTo>
+                    <a:pt x="2329" y="1594"/>
+                  </a:lnTo>
+                  <a:lnTo>
+                    <a:pt x="2329" y="810"/>
+                  </a:lnTo>
+                  <a:lnTo>
+                    <a:pt x="1544" y="810"/>
+                  </a:lnTo>
+                  <a:lnTo>
+                    <a:pt x="1544" y="0"/>
+                  </a:lnTo>
+                  <a:close/>
+                </a:path>
+              </a:pathLst>
+            </a:custGeom>
+            <a:solidFill>
+              <a:schemeClr val="accent1"/>
+            </a:solidFill>
+            <a:ln>
+              <a:noFill/>
+            </a:ln>
+          </p:spPr>
+          <p:txBody>
+            <a:bodyPr spcFirstLastPara="1" wrap="square" lIns="91425" tIns="91425" rIns="91425" bIns="91425" anchor="ctr" anchorCtr="0">
+              <a:noAutofit/>
+            </a:bodyPr>
+            <a:lstStyle/>
+            <a:p>
+              <a:pPr marL="0" lvl="0" indent="0" algn="l" rtl="0">
+                <a:spcBef>
+                  <a:spcPts val="0"/>
+                </a:spcBef>
+                <a:spcAft>
+                  <a:spcPts val="0"/>
+                </a:spcAft>
+                <a:buNone/>
+              </a:pPr>
+              <a:endParaRPr/>
+            </a:p>
+          </p:txBody>
+        </p:sp>
+        <p:sp>
+          <p:nvSpPr>
+            <p:cNvPr id="2069" name="Google Shape;2069;p48"/>
+            <p:cNvSpPr/>
+            <p:nvPr/>
+          </p:nvSpPr>
+          <p:spPr>
+            <a:xfrm>
+              <a:off x="-4383592" y="1447783"/>
+              <a:ext cx="120183" cy="120183"/>
+            </a:xfrm>
+            <a:custGeom>
+              <a:avLst/>
+              <a:gdLst/>
+              <a:ahLst/>
+              <a:cxnLst/>
+              <a:rect l="l" t="t" r="r" b="b"/>
+              <a:pathLst>
+                <a:path w="3848" h="3848" extrusionOk="0">
+                  <a:moveTo>
+                    <a:pt x="1646" y="1"/>
+                  </a:moveTo>
+                  <a:lnTo>
+                    <a:pt x="1" y="1671"/>
+                  </a:lnTo>
+                  <a:lnTo>
+                    <a:pt x="2203" y="3847"/>
+                  </a:lnTo>
+                  <a:lnTo>
+                    <a:pt x="3848" y="2202"/>
+                  </a:lnTo>
+                  <a:lnTo>
+                    <a:pt x="1646" y="1"/>
+                  </a:lnTo>
+                  <a:close/>
+                </a:path>
+              </a:pathLst>
+            </a:custGeom>
+            <a:solidFill>
+              <a:schemeClr val="accent1"/>
+            </a:solidFill>
+            <a:ln>
+              <a:noFill/>
+            </a:ln>
+          </p:spPr>
+          <p:txBody>
+            <a:bodyPr spcFirstLastPara="1" wrap="square" lIns="91425" tIns="91425" rIns="91425" bIns="91425" anchor="ctr" anchorCtr="0">
+              <a:noAutofit/>
+            </a:bodyPr>
+            <a:lstStyle/>
+            <a:p>
+              <a:pPr marL="0" lvl="0" indent="0" algn="l" rtl="0">
+                <a:spcBef>
+                  <a:spcPts val="0"/>
+                </a:spcBef>
+                <a:spcAft>
+                  <a:spcPts val="0"/>
+                </a:spcAft>
+                <a:buNone/>
+              </a:pPr>
+              <a:endParaRPr/>
+            </a:p>
+          </p:txBody>
+        </p:sp>
+        <p:sp>
+          <p:nvSpPr>
+            <p:cNvPr id="2070" name="Google Shape;2070;p48"/>
+            <p:cNvSpPr/>
+            <p:nvPr/>
+          </p:nvSpPr>
+          <p:spPr>
+            <a:xfrm>
+              <a:off x="-4521109" y="1311047"/>
+              <a:ext cx="120183" cy="120183"/>
+            </a:xfrm>
+            <a:custGeom>
+              <a:avLst/>
+              <a:gdLst/>
+              <a:ahLst/>
+              <a:cxnLst/>
+              <a:rect l="l" t="t" r="r" b="b"/>
+              <a:pathLst>
+                <a:path w="3848" h="3848" extrusionOk="0">
+                  <a:moveTo>
+                    <a:pt x="1671" y="0"/>
+                  </a:moveTo>
+                  <a:lnTo>
+                    <a:pt x="0" y="1645"/>
+                  </a:lnTo>
+                  <a:lnTo>
+                    <a:pt x="2202" y="3847"/>
+                  </a:lnTo>
+                  <a:lnTo>
+                    <a:pt x="3847" y="2202"/>
+                  </a:lnTo>
+                  <a:lnTo>
+                    <a:pt x="1671" y="0"/>
+                  </a:lnTo>
+                  <a:close/>
+                </a:path>
+              </a:pathLst>
+            </a:custGeom>
+            <a:solidFill>
+              <a:schemeClr val="accent1"/>
+            </a:solidFill>
+            <a:ln>
+              <a:noFill/>
+            </a:ln>
+          </p:spPr>
+          <p:txBody>
+            <a:bodyPr spcFirstLastPara="1" wrap="square" lIns="91425" tIns="91425" rIns="91425" bIns="91425" anchor="ctr" anchorCtr="0">
+              <a:noAutofit/>
+            </a:bodyPr>
+            <a:lstStyle/>
+            <a:p>
+              <a:pPr marL="0" lvl="0" indent="0" algn="l" rtl="0">
+                <a:spcBef>
+                  <a:spcPts val="0"/>
+                </a:spcBef>
+                <a:spcAft>
+                  <a:spcPts val="0"/>
+                </a:spcAft>
+                <a:buNone/>
+              </a:pPr>
+              <a:endParaRPr/>
+            </a:p>
+          </p:txBody>
+        </p:sp>
+        <p:sp>
+          <p:nvSpPr>
+            <p:cNvPr id="2071" name="Google Shape;2071;p48"/>
+            <p:cNvSpPr/>
+            <p:nvPr/>
+          </p:nvSpPr>
+          <p:spPr>
+            <a:xfrm>
+              <a:off x="-4629392" y="1379821"/>
+              <a:ext cx="297208" cy="283185"/>
+            </a:xfrm>
+            <a:custGeom>
+              <a:avLst/>
+              <a:gdLst/>
+              <a:ahLst/>
+              <a:cxnLst/>
+              <a:rect l="l" t="t" r="r" b="b"/>
+              <a:pathLst>
+                <a:path w="9516" h="9067" extrusionOk="0">
+                  <a:moveTo>
+                    <a:pt x="2936" y="0"/>
+                  </a:moveTo>
+                  <a:lnTo>
+                    <a:pt x="1797" y="1114"/>
+                  </a:lnTo>
+                  <a:cubicBezTo>
+                    <a:pt x="0" y="2936"/>
+                    <a:pt x="0" y="5897"/>
+                    <a:pt x="1797" y="7719"/>
+                  </a:cubicBezTo>
+                  <a:cubicBezTo>
+                    <a:pt x="2708" y="8617"/>
+                    <a:pt x="3904" y="9067"/>
+                    <a:pt x="5100" y="9067"/>
+                  </a:cubicBezTo>
+                  <a:cubicBezTo>
+                    <a:pt x="6295" y="9067"/>
+                    <a:pt x="7491" y="8617"/>
+                    <a:pt x="8402" y="7719"/>
+                  </a:cubicBezTo>
+                  <a:lnTo>
+                    <a:pt x="8402" y="7694"/>
+                  </a:lnTo>
+                  <a:lnTo>
+                    <a:pt x="9516" y="6580"/>
+                  </a:lnTo>
+                  <a:lnTo>
+                    <a:pt x="7314" y="4378"/>
+                  </a:lnTo>
+                  <a:lnTo>
+                    <a:pt x="6201" y="5517"/>
+                  </a:lnTo>
+                  <a:cubicBezTo>
+                    <a:pt x="5910" y="5808"/>
+                    <a:pt x="5505" y="5954"/>
+                    <a:pt x="5100" y="5954"/>
+                  </a:cubicBezTo>
+                  <a:cubicBezTo>
+                    <a:pt x="4695" y="5954"/>
+                    <a:pt x="4290" y="5808"/>
+                    <a:pt x="3999" y="5517"/>
+                  </a:cubicBezTo>
+                  <a:cubicBezTo>
+                    <a:pt x="3391" y="4910"/>
+                    <a:pt x="3391" y="3923"/>
+                    <a:pt x="3999" y="3315"/>
+                  </a:cubicBezTo>
+                  <a:lnTo>
+                    <a:pt x="5138" y="2202"/>
+                  </a:lnTo>
+                  <a:lnTo>
+                    <a:pt x="2936" y="0"/>
+                  </a:lnTo>
+                  <a:close/>
+                </a:path>
+              </a:pathLst>
+            </a:custGeom>
+            <a:solidFill>
+              <a:schemeClr val="accent1"/>
+            </a:solidFill>
+            <a:ln>
+              <a:noFill/>
+            </a:ln>
+          </p:spPr>
+          <p:txBody>
+            <a:bodyPr spcFirstLastPara="1" wrap="square" lIns="91425" tIns="91425" rIns="91425" bIns="91425" anchor="ctr" anchorCtr="0">
+              <a:noAutofit/>
+            </a:bodyPr>
+            <a:lstStyle/>
+            <a:p>
+              <a:pPr marL="0" lvl="0" indent="0" algn="l" rtl="0">
+                <a:spcBef>
+                  <a:spcPts val="0"/>
+                </a:spcBef>
+                <a:spcAft>
+                  <a:spcPts val="0"/>
+                </a:spcAft>
+                <a:buNone/>
+              </a:pPr>
+              <a:endParaRPr/>
+            </a:p>
+          </p:txBody>
+        </p:sp>
+        <p:sp>
+          <p:nvSpPr>
+            <p:cNvPr id="2072" name="Google Shape;2072;p48"/>
+            <p:cNvSpPr/>
+            <p:nvPr/>
+          </p:nvSpPr>
+          <p:spPr>
+            <a:xfrm>
+              <a:off x="-4434970" y="1276254"/>
+              <a:ext cx="51409" cy="52221"/>
+            </a:xfrm>
+            <a:custGeom>
+              <a:avLst/>
+              <a:gdLst/>
+              <a:ahLst/>
+              <a:cxnLst/>
+              <a:rect l="l" t="t" r="r" b="b"/>
+              <a:pathLst>
+                <a:path w="1646" h="1672" extrusionOk="0">
+                  <a:moveTo>
+                    <a:pt x="1089" y="1"/>
+                  </a:moveTo>
+                  <a:lnTo>
+                    <a:pt x="1" y="1114"/>
+                  </a:lnTo>
+                  <a:lnTo>
+                    <a:pt x="558" y="1671"/>
+                  </a:lnTo>
+                  <a:lnTo>
+                    <a:pt x="1646" y="558"/>
+                  </a:lnTo>
+                  <a:lnTo>
+                    <a:pt x="1089" y="1"/>
+                  </a:lnTo>
+                  <a:close/>
+                </a:path>
+              </a:pathLst>
+            </a:custGeom>
+            <a:solidFill>
+              <a:schemeClr val="accent1"/>
+            </a:solidFill>
+            <a:ln>
+              <a:noFill/>
+            </a:ln>
+          </p:spPr>
+          <p:txBody>
+            <a:bodyPr spcFirstLastPara="1" wrap="square" lIns="91425" tIns="91425" rIns="91425" bIns="91425" anchor="ctr" anchorCtr="0">
+              <a:noAutofit/>
+            </a:bodyPr>
+            <a:lstStyle/>
+            <a:p>
+              <a:pPr marL="0" lvl="0" indent="0" algn="l" rtl="0">
+                <a:spcBef>
+                  <a:spcPts val="0"/>
+                </a:spcBef>
+                <a:spcAft>
+                  <a:spcPts val="0"/>
+                </a:spcAft>
+                <a:buNone/>
+              </a:pPr>
+              <a:endParaRPr/>
+            </a:p>
+          </p:txBody>
+        </p:sp>
+        <p:sp>
+          <p:nvSpPr>
+            <p:cNvPr id="2073" name="Google Shape;2073;p48"/>
+            <p:cNvSpPr/>
+            <p:nvPr/>
+          </p:nvSpPr>
+          <p:spPr>
+            <a:xfrm>
+              <a:off x="-4280837" y="1431199"/>
+              <a:ext cx="51409" cy="51409"/>
+            </a:xfrm>
+            <a:custGeom>
+              <a:avLst/>
+              <a:gdLst/>
+              <a:ahLst/>
+              <a:cxnLst/>
+              <a:rect l="l" t="t" r="r" b="b"/>
+              <a:pathLst>
+                <a:path w="1646" h="1646" extrusionOk="0">
+                  <a:moveTo>
+                    <a:pt x="1114" y="0"/>
+                  </a:moveTo>
+                  <a:lnTo>
+                    <a:pt x="1" y="1088"/>
+                  </a:lnTo>
+                  <a:lnTo>
+                    <a:pt x="558" y="1645"/>
+                  </a:lnTo>
+                  <a:lnTo>
+                    <a:pt x="1646" y="557"/>
+                  </a:lnTo>
+                  <a:lnTo>
+                    <a:pt x="1114" y="0"/>
+                  </a:lnTo>
+                  <a:close/>
+                </a:path>
+              </a:pathLst>
+            </a:custGeom>
+            <a:solidFill>
+              <a:schemeClr val="accent1"/>
+            </a:solidFill>
+            <a:ln>
+              <a:noFill/>
+            </a:ln>
+          </p:spPr>
+          <p:txBody>
+            <a:bodyPr spcFirstLastPara="1" wrap="square" lIns="91425" tIns="91425" rIns="91425" bIns="91425" anchor="ctr" anchorCtr="0">
+              <a:noAutofit/>
+            </a:bodyPr>
+            <a:lstStyle/>
+            <a:p>
+              <a:pPr marL="0" lvl="0" indent="0" algn="l" rtl="0">
+                <a:spcBef>
+                  <a:spcPts val="0"/>
+                </a:spcBef>
+                <a:spcAft>
+                  <a:spcPts val="0"/>
+                </a:spcAft>
+                <a:buNone/>
+              </a:pPr>
+              <a:endParaRPr/>
+            </a:p>
+          </p:txBody>
+        </p:sp>
+      </p:grpSp>
+      <p:grpSp>
+        <p:nvGrpSpPr>
+          <p:cNvPr id="2074" name="Google Shape;2074;p48"/>
+          <p:cNvGrpSpPr/>
+          <p:nvPr/>
+        </p:nvGrpSpPr>
+        <p:grpSpPr>
+          <a:xfrm>
+            <a:off x="853707" y="3940189"/>
+            <a:ext cx="435654" cy="612656"/>
+            <a:chOff x="-5671964" y="3231752"/>
+            <a:chExt cx="291680" cy="414237"/>
+          </a:xfrm>
+        </p:grpSpPr>
+        <p:sp>
+          <p:nvSpPr>
+            <p:cNvPr id="2075" name="Google Shape;2075;p48"/>
+            <p:cNvSpPr/>
+            <p:nvPr/>
+          </p:nvSpPr>
+          <p:spPr>
+            <a:xfrm>
+              <a:off x="-5550251" y="3353496"/>
+              <a:ext cx="169967" cy="169967"/>
+            </a:xfrm>
+            <a:custGeom>
+              <a:avLst/>
+              <a:gdLst/>
+              <a:ahLst/>
+              <a:cxnLst/>
+              <a:rect l="l" t="t" r="r" b="b"/>
+              <a:pathLst>
+                <a:path w="5442" h="5442" extrusionOk="0">
+                  <a:moveTo>
+                    <a:pt x="1" y="0"/>
+                  </a:moveTo>
+                  <a:lnTo>
+                    <a:pt x="1" y="5442"/>
+                  </a:lnTo>
+                  <a:lnTo>
+                    <a:pt x="5442" y="5442"/>
+                  </a:lnTo>
+                  <a:lnTo>
+                    <a:pt x="5442" y="0"/>
+                  </a:lnTo>
+                  <a:lnTo>
+                    <a:pt x="3873" y="0"/>
+                  </a:lnTo>
+                  <a:lnTo>
+                    <a:pt x="3873" y="1569"/>
+                  </a:lnTo>
+                  <a:lnTo>
+                    <a:pt x="3113" y="1569"/>
+                  </a:lnTo>
+                  <a:lnTo>
+                    <a:pt x="3113" y="0"/>
+                  </a:lnTo>
+                  <a:lnTo>
+                    <a:pt x="2329" y="0"/>
+                  </a:lnTo>
+                  <a:lnTo>
+                    <a:pt x="2329" y="1569"/>
+                  </a:lnTo>
+                  <a:lnTo>
+                    <a:pt x="1544" y="1569"/>
+                  </a:lnTo>
+                  <a:lnTo>
+                    <a:pt x="1544" y="0"/>
+                  </a:lnTo>
+                  <a:close/>
+                </a:path>
+              </a:pathLst>
+            </a:custGeom>
+            <a:solidFill>
+              <a:schemeClr val="lt2"/>
+            </a:solidFill>
+            <a:ln>
+              <a:noFill/>
+            </a:ln>
+          </p:spPr>
+          <p:txBody>
+            <a:bodyPr spcFirstLastPara="1" wrap="square" lIns="91425" tIns="91425" rIns="91425" bIns="91425" anchor="ctr" anchorCtr="0">
+              <a:noAutofit/>
+            </a:bodyPr>
+            <a:lstStyle/>
+            <a:p>
+              <a:pPr marL="0" lvl="0" indent="0" algn="l" rtl="0">
+                <a:spcBef>
+                  <a:spcPts val="0"/>
+                </a:spcBef>
+                <a:spcAft>
+                  <a:spcPts val="0"/>
+                </a:spcAft>
+                <a:buNone/>
+              </a:pPr>
+              <a:endParaRPr/>
+            </a:p>
+          </p:txBody>
+        </p:sp>
+        <p:sp>
+          <p:nvSpPr>
+            <p:cNvPr id="2076" name="Google Shape;2076;p48"/>
+            <p:cNvSpPr/>
+            <p:nvPr/>
+          </p:nvSpPr>
+          <p:spPr>
+            <a:xfrm>
+              <a:off x="-5502028" y="3305274"/>
+              <a:ext cx="72740" cy="48254"/>
+            </a:xfrm>
+            <a:custGeom>
+              <a:avLst/>
+              <a:gdLst/>
+              <a:ahLst/>
+              <a:cxnLst/>
+              <a:rect l="l" t="t" r="r" b="b"/>
+              <a:pathLst>
+                <a:path w="2329" h="1545" extrusionOk="0">
+                  <a:moveTo>
+                    <a:pt x="1165" y="1"/>
+                  </a:moveTo>
+                  <a:cubicBezTo>
+                    <a:pt x="532" y="1"/>
+                    <a:pt x="0" y="507"/>
+                    <a:pt x="0" y="1165"/>
+                  </a:cubicBezTo>
+                  <a:lnTo>
+                    <a:pt x="0" y="1544"/>
+                  </a:lnTo>
+                  <a:lnTo>
+                    <a:pt x="785" y="1544"/>
+                  </a:lnTo>
+                  <a:lnTo>
+                    <a:pt x="785" y="1165"/>
+                  </a:lnTo>
+                  <a:cubicBezTo>
+                    <a:pt x="785" y="937"/>
+                    <a:pt x="962" y="785"/>
+                    <a:pt x="1165" y="785"/>
+                  </a:cubicBezTo>
+                  <a:cubicBezTo>
+                    <a:pt x="1392" y="785"/>
+                    <a:pt x="1569" y="937"/>
+                    <a:pt x="1569" y="1165"/>
+                  </a:cubicBezTo>
+                  <a:lnTo>
+                    <a:pt x="1569" y="1544"/>
+                  </a:lnTo>
+                  <a:lnTo>
+                    <a:pt x="2329" y="1544"/>
+                  </a:lnTo>
+                  <a:lnTo>
+                    <a:pt x="2329" y="1165"/>
+                  </a:lnTo>
+                  <a:cubicBezTo>
+                    <a:pt x="2329" y="507"/>
+                    <a:pt x="1823" y="1"/>
+                    <a:pt x="1165" y="1"/>
+                  </a:cubicBezTo>
+                  <a:close/>
+                </a:path>
+              </a:pathLst>
+            </a:custGeom>
+            <a:solidFill>
+              <a:schemeClr val="lt2"/>
+            </a:solidFill>
+            <a:ln>
+              <a:noFill/>
+            </a:ln>
+          </p:spPr>
+          <p:txBody>
+            <a:bodyPr spcFirstLastPara="1" wrap="square" lIns="91425" tIns="91425" rIns="91425" bIns="91425" anchor="ctr" anchorCtr="0">
+              <a:noAutofit/>
+            </a:bodyPr>
+            <a:lstStyle/>
+            <a:p>
+              <a:pPr marL="0" lvl="0" indent="0" algn="l" rtl="0">
+                <a:spcBef>
+                  <a:spcPts val="0"/>
+                </a:spcBef>
+                <a:spcAft>
+                  <a:spcPts val="0"/>
+                </a:spcAft>
+                <a:buNone/>
+              </a:pPr>
+              <a:endParaRPr/>
+            </a:p>
+          </p:txBody>
+        </p:sp>
+        <p:sp>
+          <p:nvSpPr>
+            <p:cNvPr id="2077" name="Google Shape;2077;p48"/>
+            <p:cNvSpPr/>
+            <p:nvPr/>
+          </p:nvSpPr>
+          <p:spPr>
+            <a:xfrm>
+              <a:off x="-5671964" y="3596142"/>
+              <a:ext cx="218190" cy="49847"/>
+            </a:xfrm>
+            <a:custGeom>
+              <a:avLst/>
+              <a:gdLst/>
+              <a:ahLst/>
+              <a:cxnLst/>
+              <a:rect l="l" t="t" r="r" b="b"/>
+              <a:pathLst>
+                <a:path w="6986" h="1596" extrusionOk="0">
+                  <a:moveTo>
+                    <a:pt x="0" y="1"/>
+                  </a:moveTo>
+                  <a:lnTo>
+                    <a:pt x="0" y="1595"/>
+                  </a:lnTo>
+                  <a:lnTo>
+                    <a:pt x="6985" y="1595"/>
+                  </a:lnTo>
+                  <a:lnTo>
+                    <a:pt x="6985" y="1"/>
+                  </a:lnTo>
+                  <a:close/>
+                </a:path>
+              </a:pathLst>
+            </a:custGeom>
+            <a:solidFill>
+              <a:schemeClr val="lt2"/>
+            </a:solidFill>
+            <a:ln>
+              <a:noFill/>
+            </a:ln>
+          </p:spPr>
+          <p:txBody>
+            <a:bodyPr spcFirstLastPara="1" wrap="square" lIns="91425" tIns="91425" rIns="91425" bIns="91425" anchor="ctr" anchorCtr="0">
+              <a:noAutofit/>
+            </a:bodyPr>
+            <a:lstStyle/>
+            <a:p>
+              <a:pPr marL="0" lvl="0" indent="0" algn="l" rtl="0">
+                <a:spcBef>
+                  <a:spcPts val="0"/>
+                </a:spcBef>
+                <a:spcAft>
+                  <a:spcPts val="0"/>
+                </a:spcAft>
+                <a:buNone/>
+              </a:pPr>
+              <a:endParaRPr/>
+            </a:p>
+          </p:txBody>
+        </p:sp>
+        <p:sp>
+          <p:nvSpPr>
+            <p:cNvPr id="2078" name="Google Shape;2078;p48"/>
+            <p:cNvSpPr/>
+            <p:nvPr/>
+          </p:nvSpPr>
+          <p:spPr>
+            <a:xfrm>
+              <a:off x="-5671964" y="3305274"/>
+              <a:ext cx="218971" cy="267194"/>
+            </a:xfrm>
+            <a:custGeom>
+              <a:avLst/>
+              <a:gdLst/>
+              <a:ahLst/>
+              <a:cxnLst/>
+              <a:rect l="l" t="t" r="r" b="b"/>
+              <a:pathLst>
+                <a:path w="7011" h="8555" extrusionOk="0">
+                  <a:moveTo>
+                    <a:pt x="0" y="1"/>
+                  </a:moveTo>
+                  <a:lnTo>
+                    <a:pt x="0" y="8555"/>
+                  </a:lnTo>
+                  <a:lnTo>
+                    <a:pt x="7010" y="8555"/>
+                  </a:lnTo>
+                  <a:lnTo>
+                    <a:pt x="7010" y="7770"/>
+                  </a:lnTo>
+                  <a:lnTo>
+                    <a:pt x="3113" y="7770"/>
+                  </a:lnTo>
+                  <a:lnTo>
+                    <a:pt x="3113" y="785"/>
+                  </a:lnTo>
+                  <a:lnTo>
+                    <a:pt x="4707" y="785"/>
+                  </a:lnTo>
+                  <a:cubicBezTo>
+                    <a:pt x="4758" y="481"/>
+                    <a:pt x="4885" y="228"/>
+                    <a:pt x="5062" y="1"/>
+                  </a:cubicBezTo>
+                  <a:close/>
+                </a:path>
+              </a:pathLst>
+            </a:custGeom>
+            <a:solidFill>
+              <a:schemeClr val="lt2"/>
+            </a:solidFill>
+            <a:ln>
+              <a:noFill/>
+            </a:ln>
+          </p:spPr>
+          <p:txBody>
+            <a:bodyPr spcFirstLastPara="1" wrap="square" lIns="91425" tIns="91425" rIns="91425" bIns="91425" anchor="ctr" anchorCtr="0">
+              <a:noAutofit/>
+            </a:bodyPr>
+            <a:lstStyle/>
+            <a:p>
+              <a:pPr marL="0" lvl="0" indent="0" algn="l" rtl="0">
+                <a:spcBef>
+                  <a:spcPts val="0"/>
+                </a:spcBef>
+                <a:spcAft>
+                  <a:spcPts val="0"/>
+                </a:spcAft>
+                <a:buNone/>
+              </a:pPr>
+              <a:endParaRPr/>
+            </a:p>
+          </p:txBody>
+        </p:sp>
+        <p:sp>
+          <p:nvSpPr>
+            <p:cNvPr id="2079" name="Google Shape;2079;p48"/>
+            <p:cNvSpPr/>
+            <p:nvPr/>
+          </p:nvSpPr>
+          <p:spPr>
+            <a:xfrm>
+              <a:off x="-5671964" y="3231752"/>
+              <a:ext cx="218190" cy="49066"/>
+            </a:xfrm>
+            <a:custGeom>
+              <a:avLst/>
+              <a:gdLst/>
+              <a:ahLst/>
+              <a:cxnLst/>
+              <a:rect l="l" t="t" r="r" b="b"/>
+              <a:pathLst>
+                <a:path w="6986" h="1571" extrusionOk="0">
+                  <a:moveTo>
+                    <a:pt x="0" y="1"/>
+                  </a:moveTo>
+                  <a:lnTo>
+                    <a:pt x="0" y="1570"/>
+                  </a:lnTo>
+                  <a:lnTo>
+                    <a:pt x="6985" y="1570"/>
+                  </a:lnTo>
+                  <a:lnTo>
+                    <a:pt x="6985" y="1"/>
+                  </a:lnTo>
+                  <a:close/>
+                </a:path>
+              </a:pathLst>
+            </a:custGeom>
+            <a:solidFill>
+              <a:schemeClr val="lt2"/>
+            </a:solidFill>
+            <a:ln>
+              <a:noFill/>
+            </a:ln>
+          </p:spPr>
+          <p:txBody>
+            <a:bodyPr spcFirstLastPara="1" wrap="square" lIns="91425" tIns="91425" rIns="91425" bIns="91425" anchor="ctr" anchorCtr="0">
+              <a:noAutofit/>
+            </a:bodyPr>
+            <a:lstStyle/>
+            <a:p>
+              <a:pPr marL="0" lvl="0" indent="0" algn="l" rtl="0">
+                <a:spcBef>
+                  <a:spcPts val="0"/>
+                </a:spcBef>
+                <a:spcAft>
+                  <a:spcPts val="0"/>
+                </a:spcAft>
+                <a:buNone/>
+              </a:pPr>
+              <a:endParaRPr/>
+            </a:p>
+          </p:txBody>
+        </p:sp>
+      </p:grpSp>
+      <p:grpSp>
+        <p:nvGrpSpPr>
+          <p:cNvPr id="2080" name="Google Shape;2080;p48"/>
+          <p:cNvGrpSpPr/>
+          <p:nvPr/>
+        </p:nvGrpSpPr>
+        <p:grpSpPr>
+          <a:xfrm>
+            <a:off x="765207" y="2506362"/>
+            <a:ext cx="612654" cy="612656"/>
+            <a:chOff x="-5669590" y="3858557"/>
+            <a:chExt cx="413425" cy="414237"/>
+          </a:xfrm>
+        </p:grpSpPr>
+        <p:sp>
+          <p:nvSpPr>
+            <p:cNvPr id="2081" name="Google Shape;2081;p48"/>
+            <p:cNvSpPr/>
+            <p:nvPr/>
+          </p:nvSpPr>
+          <p:spPr>
+            <a:xfrm>
+              <a:off x="-5439594" y="4023777"/>
+              <a:ext cx="183428" cy="230027"/>
+            </a:xfrm>
+            <a:custGeom>
+              <a:avLst/>
+              <a:gdLst/>
+              <a:ahLst/>
+              <a:cxnLst/>
+              <a:rect l="l" t="t" r="r" b="b"/>
+              <a:pathLst>
+                <a:path w="5873" h="7365" extrusionOk="0">
+                  <a:moveTo>
+                    <a:pt x="5872" y="0"/>
+                  </a:moveTo>
+                  <a:lnTo>
+                    <a:pt x="1" y="3670"/>
+                  </a:lnTo>
+                  <a:lnTo>
+                    <a:pt x="5872" y="7365"/>
+                  </a:lnTo>
+                  <a:lnTo>
+                    <a:pt x="5872" y="0"/>
+                  </a:lnTo>
+                  <a:close/>
+                </a:path>
+              </a:pathLst>
+            </a:custGeom>
+            <a:solidFill>
+              <a:schemeClr val="lt2"/>
+            </a:solidFill>
+            <a:ln>
+              <a:noFill/>
+            </a:ln>
+          </p:spPr>
+          <p:txBody>
+            <a:bodyPr spcFirstLastPara="1" wrap="square" lIns="91425" tIns="91425" rIns="91425" bIns="91425" anchor="ctr" anchorCtr="0">
+              <a:noAutofit/>
+            </a:bodyPr>
+            <a:lstStyle/>
+            <a:p>
+              <a:pPr marL="0" lvl="0" indent="0" algn="l" rtl="0">
+                <a:spcBef>
+                  <a:spcPts val="0"/>
+                </a:spcBef>
+                <a:spcAft>
+                  <a:spcPts val="0"/>
+                </a:spcAft>
+                <a:buNone/>
+              </a:pPr>
+              <a:endParaRPr/>
+            </a:p>
+          </p:txBody>
+        </p:sp>
+        <p:sp>
+          <p:nvSpPr>
+            <p:cNvPr id="2082" name="Google Shape;2082;p48"/>
+            <p:cNvSpPr/>
+            <p:nvPr/>
+          </p:nvSpPr>
+          <p:spPr>
+            <a:xfrm>
+              <a:off x="-5329718" y="3960531"/>
+              <a:ext cx="63277" cy="80674"/>
+            </a:xfrm>
+            <a:custGeom>
+              <a:avLst/>
+              <a:gdLst/>
+              <a:ahLst/>
+              <a:cxnLst/>
+              <a:rect l="l" t="t" r="r" b="b"/>
+              <a:pathLst>
+                <a:path w="2026" h="2583" extrusionOk="0">
+                  <a:moveTo>
+                    <a:pt x="0" y="1"/>
+                  </a:moveTo>
+                  <a:lnTo>
+                    <a:pt x="0" y="2582"/>
+                  </a:lnTo>
+                  <a:lnTo>
+                    <a:pt x="2025" y="1317"/>
+                  </a:lnTo>
+                  <a:lnTo>
+                    <a:pt x="0" y="1"/>
+                  </a:lnTo>
+                  <a:close/>
+                </a:path>
+              </a:pathLst>
+            </a:custGeom>
+            <a:solidFill>
+              <a:schemeClr val="lt2"/>
+            </a:solidFill>
+            <a:ln>
+              <a:noFill/>
+            </a:ln>
+          </p:spPr>
+          <p:txBody>
+            <a:bodyPr spcFirstLastPara="1" wrap="square" lIns="91425" tIns="91425" rIns="91425" bIns="91425" anchor="ctr" anchorCtr="0">
+              <a:noAutofit/>
+            </a:bodyPr>
+            <a:lstStyle/>
+            <a:p>
+              <a:pPr marL="0" lvl="0" indent="0" algn="l" rtl="0">
+                <a:spcBef>
+                  <a:spcPts val="0"/>
+                </a:spcBef>
+                <a:spcAft>
+                  <a:spcPts val="0"/>
+                </a:spcAft>
+                <a:buNone/>
+              </a:pPr>
+              <a:endParaRPr/>
+            </a:p>
+          </p:txBody>
+        </p:sp>
+        <p:sp>
+          <p:nvSpPr>
+            <p:cNvPr id="2083" name="Google Shape;2083;p48"/>
+            <p:cNvSpPr/>
+            <p:nvPr/>
+          </p:nvSpPr>
+          <p:spPr>
+            <a:xfrm>
+              <a:off x="-5659315" y="3960531"/>
+              <a:ext cx="63246" cy="79862"/>
+            </a:xfrm>
+            <a:custGeom>
+              <a:avLst/>
+              <a:gdLst/>
+              <a:ahLst/>
+              <a:cxnLst/>
+              <a:rect l="l" t="t" r="r" b="b"/>
+              <a:pathLst>
+                <a:path w="2025" h="2557" extrusionOk="0">
+                  <a:moveTo>
+                    <a:pt x="2025" y="1"/>
+                  </a:moveTo>
+                  <a:lnTo>
+                    <a:pt x="0" y="1317"/>
+                  </a:lnTo>
+                  <a:lnTo>
+                    <a:pt x="2025" y="2557"/>
+                  </a:lnTo>
+                  <a:lnTo>
+                    <a:pt x="2025" y="1"/>
+                  </a:lnTo>
+                  <a:close/>
+                </a:path>
+              </a:pathLst>
+            </a:custGeom>
+            <a:solidFill>
+              <a:schemeClr val="lt2"/>
+            </a:solidFill>
+            <a:ln>
+              <a:noFill/>
+            </a:ln>
+          </p:spPr>
+          <p:txBody>
+            <a:bodyPr spcFirstLastPara="1" wrap="square" lIns="91425" tIns="91425" rIns="91425" bIns="91425" anchor="ctr" anchorCtr="0">
+              <a:noAutofit/>
+            </a:bodyPr>
+            <a:lstStyle/>
+            <a:p>
+              <a:pPr marL="0" lvl="0" indent="0" algn="l" rtl="0">
+                <a:spcBef>
+                  <a:spcPts val="0"/>
+                </a:spcBef>
+                <a:spcAft>
+                  <a:spcPts val="0"/>
+                </a:spcAft>
+                <a:buNone/>
+              </a:pPr>
+              <a:endParaRPr/>
+            </a:p>
+          </p:txBody>
+        </p:sp>
+        <p:sp>
+          <p:nvSpPr>
+            <p:cNvPr id="2084" name="Google Shape;2084;p48"/>
+            <p:cNvSpPr/>
+            <p:nvPr/>
+          </p:nvSpPr>
+          <p:spPr>
+            <a:xfrm>
+              <a:off x="-5669590" y="4023777"/>
+              <a:ext cx="398402" cy="249017"/>
+            </a:xfrm>
+            <a:custGeom>
+              <a:avLst/>
+              <a:gdLst/>
+              <a:ahLst/>
+              <a:cxnLst/>
+              <a:rect l="l" t="t" r="r" b="b"/>
+              <a:pathLst>
+                <a:path w="12756" h="7973" extrusionOk="0">
+                  <a:moveTo>
+                    <a:pt x="3113" y="5644"/>
+                  </a:moveTo>
+                  <a:lnTo>
+                    <a:pt x="3113" y="6428"/>
+                  </a:lnTo>
+                  <a:lnTo>
+                    <a:pt x="1569" y="6428"/>
+                  </a:lnTo>
+                  <a:lnTo>
+                    <a:pt x="1569" y="5644"/>
+                  </a:lnTo>
+                  <a:close/>
+                  <a:moveTo>
+                    <a:pt x="0" y="0"/>
+                  </a:moveTo>
+                  <a:lnTo>
+                    <a:pt x="0" y="7972"/>
+                  </a:lnTo>
+                  <a:lnTo>
+                    <a:pt x="12755" y="7972"/>
+                  </a:lnTo>
+                  <a:lnTo>
+                    <a:pt x="0" y="0"/>
+                  </a:lnTo>
+                  <a:close/>
+                </a:path>
+              </a:pathLst>
+            </a:custGeom>
+            <a:solidFill>
+              <a:schemeClr val="lt2"/>
+            </a:solidFill>
+            <a:ln>
+              <a:noFill/>
+            </a:ln>
+          </p:spPr>
+          <p:txBody>
+            <a:bodyPr spcFirstLastPara="1" wrap="square" lIns="91425" tIns="91425" rIns="91425" bIns="91425" anchor="ctr" anchorCtr="0">
+              <a:noAutofit/>
+            </a:bodyPr>
+            <a:lstStyle/>
+            <a:p>
+              <a:pPr marL="0" lvl="0" indent="0" algn="l" rtl="0">
+                <a:spcBef>
+                  <a:spcPts val="0"/>
+                </a:spcBef>
+                <a:spcAft>
+                  <a:spcPts val="0"/>
+                </a:spcAft>
+                <a:buNone/>
+              </a:pPr>
+              <a:endParaRPr/>
+            </a:p>
+          </p:txBody>
+        </p:sp>
+        <p:sp>
+          <p:nvSpPr>
+            <p:cNvPr id="2085" name="Google Shape;2085;p48"/>
+            <p:cNvSpPr/>
+            <p:nvPr/>
+          </p:nvSpPr>
+          <p:spPr>
+            <a:xfrm>
+              <a:off x="-5572395" y="3858557"/>
+              <a:ext cx="219002" cy="265632"/>
+            </a:xfrm>
+            <a:custGeom>
+              <a:avLst/>
+              <a:gdLst/>
+              <a:ahLst/>
+              <a:cxnLst/>
+              <a:rect l="l" t="t" r="r" b="b"/>
+              <a:pathLst>
+                <a:path w="7012" h="8505" extrusionOk="0">
+                  <a:moveTo>
+                    <a:pt x="3898" y="1190"/>
+                  </a:moveTo>
+                  <a:lnTo>
+                    <a:pt x="3898" y="1975"/>
+                  </a:lnTo>
+                  <a:lnTo>
+                    <a:pt x="4658" y="1975"/>
+                  </a:lnTo>
+                  <a:lnTo>
+                    <a:pt x="4658" y="2734"/>
+                  </a:lnTo>
+                  <a:lnTo>
+                    <a:pt x="3493" y="2734"/>
+                  </a:lnTo>
+                  <a:cubicBezTo>
+                    <a:pt x="3291" y="2734"/>
+                    <a:pt x="3114" y="2911"/>
+                    <a:pt x="3114" y="3139"/>
+                  </a:cubicBezTo>
+                  <a:lnTo>
+                    <a:pt x="3114" y="3519"/>
+                  </a:lnTo>
+                  <a:lnTo>
+                    <a:pt x="4658" y="3519"/>
+                  </a:lnTo>
+                  <a:lnTo>
+                    <a:pt x="4658" y="4683"/>
+                  </a:lnTo>
+                  <a:cubicBezTo>
+                    <a:pt x="4658" y="5189"/>
+                    <a:pt x="4329" y="5619"/>
+                    <a:pt x="3898" y="5771"/>
+                  </a:cubicBezTo>
+                  <a:lnTo>
+                    <a:pt x="3898" y="6632"/>
+                  </a:lnTo>
+                  <a:lnTo>
+                    <a:pt x="3114" y="6632"/>
+                  </a:lnTo>
+                  <a:lnTo>
+                    <a:pt x="3114" y="5847"/>
+                  </a:lnTo>
+                  <a:lnTo>
+                    <a:pt x="2329" y="5847"/>
+                  </a:lnTo>
+                  <a:lnTo>
+                    <a:pt x="2329" y="5088"/>
+                  </a:lnTo>
+                  <a:lnTo>
+                    <a:pt x="3493" y="5088"/>
+                  </a:lnTo>
+                  <a:cubicBezTo>
+                    <a:pt x="3721" y="5088"/>
+                    <a:pt x="3898" y="4911"/>
+                    <a:pt x="3898" y="4683"/>
+                  </a:cubicBezTo>
+                  <a:lnTo>
+                    <a:pt x="3898" y="4303"/>
+                  </a:lnTo>
+                  <a:lnTo>
+                    <a:pt x="2329" y="4303"/>
+                  </a:lnTo>
+                  <a:lnTo>
+                    <a:pt x="2329" y="3139"/>
+                  </a:lnTo>
+                  <a:cubicBezTo>
+                    <a:pt x="2329" y="2633"/>
+                    <a:pt x="2658" y="2203"/>
+                    <a:pt x="3114" y="2051"/>
+                  </a:cubicBezTo>
+                  <a:lnTo>
+                    <a:pt x="3114" y="1190"/>
+                  </a:lnTo>
+                  <a:close/>
+                  <a:moveTo>
+                    <a:pt x="1" y="1"/>
+                  </a:moveTo>
+                  <a:lnTo>
+                    <a:pt x="1" y="6328"/>
+                  </a:lnTo>
+                  <a:lnTo>
+                    <a:pt x="3519" y="8504"/>
+                  </a:lnTo>
+                  <a:lnTo>
+                    <a:pt x="7011" y="6328"/>
+                  </a:lnTo>
+                  <a:lnTo>
+                    <a:pt x="7011" y="1"/>
+                  </a:lnTo>
+                  <a:close/>
+                </a:path>
+              </a:pathLst>
+            </a:custGeom>
+            <a:solidFill>
+              <a:schemeClr val="lt2"/>
+            </a:solidFill>
+            <a:ln>
+              <a:noFill/>
+            </a:ln>
+          </p:spPr>
+          <p:txBody>
+            <a:bodyPr spcFirstLastPara="1" wrap="square" lIns="91425" tIns="91425" rIns="91425" bIns="91425" anchor="ctr" anchorCtr="0">
+              <a:noAutofit/>
+            </a:bodyPr>
+            <a:lstStyle/>
+            <a:p>
+              <a:pPr marL="0" lvl="0" indent="0" algn="l" rtl="0">
+                <a:spcBef>
+                  <a:spcPts val="0"/>
+                </a:spcBef>
+                <a:spcAft>
+                  <a:spcPts val="0"/>
+                </a:spcAft>
+                <a:buNone/>
+              </a:pPr>
+              <a:endParaRPr/>
+            </a:p>
+          </p:txBody>
+        </p:sp>
+      </p:grpSp>
+      <p:grpSp>
+        <p:nvGrpSpPr>
+          <p:cNvPr id="2086" name="Google Shape;2086;p48"/>
+          <p:cNvGrpSpPr/>
+          <p:nvPr/>
+        </p:nvGrpSpPr>
+        <p:grpSpPr>
+          <a:xfrm>
+            <a:off x="5029611" y="3940194"/>
+            <a:ext cx="571788" cy="612651"/>
+            <a:chOff x="-3393959" y="3835664"/>
+            <a:chExt cx="388126" cy="414205"/>
+          </a:xfrm>
+        </p:grpSpPr>
+        <p:sp>
+          <p:nvSpPr>
+            <p:cNvPr id="2087" name="Google Shape;2087;p48"/>
+            <p:cNvSpPr/>
+            <p:nvPr/>
+          </p:nvSpPr>
+          <p:spPr>
+            <a:xfrm>
+              <a:off x="-3187668" y="3835664"/>
+              <a:ext cx="181836" cy="181804"/>
+            </a:xfrm>
+            <a:custGeom>
+              <a:avLst/>
+              <a:gdLst/>
+              <a:ahLst/>
+              <a:cxnLst/>
+              <a:rect l="l" t="t" r="r" b="b"/>
+              <a:pathLst>
+                <a:path w="5822" h="5821" extrusionOk="0">
+                  <a:moveTo>
+                    <a:pt x="1" y="0"/>
+                  </a:moveTo>
+                  <a:lnTo>
+                    <a:pt x="1" y="785"/>
+                  </a:lnTo>
+                  <a:cubicBezTo>
+                    <a:pt x="2784" y="785"/>
+                    <a:pt x="5062" y="3037"/>
+                    <a:pt x="5062" y="5821"/>
+                  </a:cubicBezTo>
+                  <a:lnTo>
+                    <a:pt x="5821" y="5821"/>
+                  </a:lnTo>
+                  <a:cubicBezTo>
+                    <a:pt x="5821" y="2607"/>
+                    <a:pt x="3215" y="0"/>
+                    <a:pt x="1" y="0"/>
+                  </a:cubicBezTo>
+                  <a:close/>
+                </a:path>
+              </a:pathLst>
+            </a:custGeom>
+            <a:solidFill>
+              <a:schemeClr val="accent1"/>
+            </a:solidFill>
+            <a:ln>
+              <a:noFill/>
+            </a:ln>
+          </p:spPr>
+          <p:txBody>
+            <a:bodyPr spcFirstLastPara="1" wrap="square" lIns="91425" tIns="91425" rIns="91425" bIns="91425" anchor="ctr" anchorCtr="0">
+              <a:noAutofit/>
+            </a:bodyPr>
+            <a:lstStyle/>
+            <a:p>
+              <a:pPr marL="0" lvl="0" indent="0" algn="l" rtl="0">
+                <a:spcBef>
+                  <a:spcPts val="0"/>
+                </a:spcBef>
+                <a:spcAft>
+                  <a:spcPts val="0"/>
+                </a:spcAft>
+                <a:buNone/>
+              </a:pPr>
+              <a:endParaRPr/>
+            </a:p>
+          </p:txBody>
+        </p:sp>
+        <p:sp>
+          <p:nvSpPr>
+            <p:cNvPr id="2088" name="Google Shape;2088;p48"/>
+            <p:cNvSpPr/>
+            <p:nvPr/>
+          </p:nvSpPr>
+          <p:spPr>
+            <a:xfrm>
+              <a:off x="-3187668" y="3883856"/>
+              <a:ext cx="133613" cy="133613"/>
+            </a:xfrm>
+            <a:custGeom>
+              <a:avLst/>
+              <a:gdLst/>
+              <a:ahLst/>
+              <a:cxnLst/>
+              <a:rect l="l" t="t" r="r" b="b"/>
+              <a:pathLst>
+                <a:path w="4278" h="4278" extrusionOk="0">
+                  <a:moveTo>
+                    <a:pt x="1" y="1"/>
+                  </a:moveTo>
+                  <a:lnTo>
+                    <a:pt x="1" y="785"/>
+                  </a:lnTo>
+                  <a:cubicBezTo>
+                    <a:pt x="1924" y="785"/>
+                    <a:pt x="3493" y="2354"/>
+                    <a:pt x="3493" y="4278"/>
+                  </a:cubicBezTo>
+                  <a:lnTo>
+                    <a:pt x="4278" y="4278"/>
+                  </a:lnTo>
+                  <a:cubicBezTo>
+                    <a:pt x="4278" y="1924"/>
+                    <a:pt x="2354" y="1"/>
+                    <a:pt x="1" y="1"/>
+                  </a:cubicBezTo>
+                  <a:close/>
+                </a:path>
+              </a:pathLst>
+            </a:custGeom>
+            <a:solidFill>
+              <a:schemeClr val="accent1"/>
+            </a:solidFill>
+            <a:ln>
+              <a:noFill/>
+            </a:ln>
+          </p:spPr>
+          <p:txBody>
+            <a:bodyPr spcFirstLastPara="1" wrap="square" lIns="91425" tIns="91425" rIns="91425" bIns="91425" anchor="ctr" anchorCtr="0">
+              <a:noAutofit/>
+            </a:bodyPr>
+            <a:lstStyle/>
+            <a:p>
+              <a:pPr marL="0" lvl="0" indent="0" algn="l" rtl="0">
+                <a:spcBef>
+                  <a:spcPts val="0"/>
+                </a:spcBef>
+                <a:spcAft>
+                  <a:spcPts val="0"/>
+                </a:spcAft>
+                <a:buNone/>
+              </a:pPr>
+              <a:endParaRPr/>
+            </a:p>
+          </p:txBody>
+        </p:sp>
+        <p:sp>
+          <p:nvSpPr>
+            <p:cNvPr id="2089" name="Google Shape;2089;p48"/>
+            <p:cNvSpPr/>
+            <p:nvPr/>
+          </p:nvSpPr>
+          <p:spPr>
+            <a:xfrm>
+              <a:off x="-3187668" y="3932859"/>
+              <a:ext cx="84609" cy="84609"/>
+            </a:xfrm>
+            <a:custGeom>
+              <a:avLst/>
+              <a:gdLst/>
+              <a:ahLst/>
+              <a:cxnLst/>
+              <a:rect l="l" t="t" r="r" b="b"/>
+              <a:pathLst>
+                <a:path w="2709" h="2709" extrusionOk="0">
+                  <a:moveTo>
+                    <a:pt x="1" y="1"/>
+                  </a:moveTo>
+                  <a:lnTo>
+                    <a:pt x="1" y="760"/>
+                  </a:lnTo>
+                  <a:cubicBezTo>
+                    <a:pt x="1063" y="760"/>
+                    <a:pt x="1949" y="1646"/>
+                    <a:pt x="1949" y="2709"/>
+                  </a:cubicBezTo>
+                  <a:lnTo>
+                    <a:pt x="2708" y="2709"/>
+                  </a:lnTo>
+                  <a:cubicBezTo>
+                    <a:pt x="2708" y="1216"/>
+                    <a:pt x="1494" y="1"/>
+                    <a:pt x="1" y="1"/>
+                  </a:cubicBezTo>
+                  <a:close/>
+                </a:path>
+              </a:pathLst>
+            </a:custGeom>
+            <a:solidFill>
+              <a:schemeClr val="accent1"/>
+            </a:solidFill>
+            <a:ln>
+              <a:noFill/>
+            </a:ln>
+          </p:spPr>
+          <p:txBody>
+            <a:bodyPr spcFirstLastPara="1" wrap="square" lIns="91425" tIns="91425" rIns="91425" bIns="91425" anchor="ctr" anchorCtr="0">
+              <a:noAutofit/>
+            </a:bodyPr>
+            <a:lstStyle/>
+            <a:p>
+              <a:pPr marL="0" lvl="0" indent="0" algn="l" rtl="0">
+                <a:spcBef>
+                  <a:spcPts val="0"/>
+                </a:spcBef>
+                <a:spcAft>
+                  <a:spcPts val="0"/>
+                </a:spcAft>
+                <a:buNone/>
+              </a:pPr>
+              <a:endParaRPr/>
+            </a:p>
+          </p:txBody>
+        </p:sp>
+        <p:sp>
+          <p:nvSpPr>
+            <p:cNvPr id="2090" name="Google Shape;2090;p48"/>
+            <p:cNvSpPr/>
+            <p:nvPr/>
+          </p:nvSpPr>
+          <p:spPr>
+            <a:xfrm>
+              <a:off x="-3199537" y="3981082"/>
+              <a:ext cx="48254" cy="48254"/>
+            </a:xfrm>
+            <a:custGeom>
+              <a:avLst/>
+              <a:gdLst/>
+              <a:ahLst/>
+              <a:cxnLst/>
+              <a:rect l="l" t="t" r="r" b="b"/>
+              <a:pathLst>
+                <a:path w="1545" h="1545" extrusionOk="0">
+                  <a:moveTo>
+                    <a:pt x="785" y="1"/>
+                  </a:moveTo>
+                  <a:cubicBezTo>
+                    <a:pt x="355" y="1"/>
+                    <a:pt x="1" y="355"/>
+                    <a:pt x="1" y="785"/>
+                  </a:cubicBezTo>
+                  <a:cubicBezTo>
+                    <a:pt x="1" y="1215"/>
+                    <a:pt x="355" y="1544"/>
+                    <a:pt x="785" y="1544"/>
+                  </a:cubicBezTo>
+                  <a:cubicBezTo>
+                    <a:pt x="1190" y="1544"/>
+                    <a:pt x="1545" y="1215"/>
+                    <a:pt x="1545" y="785"/>
+                  </a:cubicBezTo>
+                  <a:cubicBezTo>
+                    <a:pt x="1545" y="355"/>
+                    <a:pt x="1190" y="1"/>
+                    <a:pt x="785" y="1"/>
+                  </a:cubicBezTo>
+                  <a:close/>
+                </a:path>
+              </a:pathLst>
+            </a:custGeom>
+            <a:solidFill>
+              <a:schemeClr val="accent1"/>
+            </a:solidFill>
+            <a:ln>
+              <a:noFill/>
+            </a:ln>
+          </p:spPr>
+          <p:txBody>
+            <a:bodyPr spcFirstLastPara="1" wrap="square" lIns="91425" tIns="91425" rIns="91425" bIns="91425" anchor="ctr" anchorCtr="0">
+              <a:noAutofit/>
+            </a:bodyPr>
+            <a:lstStyle/>
+            <a:p>
+              <a:pPr marL="0" lvl="0" indent="0" algn="l" rtl="0">
+                <a:spcBef>
+                  <a:spcPts val="0"/>
+                </a:spcBef>
+                <a:spcAft>
+                  <a:spcPts val="0"/>
+                </a:spcAft>
+                <a:buNone/>
+              </a:pPr>
+              <a:endParaRPr/>
+            </a:p>
+          </p:txBody>
+        </p:sp>
+        <p:sp>
+          <p:nvSpPr>
+            <p:cNvPr id="2091" name="Google Shape;2091;p48"/>
+            <p:cNvSpPr/>
+            <p:nvPr/>
+          </p:nvSpPr>
+          <p:spPr>
+            <a:xfrm>
+              <a:off x="-3393959" y="3981082"/>
+              <a:ext cx="267194" cy="268787"/>
+            </a:xfrm>
+            <a:custGeom>
+              <a:avLst/>
+              <a:gdLst/>
+              <a:ahLst/>
+              <a:cxnLst/>
+              <a:rect l="l" t="t" r="r" b="b"/>
+              <a:pathLst>
+                <a:path w="8555" h="8606" extrusionOk="0">
+                  <a:moveTo>
+                    <a:pt x="4657" y="1544"/>
+                  </a:moveTo>
+                  <a:lnTo>
+                    <a:pt x="4657" y="2329"/>
+                  </a:lnTo>
+                  <a:lnTo>
+                    <a:pt x="5441" y="2329"/>
+                  </a:lnTo>
+                  <a:lnTo>
+                    <a:pt x="5441" y="3113"/>
+                  </a:lnTo>
+                  <a:lnTo>
+                    <a:pt x="4277" y="3113"/>
+                  </a:lnTo>
+                  <a:cubicBezTo>
+                    <a:pt x="4049" y="3113"/>
+                    <a:pt x="3898" y="3291"/>
+                    <a:pt x="3898" y="3493"/>
+                  </a:cubicBezTo>
+                  <a:lnTo>
+                    <a:pt x="3898" y="3873"/>
+                  </a:lnTo>
+                  <a:lnTo>
+                    <a:pt x="5441" y="3873"/>
+                  </a:lnTo>
+                  <a:lnTo>
+                    <a:pt x="5441" y="5062"/>
+                  </a:lnTo>
+                  <a:cubicBezTo>
+                    <a:pt x="5441" y="5568"/>
+                    <a:pt x="5112" y="5973"/>
+                    <a:pt x="4657" y="6150"/>
+                  </a:cubicBezTo>
+                  <a:lnTo>
+                    <a:pt x="4657" y="6986"/>
+                  </a:lnTo>
+                  <a:lnTo>
+                    <a:pt x="3898" y="6986"/>
+                  </a:lnTo>
+                  <a:lnTo>
+                    <a:pt x="3898" y="6226"/>
+                  </a:lnTo>
+                  <a:lnTo>
+                    <a:pt x="3113" y="6226"/>
+                  </a:lnTo>
+                  <a:lnTo>
+                    <a:pt x="3113" y="5442"/>
+                  </a:lnTo>
+                  <a:lnTo>
+                    <a:pt x="4277" y="5442"/>
+                  </a:lnTo>
+                  <a:cubicBezTo>
+                    <a:pt x="4505" y="5442"/>
+                    <a:pt x="4682" y="5265"/>
+                    <a:pt x="4682" y="5062"/>
+                  </a:cubicBezTo>
+                  <a:lnTo>
+                    <a:pt x="4682" y="4657"/>
+                  </a:lnTo>
+                  <a:lnTo>
+                    <a:pt x="3113" y="4657"/>
+                  </a:lnTo>
+                  <a:lnTo>
+                    <a:pt x="3113" y="3493"/>
+                  </a:lnTo>
+                  <a:cubicBezTo>
+                    <a:pt x="3113" y="2987"/>
+                    <a:pt x="3442" y="2557"/>
+                    <a:pt x="3898" y="2405"/>
+                  </a:cubicBezTo>
+                  <a:lnTo>
+                    <a:pt x="3898" y="1544"/>
+                  </a:lnTo>
+                  <a:close/>
+                  <a:moveTo>
+                    <a:pt x="4277" y="1"/>
+                  </a:moveTo>
+                  <a:cubicBezTo>
+                    <a:pt x="1924" y="1"/>
+                    <a:pt x="0" y="1924"/>
+                    <a:pt x="0" y="4278"/>
+                  </a:cubicBezTo>
+                  <a:cubicBezTo>
+                    <a:pt x="0" y="6631"/>
+                    <a:pt x="1924" y="8605"/>
+                    <a:pt x="4277" y="8605"/>
+                  </a:cubicBezTo>
+                  <a:cubicBezTo>
+                    <a:pt x="6631" y="8605"/>
+                    <a:pt x="8554" y="6631"/>
+                    <a:pt x="8554" y="4278"/>
+                  </a:cubicBezTo>
+                  <a:cubicBezTo>
+                    <a:pt x="8554" y="3442"/>
+                    <a:pt x="8301" y="2683"/>
+                    <a:pt x="7922" y="2025"/>
+                  </a:cubicBezTo>
+                  <a:cubicBezTo>
+                    <a:pt x="7643" y="2228"/>
+                    <a:pt x="7339" y="2329"/>
+                    <a:pt x="7010" y="2329"/>
+                  </a:cubicBezTo>
+                  <a:cubicBezTo>
+                    <a:pt x="6150" y="2329"/>
+                    <a:pt x="5441" y="1646"/>
+                    <a:pt x="5441" y="785"/>
+                  </a:cubicBezTo>
+                  <a:cubicBezTo>
+                    <a:pt x="5441" y="583"/>
+                    <a:pt x="5492" y="380"/>
+                    <a:pt x="5568" y="203"/>
+                  </a:cubicBezTo>
+                  <a:cubicBezTo>
+                    <a:pt x="5163" y="77"/>
+                    <a:pt x="4733" y="1"/>
+                    <a:pt x="4277" y="1"/>
+                  </a:cubicBezTo>
+                  <a:close/>
+                </a:path>
+              </a:pathLst>
+            </a:custGeom>
+            <a:solidFill>
+              <a:schemeClr val="accent1"/>
+            </a:solidFill>
+            <a:ln>
+              <a:noFill/>
+            </a:ln>
+          </p:spPr>
+          <p:txBody>
+            <a:bodyPr spcFirstLastPara="1" wrap="square" lIns="91425" tIns="91425" rIns="91425" bIns="91425" anchor="ctr" anchorCtr="0">
+              <a:noAutofit/>
+            </a:bodyPr>
+            <a:lstStyle/>
+            <a:p>
+              <a:pPr marL="0" lvl="0" indent="0" algn="l" rtl="0">
+                <a:spcBef>
+                  <a:spcPts val="0"/>
+                </a:spcBef>
+                <a:spcAft>
+                  <a:spcPts val="0"/>
+                </a:spcAft>
+                <a:buNone/>
+              </a:pPr>
+              <a:endParaRPr/>
+            </a:p>
+          </p:txBody>
+        </p:sp>
+      </p:grpSp>
+      <p:sp>
+        <p:nvSpPr>
+          <p:cNvPr id="2065" name="Google Shape;2065;p48"/>
+          <p:cNvSpPr/>
+          <p:nvPr/>
+        </p:nvSpPr>
+        <p:spPr>
+          <a:xfrm>
+            <a:off x="763864" y="1515650"/>
+            <a:ext cx="3372300" cy="554100"/>
+          </a:xfrm>
+          <a:prstGeom prst="roundRect">
+            <a:avLst>
+              <a:gd name="adj" fmla="val 16667"/>
+            </a:avLst>
+          </a:prstGeom>
+          <a:solidFill>
+            <a:schemeClr val="lt2"/>
+          </a:solidFill>
+          <a:ln>
+            <a:noFill/>
+          </a:ln>
+        </p:spPr>
+        <p:txBody>
+          <a:bodyPr spcFirstLastPara="1" wrap="square" lIns="91425" tIns="91425" rIns="91425" bIns="91425" anchor="ctr" anchorCtr="0">
+            <a:noAutofit/>
+          </a:bodyPr>
+          <a:lstStyle/>
+          <a:p>
+            <a:pPr marL="0" lvl="0" indent="0" algn="ctr" rtl="0">
+              <a:spcBef>
+                <a:spcPts val="0"/>
+              </a:spcBef>
+              <a:spcAft>
+                <a:spcPts val="0"/>
+              </a:spcAft>
+              <a:buNone/>
+            </a:pPr>
+            <a:r>
+              <a:rPr lang="en" sz="2200" dirty="0">
+                <a:solidFill>
+                  <a:schemeClr val="lt1"/>
+                </a:solidFill>
+                <a:latin typeface="Manrope SemiBold"/>
+                <a:ea typeface="Manrope"/>
+                <a:cs typeface="Manrope"/>
+                <a:sym typeface="Manrope SemiBold"/>
+              </a:rPr>
+              <a:t>DIRETOS</a:t>
+            </a:r>
+            <a:endParaRPr sz="2200" dirty="0">
+              <a:latin typeface="Manrope"/>
+              <a:ea typeface="Manrope"/>
+              <a:cs typeface="Manrope"/>
+              <a:sym typeface="Manrope"/>
+            </a:endParaRPr>
+          </a:p>
+        </p:txBody>
+      </p:sp>
+      <p:sp>
+        <p:nvSpPr>
+          <p:cNvPr id="2066" name="Google Shape;2066;p48"/>
+          <p:cNvSpPr/>
+          <p:nvPr/>
+        </p:nvSpPr>
+        <p:spPr>
+          <a:xfrm>
+            <a:off x="5007839" y="1515650"/>
+            <a:ext cx="3372300" cy="554100"/>
+          </a:xfrm>
+          <a:prstGeom prst="roundRect">
+            <a:avLst>
+              <a:gd name="adj" fmla="val 16667"/>
+            </a:avLst>
+          </a:prstGeom>
+          <a:solidFill>
+            <a:schemeClr val="accent1"/>
+          </a:solidFill>
+          <a:ln>
+            <a:noFill/>
+          </a:ln>
+        </p:spPr>
+        <p:txBody>
+          <a:bodyPr spcFirstLastPara="1" wrap="square" lIns="91425" tIns="91425" rIns="91425" bIns="91425" anchor="ctr" anchorCtr="0">
+            <a:noAutofit/>
+          </a:bodyPr>
+          <a:lstStyle/>
+          <a:p>
+            <a:pPr marL="0" lvl="0" indent="0" algn="ctr" rtl="0">
+              <a:spcBef>
+                <a:spcPts val="0"/>
+              </a:spcBef>
+              <a:spcAft>
+                <a:spcPts val="0"/>
+              </a:spcAft>
+              <a:buNone/>
+            </a:pPr>
+            <a:r>
+              <a:rPr lang="en" sz="2200" dirty="0">
+                <a:solidFill>
+                  <a:schemeClr val="lt1"/>
+                </a:solidFill>
+                <a:latin typeface="Manrope SemiBold"/>
+                <a:ea typeface="Manrope"/>
+                <a:cs typeface="Manrope"/>
+                <a:sym typeface="Manrope SemiBold"/>
+              </a:rPr>
+              <a:t>INDIRETOS</a:t>
+            </a:r>
+            <a:endParaRPr sz="2200" dirty="0">
+              <a:latin typeface="Manrope"/>
+              <a:ea typeface="Manrope"/>
+              <a:cs typeface="Manrope"/>
+              <a:sym typeface="Manrope"/>
+            </a:endParaRPr>
+          </a:p>
+        </p:txBody>
+      </p:sp>
+    </p:spTree>
+  </p:cSld>
+  <p:clrMapOvr>
+    <a:masterClrMapping/>
+  </p:clrMapOvr>
+</p:sld>
+</file>
+
+<file path=ppt/slides/slide8.xml><?xml version="1.0" encoding="utf-8"?>
+<p:sld xmlns:a="http://schemas.openxmlformats.org/drawingml/2006/main" xmlns:r="http://schemas.openxmlformats.org/officeDocument/2006/relationships" xmlns:p="http://schemas.openxmlformats.org/presentationml/2006/main">
+  <p:cSld>
+    <p:spTree>
+      <p:nvGrpSpPr>
         <p:cNvPr id="1" name="Shape 2412"/>
         <p:cNvGrpSpPr/>
         <p:nvPr/>

</xml_diff>